<commit_message>
just some adjustments in power point
</commit_message>
<xml_diff>
--- a/WaterHeater.pptx
+++ b/WaterHeater.pptx
@@ -291,7 +291,7 @@
           <a:p>
             <a:fld id="{B6D12BD2-B651-4952-86A6-7B4BE9DDEA50}" type="datetimeFigureOut">
               <a:rPr lang="en-US" smtClean="0"/>
-              <a:t>15-Jul-20</a:t>
+              <a:t>16-Jul-20</a:t>
             </a:fld>
             <a:endParaRPr lang="en-US"/>
           </a:p>
@@ -461,7 +461,7 @@
           <a:p>
             <a:fld id="{B6D12BD2-B651-4952-86A6-7B4BE9DDEA50}" type="datetimeFigureOut">
               <a:rPr lang="en-US" smtClean="0"/>
-              <a:t>15-Jul-20</a:t>
+              <a:t>16-Jul-20</a:t>
             </a:fld>
             <a:endParaRPr lang="en-US"/>
           </a:p>
@@ -641,7 +641,7 @@
           <a:p>
             <a:fld id="{B6D12BD2-B651-4952-86A6-7B4BE9DDEA50}" type="datetimeFigureOut">
               <a:rPr lang="en-US" smtClean="0"/>
-              <a:t>15-Jul-20</a:t>
+              <a:t>16-Jul-20</a:t>
             </a:fld>
             <a:endParaRPr lang="en-US"/>
           </a:p>
@@ -811,7 +811,7 @@
           <a:p>
             <a:fld id="{B6D12BD2-B651-4952-86A6-7B4BE9DDEA50}" type="datetimeFigureOut">
               <a:rPr lang="en-US" smtClean="0"/>
-              <a:t>15-Jul-20</a:t>
+              <a:t>16-Jul-20</a:t>
             </a:fld>
             <a:endParaRPr lang="en-US"/>
           </a:p>
@@ -1057,7 +1057,7 @@
           <a:p>
             <a:fld id="{B6D12BD2-B651-4952-86A6-7B4BE9DDEA50}" type="datetimeFigureOut">
               <a:rPr lang="en-US" smtClean="0"/>
-              <a:t>15-Jul-20</a:t>
+              <a:t>16-Jul-20</a:t>
             </a:fld>
             <a:endParaRPr lang="en-US"/>
           </a:p>
@@ -1345,7 +1345,7 @@
           <a:p>
             <a:fld id="{B6D12BD2-B651-4952-86A6-7B4BE9DDEA50}" type="datetimeFigureOut">
               <a:rPr lang="en-US" smtClean="0"/>
-              <a:t>15-Jul-20</a:t>
+              <a:t>16-Jul-20</a:t>
             </a:fld>
             <a:endParaRPr lang="en-US"/>
           </a:p>
@@ -1767,7 +1767,7 @@
           <a:p>
             <a:fld id="{B6D12BD2-B651-4952-86A6-7B4BE9DDEA50}" type="datetimeFigureOut">
               <a:rPr lang="en-US" smtClean="0"/>
-              <a:t>15-Jul-20</a:t>
+              <a:t>16-Jul-20</a:t>
             </a:fld>
             <a:endParaRPr lang="en-US"/>
           </a:p>
@@ -1885,7 +1885,7 @@
           <a:p>
             <a:fld id="{B6D12BD2-B651-4952-86A6-7B4BE9DDEA50}" type="datetimeFigureOut">
               <a:rPr lang="en-US" smtClean="0"/>
-              <a:t>15-Jul-20</a:t>
+              <a:t>16-Jul-20</a:t>
             </a:fld>
             <a:endParaRPr lang="en-US"/>
           </a:p>
@@ -1980,7 +1980,7 @@
           <a:p>
             <a:fld id="{B6D12BD2-B651-4952-86A6-7B4BE9DDEA50}" type="datetimeFigureOut">
               <a:rPr lang="en-US" smtClean="0"/>
-              <a:t>15-Jul-20</a:t>
+              <a:t>16-Jul-20</a:t>
             </a:fld>
             <a:endParaRPr lang="en-US"/>
           </a:p>
@@ -2257,7 +2257,7 @@
           <a:p>
             <a:fld id="{B6D12BD2-B651-4952-86A6-7B4BE9DDEA50}" type="datetimeFigureOut">
               <a:rPr lang="en-US" smtClean="0"/>
-              <a:t>15-Jul-20</a:t>
+              <a:t>16-Jul-20</a:t>
             </a:fld>
             <a:endParaRPr lang="en-US"/>
           </a:p>
@@ -2510,7 +2510,7 @@
           <a:p>
             <a:fld id="{B6D12BD2-B651-4952-86A6-7B4BE9DDEA50}" type="datetimeFigureOut">
               <a:rPr lang="en-US" smtClean="0"/>
-              <a:t>15-Jul-20</a:t>
+              <a:t>16-Jul-20</a:t>
             </a:fld>
             <a:endParaRPr lang="en-US"/>
           </a:p>
@@ -2723,7 +2723,7 @@
           <a:p>
             <a:fld id="{B6D12BD2-B651-4952-86A6-7B4BE9DDEA50}" type="datetimeFigureOut">
               <a:rPr lang="en-US" smtClean="0"/>
-              <a:t>15-Jul-20</a:t>
+              <a:t>16-Jul-20</a:t>
             </a:fld>
             <a:endParaRPr lang="en-US"/>
           </a:p>
@@ -3219,8 +3219,8 @@
         </p:nvSpPr>
         <p:spPr>
           <a:xfrm>
-            <a:off x="1717257" y="1893433"/>
-            <a:ext cx="6172200" cy="4237265"/>
+            <a:off x="1743724" y="1914137"/>
+            <a:ext cx="6172200" cy="4521068"/>
           </a:xfrm>
           <a:prstGeom prst="rect">
             <a:avLst/>
@@ -3263,8 +3263,8 @@
         </p:nvSpPr>
         <p:spPr>
           <a:xfrm>
-            <a:off x="1817912" y="5018316"/>
-            <a:ext cx="952500" cy="631370"/>
+            <a:off x="1743724" y="5506131"/>
+            <a:ext cx="1027695" cy="495299"/>
           </a:xfrm>
           <a:prstGeom prst="rect">
             <a:avLst/>
@@ -3321,8 +3321,8 @@
         </p:nvSpPr>
         <p:spPr>
           <a:xfrm>
-            <a:off x="1924047" y="2013857"/>
-            <a:ext cx="990600" cy="381000"/>
+            <a:off x="1773434" y="2013857"/>
+            <a:ext cx="898510" cy="381000"/>
           </a:xfrm>
           <a:prstGeom prst="rect">
             <a:avLst/>
@@ -3379,8 +3379,8 @@
         </p:nvSpPr>
         <p:spPr>
           <a:xfrm>
-            <a:off x="7889457" y="4800600"/>
-            <a:ext cx="1254542" cy="734786"/>
+            <a:off x="7915923" y="4759098"/>
+            <a:ext cx="1228075" cy="1242332"/>
           </a:xfrm>
           <a:prstGeom prst="rect">
             <a:avLst/>
@@ -3437,8 +3437,8 @@
         </p:nvSpPr>
         <p:spPr>
           <a:xfrm>
-            <a:off x="1817912" y="3132364"/>
-            <a:ext cx="1202871" cy="1592036"/>
+            <a:off x="1773434" y="3132364"/>
+            <a:ext cx="1247349" cy="1592036"/>
           </a:xfrm>
           <a:prstGeom prst="rect">
             <a:avLst/>
@@ -3495,8 +3495,8 @@
         </p:nvSpPr>
         <p:spPr>
           <a:xfrm>
-            <a:off x="5705475" y="2013857"/>
-            <a:ext cx="952500" cy="381000"/>
+            <a:off x="5562600" y="1915885"/>
+            <a:ext cx="1095375" cy="478972"/>
           </a:xfrm>
           <a:prstGeom prst="rect">
             <a:avLst/>
@@ -3785,7 +3785,7 @@
         </p:nvSpPr>
         <p:spPr>
           <a:xfrm>
-            <a:off x="-10885" y="5040086"/>
+            <a:off x="10887" y="5544054"/>
             <a:ext cx="1061356" cy="609600"/>
           </a:xfrm>
           <a:prstGeom prst="rect">
@@ -4227,13 +4227,15 @@
       <p:cxnSp>
         <p:nvCxnSpPr>
           <p:cNvPr id="41" name="Straight Arrow Connector 40"/>
-          <p:cNvCxnSpPr/>
+          <p:cNvCxnSpPr>
+            <a:stCxn id="19" idx="3"/>
+          </p:cNvCxnSpPr>
           <p:nvPr/>
         </p:nvCxnSpPr>
         <p:spPr>
           <a:xfrm flipV="1">
-            <a:off x="1050471" y="5327199"/>
-            <a:ext cx="666786" cy="17688"/>
+            <a:off x="1072243" y="5840010"/>
+            <a:ext cx="609415" cy="8844"/>
           </a:xfrm>
           <a:prstGeom prst="straightConnector1">
             <a:avLst/>
@@ -4308,8 +4310,8 @@
         </p:nvSpPr>
         <p:spPr>
           <a:xfrm>
-            <a:off x="4272636" y="2013857"/>
-            <a:ext cx="1094017" cy="381000"/>
+            <a:off x="3858921" y="2013856"/>
+            <a:ext cx="1583251" cy="505813"/>
           </a:xfrm>
           <a:prstGeom prst="rect">
             <a:avLst/>
@@ -4402,8 +4404,8 @@
         </p:nvCxnSpPr>
         <p:spPr>
           <a:xfrm>
-            <a:off x="2935740" y="2188028"/>
-            <a:ext cx="1357989" cy="0"/>
+            <a:off x="2671944" y="2188028"/>
+            <a:ext cx="1186977" cy="1"/>
           </a:xfrm>
           <a:prstGeom prst="straightConnector1">
             <a:avLst/>
@@ -4430,16 +4432,13 @@
       <p:cxnSp>
         <p:nvCxnSpPr>
           <p:cNvPr id="59" name="Straight Arrow Connector 58"/>
-          <p:cNvCxnSpPr>
-            <a:stCxn id="43" idx="2"/>
-            <a:endCxn id="15" idx="0"/>
-          </p:cNvCxnSpPr>
+          <p:cNvCxnSpPr/>
           <p:nvPr/>
         </p:nvCxnSpPr>
         <p:spPr>
-          <a:xfrm>
-            <a:off x="4819645" y="2394857"/>
-            <a:ext cx="5785" cy="1315811"/>
+          <a:xfrm flipH="1">
+            <a:off x="4803357" y="2525486"/>
+            <a:ext cx="8129" cy="1152525"/>
           </a:xfrm>
           <a:prstGeom prst="straightConnector1">
             <a:avLst/>
@@ -4471,8 +4470,8 @@
         </p:nvSpPr>
         <p:spPr>
           <a:xfrm>
-            <a:off x="5366653" y="5086351"/>
-            <a:ext cx="990600" cy="552449"/>
+            <a:off x="5384335" y="5506131"/>
+            <a:ext cx="990600" cy="473528"/>
           </a:xfrm>
           <a:prstGeom prst="rect">
             <a:avLst/>
@@ -4529,7 +4528,7 @@
         </p:nvSpPr>
         <p:spPr>
           <a:xfrm>
-            <a:off x="3492269" y="5116287"/>
+            <a:off x="3522475" y="5506131"/>
             <a:ext cx="1350510" cy="495299"/>
           </a:xfrm>
           <a:prstGeom prst="rect">
@@ -4593,13 +4592,16 @@
       <p:cxnSp>
         <p:nvCxnSpPr>
           <p:cNvPr id="65" name="Straight Arrow Connector 64"/>
-          <p:cNvCxnSpPr/>
+          <p:cNvCxnSpPr>
+            <a:stCxn id="8" idx="3"/>
+            <a:endCxn id="61" idx="1"/>
+          </p:cNvCxnSpPr>
           <p:nvPr/>
         </p:nvCxnSpPr>
         <p:spPr>
-          <a:xfrm flipV="1">
-            <a:off x="2771419" y="5327199"/>
-            <a:ext cx="721857" cy="6802"/>
+          <a:xfrm>
+            <a:off x="2771419" y="5753781"/>
+            <a:ext cx="751056" cy="0"/>
           </a:xfrm>
           <a:prstGeom prst="straightConnector1">
             <a:avLst/>
@@ -4634,8 +4636,8 @@
         </p:nvCxnSpPr>
         <p:spPr>
           <a:xfrm flipV="1">
-            <a:off x="4842779" y="5362576"/>
-            <a:ext cx="523874" cy="1361"/>
+            <a:off x="4872985" y="5742895"/>
+            <a:ext cx="511350" cy="10886"/>
           </a:xfrm>
           <a:prstGeom prst="straightConnector1">
             <a:avLst/>
@@ -4667,8 +4669,8 @@
         </p:nvSpPr>
         <p:spPr>
           <a:xfrm>
-            <a:off x="4222973" y="4425042"/>
-            <a:ext cx="1219200" cy="381000"/>
+            <a:off x="3807201" y="4353505"/>
+            <a:ext cx="1632173" cy="904295"/>
           </a:xfrm>
           <a:prstGeom prst="rect">
             <a:avLst/>
@@ -4720,16 +4722,20 @@
       <p:cxnSp>
         <p:nvCxnSpPr>
           <p:cNvPr id="90" name="Elbow Connector 89"/>
-          <p:cNvCxnSpPr/>
+          <p:cNvCxnSpPr>
+            <a:endCxn id="88" idx="1"/>
+          </p:cNvCxnSpPr>
           <p:nvPr/>
         </p:nvCxnSpPr>
         <p:spPr>
-          <a:xfrm flipV="1">
-            <a:off x="3020785" y="4610100"/>
-            <a:ext cx="1187903" cy="5442"/>
+          <a:xfrm>
+            <a:off x="3017986" y="4648297"/>
+            <a:ext cx="789215" cy="157356"/>
           </a:xfrm>
           <a:prstGeom prst="bentConnector3">
-            <a:avLst/>
+            <a:avLst>
+              <a:gd name="adj1" fmla="val 50000"/>
+            </a:avLst>
           </a:prstGeom>
           <a:ln w="25400">
             <a:tailEnd type="arrow"/>
@@ -4750,39 +4756,6 @@
           </a:fontRef>
         </p:style>
       </p:cxnSp>
-      <p:cxnSp>
-        <p:nvCxnSpPr>
-          <p:cNvPr id="94" name="Elbow Connector 93"/>
-          <p:cNvCxnSpPr/>
-          <p:nvPr/>
-        </p:nvCxnSpPr>
-        <p:spPr>
-          <a:xfrm flipV="1">
-            <a:off x="3020783" y="2286000"/>
-            <a:ext cx="1251853" cy="1066800"/>
-          </a:xfrm>
-          <a:prstGeom prst="bentConnector3">
-            <a:avLst/>
-          </a:prstGeom>
-          <a:ln w="25400">
-            <a:tailEnd type="arrow"/>
-          </a:ln>
-        </p:spPr>
-        <p:style>
-          <a:lnRef idx="1">
-            <a:schemeClr val="accent1"/>
-          </a:lnRef>
-          <a:fillRef idx="0">
-            <a:schemeClr val="accent1"/>
-          </a:fillRef>
-          <a:effectRef idx="0">
-            <a:schemeClr val="accent1"/>
-          </a:effectRef>
-          <a:fontRef idx="minor">
-            <a:schemeClr val="tx1"/>
-          </a:fontRef>
-        </p:style>
-      </p:cxnSp>
       <p:sp>
         <p:nvSpPr>
           <p:cNvPr id="95" name="Rectangle 94"/>
@@ -4791,8 +4764,8 @@
         </p:nvSpPr>
         <p:spPr>
           <a:xfrm>
-            <a:off x="5762625" y="3011940"/>
-            <a:ext cx="838200" cy="533400"/>
+            <a:off x="5758542" y="2922814"/>
+            <a:ext cx="838200" cy="483921"/>
           </a:xfrm>
           <a:prstGeom prst="rect">
             <a:avLst/>
@@ -4855,16 +4828,13 @@
       <p:cxnSp>
         <p:nvCxnSpPr>
           <p:cNvPr id="97" name="Straight Arrow Connector 96"/>
-          <p:cNvCxnSpPr>
-            <a:stCxn id="14" idx="2"/>
-            <a:endCxn id="95" idx="0"/>
-          </p:cNvCxnSpPr>
+          <p:cNvCxnSpPr/>
           <p:nvPr/>
         </p:nvCxnSpPr>
         <p:spPr>
           <a:xfrm>
             <a:off x="6181725" y="2394857"/>
-            <a:ext cx="0" cy="617083"/>
+            <a:ext cx="0" cy="505939"/>
           </a:xfrm>
           <a:prstGeom prst="straightConnector1">
             <a:avLst/>
@@ -4897,8 +4867,8 @@
         </p:nvSpPr>
         <p:spPr>
           <a:xfrm rot="16200000">
-            <a:off x="6490493" y="3344751"/>
-            <a:ext cx="1937657" cy="593040"/>
+            <a:off x="6557301" y="3277942"/>
+            <a:ext cx="1937657" cy="726657"/>
           </a:xfrm>
           <a:prstGeom prst="rect">
             <a:avLst/>
@@ -5054,82 +5024,14 @@
       </p:cxnSp>
       <p:cxnSp>
         <p:nvCxnSpPr>
-          <p:cNvPr id="143" name="Elbow Connector 142"/>
-          <p:cNvCxnSpPr/>
-          <p:nvPr/>
-        </p:nvCxnSpPr>
-        <p:spPr>
-          <a:xfrm flipV="1">
-            <a:off x="6357253" y="4544786"/>
-            <a:ext cx="805548" cy="713014"/>
-          </a:xfrm>
-          <a:prstGeom prst="bentConnector3">
-            <a:avLst/>
-          </a:prstGeom>
-          <a:ln w="25400">
-            <a:tailEnd type="arrow"/>
-          </a:ln>
-        </p:spPr>
-        <p:style>
-          <a:lnRef idx="1">
-            <a:schemeClr val="accent1"/>
-          </a:lnRef>
-          <a:fillRef idx="0">
-            <a:schemeClr val="accent1"/>
-          </a:fillRef>
-          <a:effectRef idx="0">
-            <a:schemeClr val="accent1"/>
-          </a:effectRef>
-          <a:fontRef idx="minor">
-            <a:schemeClr val="tx1"/>
-          </a:fontRef>
-        </p:style>
-      </p:cxnSp>
-      <p:cxnSp>
-        <p:nvCxnSpPr>
-          <p:cNvPr id="156" name="Elbow Connector 155"/>
-          <p:cNvCxnSpPr>
-            <a:stCxn id="88" idx="3"/>
-          </p:cNvCxnSpPr>
-          <p:nvPr/>
-        </p:nvCxnSpPr>
-        <p:spPr>
-          <a:xfrm flipV="1">
-            <a:off x="5442173" y="3566091"/>
-            <a:ext cx="566403" cy="1049451"/>
-          </a:xfrm>
-          <a:prstGeom prst="bentConnector2">
-            <a:avLst/>
-          </a:prstGeom>
-          <a:ln w="25400">
-            <a:tailEnd type="arrow"/>
-          </a:ln>
-        </p:spPr>
-        <p:style>
-          <a:lnRef idx="1">
-            <a:schemeClr val="accent1"/>
-          </a:lnRef>
-          <a:fillRef idx="0">
-            <a:schemeClr val="accent1"/>
-          </a:fillRef>
-          <a:effectRef idx="0">
-            <a:schemeClr val="accent1"/>
-          </a:effectRef>
-          <a:fontRef idx="minor">
-            <a:schemeClr val="tx1"/>
-          </a:fontRef>
-        </p:style>
-      </p:cxnSp>
-      <p:cxnSp>
-        <p:nvCxnSpPr>
           <p:cNvPr id="190" name="Straight Connector 189"/>
           <p:cNvCxnSpPr/>
           <p:nvPr/>
         </p:nvCxnSpPr>
         <p:spPr>
           <a:xfrm>
-            <a:off x="6477000" y="3566091"/>
-            <a:ext cx="0" cy="1290298"/>
+            <a:off x="6477000" y="3456214"/>
+            <a:ext cx="0" cy="1400175"/>
           </a:xfrm>
           <a:prstGeom prst="line">
             <a:avLst/>
@@ -5191,13 +5093,13 @@
           <p:nvPr/>
         </p:nvCxnSpPr>
         <p:spPr>
-          <a:xfrm rot="10800000" flipV="1">
-            <a:off x="2764035" y="3782782"/>
-            <a:ext cx="1438279" cy="1257303"/>
+          <a:xfrm rot="5400000">
+            <a:off x="2218431" y="4088804"/>
+            <a:ext cx="1494065" cy="1340588"/>
           </a:xfrm>
           <a:prstGeom prst="bentConnector3">
             <a:avLst>
-              <a:gd name="adj1" fmla="val 23510"/>
+              <a:gd name="adj1" fmla="val 50000"/>
             </a:avLst>
           </a:prstGeom>
           <a:ln>
@@ -5265,14 +5167,13 @@
           <p:cNvPr id="206" name="Straight Arrow Connector 205"/>
           <p:cNvCxnSpPr>
             <a:stCxn id="15" idx="2"/>
-            <a:endCxn id="88" idx="0"/>
           </p:cNvCxnSpPr>
           <p:nvPr/>
         </p:nvCxnSpPr>
         <p:spPr>
-          <a:xfrm>
-            <a:off x="4825430" y="4091668"/>
-            <a:ext cx="7143" cy="333374"/>
+          <a:xfrm flipH="1">
+            <a:off x="4825429" y="4091668"/>
+            <a:ext cx="1" cy="261837"/>
           </a:xfrm>
           <a:prstGeom prst="straightConnector1">
             <a:avLst/>
@@ -5343,7 +5244,7 @@
         </p:nvCxnSpPr>
         <p:spPr>
           <a:xfrm rot="5400000" flipH="1" flipV="1">
-            <a:off x="4789403" y="2696807"/>
+            <a:off x="4732813" y="2689020"/>
             <a:ext cx="1233415" cy="711909"/>
           </a:xfrm>
           <a:prstGeom prst="bentConnector3">
@@ -5419,7 +5320,7 @@
         </p:nvSpPr>
         <p:spPr>
           <a:xfrm rot="16200000">
-            <a:off x="2891844" y="2594056"/>
+            <a:off x="2677567" y="2656252"/>
             <a:ext cx="1054555" cy="415498"/>
           </a:xfrm>
           <a:prstGeom prst="rect">
@@ -5449,7 +5350,7 @@
         </p:nvSpPr>
         <p:spPr>
           <a:xfrm>
-            <a:off x="2935740" y="1943100"/>
+            <a:off x="2588990" y="1889257"/>
             <a:ext cx="1295098" cy="276999"/>
           </a:xfrm>
           <a:prstGeom prst="rect">
@@ -5479,7 +5380,7 @@
         </p:nvSpPr>
         <p:spPr>
           <a:xfrm rot="16200000">
-            <a:off x="6305283" y="2393234"/>
+            <a:off x="6249494" y="2282089"/>
             <a:ext cx="591082" cy="646331"/>
           </a:xfrm>
           <a:prstGeom prst="rect">
@@ -5509,7 +5410,7 @@
         </p:nvSpPr>
         <p:spPr>
           <a:xfrm>
-            <a:off x="3035068" y="4180600"/>
+            <a:off x="2938248" y="4098471"/>
             <a:ext cx="914400" cy="461665"/>
           </a:xfrm>
           <a:prstGeom prst="rect">
@@ -5545,7 +5446,7 @@
         </p:nvSpPr>
         <p:spPr>
           <a:xfrm rot="16200000">
-            <a:off x="5443793" y="4058559"/>
+            <a:off x="5295411" y="4098509"/>
             <a:ext cx="745669" cy="430887"/>
           </a:xfrm>
           <a:prstGeom prst="rect">
@@ -5605,7 +5506,7 @@
         </p:nvSpPr>
         <p:spPr>
           <a:xfrm>
-            <a:off x="2724824" y="5388076"/>
+            <a:off x="2756095" y="5737100"/>
             <a:ext cx="767444" cy="261610"/>
           </a:xfrm>
           <a:prstGeom prst="rect">
@@ -5635,8 +5536,8 @@
         </p:nvCxnSpPr>
         <p:spPr>
           <a:xfrm>
-            <a:off x="6357253" y="5388076"/>
-            <a:ext cx="1532204" cy="0"/>
+            <a:off x="6374935" y="5848854"/>
+            <a:ext cx="1514522" cy="0"/>
           </a:xfrm>
           <a:prstGeom prst="straightConnector1">
             <a:avLst/>
@@ -5668,7 +5569,7 @@
         </p:nvSpPr>
         <p:spPr>
           <a:xfrm>
-            <a:off x="4848221" y="5371747"/>
+            <a:off x="4844406" y="5470975"/>
             <a:ext cx="557890" cy="646331"/>
           </a:xfrm>
           <a:prstGeom prst="rect">
@@ -5712,7 +5613,7 @@
         </p:nvSpPr>
         <p:spPr>
           <a:xfrm>
-            <a:off x="6596742" y="5388076"/>
+            <a:off x="6645311" y="5848854"/>
             <a:ext cx="1102068" cy="261610"/>
           </a:xfrm>
           <a:prstGeom prst="rect">
@@ -5742,7 +5643,7 @@
         </p:nvSpPr>
         <p:spPr>
           <a:xfrm rot="16200000">
-            <a:off x="5852534" y="4122673"/>
+            <a:off x="6282708" y="3313055"/>
             <a:ext cx="850247" cy="461665"/>
           </a:xfrm>
           <a:prstGeom prst="rect">
@@ -5771,8 +5672,8 @@
           <p:nvPr/>
         </p:nvSpPr>
         <p:spPr>
-          <a:xfrm rot="16200000">
-            <a:off x="6540504" y="4726673"/>
+          <a:xfrm>
+            <a:off x="6317796" y="5246916"/>
             <a:ext cx="813708" cy="430887"/>
           </a:xfrm>
           <a:prstGeom prst="rect">
@@ -5791,6 +5692,549 @@
               <a:t>Control Elements</a:t>
             </a:r>
             <a:endParaRPr lang="en-US" sz="1100" dirty="0"/>
+          </a:p>
+        </p:txBody>
+      </p:sp>
+      <p:cxnSp>
+        <p:nvCxnSpPr>
+          <p:cNvPr id="243" name="Straight Arrow Connector 242"/>
+          <p:cNvCxnSpPr/>
+          <p:nvPr/>
+        </p:nvCxnSpPr>
+        <p:spPr>
+          <a:xfrm>
+            <a:off x="3950476" y="2519670"/>
+            <a:ext cx="0" cy="1845501"/>
+          </a:xfrm>
+          <a:prstGeom prst="straightConnector1">
+            <a:avLst/>
+          </a:prstGeom>
+          <a:ln w="25400">
+            <a:tailEnd type="arrow"/>
+          </a:ln>
+        </p:spPr>
+        <p:style>
+          <a:lnRef idx="1">
+            <a:schemeClr val="accent1"/>
+          </a:lnRef>
+          <a:fillRef idx="0">
+            <a:schemeClr val="accent1"/>
+          </a:fillRef>
+          <a:effectRef idx="0">
+            <a:schemeClr val="accent1"/>
+          </a:effectRef>
+          <a:fontRef idx="minor">
+            <a:schemeClr val="tx1"/>
+          </a:fontRef>
+        </p:style>
+      </p:cxnSp>
+      <p:cxnSp>
+        <p:nvCxnSpPr>
+          <p:cNvPr id="53" name="Straight Connector 52"/>
+          <p:cNvCxnSpPr/>
+          <p:nvPr/>
+        </p:nvCxnSpPr>
+        <p:spPr>
+          <a:xfrm>
+            <a:off x="5453487" y="4648297"/>
+            <a:ext cx="408466" cy="0"/>
+          </a:xfrm>
+          <a:prstGeom prst="line">
+            <a:avLst/>
+          </a:prstGeom>
+          <a:ln w="25400"/>
+        </p:spPr>
+        <p:style>
+          <a:lnRef idx="1">
+            <a:schemeClr val="accent1"/>
+          </a:lnRef>
+          <a:fillRef idx="0">
+            <a:schemeClr val="accent1"/>
+          </a:fillRef>
+          <a:effectRef idx="0">
+            <a:schemeClr val="accent1"/>
+          </a:effectRef>
+          <a:fontRef idx="minor">
+            <a:schemeClr val="tx1"/>
+          </a:fontRef>
+        </p:style>
+      </p:cxnSp>
+      <p:cxnSp>
+        <p:nvCxnSpPr>
+          <p:cNvPr id="56" name="Straight Arrow Connector 55"/>
+          <p:cNvCxnSpPr/>
+          <p:nvPr/>
+        </p:nvCxnSpPr>
+        <p:spPr>
+          <a:xfrm flipV="1">
+            <a:off x="5861953" y="3391279"/>
+            <a:ext cx="0" cy="1257018"/>
+          </a:xfrm>
+          <a:prstGeom prst="straightConnector1">
+            <a:avLst/>
+          </a:prstGeom>
+          <a:ln w="25400">
+            <a:tailEnd type="arrow"/>
+          </a:ln>
+        </p:spPr>
+        <p:style>
+          <a:lnRef idx="1">
+            <a:schemeClr val="accent1"/>
+          </a:lnRef>
+          <a:fillRef idx="0">
+            <a:schemeClr val="accent1"/>
+          </a:fillRef>
+          <a:effectRef idx="0">
+            <a:schemeClr val="accent1"/>
+          </a:effectRef>
+          <a:fontRef idx="minor">
+            <a:schemeClr val="tx1"/>
+          </a:fontRef>
+        </p:style>
+      </p:cxnSp>
+      <p:cxnSp>
+        <p:nvCxnSpPr>
+          <p:cNvPr id="256" name="Elbow Connector 255"/>
+          <p:cNvCxnSpPr/>
+          <p:nvPr/>
+        </p:nvCxnSpPr>
+        <p:spPr>
+          <a:xfrm flipV="1">
+            <a:off x="5453487" y="4083124"/>
+            <a:ext cx="1712034" cy="869876"/>
+          </a:xfrm>
+          <a:prstGeom prst="bentConnector3">
+            <a:avLst>
+              <a:gd name="adj1" fmla="val 50000"/>
+            </a:avLst>
+          </a:prstGeom>
+          <a:ln w="25400">
+            <a:tailEnd type="arrow"/>
+          </a:ln>
+        </p:spPr>
+        <p:style>
+          <a:lnRef idx="1">
+            <a:schemeClr val="accent1"/>
+          </a:lnRef>
+          <a:fillRef idx="0">
+            <a:schemeClr val="accent1"/>
+          </a:fillRef>
+          <a:effectRef idx="0">
+            <a:schemeClr val="accent1"/>
+          </a:effectRef>
+          <a:fontRef idx="minor">
+            <a:schemeClr val="tx1"/>
+          </a:fontRef>
+        </p:style>
+      </p:cxnSp>
+      <p:cxnSp>
+        <p:nvCxnSpPr>
+          <p:cNvPr id="278" name="Elbow Connector 277"/>
+          <p:cNvCxnSpPr/>
+          <p:nvPr/>
+        </p:nvCxnSpPr>
+        <p:spPr>
+          <a:xfrm rot="5400000" flipH="1" flipV="1">
+            <a:off x="3129818" y="2677632"/>
+            <a:ext cx="1011878" cy="446328"/>
+          </a:xfrm>
+          <a:prstGeom prst="bentConnector2">
+            <a:avLst/>
+          </a:prstGeom>
+          <a:ln w="25400">
+            <a:tailEnd type="arrow"/>
+          </a:ln>
+        </p:spPr>
+        <p:style>
+          <a:lnRef idx="1">
+            <a:schemeClr val="accent1"/>
+          </a:lnRef>
+          <a:fillRef idx="0">
+            <a:schemeClr val="accent1"/>
+          </a:fillRef>
+          <a:effectRef idx="0">
+            <a:schemeClr val="accent1"/>
+          </a:effectRef>
+          <a:fontRef idx="minor">
+            <a:schemeClr val="tx1"/>
+          </a:fontRef>
+        </p:style>
+      </p:cxnSp>
+      <p:cxnSp>
+        <p:nvCxnSpPr>
+          <p:cNvPr id="283" name="Straight Connector 282"/>
+          <p:cNvCxnSpPr/>
+          <p:nvPr/>
+        </p:nvCxnSpPr>
+        <p:spPr>
+          <a:xfrm flipH="1">
+            <a:off x="3017986" y="3406735"/>
+            <a:ext cx="394607" cy="0"/>
+          </a:xfrm>
+          <a:prstGeom prst="line">
+            <a:avLst/>
+          </a:prstGeom>
+          <a:ln w="25400"/>
+        </p:spPr>
+        <p:style>
+          <a:lnRef idx="1">
+            <a:schemeClr val="accent1"/>
+          </a:lnRef>
+          <a:fillRef idx="0">
+            <a:schemeClr val="accent1"/>
+          </a:fillRef>
+          <a:effectRef idx="0">
+            <a:schemeClr val="accent1"/>
+          </a:effectRef>
+          <a:fontRef idx="minor">
+            <a:schemeClr val="tx1"/>
+          </a:fontRef>
+        </p:style>
+      </p:cxnSp>
+      <p:sp>
+        <p:nvSpPr>
+          <p:cNvPr id="284" name="TextBox 283"/>
+          <p:cNvSpPr txBox="1"/>
+          <p:nvPr/>
+        </p:nvSpPr>
+        <p:spPr>
+          <a:xfrm rot="16200000">
+            <a:off x="3282042" y="2997236"/>
+            <a:ext cx="1153757" cy="276999"/>
+          </a:xfrm>
+          <a:prstGeom prst="rect">
+            <a:avLst/>
+          </a:prstGeom>
+          <a:noFill/>
+        </p:spPr>
+        <p:txBody>
+          <a:bodyPr wrap="square" rtlCol="0">
+            <a:spAutoFit/>
+          </a:bodyPr>
+          <a:lstStyle/>
+          <a:p>
+            <a:r>
+              <a:rPr lang="en-US" sz="1200" dirty="0" smtClean="0"/>
+              <a:t>Off-On Mode</a:t>
+            </a:r>
+            <a:endParaRPr lang="en-US" sz="1200" dirty="0"/>
+          </a:p>
+        </p:txBody>
+      </p:sp>
+      <p:cxnSp>
+        <p:nvCxnSpPr>
+          <p:cNvPr id="100" name="Straight Connector 99"/>
+          <p:cNvCxnSpPr/>
+          <p:nvPr/>
+        </p:nvCxnSpPr>
+        <p:spPr>
+          <a:xfrm flipV="1">
+            <a:off x="3635758" y="4012065"/>
+            <a:ext cx="561972" cy="1"/>
+          </a:xfrm>
+          <a:prstGeom prst="line">
+            <a:avLst/>
+          </a:prstGeom>
+          <a:ln>
+            <a:solidFill>
+              <a:srgbClr val="FF0000"/>
+            </a:solidFill>
+          </a:ln>
+        </p:spPr>
+        <p:style>
+          <a:lnRef idx="1">
+            <a:schemeClr val="accent1"/>
+          </a:lnRef>
+          <a:fillRef idx="0">
+            <a:schemeClr val="accent1"/>
+          </a:fillRef>
+          <a:effectRef idx="0">
+            <a:schemeClr val="accent1"/>
+          </a:effectRef>
+          <a:fontRef idx="minor">
+            <a:schemeClr val="tx1"/>
+          </a:fontRef>
+        </p:style>
+      </p:cxnSp>
+      <p:cxnSp>
+        <p:nvCxnSpPr>
+          <p:cNvPr id="140" name="Straight Connector 139"/>
+          <p:cNvCxnSpPr/>
+          <p:nvPr/>
+        </p:nvCxnSpPr>
+        <p:spPr>
+          <a:xfrm>
+            <a:off x="6374935" y="5649686"/>
+            <a:ext cx="563729" cy="0"/>
+          </a:xfrm>
+          <a:prstGeom prst="line">
+            <a:avLst/>
+          </a:prstGeom>
+          <a:ln w="25400"/>
+        </p:spPr>
+        <p:style>
+          <a:lnRef idx="1">
+            <a:schemeClr val="accent1"/>
+          </a:lnRef>
+          <a:fillRef idx="0">
+            <a:schemeClr val="accent1"/>
+          </a:fillRef>
+          <a:effectRef idx="0">
+            <a:schemeClr val="accent1"/>
+          </a:effectRef>
+          <a:fontRef idx="minor">
+            <a:schemeClr val="tx1"/>
+          </a:fontRef>
+        </p:style>
+      </p:cxnSp>
+      <p:cxnSp>
+        <p:nvCxnSpPr>
+          <p:cNvPr id="142" name="Straight Connector 141"/>
+          <p:cNvCxnSpPr/>
+          <p:nvPr/>
+        </p:nvCxnSpPr>
+        <p:spPr>
+          <a:xfrm flipV="1">
+            <a:off x="6938664" y="4365171"/>
+            <a:ext cx="0" cy="1284515"/>
+          </a:xfrm>
+          <a:prstGeom prst="line">
+            <a:avLst/>
+          </a:prstGeom>
+          <a:ln w="25400"/>
+        </p:spPr>
+        <p:style>
+          <a:lnRef idx="1">
+            <a:schemeClr val="accent1"/>
+          </a:lnRef>
+          <a:fillRef idx="0">
+            <a:schemeClr val="accent1"/>
+          </a:fillRef>
+          <a:effectRef idx="0">
+            <a:schemeClr val="accent1"/>
+          </a:effectRef>
+          <a:fontRef idx="minor">
+            <a:schemeClr val="tx1"/>
+          </a:fontRef>
+        </p:style>
+      </p:cxnSp>
+      <p:cxnSp>
+        <p:nvCxnSpPr>
+          <p:cNvPr id="145" name="Straight Arrow Connector 144"/>
+          <p:cNvCxnSpPr/>
+          <p:nvPr/>
+        </p:nvCxnSpPr>
+        <p:spPr>
+          <a:xfrm>
+            <a:off x="6938664" y="4365171"/>
+            <a:ext cx="244564" cy="0"/>
+          </a:xfrm>
+          <a:prstGeom prst="straightConnector1">
+            <a:avLst/>
+          </a:prstGeom>
+          <a:ln w="25400">
+            <a:tailEnd type="arrow"/>
+          </a:ln>
+        </p:spPr>
+        <p:style>
+          <a:lnRef idx="1">
+            <a:schemeClr val="accent1"/>
+          </a:lnRef>
+          <a:fillRef idx="0">
+            <a:schemeClr val="accent1"/>
+          </a:fillRef>
+          <a:effectRef idx="0">
+            <a:schemeClr val="accent1"/>
+          </a:effectRef>
+          <a:fontRef idx="minor">
+            <a:schemeClr val="tx1"/>
+          </a:fontRef>
+        </p:style>
+      </p:cxnSp>
+      <p:sp>
+        <p:nvSpPr>
+          <p:cNvPr id="155" name="TextBox 154"/>
+          <p:cNvSpPr txBox="1"/>
+          <p:nvPr/>
+        </p:nvSpPr>
+        <p:spPr>
+          <a:xfrm>
+            <a:off x="5442172" y="5103265"/>
+            <a:ext cx="902578" cy="276999"/>
+          </a:xfrm>
+          <a:prstGeom prst="rect">
+            <a:avLst/>
+          </a:prstGeom>
+          <a:noFill/>
+        </p:spPr>
+        <p:txBody>
+          <a:bodyPr wrap="square" rtlCol="0">
+            <a:spAutoFit/>
+          </a:bodyPr>
+          <a:lstStyle/>
+          <a:p>
+            <a:r>
+              <a:rPr lang="en-US" sz="1200" dirty="0" smtClean="0"/>
+              <a:t>SSD Off</a:t>
+            </a:r>
+            <a:endParaRPr lang="en-US" sz="1200" dirty="0"/>
+          </a:p>
+        </p:txBody>
+      </p:sp>
+      <p:sp>
+        <p:nvSpPr>
+          <p:cNvPr id="157" name="TextBox 156"/>
+          <p:cNvSpPr txBox="1"/>
+          <p:nvPr/>
+        </p:nvSpPr>
+        <p:spPr>
+          <a:xfrm>
+            <a:off x="5356056" y="4717889"/>
+            <a:ext cx="1251855" cy="276999"/>
+          </a:xfrm>
+          <a:prstGeom prst="rect">
+            <a:avLst/>
+          </a:prstGeom>
+          <a:noFill/>
+        </p:spPr>
+        <p:txBody>
+          <a:bodyPr wrap="square" rtlCol="0">
+            <a:spAutoFit/>
+          </a:bodyPr>
+          <a:lstStyle/>
+          <a:p>
+            <a:r>
+              <a:rPr lang="en-US" sz="1200" dirty="0" smtClean="0"/>
+              <a:t>Elements Off</a:t>
+            </a:r>
+            <a:endParaRPr lang="en-US" sz="1200" dirty="0"/>
+          </a:p>
+        </p:txBody>
+      </p:sp>
+      <p:cxnSp>
+        <p:nvCxnSpPr>
+          <p:cNvPr id="162" name="Straight Connector 161"/>
+          <p:cNvCxnSpPr/>
+          <p:nvPr/>
+        </p:nvCxnSpPr>
+        <p:spPr>
+          <a:xfrm flipH="1">
+            <a:off x="2671944" y="5159829"/>
+            <a:ext cx="1135257" cy="0"/>
+          </a:xfrm>
+          <a:prstGeom prst="line">
+            <a:avLst/>
+          </a:prstGeom>
+          <a:ln w="25400"/>
+        </p:spPr>
+        <p:style>
+          <a:lnRef idx="1">
+            <a:schemeClr val="accent1"/>
+          </a:lnRef>
+          <a:fillRef idx="0">
+            <a:schemeClr val="accent1"/>
+          </a:fillRef>
+          <a:effectRef idx="0">
+            <a:schemeClr val="accent1"/>
+          </a:effectRef>
+          <a:fontRef idx="minor">
+            <a:schemeClr val="tx1"/>
+          </a:fontRef>
+        </p:style>
+      </p:cxnSp>
+      <p:cxnSp>
+        <p:nvCxnSpPr>
+          <p:cNvPr id="164" name="Straight Arrow Connector 163"/>
+          <p:cNvCxnSpPr/>
+          <p:nvPr/>
+        </p:nvCxnSpPr>
+        <p:spPr>
+          <a:xfrm>
+            <a:off x="2671944" y="5159829"/>
+            <a:ext cx="0" cy="346302"/>
+          </a:xfrm>
+          <a:prstGeom prst="straightConnector1">
+            <a:avLst/>
+          </a:prstGeom>
+          <a:ln w="25400">
+            <a:tailEnd type="arrow"/>
+          </a:ln>
+        </p:spPr>
+        <p:style>
+          <a:lnRef idx="1">
+            <a:schemeClr val="accent1"/>
+          </a:lnRef>
+          <a:fillRef idx="0">
+            <a:schemeClr val="accent1"/>
+          </a:fillRef>
+          <a:effectRef idx="0">
+            <a:schemeClr val="accent1"/>
+          </a:effectRef>
+          <a:fontRef idx="minor">
+            <a:schemeClr val="tx1"/>
+          </a:fontRef>
+        </p:style>
+      </p:cxnSp>
+      <p:cxnSp>
+        <p:nvCxnSpPr>
+          <p:cNvPr id="168" name="Straight Arrow Connector 167"/>
+          <p:cNvCxnSpPr/>
+          <p:nvPr/>
+        </p:nvCxnSpPr>
+        <p:spPr>
+          <a:xfrm>
+            <a:off x="5453487" y="5159829"/>
+            <a:ext cx="2462436" cy="0"/>
+          </a:xfrm>
+          <a:prstGeom prst="straightConnector1">
+            <a:avLst/>
+          </a:prstGeom>
+          <a:ln w="25400">
+            <a:tailEnd type="arrow"/>
+          </a:ln>
+        </p:spPr>
+        <p:style>
+          <a:lnRef idx="1">
+            <a:schemeClr val="accent1"/>
+          </a:lnRef>
+          <a:fillRef idx="0">
+            <a:schemeClr val="accent1"/>
+          </a:fillRef>
+          <a:effectRef idx="0">
+            <a:schemeClr val="accent1"/>
+          </a:effectRef>
+          <a:fontRef idx="minor">
+            <a:schemeClr val="tx1"/>
+          </a:fontRef>
+        </p:style>
+      </p:cxnSp>
+      <p:sp>
+        <p:nvSpPr>
+          <p:cNvPr id="169" name="TextBox 168"/>
+          <p:cNvSpPr txBox="1"/>
+          <p:nvPr/>
+        </p:nvSpPr>
+        <p:spPr>
+          <a:xfrm>
+            <a:off x="2771419" y="5097822"/>
+            <a:ext cx="1171219" cy="276999"/>
+          </a:xfrm>
+          <a:prstGeom prst="rect">
+            <a:avLst/>
+          </a:prstGeom>
+          <a:noFill/>
+        </p:spPr>
+        <p:txBody>
+          <a:bodyPr wrap="square" rtlCol="0">
+            <a:spAutoFit/>
+          </a:bodyPr>
+          <a:lstStyle/>
+          <a:p>
+            <a:r>
+              <a:rPr lang="en-US" sz="1200" dirty="0" smtClean="0"/>
+              <a:t>ADC Off</a:t>
+            </a:r>
+            <a:endParaRPr lang="en-US" sz="1200" dirty="0"/>
           </a:p>
         </p:txBody>
       </p:sp>
@@ -6227,14 +6671,6 @@
               </a:rPr>
               <a:t>Timer0_Init</a:t>
             </a:r>
-            <a:endParaRPr lang="en-US" sz="1600" b="1" dirty="0" smtClean="0">
-              <a:solidFill>
-                <a:schemeClr val="tx2">
-                  <a:lumMod val="60000"/>
-                  <a:lumOff val="40000"/>
-                </a:schemeClr>
-              </a:solidFill>
-            </a:endParaRPr>
           </a:p>
           <a:p>
             <a:pPr marL="800100" lvl="1" indent="-342900">
@@ -8766,9 +9202,6 @@
                         </a:rPr>
                         <a:t>~0</a:t>
                       </a:r>
-                      <a:endParaRPr lang="en-US" sz="1800" dirty="0" smtClean="0">
-                        <a:effectLst/>
-                      </a:endParaRPr>
                     </a:p>
                   </a:txBody>
                   <a:tcPr marL="0" marR="0" marT="0" marB="0"/>

</xml_diff>

<commit_message>
Merge Led with Elements_MainFunction
</commit_message>
<xml_diff>
--- a/WaterHeater.pptx
+++ b/WaterHeater.pptx
@@ -3379,8 +3379,8 @@
         </p:nvSpPr>
         <p:spPr>
           <a:xfrm>
-            <a:off x="7915923" y="4759098"/>
-            <a:ext cx="1228075" cy="1242332"/>
+            <a:off x="7915924" y="4759098"/>
+            <a:ext cx="1228074" cy="1242332"/>
           </a:xfrm>
           <a:prstGeom prst="rect">
             <a:avLst/>
@@ -6502,8 +6502,16 @@
                   </a:schemeClr>
                 </a:solidFill>
               </a:rPr>
-              <a:t>LED_MainFunction</a:t>
-            </a:r>
+              <a:t>LED_Control</a:t>
+            </a:r>
+            <a:endParaRPr lang="en-US" sz="1600" b="1" dirty="0" smtClean="0">
+              <a:solidFill>
+                <a:schemeClr val="tx2">
+                  <a:lumMod val="60000"/>
+                  <a:lumOff val="40000"/>
+                </a:schemeClr>
+              </a:solidFill>
+            </a:endParaRPr>
           </a:p>
           <a:p>
             <a:pPr marL="800100" lvl="1" indent="-342900">
@@ -7582,14 +7590,14 @@
           <p:nvPr>
             <p:extLst>
               <p:ext uri="{D42A27DB-BD31-4B8C-83A1-F6EECF244321}">
-                <p14:modId xmlns:p14="http://schemas.microsoft.com/office/powerpoint/2010/main" val="3607663748"/>
+                <p14:modId xmlns:p14="http://schemas.microsoft.com/office/powerpoint/2010/main" val="19482241"/>
               </p:ext>
             </p:extLst>
           </p:nvPr>
         </p:nvGraphicFramePr>
         <p:xfrm>
           <a:off x="228600" y="1295400"/>
-          <a:ext cx="8763000" cy="5395536"/>
+          <a:ext cx="8763000" cy="5090736"/>
         </p:xfrm>
         <a:graphic>
           <a:graphicData uri="http://schemas.openxmlformats.org/drawingml/2006/table">
@@ -8536,6 +8544,34 @@
                     <a:bodyPr/>
                     <a:lstStyle/>
                     <a:p>
+                      <a:pPr marL="91440" marR="0" indent="0" algn="l" defTabSz="914400" rtl="0" eaLnBrk="1" fontAlgn="auto" latinLnBrk="0" hangingPunct="1">
+                        <a:lnSpc>
+                          <a:spcPct val="100000"/>
+                        </a:lnSpc>
+                        <a:spcBef>
+                          <a:spcPts val="305"/>
+                        </a:spcBef>
+                        <a:spcAft>
+                          <a:spcPts val="0"/>
+                        </a:spcAft>
+                        <a:buClrTx/>
+                        <a:buSzTx/>
+                        <a:buFontTx/>
+                        <a:buNone/>
+                        <a:tabLst/>
+                        <a:defRPr/>
+                      </a:pPr>
+                      <a:r>
+                        <a:rPr lang="en-US" sz="1800" dirty="0" smtClean="0">
+                          <a:effectLst/>
+                          <a:latin typeface="+mn-lt"/>
+                          <a:ea typeface="Calibri"/>
+                          <a:cs typeface="Arial"/>
+                        </a:rPr>
+                        <a:t>Elements</a:t>
+                      </a:r>
+                    </a:p>
+                    <a:p>
                       <a:pPr marL="91440" marR="0">
                         <a:spcBef>
                           <a:spcPts val="305"/>
@@ -8544,12 +8580,6 @@
                           <a:spcPts val="0"/>
                         </a:spcAft>
                       </a:pPr>
-                      <a:r>
-                        <a:rPr lang="en-US" sz="1800" dirty="0" smtClean="0">
-                          <a:effectLst/>
-                        </a:rPr>
-                        <a:t>LED</a:t>
-                      </a:r>
                       <a:endParaRPr lang="en-US" sz="1100" dirty="0">
                         <a:effectLst/>
                         <a:latin typeface="Calibri"/>
@@ -8589,9 +8619,15 @@
                       <a:r>
                         <a:rPr lang="en-US" sz="1800" dirty="0" smtClean="0">
                           <a:effectLst/>
+                          <a:latin typeface="+mn-lt"/>
+                          <a:ea typeface="Calibri"/>
+                          <a:cs typeface="Arial"/>
                         </a:rPr>
-                        <a:t>LED</a:t>
+                        <a:t>Elements</a:t>
                       </a:r>
+                      <a:endParaRPr lang="en-US" sz="1800" dirty="0" smtClean="0">
+                        <a:effectLst/>
+                      </a:endParaRPr>
                     </a:p>
                     <a:p>
                       <a:pPr marL="91440" marR="0">
@@ -8603,22 +8639,13 @@
                         </a:spcAft>
                       </a:pPr>
                       <a:r>
-                        <a:rPr lang="en-US" sz="1800" dirty="0" smtClean="0">
-                          <a:effectLst/>
-                          <a:latin typeface="Calibri"/>
-                          <a:ea typeface="Calibri"/>
-                          <a:cs typeface="Arial"/>
-                        </a:rPr>
-                        <a:t>Blink</a:t>
-                      </a:r>
-                      <a:r>
                         <a:rPr lang="en-US" sz="1800" baseline="0" dirty="0" smtClean="0">
                           <a:effectLst/>
                           <a:latin typeface="Calibri"/>
                           <a:ea typeface="Calibri"/>
                           <a:cs typeface="Arial"/>
                         </a:rPr>
-                        <a:t> LED</a:t>
+                        <a:t>LED_Control</a:t>
                       </a:r>
                       <a:endParaRPr lang="en-US" sz="1100" dirty="0">
                         <a:effectLst/>
@@ -9015,201 +9042,6 @@
                         <a:t>500</a:t>
                       </a:r>
                     </a:p>
-                    <a:p>
-                      <a:pPr marL="93345" marR="0">
-                        <a:spcBef>
-                          <a:spcPts val="305"/>
-                        </a:spcBef>
-                        <a:spcAft>
-                          <a:spcPts val="0"/>
-                        </a:spcAft>
-                      </a:pPr>
-                      <a:r>
-                        <a:rPr lang="en-US" sz="1800" dirty="0" smtClean="0">
-                          <a:effectLst/>
-                          <a:latin typeface="Calibri"/>
-                          <a:ea typeface="Calibri"/>
-                          <a:cs typeface="Arial"/>
-                        </a:rPr>
-                        <a:t>500</a:t>
-                      </a:r>
-                    </a:p>
-                  </a:txBody>
-                  <a:tcPr marL="0" marR="0" marT="0" marB="0"/>
-                </a:tc>
-                <a:tc>
-                  <a:txBody>
-                    <a:bodyPr/>
-                    <a:lstStyle/>
-                    <a:p>
-                      <a:pPr marL="94615" marR="0">
-                        <a:spcBef>
-                          <a:spcPts val="305"/>
-                        </a:spcBef>
-                        <a:spcAft>
-                          <a:spcPts val="0"/>
-                        </a:spcAft>
-                      </a:pPr>
-                      <a:r>
-                        <a:rPr lang="en-US" sz="1800" dirty="0" smtClean="0">
-                          <a:effectLst/>
-                          <a:latin typeface="Calibri"/>
-                          <a:ea typeface="Calibri"/>
-                          <a:cs typeface="Arial"/>
-                        </a:rPr>
-                        <a:t>500</a:t>
-                      </a:r>
-                      <a:endParaRPr lang="en-US" sz="1800" dirty="0">
-                        <a:effectLst/>
-                        <a:latin typeface="Calibri"/>
-                        <a:ea typeface="Calibri"/>
-                        <a:cs typeface="Arial"/>
-                      </a:endParaRPr>
-                    </a:p>
-                  </a:txBody>
-                  <a:tcPr marL="0" marR="0" marT="0" marB="0"/>
-                </a:tc>
-              </a:tr>
-              <a:tr h="304800">
-                <a:tc>
-                  <a:txBody>
-                    <a:bodyPr/>
-                    <a:lstStyle/>
-                    <a:p>
-                      <a:pPr marL="91440" marR="0">
-                        <a:spcBef>
-                          <a:spcPts val="305"/>
-                        </a:spcBef>
-                        <a:spcAft>
-                          <a:spcPts val="0"/>
-                        </a:spcAft>
-                      </a:pPr>
-                      <a:r>
-                        <a:rPr lang="en-US" sz="1800" dirty="0" smtClean="0">
-                          <a:effectLst/>
-                          <a:latin typeface="Calibri"/>
-                          <a:ea typeface="Calibri"/>
-                          <a:cs typeface="Arial"/>
-                        </a:rPr>
-                        <a:t>Elements</a:t>
-                      </a:r>
-                      <a:endParaRPr lang="en-US" sz="1800" dirty="0">
-                        <a:effectLst/>
-                        <a:latin typeface="Calibri"/>
-                        <a:ea typeface="Calibri"/>
-                        <a:cs typeface="Arial"/>
-                      </a:endParaRPr>
-                    </a:p>
-                  </a:txBody>
-                  <a:tcPr marL="0" marR="0" marT="0" marB="0">
-                    <a:solidFill>
-                      <a:schemeClr val="tx2">
-                        <a:lumMod val="60000"/>
-                        <a:lumOff val="40000"/>
-                      </a:schemeClr>
-                    </a:solidFill>
-                  </a:tcPr>
-                </a:tc>
-                <a:tc>
-                  <a:txBody>
-                    <a:bodyPr/>
-                    <a:lstStyle/>
-                    <a:p>
-                      <a:pPr marL="91440" marR="0">
-                        <a:spcBef>
-                          <a:spcPts val="305"/>
-                        </a:spcBef>
-                        <a:spcAft>
-                          <a:spcPts val="0"/>
-                        </a:spcAft>
-                      </a:pPr>
-                      <a:r>
-                        <a:rPr lang="en-US" sz="1600" dirty="0" smtClean="0">
-                          <a:effectLst/>
-                          <a:latin typeface="Calibri"/>
-                          <a:ea typeface="Calibri"/>
-                          <a:cs typeface="Arial"/>
-                        </a:rPr>
-                        <a:t>Update Elements State</a:t>
-                      </a:r>
-                      <a:endParaRPr lang="en-US" sz="1600" dirty="0">
-                        <a:effectLst/>
-                        <a:latin typeface="Calibri"/>
-                        <a:ea typeface="Calibri"/>
-                        <a:cs typeface="Arial"/>
-                      </a:endParaRPr>
-                    </a:p>
-                  </a:txBody>
-                  <a:tcPr marL="0" marR="0" marT="0" marB="0"/>
-                </a:tc>
-                <a:tc>
-                  <a:txBody>
-                    <a:bodyPr/>
-                    <a:lstStyle/>
-                    <a:p>
-                      <a:pPr marL="92075" marR="0" indent="0" algn="l" defTabSz="914400" rtl="0" eaLnBrk="1" fontAlgn="auto" latinLnBrk="0" hangingPunct="1">
-                        <a:lnSpc>
-                          <a:spcPct val="100000"/>
-                        </a:lnSpc>
-                        <a:spcBef>
-                          <a:spcPts val="305"/>
-                        </a:spcBef>
-                        <a:spcAft>
-                          <a:spcPts val="0"/>
-                        </a:spcAft>
-                        <a:buClrTx/>
-                        <a:buSzTx/>
-                        <a:buFontTx/>
-                        <a:buNone/>
-                        <a:tabLst/>
-                        <a:defRPr/>
-                      </a:pPr>
-                      <a:r>
-                        <a:rPr lang="en-US" sz="1800" dirty="0" smtClean="0">
-                          <a:effectLst/>
-                        </a:rPr>
-                        <a:t>~0</a:t>
-                      </a:r>
-                    </a:p>
-                  </a:txBody>
-                  <a:tcPr marL="0" marR="0" marT="0" marB="0"/>
-                </a:tc>
-                <a:tc>
-                  <a:txBody>
-                    <a:bodyPr/>
-                    <a:lstStyle/>
-                    <a:p>
-                      <a:pPr marL="92075" marR="0" indent="0" algn="l" defTabSz="914400" rtl="0" eaLnBrk="1" fontAlgn="auto" latinLnBrk="0" hangingPunct="1">
-                        <a:lnSpc>
-                          <a:spcPct val="100000"/>
-                        </a:lnSpc>
-                        <a:spcBef>
-                          <a:spcPts val="305"/>
-                        </a:spcBef>
-                        <a:spcAft>
-                          <a:spcPts val="0"/>
-                        </a:spcAft>
-                        <a:buClrTx/>
-                        <a:buSzTx/>
-                        <a:buFontTx/>
-                        <a:buNone/>
-                        <a:tabLst/>
-                        <a:defRPr/>
-                      </a:pPr>
-                      <a:r>
-                        <a:rPr lang="en-US" sz="1800" dirty="0" smtClean="0">
-                          <a:effectLst/>
-                        </a:rPr>
-                        <a:t>~0</a:t>
-                      </a:r>
-                    </a:p>
-                  </a:txBody>
-                  <a:tcPr marL="0" marR="0" marT="0" marB="0"/>
-                </a:tc>
-                <a:tc>
-                  <a:txBody>
-                    <a:bodyPr/>
-                    <a:lstStyle/>
                     <a:p>
                       <a:pPr marL="93345" marR="0">
                         <a:spcBef>
@@ -9848,22 +9680,22 @@
       </p:sp>
       <p:sp>
         <p:nvSpPr>
-          <p:cNvPr id="8" name="Rectangle 7"/>
+          <p:cNvPr id="9" name="Rectangle 8"/>
           <p:cNvSpPr/>
           <p:nvPr/>
         </p:nvSpPr>
         <p:spPr>
           <a:xfrm>
-            <a:off x="3352800" y="2667000"/>
+            <a:off x="3352800" y="2696251"/>
             <a:ext cx="152400" cy="1066800"/>
           </a:xfrm>
           <a:prstGeom prst="rect">
             <a:avLst/>
           </a:prstGeom>
           <a:solidFill>
-            <a:schemeClr val="tx1">
-              <a:lumMod val="85000"/>
-              <a:lumOff val="15000"/>
+            <a:schemeClr val="accent2">
+              <a:lumMod val="40000"/>
+              <a:lumOff val="60000"/>
             </a:schemeClr>
           </a:solidFill>
         </p:spPr>
@@ -9894,23 +9726,20 @@
       </p:sp>
       <p:sp>
         <p:nvSpPr>
-          <p:cNvPr id="9" name="Rectangle 8"/>
+          <p:cNvPr id="10" name="Rectangle 9"/>
           <p:cNvSpPr/>
           <p:nvPr/>
         </p:nvSpPr>
         <p:spPr>
           <a:xfrm>
-            <a:off x="1066800" y="2667000"/>
+            <a:off x="3352800" y="1077686"/>
             <a:ext cx="152400" cy="1066800"/>
           </a:xfrm>
           <a:prstGeom prst="rect">
             <a:avLst/>
           </a:prstGeom>
           <a:solidFill>
-            <a:schemeClr val="accent2">
-              <a:lumMod val="40000"/>
-              <a:lumOff val="60000"/>
-            </a:schemeClr>
+            <a:schemeClr val="accent6"/>
           </a:solidFill>
         </p:spPr>
         <p:style>
@@ -9940,20 +9769,22 @@
       </p:sp>
       <p:sp>
         <p:nvSpPr>
-          <p:cNvPr id="10" name="Rectangle 9"/>
+          <p:cNvPr id="11" name="Rectangle 10"/>
           <p:cNvSpPr/>
           <p:nvPr/>
         </p:nvSpPr>
         <p:spPr>
           <a:xfrm>
-            <a:off x="3352800" y="1077686"/>
+            <a:off x="5334000" y="2667000"/>
             <a:ext cx="152400" cy="1066800"/>
           </a:xfrm>
           <a:prstGeom prst="rect">
             <a:avLst/>
           </a:prstGeom>
           <a:solidFill>
-            <a:schemeClr val="accent6"/>
+            <a:schemeClr val="bg1">
+              <a:lumMod val="85000"/>
+            </a:schemeClr>
           </a:solidFill>
         </p:spPr>
         <p:style>
@@ -9983,22 +9814,20 @@
       </p:sp>
       <p:sp>
         <p:nvSpPr>
-          <p:cNvPr id="11" name="Rectangle 10"/>
+          <p:cNvPr id="12" name="Rectangle 11"/>
           <p:cNvSpPr/>
           <p:nvPr/>
         </p:nvSpPr>
         <p:spPr>
           <a:xfrm>
-            <a:off x="5334000" y="2667000"/>
+            <a:off x="1066800" y="2696251"/>
             <a:ext cx="152400" cy="1066800"/>
           </a:xfrm>
           <a:prstGeom prst="rect">
             <a:avLst/>
           </a:prstGeom>
           <a:solidFill>
-            <a:schemeClr val="bg1">
-              <a:lumMod val="85000"/>
-            </a:schemeClr>
+            <a:srgbClr val="FFFF00"/>
           </a:solidFill>
         </p:spPr>
         <p:style>
@@ -10028,21 +9857,242 @@
       </p:sp>
       <p:sp>
         <p:nvSpPr>
-          <p:cNvPr id="12" name="Rectangle 11"/>
+          <p:cNvPr id="13" name="TextBox 12"/>
+          <p:cNvSpPr txBox="1"/>
+          <p:nvPr/>
+        </p:nvSpPr>
+        <p:spPr>
+          <a:xfrm>
+            <a:off x="1219200" y="1077686"/>
+            <a:ext cx="1409700" cy="646331"/>
+          </a:xfrm>
+          <a:prstGeom prst="rect">
+            <a:avLst/>
+          </a:prstGeom>
+          <a:noFill/>
+        </p:spPr>
+        <p:txBody>
+          <a:bodyPr wrap="square" rtlCol="0">
+            <a:spAutoFit/>
+          </a:bodyPr>
+          <a:lstStyle/>
+          <a:p>
+            <a:r>
+              <a:rPr lang="en-US" dirty="0" smtClean="0"/>
+              <a:t>SSD Task @20ms</a:t>
+            </a:r>
+            <a:endParaRPr lang="en-US" dirty="0"/>
+          </a:p>
+        </p:txBody>
+      </p:sp>
+      <p:sp>
+        <p:nvSpPr>
+          <p:cNvPr id="14" name="TextBox 13"/>
+          <p:cNvSpPr txBox="1"/>
+          <p:nvPr/>
+        </p:nvSpPr>
+        <p:spPr>
+          <a:xfrm>
+            <a:off x="3505201" y="1077686"/>
+            <a:ext cx="1828800" cy="646331"/>
+          </a:xfrm>
+          <a:prstGeom prst="rect">
+            <a:avLst/>
+          </a:prstGeom>
+          <a:noFill/>
+        </p:spPr>
+        <p:txBody>
+          <a:bodyPr wrap="square" rtlCol="0">
+            <a:spAutoFit/>
+          </a:bodyPr>
+          <a:lstStyle/>
+          <a:p>
+            <a:r>
+              <a:rPr lang="en-US" dirty="0" smtClean="0"/>
+              <a:t>Buttons Task @100ms</a:t>
+            </a:r>
+            <a:endParaRPr lang="en-US" dirty="0"/>
+          </a:p>
+        </p:txBody>
+      </p:sp>
+      <p:sp>
+        <p:nvSpPr>
+          <p:cNvPr id="15" name="TextBox 14"/>
+          <p:cNvSpPr txBox="1"/>
+          <p:nvPr/>
+        </p:nvSpPr>
+        <p:spPr>
+          <a:xfrm>
+            <a:off x="5431972" y="1120838"/>
+            <a:ext cx="1045028" cy="646331"/>
+          </a:xfrm>
+          <a:prstGeom prst="rect">
+            <a:avLst/>
+          </a:prstGeom>
+          <a:noFill/>
+        </p:spPr>
+        <p:txBody>
+          <a:bodyPr wrap="square" rtlCol="0">
+            <a:spAutoFit/>
+          </a:bodyPr>
+          <a:lstStyle/>
+          <a:p>
+            <a:r>
+              <a:rPr lang="en-US" dirty="0" smtClean="0"/>
+              <a:t>ADC Task @100ms</a:t>
+            </a:r>
+            <a:endParaRPr lang="en-US" dirty="0"/>
+          </a:p>
+        </p:txBody>
+      </p:sp>
+      <p:sp>
+        <p:nvSpPr>
+          <p:cNvPr id="16" name="TextBox 15"/>
+          <p:cNvSpPr txBox="1"/>
+          <p:nvPr/>
+        </p:nvSpPr>
+        <p:spPr>
+          <a:xfrm>
+            <a:off x="1219201" y="2725502"/>
+            <a:ext cx="1567543" cy="646331"/>
+          </a:xfrm>
+          <a:prstGeom prst="rect">
+            <a:avLst/>
+          </a:prstGeom>
+          <a:noFill/>
+        </p:spPr>
+        <p:txBody>
+          <a:bodyPr wrap="square" rtlCol="0">
+            <a:spAutoFit/>
+          </a:bodyPr>
+          <a:lstStyle/>
+          <a:p>
+            <a:r>
+              <a:rPr lang="en-US" dirty="0"/>
+              <a:t>Elements Task @</a:t>
+            </a:r>
+            <a:r>
+              <a:rPr lang="en-US" dirty="0" smtClean="0"/>
+              <a:t>100ms</a:t>
+            </a:r>
+            <a:endParaRPr lang="en-US" dirty="0"/>
+          </a:p>
+        </p:txBody>
+      </p:sp>
+      <p:sp>
+        <p:nvSpPr>
+          <p:cNvPr id="17" name="TextBox 16"/>
+          <p:cNvSpPr txBox="1"/>
+          <p:nvPr/>
+        </p:nvSpPr>
+        <p:spPr>
+          <a:xfrm>
+            <a:off x="3505200" y="2696251"/>
+            <a:ext cx="1409700" cy="646331"/>
+          </a:xfrm>
+          <a:prstGeom prst="rect">
+            <a:avLst/>
+          </a:prstGeom>
+          <a:noFill/>
+        </p:spPr>
+        <p:txBody>
+          <a:bodyPr wrap="square" rtlCol="0">
+            <a:spAutoFit/>
+          </a:bodyPr>
+          <a:lstStyle/>
+          <a:p>
+            <a:r>
+              <a:rPr lang="en-US" dirty="0" smtClean="0"/>
+              <a:t>MODE </a:t>
+            </a:r>
+            <a:r>
+              <a:rPr lang="en-US" dirty="0" smtClean="0"/>
+              <a:t>Task @500ms</a:t>
+            </a:r>
+            <a:endParaRPr lang="en-US" dirty="0"/>
+          </a:p>
+        </p:txBody>
+      </p:sp>
+      <p:sp>
+        <p:nvSpPr>
+          <p:cNvPr id="19" name="TextBox 18"/>
+          <p:cNvSpPr txBox="1"/>
+          <p:nvPr/>
+        </p:nvSpPr>
+        <p:spPr>
+          <a:xfrm>
+            <a:off x="5486400" y="2696251"/>
+            <a:ext cx="1676400" cy="646331"/>
+          </a:xfrm>
+          <a:prstGeom prst="rect">
+            <a:avLst/>
+          </a:prstGeom>
+          <a:noFill/>
+        </p:spPr>
+        <p:txBody>
+          <a:bodyPr wrap="square" rtlCol="0">
+            <a:spAutoFit/>
+          </a:bodyPr>
+          <a:lstStyle/>
+          <a:p>
+            <a:r>
+              <a:rPr lang="en-US" dirty="0" smtClean="0"/>
+              <a:t>EEPROM Task @500ms</a:t>
+            </a:r>
+            <a:endParaRPr lang="en-US" dirty="0"/>
+          </a:p>
+        </p:txBody>
+      </p:sp>
+      <p:cxnSp>
+        <p:nvCxnSpPr>
+          <p:cNvPr id="21" name="Straight Arrow Connector 20"/>
+          <p:cNvCxnSpPr/>
+          <p:nvPr/>
+        </p:nvCxnSpPr>
+        <p:spPr>
+          <a:xfrm>
+            <a:off x="685800" y="6172200"/>
+            <a:ext cx="7863840" cy="0"/>
+          </a:xfrm>
+          <a:prstGeom prst="straightConnector1">
+            <a:avLst/>
+          </a:prstGeom>
+          <a:ln w="31750">
+            <a:solidFill>
+              <a:schemeClr val="tx1"/>
+            </a:solidFill>
+            <a:tailEnd type="arrow"/>
+          </a:ln>
+        </p:spPr>
+        <p:style>
+          <a:lnRef idx="1">
+            <a:schemeClr val="accent1"/>
+          </a:lnRef>
+          <a:fillRef idx="0">
+            <a:schemeClr val="accent1"/>
+          </a:fillRef>
+          <a:effectRef idx="0">
+            <a:schemeClr val="accent1"/>
+          </a:effectRef>
+          <a:fontRef idx="minor">
+            <a:schemeClr val="tx1"/>
+          </a:fontRef>
+        </p:style>
+      </p:cxnSp>
+      <p:sp>
+        <p:nvSpPr>
+          <p:cNvPr id="22" name="Rectangle 21"/>
           <p:cNvSpPr/>
           <p:nvPr/>
         </p:nvSpPr>
         <p:spPr>
           <a:xfrm>
-            <a:off x="7162800" y="1077686"/>
+            <a:off x="762000" y="5094514"/>
             <a:ext cx="152400" cy="1066800"/>
           </a:xfrm>
           <a:prstGeom prst="rect">
             <a:avLst/>
           </a:prstGeom>
-          <a:solidFill>
-            <a:srgbClr val="FFFF00"/>
-          </a:solidFill>
         </p:spPr>
         <p:style>
           <a:lnRef idx="2">
@@ -10069,235 +10119,24 @@
           </a:p>
         </p:txBody>
       </p:sp>
-      <p:sp>
-        <p:nvSpPr>
-          <p:cNvPr id="13" name="TextBox 12"/>
-          <p:cNvSpPr txBox="1"/>
-          <p:nvPr/>
-        </p:nvSpPr>
-        <p:spPr>
-          <a:xfrm>
-            <a:off x="1219200" y="1077686"/>
-            <a:ext cx="1409700" cy="646331"/>
-          </a:xfrm>
-          <a:prstGeom prst="rect">
-            <a:avLst/>
-          </a:prstGeom>
-          <a:noFill/>
-        </p:spPr>
-        <p:txBody>
-          <a:bodyPr wrap="square" rtlCol="0">
-            <a:spAutoFit/>
-          </a:bodyPr>
-          <a:lstStyle/>
-          <a:p>
-            <a:r>
-              <a:rPr lang="en-US" dirty="0" smtClean="0"/>
-              <a:t>SSD Task @20ms</a:t>
-            </a:r>
-            <a:endParaRPr lang="en-US" dirty="0"/>
-          </a:p>
-        </p:txBody>
-      </p:sp>
-      <p:sp>
-        <p:nvSpPr>
-          <p:cNvPr id="14" name="TextBox 13"/>
-          <p:cNvSpPr txBox="1"/>
-          <p:nvPr/>
-        </p:nvSpPr>
-        <p:spPr>
-          <a:xfrm>
-            <a:off x="3505201" y="1077686"/>
-            <a:ext cx="1828800" cy="646331"/>
-          </a:xfrm>
-          <a:prstGeom prst="rect">
-            <a:avLst/>
-          </a:prstGeom>
-          <a:noFill/>
-        </p:spPr>
-        <p:txBody>
-          <a:bodyPr wrap="square" rtlCol="0">
-            <a:spAutoFit/>
-          </a:bodyPr>
-          <a:lstStyle/>
-          <a:p>
-            <a:r>
-              <a:rPr lang="en-US" dirty="0" smtClean="0"/>
-              <a:t>Buttons Task @100ms</a:t>
-            </a:r>
-            <a:endParaRPr lang="en-US" dirty="0"/>
-          </a:p>
-        </p:txBody>
-      </p:sp>
-      <p:sp>
-        <p:nvSpPr>
-          <p:cNvPr id="15" name="TextBox 14"/>
-          <p:cNvSpPr txBox="1"/>
-          <p:nvPr/>
-        </p:nvSpPr>
-        <p:spPr>
-          <a:xfrm>
-            <a:off x="5431972" y="1120838"/>
-            <a:ext cx="1045028" cy="646331"/>
-          </a:xfrm>
-          <a:prstGeom prst="rect">
-            <a:avLst/>
-          </a:prstGeom>
-          <a:noFill/>
-        </p:spPr>
-        <p:txBody>
-          <a:bodyPr wrap="square" rtlCol="0">
-            <a:spAutoFit/>
-          </a:bodyPr>
-          <a:lstStyle/>
-          <a:p>
-            <a:r>
-              <a:rPr lang="en-US" dirty="0" smtClean="0"/>
-              <a:t>ADC Task @100ms</a:t>
-            </a:r>
-            <a:endParaRPr lang="en-US" dirty="0"/>
-          </a:p>
-        </p:txBody>
-      </p:sp>
-      <p:sp>
-        <p:nvSpPr>
-          <p:cNvPr id="16" name="TextBox 15"/>
-          <p:cNvSpPr txBox="1"/>
-          <p:nvPr/>
-        </p:nvSpPr>
-        <p:spPr>
-          <a:xfrm>
-            <a:off x="7347857" y="1185761"/>
-            <a:ext cx="1567543" cy="646331"/>
-          </a:xfrm>
-          <a:prstGeom prst="rect">
-            <a:avLst/>
-          </a:prstGeom>
-          <a:noFill/>
-        </p:spPr>
-        <p:txBody>
-          <a:bodyPr wrap="square" rtlCol="0">
-            <a:spAutoFit/>
-          </a:bodyPr>
-          <a:lstStyle/>
-          <a:p>
-            <a:r>
-              <a:rPr lang="en-US" dirty="0" smtClean="0"/>
-              <a:t>LED Task @100ms</a:t>
-            </a:r>
-            <a:endParaRPr lang="en-US" dirty="0"/>
-          </a:p>
-        </p:txBody>
-      </p:sp>
-      <p:sp>
-        <p:nvSpPr>
-          <p:cNvPr id="17" name="TextBox 16"/>
-          <p:cNvSpPr txBox="1"/>
-          <p:nvPr/>
-        </p:nvSpPr>
-        <p:spPr>
-          <a:xfrm>
-            <a:off x="1219200" y="2667000"/>
-            <a:ext cx="1409700" cy="646331"/>
-          </a:xfrm>
-          <a:prstGeom prst="rect">
-            <a:avLst/>
-          </a:prstGeom>
-          <a:noFill/>
-        </p:spPr>
-        <p:txBody>
-          <a:bodyPr wrap="square" rtlCol="0">
-            <a:spAutoFit/>
-          </a:bodyPr>
-          <a:lstStyle/>
-          <a:p>
-            <a:r>
-              <a:rPr lang="en-US" dirty="0" smtClean="0"/>
-              <a:t>MODE Task @500ms</a:t>
-            </a:r>
-            <a:endParaRPr lang="en-US" dirty="0"/>
-          </a:p>
-        </p:txBody>
-      </p:sp>
-      <p:sp>
-        <p:nvSpPr>
-          <p:cNvPr id="18" name="TextBox 17"/>
-          <p:cNvSpPr txBox="1"/>
-          <p:nvPr/>
-        </p:nvSpPr>
-        <p:spPr>
-          <a:xfrm>
-            <a:off x="3505200" y="2696251"/>
-            <a:ext cx="1600199" cy="646331"/>
-          </a:xfrm>
-          <a:prstGeom prst="rect">
-            <a:avLst/>
-          </a:prstGeom>
-          <a:noFill/>
-        </p:spPr>
-        <p:txBody>
-          <a:bodyPr wrap="square" rtlCol="0">
-            <a:spAutoFit/>
-          </a:bodyPr>
-          <a:lstStyle/>
-          <a:p>
-            <a:r>
-              <a:rPr lang="en-US" dirty="0" smtClean="0"/>
-              <a:t>Elements Task @500ms</a:t>
-            </a:r>
-            <a:endParaRPr lang="en-US" dirty="0"/>
-          </a:p>
-        </p:txBody>
-      </p:sp>
-      <p:sp>
-        <p:nvSpPr>
-          <p:cNvPr id="19" name="TextBox 18"/>
-          <p:cNvSpPr txBox="1"/>
-          <p:nvPr/>
-        </p:nvSpPr>
-        <p:spPr>
-          <a:xfrm>
-            <a:off x="5486400" y="2696251"/>
-            <a:ext cx="1676400" cy="646331"/>
-          </a:xfrm>
-          <a:prstGeom prst="rect">
-            <a:avLst/>
-          </a:prstGeom>
-          <a:noFill/>
-        </p:spPr>
-        <p:txBody>
-          <a:bodyPr wrap="square" rtlCol="0">
-            <a:spAutoFit/>
-          </a:bodyPr>
-          <a:lstStyle/>
-          <a:p>
-            <a:r>
-              <a:rPr lang="en-US" dirty="0" smtClean="0"/>
-              <a:t>EEPROM Task @500ms</a:t>
-            </a:r>
-            <a:endParaRPr lang="en-US" dirty="0"/>
-          </a:p>
-        </p:txBody>
-      </p:sp>
       <p:cxnSp>
         <p:nvCxnSpPr>
-          <p:cNvPr id="21" name="Straight Arrow Connector 20"/>
+          <p:cNvPr id="26" name="Straight Connector 25"/>
           <p:cNvCxnSpPr/>
           <p:nvPr/>
         </p:nvCxnSpPr>
         <p:spPr>
           <a:xfrm>
-            <a:off x="685800" y="6172200"/>
-            <a:ext cx="7863840" cy="0"/>
-          </a:xfrm>
-          <a:prstGeom prst="straightConnector1">
-            <a:avLst/>
-          </a:prstGeom>
-          <a:ln w="31750">
+            <a:off x="762000" y="5018314"/>
+            <a:ext cx="0" cy="1143000"/>
+          </a:xfrm>
+          <a:prstGeom prst="line">
+            <a:avLst/>
+          </a:prstGeom>
+          <a:ln w="22225">
             <a:solidFill>
               <a:schemeClr val="tx1"/>
             </a:solidFill>
-            <a:tailEnd type="arrow"/>
           </a:ln>
         </p:spPr>
         <p:style>
@@ -10317,18 +10156,21 @@
       </p:cxnSp>
       <p:sp>
         <p:nvSpPr>
-          <p:cNvPr id="22" name="Rectangle 21"/>
+          <p:cNvPr id="28" name="Rectangle 27"/>
           <p:cNvSpPr/>
           <p:nvPr/>
         </p:nvSpPr>
         <p:spPr>
           <a:xfrm>
-            <a:off x="762000" y="5094514"/>
+            <a:off x="914400" y="5094514"/>
             <a:ext cx="152400" cy="1066800"/>
           </a:xfrm>
           <a:prstGeom prst="rect">
             <a:avLst/>
           </a:prstGeom>
+          <a:solidFill>
+            <a:schemeClr val="accent6"/>
+          </a:solidFill>
         </p:spPr>
         <p:style>
           <a:lnRef idx="2">
@@ -10355,57 +10197,22 @@
           </a:p>
         </p:txBody>
       </p:sp>
-      <p:cxnSp>
-        <p:nvCxnSpPr>
-          <p:cNvPr id="26" name="Straight Connector 25"/>
-          <p:cNvCxnSpPr/>
-          <p:nvPr/>
-        </p:nvCxnSpPr>
-        <p:spPr>
-          <a:xfrm>
-            <a:off x="762000" y="5018314"/>
-            <a:ext cx="0" cy="1143000"/>
-          </a:xfrm>
-          <a:prstGeom prst="line">
-            <a:avLst/>
-          </a:prstGeom>
-          <a:ln w="22225">
-            <a:solidFill>
-              <a:schemeClr val="tx1"/>
-            </a:solidFill>
-          </a:ln>
-        </p:spPr>
-        <p:style>
-          <a:lnRef idx="1">
-            <a:schemeClr val="accent1"/>
-          </a:lnRef>
-          <a:fillRef idx="0">
-            <a:schemeClr val="accent1"/>
-          </a:fillRef>
-          <a:effectRef idx="0">
-            <a:schemeClr val="accent1"/>
-          </a:effectRef>
-          <a:fontRef idx="minor">
-            <a:schemeClr val="tx1"/>
-          </a:fontRef>
-        </p:style>
-      </p:cxnSp>
-      <p:sp>
-        <p:nvSpPr>
-          <p:cNvPr id="28" name="Rectangle 27"/>
+      <p:sp>
+        <p:nvSpPr>
+          <p:cNvPr id="29" name="Rectangle 28"/>
           <p:cNvSpPr/>
           <p:nvPr/>
         </p:nvSpPr>
         <p:spPr>
           <a:xfrm>
-            <a:off x="914400" y="5094514"/>
+            <a:off x="1066800" y="5094514"/>
             <a:ext cx="152400" cy="1066800"/>
           </a:xfrm>
           <a:prstGeom prst="rect">
             <a:avLst/>
           </a:prstGeom>
           <a:solidFill>
-            <a:schemeClr val="accent6"/>
+            <a:schemeClr val="accent2"/>
           </a:solidFill>
         </p:spPr>
         <p:style>
@@ -10435,20 +10242,20 @@
       </p:sp>
       <p:sp>
         <p:nvSpPr>
-          <p:cNvPr id="29" name="Rectangle 28"/>
+          <p:cNvPr id="30" name="Rectangle 29"/>
           <p:cNvSpPr/>
           <p:nvPr/>
         </p:nvSpPr>
         <p:spPr>
           <a:xfrm>
-            <a:off x="1066800" y="5094514"/>
-            <a:ext cx="152400" cy="1066800"/>
+            <a:off x="1230086" y="5094514"/>
+            <a:ext cx="152400" cy="1077686"/>
           </a:xfrm>
           <a:prstGeom prst="rect">
             <a:avLst/>
           </a:prstGeom>
           <a:solidFill>
-            <a:schemeClr val="accent2"/>
+            <a:srgbClr val="FFFF00"/>
           </a:solidFill>
         </p:spPr>
         <p:style>
@@ -10478,20 +10285,23 @@
       </p:sp>
       <p:sp>
         <p:nvSpPr>
-          <p:cNvPr id="30" name="Rectangle 29"/>
+          <p:cNvPr id="31" name="Rectangle 30"/>
           <p:cNvSpPr/>
           <p:nvPr/>
         </p:nvSpPr>
         <p:spPr>
           <a:xfrm>
-            <a:off x="1230086" y="5105400"/>
-            <a:ext cx="152400" cy="1066800"/>
+            <a:off x="1382486" y="5094514"/>
+            <a:ext cx="152400" cy="1077686"/>
           </a:xfrm>
           <a:prstGeom prst="rect">
             <a:avLst/>
           </a:prstGeom>
           <a:solidFill>
-            <a:srgbClr val="FFFF00"/>
+            <a:schemeClr val="accent2">
+              <a:lumMod val="40000"/>
+              <a:lumOff val="60000"/>
+            </a:schemeClr>
           </a:solidFill>
         </p:spPr>
         <p:style>
@@ -10521,105 +10331,13 @@
       </p:sp>
       <p:sp>
         <p:nvSpPr>
-          <p:cNvPr id="31" name="Rectangle 30"/>
-          <p:cNvSpPr/>
-          <p:nvPr/>
-        </p:nvSpPr>
-        <p:spPr>
-          <a:xfrm>
-            <a:off x="1382486" y="5105400"/>
-            <a:ext cx="152400" cy="1066800"/>
-          </a:xfrm>
-          <a:prstGeom prst="rect">
-            <a:avLst/>
-          </a:prstGeom>
-          <a:solidFill>
-            <a:schemeClr val="accent2">
-              <a:lumMod val="40000"/>
-              <a:lumOff val="60000"/>
-            </a:schemeClr>
-          </a:solidFill>
-        </p:spPr>
-        <p:style>
-          <a:lnRef idx="2">
-            <a:schemeClr val="accent1">
-              <a:shade val="50000"/>
-            </a:schemeClr>
-          </a:lnRef>
-          <a:fillRef idx="1">
-            <a:schemeClr val="accent1"/>
-          </a:fillRef>
-          <a:effectRef idx="0">
-            <a:schemeClr val="accent1"/>
-          </a:effectRef>
-          <a:fontRef idx="minor">
-            <a:schemeClr val="lt1"/>
-          </a:fontRef>
-        </p:style>
-        <p:txBody>
-          <a:bodyPr rtlCol="0" anchor="ctr"/>
-          <a:lstStyle/>
-          <a:p>
-            <a:pPr algn="ctr"/>
-            <a:endParaRPr lang="en-US"/>
-          </a:p>
-        </p:txBody>
-      </p:sp>
-      <p:sp>
-        <p:nvSpPr>
-          <p:cNvPr id="32" name="Rectangle 31"/>
-          <p:cNvSpPr/>
-          <p:nvPr/>
-        </p:nvSpPr>
-        <p:spPr>
-          <a:xfrm>
-            <a:off x="1534886" y="5105400"/>
-            <a:ext cx="152400" cy="1066800"/>
-          </a:xfrm>
-          <a:prstGeom prst="rect">
-            <a:avLst/>
-          </a:prstGeom>
-          <a:solidFill>
-            <a:schemeClr val="tx1">
-              <a:lumMod val="85000"/>
-              <a:lumOff val="15000"/>
-            </a:schemeClr>
-          </a:solidFill>
-        </p:spPr>
-        <p:style>
-          <a:lnRef idx="2">
-            <a:schemeClr val="accent1">
-              <a:shade val="50000"/>
-            </a:schemeClr>
-          </a:lnRef>
-          <a:fillRef idx="1">
-            <a:schemeClr val="accent1"/>
-          </a:fillRef>
-          <a:effectRef idx="0">
-            <a:schemeClr val="accent1"/>
-          </a:effectRef>
-          <a:fontRef idx="minor">
-            <a:schemeClr val="lt1"/>
-          </a:fontRef>
-        </p:style>
-        <p:txBody>
-          <a:bodyPr rtlCol="0" anchor="ctr"/>
-          <a:lstStyle/>
-          <a:p>
-            <a:pPr algn="ctr"/>
-            <a:endParaRPr lang="en-US"/>
-          </a:p>
-        </p:txBody>
-      </p:sp>
-      <p:sp>
-        <p:nvSpPr>
           <p:cNvPr id="33" name="Rectangle 32"/>
           <p:cNvSpPr/>
           <p:nvPr/>
         </p:nvSpPr>
         <p:spPr>
           <a:xfrm>
-            <a:off x="1687286" y="5105400"/>
+            <a:off x="1534886" y="5094514"/>
             <a:ext cx="152400" cy="1066800"/>
           </a:xfrm>
           <a:prstGeom prst="rect">
@@ -10849,8 +10567,8 @@
         </p:nvSpPr>
         <p:spPr>
           <a:xfrm>
-            <a:off x="6792686" y="5105400"/>
-            <a:ext cx="152400" cy="1066800"/>
+            <a:off x="6792686" y="5094514"/>
+            <a:ext cx="152400" cy="1077686"/>
           </a:xfrm>
           <a:prstGeom prst="rect">
             <a:avLst/>
@@ -10889,8 +10607,8 @@
         </p:nvSpPr>
         <p:spPr>
           <a:xfrm>
-            <a:off x="6945086" y="5105400"/>
-            <a:ext cx="152400" cy="1066800"/>
+            <a:off x="6945086" y="5094514"/>
+            <a:ext cx="217714" cy="1077686"/>
           </a:xfrm>
           <a:prstGeom prst="rect">
             <a:avLst/>
@@ -10932,8 +10650,8 @@
         </p:nvSpPr>
         <p:spPr>
           <a:xfrm>
-            <a:off x="7097486" y="5105400"/>
-            <a:ext cx="152400" cy="1066800"/>
+            <a:off x="7097486" y="5094514"/>
+            <a:ext cx="163286" cy="1077686"/>
           </a:xfrm>
           <a:prstGeom prst="rect">
             <a:avLst/>
@@ -10975,8 +10693,8 @@
         </p:nvSpPr>
         <p:spPr>
           <a:xfrm>
-            <a:off x="7260772" y="5116286"/>
-            <a:ext cx="152400" cy="1066800"/>
+            <a:off x="7260772" y="5094514"/>
+            <a:ext cx="152400" cy="1088572"/>
           </a:xfrm>
           <a:prstGeom prst="rect">
             <a:avLst/>
@@ -11018,8 +10736,8 @@
         </p:nvSpPr>
         <p:spPr>
           <a:xfrm>
-            <a:off x="7413172" y="5116286"/>
-            <a:ext cx="152400" cy="1066800"/>
+            <a:off x="7413172" y="5094514"/>
+            <a:ext cx="152400" cy="1088572"/>
           </a:xfrm>
           <a:prstGeom prst="rect">
             <a:avLst/>
@@ -11058,60 +10776,14 @@
       </p:sp>
       <p:sp>
         <p:nvSpPr>
-          <p:cNvPr id="46" name="Rectangle 45"/>
-          <p:cNvSpPr/>
-          <p:nvPr/>
-        </p:nvSpPr>
-        <p:spPr>
-          <a:xfrm>
-            <a:off x="7565572" y="5116286"/>
-            <a:ext cx="152400" cy="1066800"/>
-          </a:xfrm>
-          <a:prstGeom prst="rect">
-            <a:avLst/>
-          </a:prstGeom>
-          <a:solidFill>
-            <a:schemeClr val="tx1">
-              <a:lumMod val="85000"/>
-              <a:lumOff val="15000"/>
-            </a:schemeClr>
-          </a:solidFill>
-        </p:spPr>
-        <p:style>
-          <a:lnRef idx="2">
-            <a:schemeClr val="accent1">
-              <a:shade val="50000"/>
-            </a:schemeClr>
-          </a:lnRef>
-          <a:fillRef idx="1">
-            <a:schemeClr val="accent1"/>
-          </a:fillRef>
-          <a:effectRef idx="0">
-            <a:schemeClr val="accent1"/>
-          </a:effectRef>
-          <a:fontRef idx="minor">
-            <a:schemeClr val="lt1"/>
-          </a:fontRef>
-        </p:style>
-        <p:txBody>
-          <a:bodyPr rtlCol="0" anchor="ctr"/>
-          <a:lstStyle/>
-          <a:p>
-            <a:pPr algn="ctr"/>
-            <a:endParaRPr lang="en-US"/>
-          </a:p>
-        </p:txBody>
-      </p:sp>
-      <p:sp>
-        <p:nvSpPr>
           <p:cNvPr id="47" name="Rectangle 46"/>
           <p:cNvSpPr/>
           <p:nvPr/>
         </p:nvSpPr>
         <p:spPr>
           <a:xfrm>
-            <a:off x="7717972" y="5116286"/>
-            <a:ext cx="152400" cy="1066800"/>
+            <a:off x="7565572" y="5094514"/>
+            <a:ext cx="152400" cy="1088572"/>
           </a:xfrm>
           <a:prstGeom prst="rect">
             <a:avLst/>

</xml_diff>

<commit_message>
Power Point with Flowchart
</commit_message>
<xml_diff>
--- a/WaterHeater.pptx
+++ b/WaterHeater.pptx
@@ -13,6 +13,19 @@
     <p:sldId id="261" r:id="rId7"/>
     <p:sldId id="262" r:id="rId8"/>
     <p:sldId id="263" r:id="rId9"/>
+    <p:sldId id="264" r:id="rId10"/>
+    <p:sldId id="265" r:id="rId11"/>
+    <p:sldId id="266" r:id="rId12"/>
+    <p:sldId id="268" r:id="rId13"/>
+    <p:sldId id="267" r:id="rId14"/>
+    <p:sldId id="269" r:id="rId15"/>
+    <p:sldId id="270" r:id="rId16"/>
+    <p:sldId id="271" r:id="rId17"/>
+    <p:sldId id="272" r:id="rId18"/>
+    <p:sldId id="273" r:id="rId19"/>
+    <p:sldId id="274" r:id="rId20"/>
+    <p:sldId id="275" r:id="rId21"/>
+    <p:sldId id="276" r:id="rId22"/>
   </p:sldIdLst>
   <p:sldSz cx="9144000" cy="6858000" type="screen4x3"/>
   <p:notesSz cx="6858000" cy="9144000"/>
@@ -6262,6 +6275,1583 @@
 </p:sld>
 </file>
 
+<file path=ppt/slides/slide10.xml><?xml version="1.0" encoding="utf-8"?>
+<p:sld xmlns:a="http://schemas.openxmlformats.org/drawingml/2006/main" xmlns:r="http://schemas.openxmlformats.org/officeDocument/2006/relationships" xmlns:p="http://schemas.openxmlformats.org/presentationml/2006/main">
+  <p:cSld>
+    <p:spTree>
+      <p:nvGrpSpPr>
+        <p:cNvPr id="1" name=""/>
+        <p:cNvGrpSpPr/>
+        <p:nvPr/>
+      </p:nvGrpSpPr>
+      <p:grpSpPr>
+        <a:xfrm>
+          <a:off x="0" y="0"/>
+          <a:ext cx="0" cy="0"/>
+          <a:chOff x="0" y="0"/>
+          <a:chExt cx="0" cy="0"/>
+        </a:xfrm>
+      </p:grpSpPr>
+      <p:sp>
+        <p:nvSpPr>
+          <p:cNvPr id="4" name="TextBox 3"/>
+          <p:cNvSpPr txBox="1"/>
+          <p:nvPr/>
+        </p:nvSpPr>
+        <p:spPr>
+          <a:xfrm>
+            <a:off x="152400" y="85929"/>
+            <a:ext cx="1634358" cy="369332"/>
+          </a:xfrm>
+          <a:prstGeom prst="rect">
+            <a:avLst/>
+          </a:prstGeom>
+          <a:noFill/>
+        </p:spPr>
+        <p:txBody>
+          <a:bodyPr wrap="none" rtlCol="0">
+            <a:spAutoFit/>
+          </a:bodyPr>
+          <a:lstStyle/>
+          <a:p>
+            <a:pPr marL="285750" indent="-285750">
+              <a:buFont typeface="Wingdings" pitchFamily="2" charset="2"/>
+              <a:buChar char="q"/>
+            </a:pPr>
+            <a:r>
+              <a:rPr lang="en-US" dirty="0"/>
+              <a:t>LED_Control</a:t>
+            </a:r>
+          </a:p>
+        </p:txBody>
+      </p:sp>
+      <p:pic>
+        <p:nvPicPr>
+          <p:cNvPr id="5" name="Picture 4"/>
+          <p:cNvPicPr>
+            <a:picLocks noChangeAspect="1"/>
+          </p:cNvPicPr>
+          <p:nvPr/>
+        </p:nvPicPr>
+        <p:blipFill>
+          <a:blip r:embed="rId2">
+            <a:extLst>
+              <a:ext uri="{28A0092B-C50C-407E-A947-70E740481C1C}">
+                <a14:useLocalDpi xmlns:a14="http://schemas.microsoft.com/office/drawing/2010/main" val="0"/>
+              </a:ext>
+            </a:extLst>
+          </a:blip>
+          <a:stretch>
+            <a:fillRect/>
+          </a:stretch>
+        </p:blipFill>
+        <p:spPr>
+          <a:xfrm>
+            <a:off x="0" y="838200"/>
+            <a:ext cx="4800600" cy="5791200"/>
+          </a:xfrm>
+          <a:prstGeom prst="rect">
+            <a:avLst/>
+          </a:prstGeom>
+        </p:spPr>
+      </p:pic>
+      <p:sp>
+        <p:nvSpPr>
+          <p:cNvPr id="6" name="TextBox 5"/>
+          <p:cNvSpPr txBox="1"/>
+          <p:nvPr/>
+        </p:nvSpPr>
+        <p:spPr>
+          <a:xfrm>
+            <a:off x="6075729" y="85929"/>
+            <a:ext cx="1843774" cy="369332"/>
+          </a:xfrm>
+          <a:prstGeom prst="rect">
+            <a:avLst/>
+          </a:prstGeom>
+          <a:noFill/>
+        </p:spPr>
+        <p:txBody>
+          <a:bodyPr wrap="none" rtlCol="0">
+            <a:spAutoFit/>
+          </a:bodyPr>
+          <a:lstStyle/>
+          <a:p>
+            <a:pPr marL="285750" indent="-285750">
+              <a:buFont typeface="Wingdings" pitchFamily="2" charset="2"/>
+              <a:buChar char="q"/>
+            </a:pPr>
+            <a:r>
+              <a:rPr lang="en-US" dirty="0"/>
+              <a:t>LED_BLINKING</a:t>
+            </a:r>
+          </a:p>
+        </p:txBody>
+      </p:sp>
+      <p:pic>
+        <p:nvPicPr>
+          <p:cNvPr id="7" name="Picture 6"/>
+          <p:cNvPicPr>
+            <a:picLocks noChangeAspect="1"/>
+          </p:cNvPicPr>
+          <p:nvPr/>
+        </p:nvPicPr>
+        <p:blipFill>
+          <a:blip r:embed="rId3">
+            <a:extLst>
+              <a:ext uri="{28A0092B-C50C-407E-A947-70E740481C1C}">
+                <a14:useLocalDpi xmlns:a14="http://schemas.microsoft.com/office/drawing/2010/main" val="0"/>
+              </a:ext>
+            </a:extLst>
+          </a:blip>
+          <a:stretch>
+            <a:fillRect/>
+          </a:stretch>
+        </p:blipFill>
+        <p:spPr>
+          <a:xfrm>
+            <a:off x="5638800" y="990600"/>
+            <a:ext cx="3105150" cy="5638800"/>
+          </a:xfrm>
+          <a:prstGeom prst="rect">
+            <a:avLst/>
+          </a:prstGeom>
+        </p:spPr>
+      </p:pic>
+    </p:spTree>
+    <p:extLst>
+      <p:ext uri="{BB962C8B-B14F-4D97-AF65-F5344CB8AC3E}">
+        <p14:creationId xmlns:p14="http://schemas.microsoft.com/office/powerpoint/2010/main" val="490238792"/>
+      </p:ext>
+    </p:extLst>
+  </p:cSld>
+  <p:clrMapOvr>
+    <a:masterClrMapping/>
+  </p:clrMapOvr>
+  <p:timing>
+    <p:tnLst>
+      <p:par>
+        <p:cTn id="1" dur="indefinite" restart="never" nodeType="tmRoot"/>
+      </p:par>
+    </p:tnLst>
+  </p:timing>
+</p:sld>
+</file>
+
+<file path=ppt/slides/slide11.xml><?xml version="1.0" encoding="utf-8"?>
+<p:sld xmlns:a="http://schemas.openxmlformats.org/drawingml/2006/main" xmlns:r="http://schemas.openxmlformats.org/officeDocument/2006/relationships" xmlns:p="http://schemas.openxmlformats.org/presentationml/2006/main">
+  <p:cSld>
+    <p:spTree>
+      <p:nvGrpSpPr>
+        <p:cNvPr id="1" name=""/>
+        <p:cNvGrpSpPr/>
+        <p:nvPr/>
+      </p:nvGrpSpPr>
+      <p:grpSpPr>
+        <a:xfrm>
+          <a:off x="0" y="0"/>
+          <a:ext cx="0" cy="0"/>
+          <a:chOff x="0" y="0"/>
+          <a:chExt cx="0" cy="0"/>
+        </a:xfrm>
+      </p:grpSpPr>
+      <p:sp>
+        <p:nvSpPr>
+          <p:cNvPr id="4" name="TextBox 3"/>
+          <p:cNvSpPr txBox="1"/>
+          <p:nvPr/>
+        </p:nvSpPr>
+        <p:spPr>
+          <a:xfrm>
+            <a:off x="76200" y="179427"/>
+            <a:ext cx="1713931" cy="646331"/>
+          </a:xfrm>
+          <a:prstGeom prst="rect">
+            <a:avLst/>
+          </a:prstGeom>
+          <a:noFill/>
+        </p:spPr>
+        <p:txBody>
+          <a:bodyPr wrap="none" rtlCol="0">
+            <a:spAutoFit/>
+          </a:bodyPr>
+          <a:lstStyle/>
+          <a:p>
+            <a:pPr marL="285750" indent="-285750">
+              <a:buFont typeface="Wingdings" pitchFamily="2" charset="2"/>
+              <a:buChar char="q"/>
+            </a:pPr>
+            <a:r>
+              <a:rPr lang="en-US" dirty="0" smtClean="0"/>
+              <a:t>SSD</a:t>
+            </a:r>
+          </a:p>
+          <a:p>
+            <a:pPr marL="742950" lvl="1" indent="-285750">
+              <a:buFont typeface="Wingdings" pitchFamily="2" charset="2"/>
+              <a:buChar char="q"/>
+            </a:pPr>
+            <a:r>
+              <a:rPr lang="en-US" dirty="0" err="1"/>
+              <a:t>SSD_Init</a:t>
+            </a:r>
+            <a:endParaRPr lang="en-US" dirty="0"/>
+          </a:p>
+        </p:txBody>
+      </p:sp>
+      <p:pic>
+        <p:nvPicPr>
+          <p:cNvPr id="5" name="Picture 4"/>
+          <p:cNvPicPr>
+            <a:picLocks noChangeAspect="1"/>
+          </p:cNvPicPr>
+          <p:nvPr/>
+        </p:nvPicPr>
+        <p:blipFill>
+          <a:blip r:embed="rId2">
+            <a:extLst>
+              <a:ext uri="{28A0092B-C50C-407E-A947-70E740481C1C}">
+                <a14:useLocalDpi xmlns:a14="http://schemas.microsoft.com/office/drawing/2010/main" val="0"/>
+              </a:ext>
+            </a:extLst>
+          </a:blip>
+          <a:stretch>
+            <a:fillRect/>
+          </a:stretch>
+        </p:blipFill>
+        <p:spPr>
+          <a:xfrm>
+            <a:off x="152400" y="1219200"/>
+            <a:ext cx="1981200" cy="5257800"/>
+          </a:xfrm>
+          <a:prstGeom prst="rect">
+            <a:avLst/>
+          </a:prstGeom>
+        </p:spPr>
+      </p:pic>
+      <p:sp>
+        <p:nvSpPr>
+          <p:cNvPr id="9" name="TextBox 8"/>
+          <p:cNvSpPr txBox="1"/>
+          <p:nvPr/>
+        </p:nvSpPr>
+        <p:spPr>
+          <a:xfrm>
+            <a:off x="4495800" y="471784"/>
+            <a:ext cx="2246128" cy="369332"/>
+          </a:xfrm>
+          <a:prstGeom prst="rect">
+            <a:avLst/>
+          </a:prstGeom>
+          <a:noFill/>
+        </p:spPr>
+        <p:txBody>
+          <a:bodyPr wrap="none" rtlCol="0">
+            <a:spAutoFit/>
+          </a:bodyPr>
+          <a:lstStyle/>
+          <a:p>
+            <a:pPr marL="285750" indent="-285750">
+              <a:buFont typeface="Wingdings" pitchFamily="2" charset="2"/>
+              <a:buChar char="q"/>
+            </a:pPr>
+            <a:r>
+              <a:rPr lang="en-US" dirty="0"/>
+              <a:t>SSD_SelectDisplay</a:t>
+            </a:r>
+          </a:p>
+        </p:txBody>
+      </p:sp>
+      <p:pic>
+        <p:nvPicPr>
+          <p:cNvPr id="11" name="Picture 10"/>
+          <p:cNvPicPr>
+            <a:picLocks noChangeAspect="1"/>
+          </p:cNvPicPr>
+          <p:nvPr/>
+        </p:nvPicPr>
+        <p:blipFill>
+          <a:blip r:embed="rId3">
+            <a:extLst>
+              <a:ext uri="{28A0092B-C50C-407E-A947-70E740481C1C}">
+                <a14:useLocalDpi xmlns:a14="http://schemas.microsoft.com/office/drawing/2010/main" val="0"/>
+              </a:ext>
+            </a:extLst>
+          </a:blip>
+          <a:stretch>
+            <a:fillRect/>
+          </a:stretch>
+        </p:blipFill>
+        <p:spPr>
+          <a:xfrm>
+            <a:off x="3076574" y="1181100"/>
+            <a:ext cx="6067425" cy="5543550"/>
+          </a:xfrm>
+          <a:prstGeom prst="rect">
+            <a:avLst/>
+          </a:prstGeom>
+        </p:spPr>
+      </p:pic>
+    </p:spTree>
+    <p:extLst>
+      <p:ext uri="{BB962C8B-B14F-4D97-AF65-F5344CB8AC3E}">
+        <p14:creationId xmlns:p14="http://schemas.microsoft.com/office/powerpoint/2010/main" val="2703036149"/>
+      </p:ext>
+    </p:extLst>
+  </p:cSld>
+  <p:clrMapOvr>
+    <a:masterClrMapping/>
+  </p:clrMapOvr>
+  <p:timing>
+    <p:tnLst>
+      <p:par>
+        <p:cTn id="1" dur="indefinite" restart="never" nodeType="tmRoot"/>
+      </p:par>
+    </p:tnLst>
+  </p:timing>
+</p:sld>
+</file>
+
+<file path=ppt/slides/slide12.xml><?xml version="1.0" encoding="utf-8"?>
+<p:sld xmlns:a="http://schemas.openxmlformats.org/drawingml/2006/main" xmlns:r="http://schemas.openxmlformats.org/officeDocument/2006/relationships" xmlns:p="http://schemas.openxmlformats.org/presentationml/2006/main">
+  <p:cSld>
+    <p:spTree>
+      <p:nvGrpSpPr>
+        <p:cNvPr id="1" name=""/>
+        <p:cNvGrpSpPr/>
+        <p:nvPr/>
+      </p:nvGrpSpPr>
+      <p:grpSpPr>
+        <a:xfrm>
+          <a:off x="0" y="0"/>
+          <a:ext cx="0" cy="0"/>
+          <a:chOff x="0" y="0"/>
+          <a:chExt cx="0" cy="0"/>
+        </a:xfrm>
+      </p:grpSpPr>
+      <p:sp>
+        <p:nvSpPr>
+          <p:cNvPr id="4" name="TextBox 3"/>
+          <p:cNvSpPr txBox="1"/>
+          <p:nvPr/>
+        </p:nvSpPr>
+        <p:spPr>
+          <a:xfrm>
+            <a:off x="5791200" y="113345"/>
+            <a:ext cx="1941557" cy="369332"/>
+          </a:xfrm>
+          <a:prstGeom prst="rect">
+            <a:avLst/>
+          </a:prstGeom>
+          <a:noFill/>
+        </p:spPr>
+        <p:txBody>
+          <a:bodyPr wrap="none" rtlCol="0">
+            <a:spAutoFit/>
+          </a:bodyPr>
+          <a:lstStyle/>
+          <a:p>
+            <a:pPr marL="285750" indent="-285750">
+              <a:buFont typeface="Wingdings" pitchFamily="2" charset="2"/>
+              <a:buChar char="q"/>
+            </a:pPr>
+            <a:r>
+              <a:rPr lang="en-US" dirty="0" smtClean="0"/>
+              <a:t>SSD_SelectDigit</a:t>
+            </a:r>
+            <a:endParaRPr lang="en-US" dirty="0"/>
+          </a:p>
+        </p:txBody>
+      </p:sp>
+      <p:pic>
+        <p:nvPicPr>
+          <p:cNvPr id="5" name="Picture 4"/>
+          <p:cNvPicPr>
+            <a:picLocks noChangeAspect="1"/>
+          </p:cNvPicPr>
+          <p:nvPr/>
+        </p:nvPicPr>
+        <p:blipFill>
+          <a:blip r:embed="rId2">
+            <a:extLst>
+              <a:ext uri="{28A0092B-C50C-407E-A947-70E740481C1C}">
+                <a14:useLocalDpi xmlns:a14="http://schemas.microsoft.com/office/drawing/2010/main" val="0"/>
+              </a:ext>
+            </a:extLst>
+          </a:blip>
+          <a:stretch>
+            <a:fillRect/>
+          </a:stretch>
+        </p:blipFill>
+        <p:spPr>
+          <a:xfrm>
+            <a:off x="5486400" y="1101802"/>
+            <a:ext cx="3429000" cy="5737148"/>
+          </a:xfrm>
+          <a:prstGeom prst="rect">
+            <a:avLst/>
+          </a:prstGeom>
+        </p:spPr>
+      </p:pic>
+      <p:pic>
+        <p:nvPicPr>
+          <p:cNvPr id="6" name="Picture 5"/>
+          <p:cNvPicPr>
+            <a:picLocks noChangeAspect="1"/>
+          </p:cNvPicPr>
+          <p:nvPr/>
+        </p:nvPicPr>
+        <p:blipFill>
+          <a:blip r:embed="rId3">
+            <a:extLst>
+              <a:ext uri="{28A0092B-C50C-407E-A947-70E740481C1C}">
+                <a14:useLocalDpi xmlns:a14="http://schemas.microsoft.com/office/drawing/2010/main" val="0"/>
+              </a:ext>
+            </a:extLst>
+          </a:blip>
+          <a:stretch>
+            <a:fillRect/>
+          </a:stretch>
+        </p:blipFill>
+        <p:spPr>
+          <a:xfrm>
+            <a:off x="152400" y="533400"/>
+            <a:ext cx="4667250" cy="5753100"/>
+          </a:xfrm>
+          <a:prstGeom prst="rect">
+            <a:avLst/>
+          </a:prstGeom>
+        </p:spPr>
+      </p:pic>
+      <p:sp>
+        <p:nvSpPr>
+          <p:cNvPr id="7" name="TextBox 6"/>
+          <p:cNvSpPr txBox="1"/>
+          <p:nvPr/>
+        </p:nvSpPr>
+        <p:spPr>
+          <a:xfrm>
+            <a:off x="152400" y="81079"/>
+            <a:ext cx="1399742" cy="369332"/>
+          </a:xfrm>
+          <a:prstGeom prst="rect">
+            <a:avLst/>
+          </a:prstGeom>
+          <a:noFill/>
+        </p:spPr>
+        <p:txBody>
+          <a:bodyPr wrap="none" rtlCol="0">
+            <a:spAutoFit/>
+          </a:bodyPr>
+          <a:lstStyle/>
+          <a:p>
+            <a:pPr marL="285750" indent="-285750">
+              <a:buFont typeface="Wingdings" pitchFamily="2" charset="2"/>
+              <a:buChar char="q"/>
+            </a:pPr>
+            <a:r>
+              <a:rPr lang="en-US" dirty="0" smtClean="0"/>
+              <a:t>SSD_Blink</a:t>
+            </a:r>
+            <a:endParaRPr lang="en-US" dirty="0"/>
+          </a:p>
+        </p:txBody>
+      </p:sp>
+    </p:spTree>
+    <p:extLst>
+      <p:ext uri="{BB962C8B-B14F-4D97-AF65-F5344CB8AC3E}">
+        <p14:creationId xmlns:p14="http://schemas.microsoft.com/office/powerpoint/2010/main" val="269096366"/>
+      </p:ext>
+    </p:extLst>
+  </p:cSld>
+  <p:clrMapOvr>
+    <a:masterClrMapping/>
+  </p:clrMapOvr>
+  <p:timing>
+    <p:tnLst>
+      <p:par>
+        <p:cTn id="1" dur="indefinite" restart="never" nodeType="tmRoot"/>
+      </p:par>
+    </p:tnLst>
+  </p:timing>
+</p:sld>
+</file>
+
+<file path=ppt/slides/slide13.xml><?xml version="1.0" encoding="utf-8"?>
+<p:sld xmlns:a="http://schemas.openxmlformats.org/drawingml/2006/main" xmlns:r="http://schemas.openxmlformats.org/officeDocument/2006/relationships" xmlns:p="http://schemas.openxmlformats.org/presentationml/2006/main">
+  <p:cSld>
+    <p:spTree>
+      <p:nvGrpSpPr>
+        <p:cNvPr id="1" name=""/>
+        <p:cNvGrpSpPr/>
+        <p:nvPr/>
+      </p:nvGrpSpPr>
+      <p:grpSpPr>
+        <a:xfrm>
+          <a:off x="0" y="0"/>
+          <a:ext cx="0" cy="0"/>
+          <a:chOff x="0" y="0"/>
+          <a:chExt cx="0" cy="0"/>
+        </a:xfrm>
+      </p:grpSpPr>
+      <p:sp>
+        <p:nvSpPr>
+          <p:cNvPr id="5" name="TextBox 4"/>
+          <p:cNvSpPr txBox="1"/>
+          <p:nvPr/>
+        </p:nvSpPr>
+        <p:spPr>
+          <a:xfrm>
+            <a:off x="228600" y="239906"/>
+            <a:ext cx="2246128" cy="369332"/>
+          </a:xfrm>
+          <a:prstGeom prst="rect">
+            <a:avLst/>
+          </a:prstGeom>
+          <a:noFill/>
+        </p:spPr>
+        <p:txBody>
+          <a:bodyPr wrap="none" rtlCol="0">
+            <a:spAutoFit/>
+          </a:bodyPr>
+          <a:lstStyle/>
+          <a:p>
+            <a:pPr marL="285750" indent="-285750">
+              <a:buFont typeface="Wingdings" pitchFamily="2" charset="2"/>
+              <a:buChar char="q"/>
+            </a:pPr>
+            <a:r>
+              <a:rPr lang="en-US" dirty="0"/>
+              <a:t>SSD_MainFunction</a:t>
+            </a:r>
+          </a:p>
+        </p:txBody>
+      </p:sp>
+      <p:pic>
+        <p:nvPicPr>
+          <p:cNvPr id="6" name="Picture 5"/>
+          <p:cNvPicPr>
+            <a:picLocks noChangeAspect="1"/>
+          </p:cNvPicPr>
+          <p:nvPr/>
+        </p:nvPicPr>
+        <p:blipFill>
+          <a:blip r:embed="rId2">
+            <a:extLst>
+              <a:ext uri="{28A0092B-C50C-407E-A947-70E740481C1C}">
+                <a14:useLocalDpi xmlns:a14="http://schemas.microsoft.com/office/drawing/2010/main" val="0"/>
+              </a:ext>
+            </a:extLst>
+          </a:blip>
+          <a:stretch>
+            <a:fillRect/>
+          </a:stretch>
+        </p:blipFill>
+        <p:spPr>
+          <a:xfrm>
+            <a:off x="217714" y="914400"/>
+            <a:ext cx="8686800" cy="5715000"/>
+          </a:xfrm>
+          <a:prstGeom prst="rect">
+            <a:avLst/>
+          </a:prstGeom>
+        </p:spPr>
+      </p:pic>
+    </p:spTree>
+    <p:extLst>
+      <p:ext uri="{BB962C8B-B14F-4D97-AF65-F5344CB8AC3E}">
+        <p14:creationId xmlns:p14="http://schemas.microsoft.com/office/powerpoint/2010/main" val="3286378366"/>
+      </p:ext>
+    </p:extLst>
+  </p:cSld>
+  <p:clrMapOvr>
+    <a:masterClrMapping/>
+  </p:clrMapOvr>
+  <p:timing>
+    <p:tnLst>
+      <p:par>
+        <p:cTn id="1" dur="indefinite" restart="never" nodeType="tmRoot"/>
+      </p:par>
+    </p:tnLst>
+  </p:timing>
+</p:sld>
+</file>
+
+<file path=ppt/slides/slide14.xml><?xml version="1.0" encoding="utf-8"?>
+<p:sld xmlns:a="http://schemas.openxmlformats.org/drawingml/2006/main" xmlns:r="http://schemas.openxmlformats.org/officeDocument/2006/relationships" xmlns:p="http://schemas.openxmlformats.org/presentationml/2006/main">
+  <p:cSld>
+    <p:spTree>
+      <p:nvGrpSpPr>
+        <p:cNvPr id="1" name=""/>
+        <p:cNvGrpSpPr/>
+        <p:nvPr/>
+      </p:nvGrpSpPr>
+      <p:grpSpPr>
+        <a:xfrm>
+          <a:off x="0" y="0"/>
+          <a:ext cx="0" cy="0"/>
+          <a:chOff x="0" y="0"/>
+          <a:chExt cx="0" cy="0"/>
+        </a:xfrm>
+      </p:grpSpPr>
+      <p:sp>
+        <p:nvSpPr>
+          <p:cNvPr id="4" name="TextBox 3"/>
+          <p:cNvSpPr txBox="1"/>
+          <p:nvPr/>
+        </p:nvSpPr>
+        <p:spPr>
+          <a:xfrm>
+            <a:off x="76200" y="179427"/>
+            <a:ext cx="2349105" cy="646331"/>
+          </a:xfrm>
+          <a:prstGeom prst="rect">
+            <a:avLst/>
+          </a:prstGeom>
+          <a:noFill/>
+        </p:spPr>
+        <p:txBody>
+          <a:bodyPr wrap="none" rtlCol="0">
+            <a:spAutoFit/>
+          </a:bodyPr>
+          <a:lstStyle/>
+          <a:p>
+            <a:pPr marL="285750" indent="-285750">
+              <a:buFont typeface="Wingdings" pitchFamily="2" charset="2"/>
+              <a:buChar char="q"/>
+            </a:pPr>
+            <a:r>
+              <a:rPr lang="en-US" dirty="0" smtClean="0"/>
+              <a:t>Water Heater Mode</a:t>
+            </a:r>
+          </a:p>
+          <a:p>
+            <a:pPr marL="742950" lvl="1" indent="-285750">
+              <a:buFont typeface="Wingdings" pitchFamily="2" charset="2"/>
+              <a:buChar char="q"/>
+            </a:pPr>
+            <a:r>
+              <a:rPr lang="en-US" dirty="0"/>
+              <a:t>Mode_Init</a:t>
+            </a:r>
+          </a:p>
+        </p:txBody>
+      </p:sp>
+      <p:pic>
+        <p:nvPicPr>
+          <p:cNvPr id="5" name="Picture 4"/>
+          <p:cNvPicPr>
+            <a:picLocks noChangeAspect="1"/>
+          </p:cNvPicPr>
+          <p:nvPr/>
+        </p:nvPicPr>
+        <p:blipFill>
+          <a:blip r:embed="rId2">
+            <a:extLst>
+              <a:ext uri="{28A0092B-C50C-407E-A947-70E740481C1C}">
+                <a14:useLocalDpi xmlns:a14="http://schemas.microsoft.com/office/drawing/2010/main" val="0"/>
+              </a:ext>
+            </a:extLst>
+          </a:blip>
+          <a:stretch>
+            <a:fillRect/>
+          </a:stretch>
+        </p:blipFill>
+        <p:spPr>
+          <a:xfrm>
+            <a:off x="228600" y="1524000"/>
+            <a:ext cx="2057400" cy="3124200"/>
+          </a:xfrm>
+          <a:prstGeom prst="rect">
+            <a:avLst/>
+          </a:prstGeom>
+        </p:spPr>
+      </p:pic>
+      <p:sp>
+        <p:nvSpPr>
+          <p:cNvPr id="7" name="TextBox 6"/>
+          <p:cNvSpPr txBox="1"/>
+          <p:nvPr/>
+        </p:nvSpPr>
+        <p:spPr>
+          <a:xfrm>
+            <a:off x="5486400" y="271760"/>
+            <a:ext cx="2448106" cy="369332"/>
+          </a:xfrm>
+          <a:prstGeom prst="rect">
+            <a:avLst/>
+          </a:prstGeom>
+          <a:noFill/>
+        </p:spPr>
+        <p:txBody>
+          <a:bodyPr wrap="none" rtlCol="0">
+            <a:spAutoFit/>
+          </a:bodyPr>
+          <a:lstStyle/>
+          <a:p>
+            <a:pPr marL="285750" indent="-285750">
+              <a:buFont typeface="Wingdings" pitchFamily="2" charset="2"/>
+              <a:buChar char="q"/>
+            </a:pPr>
+            <a:r>
+              <a:rPr lang="en-US" dirty="0"/>
+              <a:t>Mode_MainFunction</a:t>
+            </a:r>
+          </a:p>
+        </p:txBody>
+      </p:sp>
+      <p:pic>
+        <p:nvPicPr>
+          <p:cNvPr id="8" name="Picture 7"/>
+          <p:cNvPicPr>
+            <a:picLocks noChangeAspect="1"/>
+          </p:cNvPicPr>
+          <p:nvPr/>
+        </p:nvPicPr>
+        <p:blipFill>
+          <a:blip r:embed="rId3">
+            <a:extLst>
+              <a:ext uri="{28A0092B-C50C-407E-A947-70E740481C1C}">
+                <a14:useLocalDpi xmlns:a14="http://schemas.microsoft.com/office/drawing/2010/main" val="0"/>
+              </a:ext>
+            </a:extLst>
+          </a:blip>
+          <a:stretch>
+            <a:fillRect/>
+          </a:stretch>
+        </p:blipFill>
+        <p:spPr>
+          <a:xfrm>
+            <a:off x="2514600" y="685800"/>
+            <a:ext cx="6629400" cy="6096000"/>
+          </a:xfrm>
+          <a:prstGeom prst="rect">
+            <a:avLst/>
+          </a:prstGeom>
+        </p:spPr>
+      </p:pic>
+    </p:spTree>
+    <p:extLst>
+      <p:ext uri="{BB962C8B-B14F-4D97-AF65-F5344CB8AC3E}">
+        <p14:creationId xmlns:p14="http://schemas.microsoft.com/office/powerpoint/2010/main" val="858223657"/>
+      </p:ext>
+    </p:extLst>
+  </p:cSld>
+  <p:clrMapOvr>
+    <a:masterClrMapping/>
+  </p:clrMapOvr>
+  <p:timing>
+    <p:tnLst>
+      <p:par>
+        <p:cTn id="1" dur="indefinite" restart="never" nodeType="tmRoot"/>
+      </p:par>
+    </p:tnLst>
+  </p:timing>
+</p:sld>
+</file>
+
+<file path=ppt/slides/slide15.xml><?xml version="1.0" encoding="utf-8"?>
+<p:sld xmlns:a="http://schemas.openxmlformats.org/drawingml/2006/main" xmlns:r="http://schemas.openxmlformats.org/officeDocument/2006/relationships" xmlns:p="http://schemas.openxmlformats.org/presentationml/2006/main">
+  <p:cSld>
+    <p:spTree>
+      <p:nvGrpSpPr>
+        <p:cNvPr id="1" name=""/>
+        <p:cNvGrpSpPr/>
+        <p:nvPr/>
+      </p:nvGrpSpPr>
+      <p:grpSpPr>
+        <a:xfrm>
+          <a:off x="0" y="0"/>
+          <a:ext cx="0" cy="0"/>
+          <a:chOff x="0" y="0"/>
+          <a:chExt cx="0" cy="0"/>
+        </a:xfrm>
+      </p:grpSpPr>
+      <p:sp>
+        <p:nvSpPr>
+          <p:cNvPr id="5" name="TextBox 4"/>
+          <p:cNvSpPr txBox="1"/>
+          <p:nvPr/>
+        </p:nvSpPr>
+        <p:spPr>
+          <a:xfrm>
+            <a:off x="152400" y="162520"/>
+            <a:ext cx="2351028" cy="369332"/>
+          </a:xfrm>
+          <a:prstGeom prst="rect">
+            <a:avLst/>
+          </a:prstGeom>
+          <a:noFill/>
+        </p:spPr>
+        <p:txBody>
+          <a:bodyPr wrap="none" rtlCol="0">
+            <a:spAutoFit/>
+          </a:bodyPr>
+          <a:lstStyle/>
+          <a:p>
+            <a:pPr marL="285750" indent="-285750">
+              <a:buFont typeface="Wingdings" pitchFamily="2" charset="2"/>
+              <a:buChar char="q"/>
+            </a:pPr>
+            <a:r>
+              <a:rPr lang="en-US" dirty="0"/>
+              <a:t>Start_Setting_Timer</a:t>
+            </a:r>
+          </a:p>
+        </p:txBody>
+      </p:sp>
+      <p:pic>
+        <p:nvPicPr>
+          <p:cNvPr id="6" name="Picture 5"/>
+          <p:cNvPicPr>
+            <a:picLocks noChangeAspect="1"/>
+          </p:cNvPicPr>
+          <p:nvPr/>
+        </p:nvPicPr>
+        <p:blipFill>
+          <a:blip r:embed="rId2">
+            <a:extLst>
+              <a:ext uri="{28A0092B-C50C-407E-A947-70E740481C1C}">
+                <a14:useLocalDpi xmlns:a14="http://schemas.microsoft.com/office/drawing/2010/main" val="0"/>
+              </a:ext>
+            </a:extLst>
+          </a:blip>
+          <a:stretch>
+            <a:fillRect/>
+          </a:stretch>
+        </p:blipFill>
+        <p:spPr>
+          <a:xfrm>
+            <a:off x="2057400" y="523875"/>
+            <a:ext cx="5105399" cy="5810250"/>
+          </a:xfrm>
+          <a:prstGeom prst="rect">
+            <a:avLst/>
+          </a:prstGeom>
+        </p:spPr>
+      </p:pic>
+    </p:spTree>
+    <p:extLst>
+      <p:ext uri="{BB962C8B-B14F-4D97-AF65-F5344CB8AC3E}">
+        <p14:creationId xmlns:p14="http://schemas.microsoft.com/office/powerpoint/2010/main" val="2383129205"/>
+      </p:ext>
+    </p:extLst>
+  </p:cSld>
+  <p:clrMapOvr>
+    <a:masterClrMapping/>
+  </p:clrMapOvr>
+  <p:timing>
+    <p:tnLst>
+      <p:par>
+        <p:cTn id="1" dur="indefinite" restart="never" nodeType="tmRoot"/>
+      </p:par>
+    </p:tnLst>
+  </p:timing>
+</p:sld>
+</file>
+
+<file path=ppt/slides/slide16.xml><?xml version="1.0" encoding="utf-8"?>
+<p:sld xmlns:a="http://schemas.openxmlformats.org/drawingml/2006/main" xmlns:r="http://schemas.openxmlformats.org/officeDocument/2006/relationships" xmlns:p="http://schemas.openxmlformats.org/presentationml/2006/main">
+  <p:cSld>
+    <p:spTree>
+      <p:nvGrpSpPr>
+        <p:cNvPr id="1" name=""/>
+        <p:cNvGrpSpPr/>
+        <p:nvPr/>
+      </p:nvGrpSpPr>
+      <p:grpSpPr>
+        <a:xfrm>
+          <a:off x="0" y="0"/>
+          <a:ext cx="0" cy="0"/>
+          <a:chOff x="0" y="0"/>
+          <a:chExt cx="0" cy="0"/>
+        </a:xfrm>
+      </p:grpSpPr>
+      <p:sp>
+        <p:nvSpPr>
+          <p:cNvPr id="4" name="TextBox 3"/>
+          <p:cNvSpPr txBox="1"/>
+          <p:nvPr/>
+        </p:nvSpPr>
+        <p:spPr>
+          <a:xfrm>
+            <a:off x="76200" y="179427"/>
+            <a:ext cx="2638928" cy="646331"/>
+          </a:xfrm>
+          <a:prstGeom prst="rect">
+            <a:avLst/>
+          </a:prstGeom>
+          <a:noFill/>
+        </p:spPr>
+        <p:txBody>
+          <a:bodyPr wrap="none" rtlCol="0">
+            <a:spAutoFit/>
+          </a:bodyPr>
+          <a:lstStyle/>
+          <a:p>
+            <a:pPr marL="285750" indent="-285750">
+              <a:buFont typeface="Wingdings" pitchFamily="2" charset="2"/>
+              <a:buChar char="q"/>
+            </a:pPr>
+            <a:r>
+              <a:rPr lang="en-US" dirty="0" smtClean="0"/>
+              <a:t>Temperature</a:t>
+            </a:r>
+          </a:p>
+          <a:p>
+            <a:pPr marL="742950" lvl="1" indent="-285750">
+              <a:buFont typeface="Wingdings" pitchFamily="2" charset="2"/>
+              <a:buChar char="q"/>
+            </a:pPr>
+            <a:r>
+              <a:rPr lang="en-US" dirty="0"/>
+              <a:t>Temperature_Calc</a:t>
+            </a:r>
+          </a:p>
+        </p:txBody>
+      </p:sp>
+      <p:pic>
+        <p:nvPicPr>
+          <p:cNvPr id="6" name="Picture 5"/>
+          <p:cNvPicPr>
+            <a:picLocks noChangeAspect="1"/>
+          </p:cNvPicPr>
+          <p:nvPr/>
+        </p:nvPicPr>
+        <p:blipFill>
+          <a:blip r:embed="rId2">
+            <a:extLst>
+              <a:ext uri="{28A0092B-C50C-407E-A947-70E740481C1C}">
+                <a14:useLocalDpi xmlns:a14="http://schemas.microsoft.com/office/drawing/2010/main" val="0"/>
+              </a:ext>
+            </a:extLst>
+          </a:blip>
+          <a:stretch>
+            <a:fillRect/>
+          </a:stretch>
+        </p:blipFill>
+        <p:spPr>
+          <a:xfrm>
+            <a:off x="76200" y="1038225"/>
+            <a:ext cx="3984171" cy="4781550"/>
+          </a:xfrm>
+          <a:prstGeom prst="rect">
+            <a:avLst/>
+          </a:prstGeom>
+        </p:spPr>
+      </p:pic>
+      <p:sp>
+        <p:nvSpPr>
+          <p:cNvPr id="7" name="TextBox 6"/>
+          <p:cNvSpPr txBox="1"/>
+          <p:nvPr/>
+        </p:nvSpPr>
+        <p:spPr>
+          <a:xfrm>
+            <a:off x="5562600" y="179427"/>
+            <a:ext cx="2324291" cy="646331"/>
+          </a:xfrm>
+          <a:prstGeom prst="rect">
+            <a:avLst/>
+          </a:prstGeom>
+          <a:noFill/>
+        </p:spPr>
+        <p:txBody>
+          <a:bodyPr wrap="none" rtlCol="0">
+            <a:spAutoFit/>
+          </a:bodyPr>
+          <a:lstStyle/>
+          <a:p>
+            <a:pPr marL="285750" indent="-285750">
+              <a:buFont typeface="Wingdings" pitchFamily="2" charset="2"/>
+              <a:buChar char="q"/>
+            </a:pPr>
+            <a:r>
+              <a:rPr lang="en-US" dirty="0"/>
+              <a:t>Average</a:t>
+            </a:r>
+            <a:endParaRPr lang="en-US" dirty="0" smtClean="0"/>
+          </a:p>
+          <a:p>
+            <a:pPr marL="742950" lvl="1" indent="-285750">
+              <a:buFont typeface="Wingdings" pitchFamily="2" charset="2"/>
+              <a:buChar char="q"/>
+            </a:pPr>
+            <a:r>
+              <a:rPr lang="en-US" dirty="0" err="1"/>
+              <a:t>Average_Value</a:t>
+            </a:r>
+            <a:endParaRPr lang="en-US" dirty="0"/>
+          </a:p>
+        </p:txBody>
+      </p:sp>
+      <p:pic>
+        <p:nvPicPr>
+          <p:cNvPr id="8" name="Picture 7"/>
+          <p:cNvPicPr>
+            <a:picLocks noChangeAspect="1"/>
+          </p:cNvPicPr>
+          <p:nvPr/>
+        </p:nvPicPr>
+        <p:blipFill>
+          <a:blip r:embed="rId3">
+            <a:extLst>
+              <a:ext uri="{28A0092B-C50C-407E-A947-70E740481C1C}">
+                <a14:useLocalDpi xmlns:a14="http://schemas.microsoft.com/office/drawing/2010/main" val="0"/>
+              </a:ext>
+            </a:extLst>
+          </a:blip>
+          <a:stretch>
+            <a:fillRect/>
+          </a:stretch>
+        </p:blipFill>
+        <p:spPr>
+          <a:xfrm>
+            <a:off x="4876800" y="1171575"/>
+            <a:ext cx="4191000" cy="4781550"/>
+          </a:xfrm>
+          <a:prstGeom prst="rect">
+            <a:avLst/>
+          </a:prstGeom>
+        </p:spPr>
+      </p:pic>
+    </p:spTree>
+    <p:extLst>
+      <p:ext uri="{BB962C8B-B14F-4D97-AF65-F5344CB8AC3E}">
+        <p14:creationId xmlns:p14="http://schemas.microsoft.com/office/powerpoint/2010/main" val="2027477319"/>
+      </p:ext>
+    </p:extLst>
+  </p:cSld>
+  <p:clrMapOvr>
+    <a:masterClrMapping/>
+  </p:clrMapOvr>
+  <p:timing>
+    <p:tnLst>
+      <p:par>
+        <p:cTn id="1" dur="indefinite" restart="never" nodeType="tmRoot"/>
+      </p:par>
+    </p:tnLst>
+  </p:timing>
+</p:sld>
+</file>
+
+<file path=ppt/slides/slide17.xml><?xml version="1.0" encoding="utf-8"?>
+<p:sld xmlns:a="http://schemas.openxmlformats.org/drawingml/2006/main" xmlns:r="http://schemas.openxmlformats.org/officeDocument/2006/relationships" xmlns:p="http://schemas.openxmlformats.org/presentationml/2006/main">
+  <p:cSld>
+    <p:spTree>
+      <p:nvGrpSpPr>
+        <p:cNvPr id="1" name=""/>
+        <p:cNvGrpSpPr/>
+        <p:nvPr/>
+      </p:nvGrpSpPr>
+      <p:grpSpPr>
+        <a:xfrm>
+          <a:off x="0" y="0"/>
+          <a:ext cx="0" cy="0"/>
+          <a:chOff x="0" y="0"/>
+          <a:chExt cx="0" cy="0"/>
+        </a:xfrm>
+      </p:grpSpPr>
+      <p:sp>
+        <p:nvSpPr>
+          <p:cNvPr id="4" name="TextBox 3"/>
+          <p:cNvSpPr txBox="1"/>
+          <p:nvPr/>
+        </p:nvSpPr>
+        <p:spPr>
+          <a:xfrm>
+            <a:off x="76200" y="179427"/>
+            <a:ext cx="2753895" cy="646331"/>
+          </a:xfrm>
+          <a:prstGeom prst="rect">
+            <a:avLst/>
+          </a:prstGeom>
+          <a:noFill/>
+        </p:spPr>
+        <p:txBody>
+          <a:bodyPr wrap="none" rtlCol="0">
+            <a:spAutoFit/>
+          </a:bodyPr>
+          <a:lstStyle/>
+          <a:p>
+            <a:pPr marL="285750" indent="-285750">
+              <a:buFont typeface="Wingdings" pitchFamily="2" charset="2"/>
+              <a:buChar char="q"/>
+            </a:pPr>
+            <a:r>
+              <a:rPr lang="en-US" dirty="0"/>
+              <a:t>EEPROM</a:t>
+            </a:r>
+            <a:endParaRPr lang="en-US" dirty="0" smtClean="0"/>
+          </a:p>
+          <a:p>
+            <a:pPr marL="742950" lvl="1" indent="-285750">
+              <a:buFont typeface="Wingdings" pitchFamily="2" charset="2"/>
+              <a:buChar char="q"/>
+            </a:pPr>
+            <a:r>
+              <a:rPr lang="en-US" dirty="0" err="1"/>
+              <a:t>Get_EEPROM_Data</a:t>
+            </a:r>
+            <a:endParaRPr lang="en-US" dirty="0"/>
+          </a:p>
+        </p:txBody>
+      </p:sp>
+      <p:pic>
+        <p:nvPicPr>
+          <p:cNvPr id="6" name="Picture 5"/>
+          <p:cNvPicPr>
+            <a:picLocks noChangeAspect="1"/>
+          </p:cNvPicPr>
+          <p:nvPr/>
+        </p:nvPicPr>
+        <p:blipFill>
+          <a:blip r:embed="rId2">
+            <a:extLst>
+              <a:ext uri="{28A0092B-C50C-407E-A947-70E740481C1C}">
+                <a14:useLocalDpi xmlns:a14="http://schemas.microsoft.com/office/drawing/2010/main" val="0"/>
+              </a:ext>
+            </a:extLst>
+          </a:blip>
+          <a:stretch>
+            <a:fillRect/>
+          </a:stretch>
+        </p:blipFill>
+        <p:spPr>
+          <a:xfrm>
+            <a:off x="76200" y="990599"/>
+            <a:ext cx="6019800" cy="5714999"/>
+          </a:xfrm>
+          <a:prstGeom prst="rect">
+            <a:avLst/>
+          </a:prstGeom>
+        </p:spPr>
+      </p:pic>
+      <p:sp>
+        <p:nvSpPr>
+          <p:cNvPr id="7" name="TextBox 6"/>
+          <p:cNvSpPr txBox="1"/>
+          <p:nvPr/>
+        </p:nvSpPr>
+        <p:spPr>
+          <a:xfrm>
+            <a:off x="5715000" y="205769"/>
+            <a:ext cx="1872757" cy="369332"/>
+          </a:xfrm>
+          <a:prstGeom prst="rect">
+            <a:avLst/>
+          </a:prstGeom>
+          <a:noFill/>
+        </p:spPr>
+        <p:txBody>
+          <a:bodyPr wrap="none" rtlCol="0">
+            <a:spAutoFit/>
+          </a:bodyPr>
+          <a:lstStyle/>
+          <a:p>
+            <a:pPr marL="285750" indent="-285750">
+              <a:buFont typeface="Wingdings" pitchFamily="2" charset="2"/>
+              <a:buChar char="q"/>
+            </a:pPr>
+            <a:r>
+              <a:rPr lang="en-US" dirty="0" err="1"/>
+              <a:t>EEPROM_Read</a:t>
+            </a:r>
+            <a:endParaRPr lang="en-US" dirty="0"/>
+          </a:p>
+        </p:txBody>
+      </p:sp>
+      <p:pic>
+        <p:nvPicPr>
+          <p:cNvPr id="8" name="Picture 7"/>
+          <p:cNvPicPr>
+            <a:picLocks noChangeAspect="1"/>
+          </p:cNvPicPr>
+          <p:nvPr/>
+        </p:nvPicPr>
+        <p:blipFill>
+          <a:blip r:embed="rId3">
+            <a:extLst>
+              <a:ext uri="{28A0092B-C50C-407E-A947-70E740481C1C}">
+                <a14:useLocalDpi xmlns:a14="http://schemas.microsoft.com/office/drawing/2010/main" val="0"/>
+              </a:ext>
+            </a:extLst>
+          </a:blip>
+          <a:stretch>
+            <a:fillRect/>
+          </a:stretch>
+        </p:blipFill>
+        <p:spPr>
+          <a:xfrm>
+            <a:off x="6239615" y="685800"/>
+            <a:ext cx="1826413" cy="6019799"/>
+          </a:xfrm>
+          <a:prstGeom prst="rect">
+            <a:avLst/>
+          </a:prstGeom>
+        </p:spPr>
+      </p:pic>
+    </p:spTree>
+    <p:extLst>
+      <p:ext uri="{BB962C8B-B14F-4D97-AF65-F5344CB8AC3E}">
+        <p14:creationId xmlns:p14="http://schemas.microsoft.com/office/powerpoint/2010/main" val="903947157"/>
+      </p:ext>
+    </p:extLst>
+  </p:cSld>
+  <p:clrMapOvr>
+    <a:masterClrMapping/>
+  </p:clrMapOvr>
+  <p:timing>
+    <p:tnLst>
+      <p:par>
+        <p:cTn id="1" dur="indefinite" restart="never" nodeType="tmRoot"/>
+      </p:par>
+    </p:tnLst>
+  </p:timing>
+</p:sld>
+</file>
+
+<file path=ppt/slides/slide18.xml><?xml version="1.0" encoding="utf-8"?>
+<p:sld xmlns:a="http://schemas.openxmlformats.org/drawingml/2006/main" xmlns:r="http://schemas.openxmlformats.org/officeDocument/2006/relationships" xmlns:p="http://schemas.openxmlformats.org/presentationml/2006/main">
+  <p:cSld>
+    <p:spTree>
+      <p:nvGrpSpPr>
+        <p:cNvPr id="1" name=""/>
+        <p:cNvGrpSpPr/>
+        <p:nvPr/>
+      </p:nvGrpSpPr>
+      <p:grpSpPr>
+        <a:xfrm>
+          <a:off x="0" y="0"/>
+          <a:ext cx="0" cy="0"/>
+          <a:chOff x="0" y="0"/>
+          <a:chExt cx="0" cy="0"/>
+        </a:xfrm>
+      </p:grpSpPr>
+      <p:sp>
+        <p:nvSpPr>
+          <p:cNvPr id="4" name="TextBox 3"/>
+          <p:cNvSpPr txBox="1"/>
+          <p:nvPr/>
+        </p:nvSpPr>
+        <p:spPr>
+          <a:xfrm>
+            <a:off x="152400" y="205769"/>
+            <a:ext cx="2252155" cy="369332"/>
+          </a:xfrm>
+          <a:prstGeom prst="rect">
+            <a:avLst/>
+          </a:prstGeom>
+          <a:noFill/>
+        </p:spPr>
+        <p:txBody>
+          <a:bodyPr wrap="none" rtlCol="0">
+            <a:spAutoFit/>
+          </a:bodyPr>
+          <a:lstStyle/>
+          <a:p>
+            <a:pPr marL="285750" indent="-285750">
+              <a:buFont typeface="Wingdings" pitchFamily="2" charset="2"/>
+              <a:buChar char="q"/>
+            </a:pPr>
+            <a:r>
+              <a:rPr lang="en-US" dirty="0" err="1"/>
+              <a:t>Set_EEPROM_Data</a:t>
+            </a:r>
+            <a:endParaRPr lang="en-US" dirty="0"/>
+          </a:p>
+        </p:txBody>
+      </p:sp>
+      <p:pic>
+        <p:nvPicPr>
+          <p:cNvPr id="5" name="Picture 4"/>
+          <p:cNvPicPr>
+            <a:picLocks noChangeAspect="1"/>
+          </p:cNvPicPr>
+          <p:nvPr/>
+        </p:nvPicPr>
+        <p:blipFill>
+          <a:blip r:embed="rId2">
+            <a:extLst>
+              <a:ext uri="{28A0092B-C50C-407E-A947-70E740481C1C}">
+                <a14:useLocalDpi xmlns:a14="http://schemas.microsoft.com/office/drawing/2010/main" val="0"/>
+              </a:ext>
+            </a:extLst>
+          </a:blip>
+          <a:stretch>
+            <a:fillRect/>
+          </a:stretch>
+        </p:blipFill>
+        <p:spPr>
+          <a:xfrm>
+            <a:off x="0" y="819150"/>
+            <a:ext cx="4800600" cy="5410200"/>
+          </a:xfrm>
+          <a:prstGeom prst="rect">
+            <a:avLst/>
+          </a:prstGeom>
+        </p:spPr>
+      </p:pic>
+      <p:sp>
+        <p:nvSpPr>
+          <p:cNvPr id="6" name="TextBox 5"/>
+          <p:cNvSpPr txBox="1"/>
+          <p:nvPr/>
+        </p:nvSpPr>
+        <p:spPr>
+          <a:xfrm>
+            <a:off x="6324599" y="205769"/>
+            <a:ext cx="1925271" cy="369332"/>
+          </a:xfrm>
+          <a:prstGeom prst="rect">
+            <a:avLst/>
+          </a:prstGeom>
+          <a:noFill/>
+        </p:spPr>
+        <p:txBody>
+          <a:bodyPr wrap="none" rtlCol="0">
+            <a:spAutoFit/>
+          </a:bodyPr>
+          <a:lstStyle/>
+          <a:p>
+            <a:pPr marL="285750" indent="-285750">
+              <a:buFont typeface="Wingdings" pitchFamily="2" charset="2"/>
+              <a:buChar char="q"/>
+            </a:pPr>
+            <a:r>
+              <a:rPr lang="en-US" dirty="0" err="1"/>
+              <a:t>EEPROM_Write</a:t>
+            </a:r>
+            <a:endParaRPr lang="en-US" dirty="0"/>
+          </a:p>
+        </p:txBody>
+      </p:sp>
+      <p:pic>
+        <p:nvPicPr>
+          <p:cNvPr id="7" name="Picture 6"/>
+          <p:cNvPicPr>
+            <a:picLocks noChangeAspect="1"/>
+          </p:cNvPicPr>
+          <p:nvPr/>
+        </p:nvPicPr>
+        <p:blipFill>
+          <a:blip r:embed="rId3">
+            <a:extLst>
+              <a:ext uri="{28A0092B-C50C-407E-A947-70E740481C1C}">
+                <a14:useLocalDpi xmlns:a14="http://schemas.microsoft.com/office/drawing/2010/main" val="0"/>
+              </a:ext>
+            </a:extLst>
+          </a:blip>
+          <a:stretch>
+            <a:fillRect/>
+          </a:stretch>
+        </p:blipFill>
+        <p:spPr>
+          <a:xfrm>
+            <a:off x="6553200" y="819150"/>
+            <a:ext cx="1828800" cy="5581650"/>
+          </a:xfrm>
+          <a:prstGeom prst="rect">
+            <a:avLst/>
+          </a:prstGeom>
+        </p:spPr>
+      </p:pic>
+    </p:spTree>
+    <p:extLst>
+      <p:ext uri="{BB962C8B-B14F-4D97-AF65-F5344CB8AC3E}">
+        <p14:creationId xmlns:p14="http://schemas.microsoft.com/office/powerpoint/2010/main" val="1602406984"/>
+      </p:ext>
+    </p:extLst>
+  </p:cSld>
+  <p:clrMapOvr>
+    <a:masterClrMapping/>
+  </p:clrMapOvr>
+  <p:timing>
+    <p:tnLst>
+      <p:par>
+        <p:cTn id="1" dur="indefinite" restart="never" nodeType="tmRoot"/>
+      </p:par>
+    </p:tnLst>
+  </p:timing>
+</p:sld>
+</file>
+
+<file path=ppt/slides/slide19.xml><?xml version="1.0" encoding="utf-8"?>
+<p:sld xmlns:a="http://schemas.openxmlformats.org/drawingml/2006/main" xmlns:r="http://schemas.openxmlformats.org/officeDocument/2006/relationships" xmlns:p="http://schemas.openxmlformats.org/presentationml/2006/main">
+  <p:cSld>
+    <p:spTree>
+      <p:nvGrpSpPr>
+        <p:cNvPr id="1" name=""/>
+        <p:cNvGrpSpPr/>
+        <p:nvPr/>
+      </p:nvGrpSpPr>
+      <p:grpSpPr>
+        <a:xfrm>
+          <a:off x="0" y="0"/>
+          <a:ext cx="0" cy="0"/>
+          <a:chOff x="0" y="0"/>
+          <a:chExt cx="0" cy="0"/>
+        </a:xfrm>
+      </p:grpSpPr>
+      <p:sp>
+        <p:nvSpPr>
+          <p:cNvPr id="4" name="TextBox 3"/>
+          <p:cNvSpPr txBox="1"/>
+          <p:nvPr/>
+        </p:nvSpPr>
+        <p:spPr>
+          <a:xfrm>
+            <a:off x="76200" y="179427"/>
+            <a:ext cx="2292615" cy="646331"/>
+          </a:xfrm>
+          <a:prstGeom prst="rect">
+            <a:avLst/>
+          </a:prstGeom>
+          <a:noFill/>
+        </p:spPr>
+        <p:txBody>
+          <a:bodyPr wrap="none" rtlCol="0">
+            <a:spAutoFit/>
+          </a:bodyPr>
+          <a:lstStyle/>
+          <a:p>
+            <a:pPr marL="285750" indent="-285750">
+              <a:buFont typeface="Wingdings" pitchFamily="2" charset="2"/>
+              <a:buChar char="q"/>
+            </a:pPr>
+            <a:r>
+              <a:rPr lang="en-US" dirty="0"/>
+              <a:t>Scheduler</a:t>
+            </a:r>
+            <a:endParaRPr lang="en-US" dirty="0" smtClean="0"/>
+          </a:p>
+          <a:p>
+            <a:pPr marL="742950" lvl="1" indent="-285750">
+              <a:buFont typeface="Wingdings" pitchFamily="2" charset="2"/>
+              <a:buChar char="q"/>
+            </a:pPr>
+            <a:r>
+              <a:rPr lang="en-US" dirty="0" err="1"/>
+              <a:t>Scheduler_Init</a:t>
+            </a:r>
+            <a:endParaRPr lang="en-US" dirty="0"/>
+          </a:p>
+        </p:txBody>
+      </p:sp>
+      <p:pic>
+        <p:nvPicPr>
+          <p:cNvPr id="5" name="Picture 4"/>
+          <p:cNvPicPr>
+            <a:picLocks noChangeAspect="1"/>
+          </p:cNvPicPr>
+          <p:nvPr/>
+        </p:nvPicPr>
+        <p:blipFill>
+          <a:blip r:embed="rId2">
+            <a:extLst>
+              <a:ext uri="{28A0092B-C50C-407E-A947-70E740481C1C}">
+                <a14:useLocalDpi xmlns:a14="http://schemas.microsoft.com/office/drawing/2010/main" val="0"/>
+              </a:ext>
+            </a:extLst>
+          </a:blip>
+          <a:stretch>
+            <a:fillRect/>
+          </a:stretch>
+        </p:blipFill>
+        <p:spPr>
+          <a:xfrm>
+            <a:off x="0" y="1600200"/>
+            <a:ext cx="2819400" cy="4038600"/>
+          </a:xfrm>
+          <a:prstGeom prst="rect">
+            <a:avLst/>
+          </a:prstGeom>
+        </p:spPr>
+      </p:pic>
+      <p:sp>
+        <p:nvSpPr>
+          <p:cNvPr id="6" name="TextBox 5"/>
+          <p:cNvSpPr txBox="1"/>
+          <p:nvPr/>
+        </p:nvSpPr>
+        <p:spPr>
+          <a:xfrm>
+            <a:off x="5714999" y="104685"/>
+            <a:ext cx="2680157" cy="369332"/>
+          </a:xfrm>
+          <a:prstGeom prst="rect">
+            <a:avLst/>
+          </a:prstGeom>
+          <a:noFill/>
+        </p:spPr>
+        <p:txBody>
+          <a:bodyPr wrap="none" rtlCol="0">
+            <a:spAutoFit/>
+          </a:bodyPr>
+          <a:lstStyle/>
+          <a:p>
+            <a:pPr marL="285750" indent="-285750">
+              <a:buFont typeface="Wingdings" pitchFamily="2" charset="2"/>
+              <a:buChar char="q"/>
+            </a:pPr>
+            <a:r>
+              <a:rPr lang="en-US" dirty="0" err="1"/>
+              <a:t>Scheduler_ActivateTask</a:t>
+            </a:r>
+            <a:endParaRPr lang="en-US" dirty="0"/>
+          </a:p>
+        </p:txBody>
+      </p:sp>
+      <p:pic>
+        <p:nvPicPr>
+          <p:cNvPr id="8" name="Picture 7"/>
+          <p:cNvPicPr>
+            <a:picLocks noChangeAspect="1"/>
+          </p:cNvPicPr>
+          <p:nvPr/>
+        </p:nvPicPr>
+        <p:blipFill>
+          <a:blip r:embed="rId3">
+            <a:extLst>
+              <a:ext uri="{28A0092B-C50C-407E-A947-70E740481C1C}">
+                <a14:useLocalDpi xmlns:a14="http://schemas.microsoft.com/office/drawing/2010/main" val="0"/>
+              </a:ext>
+            </a:extLst>
+          </a:blip>
+          <a:stretch>
+            <a:fillRect/>
+          </a:stretch>
+        </p:blipFill>
+        <p:spPr>
+          <a:xfrm>
+            <a:off x="4092118" y="914400"/>
+            <a:ext cx="5042357" cy="3810000"/>
+          </a:xfrm>
+          <a:prstGeom prst="rect">
+            <a:avLst/>
+          </a:prstGeom>
+        </p:spPr>
+      </p:pic>
+    </p:spTree>
+    <p:extLst>
+      <p:ext uri="{BB962C8B-B14F-4D97-AF65-F5344CB8AC3E}">
+        <p14:creationId xmlns:p14="http://schemas.microsoft.com/office/powerpoint/2010/main" val="3436191451"/>
+      </p:ext>
+    </p:extLst>
+  </p:cSld>
+  <p:clrMapOvr>
+    <a:masterClrMapping/>
+  </p:clrMapOvr>
+  <p:timing>
+    <p:tnLst>
+      <p:par>
+        <p:cTn id="1" dur="indefinite" restart="never" nodeType="tmRoot"/>
+      </p:par>
+    </p:tnLst>
+  </p:timing>
+</p:sld>
+</file>
+
 <file path=ppt/slides/slide2.xml><?xml version="1.0" encoding="utf-8"?>
 <p:sld xmlns:a="http://schemas.openxmlformats.org/drawingml/2006/main" xmlns:r="http://schemas.openxmlformats.org/officeDocument/2006/relationships" xmlns:p="http://schemas.openxmlformats.org/presentationml/2006/main">
   <p:cSld>
@@ -6344,7 +7934,7 @@
         <p:spPr>
           <a:xfrm>
             <a:off x="0" y="819128"/>
-            <a:ext cx="2623458" cy="1077218"/>
+            <a:ext cx="2623458" cy="1569660"/>
           </a:xfrm>
           <a:prstGeom prst="rect">
             <a:avLst/>
@@ -6421,6 +8011,56 @@
                   </a:schemeClr>
                 </a:solidFill>
               </a:rPr>
+              <a:t>SSD_SelectDisplay</a:t>
+            </a:r>
+            <a:endParaRPr lang="en-US" sz="1600" b="1" dirty="0">
+              <a:solidFill>
+                <a:schemeClr val="tx2">
+                  <a:lumMod val="60000"/>
+                  <a:lumOff val="40000"/>
+                </a:schemeClr>
+              </a:solidFill>
+            </a:endParaRPr>
+          </a:p>
+          <a:p>
+            <a:pPr marL="800100" lvl="1" indent="-342900">
+              <a:buFont typeface="Wingdings" pitchFamily="2" charset="2"/>
+              <a:buChar char="q"/>
+            </a:pPr>
+            <a:r>
+              <a:rPr lang="en-US" sz="1600" b="1" dirty="0" smtClean="0">
+                <a:solidFill>
+                  <a:schemeClr val="tx2">
+                    <a:lumMod val="60000"/>
+                    <a:lumOff val="40000"/>
+                  </a:schemeClr>
+                </a:solidFill>
+              </a:rPr>
+              <a:t>SSD_SelectDigit</a:t>
+            </a:r>
+            <a:endParaRPr lang="en-US" sz="1600" b="1" dirty="0" smtClean="0">
+              <a:solidFill>
+                <a:schemeClr val="tx2">
+                  <a:lumMod val="60000"/>
+                  <a:lumOff val="40000"/>
+                </a:schemeClr>
+              </a:solidFill>
+            </a:endParaRPr>
+          </a:p>
+          <a:p>
+            <a:pPr marL="800100" lvl="1" indent="-342900">
+              <a:buFont typeface="Wingdings" pitchFamily="2" charset="2"/>
+              <a:buChar char="q"/>
+            </a:pPr>
+            <a:r>
+              <a:rPr lang="en-US" sz="1600" b="1" dirty="0" smtClean="0">
+                <a:solidFill>
+                  <a:schemeClr val="tx2">
+                    <a:lumMod val="60000"/>
+                    <a:lumOff val="40000"/>
+                  </a:schemeClr>
+                </a:solidFill>
+              </a:rPr>
               <a:t>SSD_BLINK </a:t>
             </a:r>
             <a:endParaRPr lang="en-US" sz="1600" dirty="0" smtClean="0"/>
@@ -6435,7 +8075,7 @@
         </p:nvSpPr>
         <p:spPr>
           <a:xfrm>
-            <a:off x="-32661" y="1947797"/>
+            <a:off x="-13613" y="2388788"/>
             <a:ext cx="3102428" cy="1323439"/>
           </a:xfrm>
           <a:prstGeom prst="rect">
@@ -6544,7 +8184,7 @@
         </p:nvSpPr>
         <p:spPr>
           <a:xfrm>
-            <a:off x="-32661" y="3322611"/>
+            <a:off x="-13613" y="3726806"/>
             <a:ext cx="2841170" cy="1077218"/>
           </a:xfrm>
           <a:prstGeom prst="rect">
@@ -7413,7 +9053,7 @@
         </p:nvSpPr>
         <p:spPr>
           <a:xfrm>
-            <a:off x="19048" y="4707959"/>
+            <a:off x="0" y="4918900"/>
             <a:ext cx="2999010" cy="1077218"/>
           </a:xfrm>
           <a:prstGeom prst="rect">
@@ -7558,6 +9198,223 @@
     <p:extLst>
       <p:ext uri="{BB962C8B-B14F-4D97-AF65-F5344CB8AC3E}">
         <p14:creationId xmlns:p14="http://schemas.microsoft.com/office/powerpoint/2010/main" val="2164364057"/>
+      </p:ext>
+    </p:extLst>
+  </p:cSld>
+  <p:clrMapOvr>
+    <a:masterClrMapping/>
+  </p:clrMapOvr>
+  <p:timing>
+    <p:tnLst>
+      <p:par>
+        <p:cTn id="1" dur="indefinite" restart="never" nodeType="tmRoot"/>
+      </p:par>
+    </p:tnLst>
+  </p:timing>
+</p:sld>
+</file>
+
+<file path=ppt/slides/slide20.xml><?xml version="1.0" encoding="utf-8"?>
+<p:sld xmlns:a="http://schemas.openxmlformats.org/drawingml/2006/main" xmlns:r="http://schemas.openxmlformats.org/officeDocument/2006/relationships" xmlns:p="http://schemas.openxmlformats.org/presentationml/2006/main">
+  <p:cSld>
+    <p:spTree>
+      <p:nvGrpSpPr>
+        <p:cNvPr id="1" name=""/>
+        <p:cNvGrpSpPr/>
+        <p:nvPr/>
+      </p:nvGrpSpPr>
+      <p:grpSpPr>
+        <a:xfrm>
+          <a:off x="0" y="0"/>
+          <a:ext cx="0" cy="0"/>
+          <a:chOff x="0" y="0"/>
+          <a:chExt cx="0" cy="0"/>
+        </a:xfrm>
+      </p:grpSpPr>
+      <p:sp>
+        <p:nvSpPr>
+          <p:cNvPr id="4" name="TextBox 3"/>
+          <p:cNvSpPr txBox="1"/>
+          <p:nvPr/>
+        </p:nvSpPr>
+        <p:spPr>
+          <a:xfrm>
+            <a:off x="152399" y="104685"/>
+            <a:ext cx="1969193" cy="369332"/>
+          </a:xfrm>
+          <a:prstGeom prst="rect">
+            <a:avLst/>
+          </a:prstGeom>
+          <a:noFill/>
+        </p:spPr>
+        <p:txBody>
+          <a:bodyPr wrap="none" rtlCol="0">
+            <a:spAutoFit/>
+          </a:bodyPr>
+          <a:lstStyle/>
+          <a:p>
+            <a:pPr marL="285750" indent="-285750">
+              <a:buFont typeface="Wingdings" pitchFamily="2" charset="2"/>
+              <a:buChar char="q"/>
+            </a:pPr>
+            <a:r>
+              <a:rPr lang="en-US" dirty="0" err="1"/>
+              <a:t>Scheduler_Start</a:t>
+            </a:r>
+            <a:endParaRPr lang="en-US" dirty="0"/>
+          </a:p>
+        </p:txBody>
+      </p:sp>
+      <p:pic>
+        <p:nvPicPr>
+          <p:cNvPr id="5" name="Picture 4"/>
+          <p:cNvPicPr>
+            <a:picLocks noChangeAspect="1"/>
+          </p:cNvPicPr>
+          <p:nvPr/>
+        </p:nvPicPr>
+        <p:blipFill>
+          <a:blip r:embed="rId2">
+            <a:extLst>
+              <a:ext uri="{28A0092B-C50C-407E-A947-70E740481C1C}">
+                <a14:useLocalDpi xmlns:a14="http://schemas.microsoft.com/office/drawing/2010/main" val="0"/>
+              </a:ext>
+            </a:extLst>
+          </a:blip>
+          <a:stretch>
+            <a:fillRect/>
+          </a:stretch>
+        </p:blipFill>
+        <p:spPr>
+          <a:xfrm>
+            <a:off x="1143000" y="866775"/>
+            <a:ext cx="5791200" cy="4876800"/>
+          </a:xfrm>
+          <a:prstGeom prst="rect">
+            <a:avLst/>
+          </a:prstGeom>
+        </p:spPr>
+      </p:pic>
+    </p:spTree>
+    <p:extLst>
+      <p:ext uri="{BB962C8B-B14F-4D97-AF65-F5344CB8AC3E}">
+        <p14:creationId xmlns:p14="http://schemas.microsoft.com/office/powerpoint/2010/main" val="874812224"/>
+      </p:ext>
+    </p:extLst>
+  </p:cSld>
+  <p:clrMapOvr>
+    <a:masterClrMapping/>
+  </p:clrMapOvr>
+  <p:timing>
+    <p:tnLst>
+      <p:par>
+        <p:cTn id="1" dur="indefinite" restart="never" nodeType="tmRoot"/>
+      </p:par>
+    </p:tnLst>
+  </p:timing>
+</p:sld>
+</file>
+
+<file path=ppt/slides/slide21.xml><?xml version="1.0" encoding="utf-8"?>
+<p:sld xmlns:a="http://schemas.openxmlformats.org/drawingml/2006/main" xmlns:r="http://schemas.openxmlformats.org/officeDocument/2006/relationships" xmlns:p="http://schemas.openxmlformats.org/presentationml/2006/main">
+  <p:cSld>
+    <p:spTree>
+      <p:nvGrpSpPr>
+        <p:cNvPr id="1" name=""/>
+        <p:cNvGrpSpPr/>
+        <p:nvPr/>
+      </p:nvGrpSpPr>
+      <p:grpSpPr>
+        <a:xfrm>
+          <a:off x="0" y="0"/>
+          <a:ext cx="0" cy="0"/>
+          <a:chOff x="0" y="0"/>
+          <a:chExt cx="0" cy="0"/>
+        </a:xfrm>
+      </p:grpSpPr>
+      <p:sp>
+        <p:nvSpPr>
+          <p:cNvPr id="4" name="TextBox 3"/>
+          <p:cNvSpPr txBox="1"/>
+          <p:nvPr/>
+        </p:nvSpPr>
+        <p:spPr>
+          <a:xfrm>
+            <a:off x="76200" y="179427"/>
+            <a:ext cx="2827697" cy="646331"/>
+          </a:xfrm>
+          <a:prstGeom prst="rect">
+            <a:avLst/>
+          </a:prstGeom>
+          <a:noFill/>
+        </p:spPr>
+        <p:txBody>
+          <a:bodyPr wrap="none" rtlCol="0">
+            <a:spAutoFit/>
+          </a:bodyPr>
+          <a:lstStyle/>
+          <a:p>
+            <a:pPr marL="285750" indent="-285750">
+              <a:buFont typeface="Wingdings" pitchFamily="2" charset="2"/>
+              <a:buChar char="q"/>
+            </a:pPr>
+            <a:r>
+              <a:rPr lang="en-US" dirty="0"/>
+              <a:t>Interrupt</a:t>
+            </a:r>
+            <a:endParaRPr lang="en-US" dirty="0" smtClean="0"/>
+          </a:p>
+          <a:p>
+            <a:pPr marL="742950" lvl="1" indent="-285750">
+              <a:buFont typeface="Wingdings" pitchFamily="2" charset="2"/>
+              <a:buChar char="q"/>
+            </a:pPr>
+            <a:r>
+              <a:rPr lang="en-US" dirty="0"/>
+              <a:t> __interrupt() </a:t>
+            </a:r>
+            <a:r>
+              <a:rPr lang="en-US" dirty="0" err="1"/>
+              <a:t>myISR</a:t>
+            </a:r>
+            <a:endParaRPr lang="en-US" dirty="0"/>
+          </a:p>
+        </p:txBody>
+      </p:sp>
+      <p:pic>
+        <p:nvPicPr>
+          <p:cNvPr id="5" name="Picture 4"/>
+          <p:cNvPicPr>
+            <a:picLocks noChangeAspect="1"/>
+          </p:cNvPicPr>
+          <p:nvPr/>
+        </p:nvPicPr>
+        <p:blipFill>
+          <a:blip r:embed="rId2">
+            <a:extLst>
+              <a:ext uri="{28A0092B-C50C-407E-A947-70E740481C1C}">
+                <a14:useLocalDpi xmlns:a14="http://schemas.microsoft.com/office/drawing/2010/main" val="0"/>
+              </a:ext>
+            </a:extLst>
+          </a:blip>
+          <a:stretch>
+            <a:fillRect/>
+          </a:stretch>
+        </p:blipFill>
+        <p:spPr>
+          <a:xfrm>
+            <a:off x="1981200" y="914400"/>
+            <a:ext cx="4648200" cy="5715000"/>
+          </a:xfrm>
+          <a:prstGeom prst="rect">
+            <a:avLst/>
+          </a:prstGeom>
+        </p:spPr>
+      </p:pic>
+    </p:spTree>
+    <p:extLst>
+      <p:ext uri="{BB962C8B-B14F-4D97-AF65-F5344CB8AC3E}">
+        <p14:creationId xmlns:p14="http://schemas.microsoft.com/office/powerpoint/2010/main" val="52297288"/>
       </p:ext>
     </p:extLst>
   </p:cSld>
@@ -7600,14 +9457,14 @@
           <p:nvPr>
             <p:extLst>
               <p:ext uri="{D42A27DB-BD31-4B8C-83A1-F6EECF244321}">
-                <p14:modId xmlns:p14="http://schemas.microsoft.com/office/powerpoint/2010/main" val="3874829804"/>
+                <p14:modId xmlns:p14="http://schemas.microsoft.com/office/powerpoint/2010/main" val="3197510242"/>
               </p:ext>
             </p:extLst>
           </p:nvPr>
         </p:nvGraphicFramePr>
         <p:xfrm>
           <a:off x="228600" y="1295400"/>
-          <a:ext cx="8763000" cy="5090736"/>
+          <a:ext cx="8763000" cy="5625406"/>
         </p:xfrm>
         <a:graphic>
           <a:graphicData uri="http://schemas.openxmlformats.org/drawingml/2006/table">
@@ -7871,8 +9728,55 @@
                         <a:rPr lang="en-US" sz="1600" baseline="0" dirty="0" smtClean="0">
                           <a:effectLst/>
                         </a:rPr>
-                        <a:t> SSD</a:t>
+                        <a:t> </a:t>
                       </a:r>
+                      <a:r>
+                        <a:rPr lang="en-US" sz="1600" baseline="0" dirty="0" smtClean="0">
+                          <a:effectLst/>
+                        </a:rPr>
+                        <a:t>SSD</a:t>
+                      </a:r>
+                    </a:p>
+                    <a:p>
+                      <a:pPr marL="91440" marR="0">
+                        <a:lnSpc>
+                          <a:spcPct val="97000"/>
+                        </a:lnSpc>
+                        <a:spcBef>
+                          <a:spcPts val="215"/>
+                        </a:spcBef>
+                        <a:spcAft>
+                          <a:spcPts val="0"/>
+                        </a:spcAft>
+                      </a:pPr>
+                      <a:r>
+                        <a:rPr lang="en-US" sz="1600" baseline="0" dirty="0" smtClean="0">
+                          <a:effectLst/>
+                        </a:rPr>
+                        <a:t>SSD_SelectDisplay</a:t>
+                      </a:r>
+                    </a:p>
+                    <a:p>
+                      <a:pPr marL="91440" marR="0">
+                        <a:lnSpc>
+                          <a:spcPct val="97000"/>
+                        </a:lnSpc>
+                        <a:spcBef>
+                          <a:spcPts val="215"/>
+                        </a:spcBef>
+                        <a:spcAft>
+                          <a:spcPts val="0"/>
+                        </a:spcAft>
+                      </a:pPr>
+                      <a:r>
+                        <a:rPr lang="en-US" sz="1600" baseline="0" dirty="0" smtClean="0">
+                          <a:effectLst/>
+                        </a:rPr>
+                        <a:t>SSD_SelectDigit</a:t>
+                      </a:r>
+                      <a:endParaRPr lang="en-US" sz="1600" baseline="0" dirty="0" smtClean="0">
+                        <a:effectLst/>
+                      </a:endParaRPr>
                     </a:p>
                     <a:p>
                       <a:pPr marL="91440" marR="0">
@@ -7944,14 +9848,70 @@
                         </a:spcAft>
                       </a:pPr>
                       <a:r>
-                        <a:rPr lang="en-US" sz="1800" dirty="0">
+                        <a:rPr lang="en-US" sz="1800" dirty="0" smtClean="0">
                           <a:effectLst/>
                         </a:rPr>
                         <a:t>~0</a:t>
                       </a:r>
-                      <a:endParaRPr lang="en-US" sz="1100" dirty="0">
+                    </a:p>
+                    <a:p>
+                      <a:pPr marL="92075" marR="0" indent="0" algn="l" defTabSz="914400" rtl="0" eaLnBrk="1" fontAlgn="auto" latinLnBrk="0" hangingPunct="1">
+                        <a:lnSpc>
+                          <a:spcPts val="2180"/>
+                        </a:lnSpc>
+                        <a:spcBef>
+                          <a:spcPts val="0"/>
+                        </a:spcBef>
+                        <a:spcAft>
+                          <a:spcPts val="0"/>
+                        </a:spcAft>
+                        <a:buClrTx/>
+                        <a:buSzTx/>
+                        <a:buFontTx/>
+                        <a:buNone/>
+                        <a:tabLst/>
+                        <a:defRPr/>
+                      </a:pPr>
+                      <a:r>
+                        <a:rPr lang="en-US" sz="1800" b="0" dirty="0" smtClean="0">
+                          <a:effectLst/>
+                        </a:rPr>
+                        <a:t>~0</a:t>
+                      </a:r>
+                      <a:endParaRPr lang="en-US" sz="1800" b="0" dirty="0" smtClean="0">
                         <a:effectLst/>
-                        <a:latin typeface="Calibri"/>
+                        <a:latin typeface="+mn-lt"/>
+                        <a:ea typeface="Calibri"/>
+                        <a:cs typeface="Arial"/>
+                      </a:endParaRPr>
+                    </a:p>
+                    <a:p>
+                      <a:pPr marL="92075" marR="0" indent="0" algn="l" defTabSz="914400" rtl="0" eaLnBrk="1" fontAlgn="auto" latinLnBrk="0" hangingPunct="1">
+                        <a:lnSpc>
+                          <a:spcPts val="2180"/>
+                        </a:lnSpc>
+                        <a:spcBef>
+                          <a:spcPts val="0"/>
+                        </a:spcBef>
+                        <a:spcAft>
+                          <a:spcPts val="0"/>
+                        </a:spcAft>
+                        <a:buClrTx/>
+                        <a:buSzTx/>
+                        <a:buFontTx/>
+                        <a:buNone/>
+                        <a:tabLst/>
+                        <a:defRPr/>
+                      </a:pPr>
+                      <a:r>
+                        <a:rPr lang="en-US" sz="1800" dirty="0" smtClean="0">
+                          <a:effectLst/>
+                        </a:rPr>
+                        <a:t>~0</a:t>
+                      </a:r>
+                      <a:endParaRPr lang="en-US" sz="1800" dirty="0" smtClean="0">
+                        <a:effectLst/>
+                        <a:latin typeface="+mn-lt"/>
                         <a:ea typeface="Calibri"/>
                         <a:cs typeface="Arial"/>
                       </a:endParaRPr>
@@ -7976,12 +9936,12 @@
                         </a:spcAft>
                       </a:pPr>
                       <a:r>
-                        <a:rPr lang="en-US" sz="1800">
+                        <a:rPr lang="en-US" sz="1800" dirty="0">
                           <a:effectLst/>
                         </a:rPr>
                         <a:t>~0</a:t>
                       </a:r>
-                      <a:endParaRPr lang="en-US" sz="1100">
+                      <a:endParaRPr lang="en-US" sz="1100" dirty="0">
                         <a:effectLst/>
                       </a:endParaRPr>
                     </a:p>
@@ -7998,14 +9958,76 @@
                         </a:spcAft>
                       </a:pPr>
                       <a:r>
-                        <a:rPr lang="en-US" sz="1800">
+                        <a:rPr lang="en-US" sz="1800" dirty="0">
+                          <a:effectLst/>
+                        </a:rPr>
+                        <a:t>~</a:t>
+                      </a:r>
+                      <a:r>
+                        <a:rPr lang="en-US" sz="1800" dirty="0" smtClean="0">
+                          <a:effectLst/>
+                        </a:rPr>
+                        <a:t>0</a:t>
+                      </a:r>
+                    </a:p>
+                    <a:p>
+                      <a:pPr marL="92075" marR="0" indent="0" algn="l" defTabSz="914400" rtl="0" eaLnBrk="1" fontAlgn="auto" latinLnBrk="0" hangingPunct="1">
+                        <a:lnSpc>
+                          <a:spcPts val="2180"/>
+                        </a:lnSpc>
+                        <a:spcBef>
+                          <a:spcPts val="0"/>
+                        </a:spcBef>
+                        <a:spcAft>
+                          <a:spcPts val="0"/>
+                        </a:spcAft>
+                        <a:buClrTx/>
+                        <a:buSzTx/>
+                        <a:buFontTx/>
+                        <a:buNone/>
+                        <a:tabLst/>
+                        <a:defRPr/>
+                      </a:pPr>
+                      <a:r>
+                        <a:rPr lang="en-US" sz="1800" b="0" dirty="0" smtClean="0">
                           <a:effectLst/>
                         </a:rPr>
                         <a:t>~0</a:t>
                       </a:r>
-                      <a:endParaRPr lang="en-US" sz="1100">
+                      <a:endParaRPr lang="en-US" sz="1800" b="0" dirty="0" smtClean="0">
                         <a:effectLst/>
-                        <a:latin typeface="Calibri"/>
+                        <a:latin typeface="+mn-lt"/>
+                        <a:ea typeface="Calibri"/>
+                        <a:cs typeface="Arial"/>
+                      </a:endParaRPr>
+                    </a:p>
+                    <a:p>
+                      <a:pPr marL="92075" marR="0" indent="0" algn="l" defTabSz="914400" rtl="0" eaLnBrk="1" fontAlgn="auto" latinLnBrk="0" hangingPunct="1">
+                        <a:lnSpc>
+                          <a:spcPts val="2180"/>
+                        </a:lnSpc>
+                        <a:spcBef>
+                          <a:spcPts val="0"/>
+                        </a:spcBef>
+                        <a:spcAft>
+                          <a:spcPts val="0"/>
+                        </a:spcAft>
+                        <a:buClrTx/>
+                        <a:buSzTx/>
+                        <a:buFontTx/>
+                        <a:buNone/>
+                        <a:tabLst/>
+                        <a:defRPr/>
+                      </a:pPr>
+                      <a:r>
+                        <a:rPr lang="en-US" sz="1800" dirty="0" smtClean="0">
+                          <a:effectLst/>
+                        </a:rPr>
+                        <a:t>~0</a:t>
+                      </a:r>
+                      <a:endParaRPr lang="en-US" sz="1800" dirty="0" smtClean="0">
+                        <a:effectLst/>
+                        <a:latin typeface="+mn-lt"/>
                         <a:ea typeface="Calibri"/>
                         <a:cs typeface="Arial"/>
                       </a:endParaRPr>
@@ -8030,12 +10052,12 @@
                         </a:spcAft>
                       </a:pPr>
                       <a:r>
-                        <a:rPr lang="en-US" sz="1800">
+                        <a:rPr lang="en-US" sz="1800" dirty="0">
                           <a:effectLst/>
                         </a:rPr>
                         <a:t>20</a:t>
                       </a:r>
-                      <a:endParaRPr lang="en-US" sz="1100">
+                      <a:endParaRPr lang="en-US" sz="1100" dirty="0">
                         <a:effectLst/>
                       </a:endParaRPr>
                     </a:p>
@@ -8052,12 +10074,56 @@
                         </a:spcAft>
                       </a:pPr>
                       <a:r>
-                        <a:rPr lang="en-US" sz="1800">
+                        <a:rPr lang="en-US" sz="1800" dirty="0" smtClean="0">
                           <a:effectLst/>
                         </a:rPr>
                         <a:t>20</a:t>
                       </a:r>
-                      <a:endParaRPr lang="en-US" sz="1100">
+                    </a:p>
+                    <a:p>
+                      <a:pPr marL="93345" marR="0">
+                        <a:lnSpc>
+                          <a:spcPts val="2180"/>
+                        </a:lnSpc>
+                        <a:spcBef>
+                          <a:spcPts val="0"/>
+                        </a:spcBef>
+                        <a:spcAft>
+                          <a:spcPts val="0"/>
+                        </a:spcAft>
+                      </a:pPr>
+                      <a:r>
+                        <a:rPr lang="en-US" sz="1800" dirty="0" smtClean="0">
+                          <a:effectLst/>
+                          <a:latin typeface="Calibri"/>
+                          <a:ea typeface="Calibri"/>
+                          <a:cs typeface="Arial"/>
+                        </a:rPr>
+                        <a:t>20</a:t>
+                      </a:r>
+                    </a:p>
+                    <a:p>
+                      <a:pPr marL="93345" marR="0">
+                        <a:lnSpc>
+                          <a:spcPts val="2180"/>
+                        </a:lnSpc>
+                        <a:spcBef>
+                          <a:spcPts val="0"/>
+                        </a:spcBef>
+                        <a:spcAft>
+                          <a:spcPts val="0"/>
+                        </a:spcAft>
+                      </a:pPr>
+                      <a:r>
+                        <a:rPr lang="en-US" sz="1800" dirty="0" smtClean="0">
+                          <a:effectLst/>
+                          <a:latin typeface="Calibri"/>
+                          <a:ea typeface="Calibri"/>
+                          <a:cs typeface="Arial"/>
+                        </a:rPr>
+                        <a:t>20</a:t>
+                      </a:r>
+                      <a:endParaRPr lang="en-US" sz="1100" dirty="0">
                         <a:effectLst/>
                         <a:latin typeface="Calibri"/>
                         <a:ea typeface="Calibri"/>
@@ -11640,6 +13706,181 @@
 </p:sld>
 </file>
 
+<file path=ppt/slides/slide9.xml><?xml version="1.0" encoding="utf-8"?>
+<p:sld xmlns:a="http://schemas.openxmlformats.org/drawingml/2006/main" xmlns:r="http://schemas.openxmlformats.org/officeDocument/2006/relationships" xmlns:p="http://schemas.openxmlformats.org/presentationml/2006/main">
+  <p:cSld>
+    <p:spTree>
+      <p:nvGrpSpPr>
+        <p:cNvPr id="1" name=""/>
+        <p:cNvGrpSpPr/>
+        <p:nvPr/>
+      </p:nvGrpSpPr>
+      <p:grpSpPr>
+        <a:xfrm>
+          <a:off x="0" y="0"/>
+          <a:ext cx="0" cy="0"/>
+          <a:chOff x="0" y="0"/>
+          <a:chExt cx="0" cy="0"/>
+        </a:xfrm>
+      </p:grpSpPr>
+      <p:sp>
+        <p:nvSpPr>
+          <p:cNvPr id="6" name="TextBox 5"/>
+          <p:cNvSpPr txBox="1"/>
+          <p:nvPr/>
+        </p:nvSpPr>
+        <p:spPr>
+          <a:xfrm>
+            <a:off x="76200" y="179427"/>
+            <a:ext cx="2226379" cy="646331"/>
+          </a:xfrm>
+          <a:prstGeom prst="rect">
+            <a:avLst/>
+          </a:prstGeom>
+          <a:noFill/>
+        </p:spPr>
+        <p:txBody>
+          <a:bodyPr wrap="none" rtlCol="0">
+            <a:spAutoFit/>
+          </a:bodyPr>
+          <a:lstStyle/>
+          <a:p>
+            <a:pPr marL="285750" indent="-285750">
+              <a:buFont typeface="Wingdings" pitchFamily="2" charset="2"/>
+              <a:buChar char="q"/>
+            </a:pPr>
+            <a:r>
+              <a:rPr lang="en-US" dirty="0" smtClean="0"/>
+              <a:t>Elements</a:t>
+            </a:r>
+          </a:p>
+          <a:p>
+            <a:pPr marL="742950" lvl="1" indent="-285750">
+              <a:buFont typeface="Wingdings" pitchFamily="2" charset="2"/>
+              <a:buChar char="q"/>
+            </a:pPr>
+            <a:r>
+              <a:rPr lang="en-US" dirty="0" err="1"/>
+              <a:t>Elements_Init</a:t>
+            </a:r>
+            <a:endParaRPr lang="en-US" dirty="0"/>
+          </a:p>
+        </p:txBody>
+      </p:sp>
+      <p:pic>
+        <p:nvPicPr>
+          <p:cNvPr id="7" name="Picture 6"/>
+          <p:cNvPicPr>
+            <a:picLocks noChangeAspect="1"/>
+          </p:cNvPicPr>
+          <p:nvPr/>
+        </p:nvPicPr>
+        <p:blipFill>
+          <a:blip r:embed="rId2">
+            <a:extLst>
+              <a:ext uri="{28A0092B-C50C-407E-A947-70E740481C1C}">
+                <a14:useLocalDpi xmlns:a14="http://schemas.microsoft.com/office/drawing/2010/main" val="0"/>
+              </a:ext>
+            </a:extLst>
+          </a:blip>
+          <a:stretch>
+            <a:fillRect/>
+          </a:stretch>
+        </p:blipFill>
+        <p:spPr>
+          <a:xfrm>
+            <a:off x="381000" y="1143000"/>
+            <a:ext cx="1524000" cy="5257800"/>
+          </a:xfrm>
+          <a:prstGeom prst="rect">
+            <a:avLst/>
+          </a:prstGeom>
+        </p:spPr>
+      </p:pic>
+      <p:sp>
+        <p:nvSpPr>
+          <p:cNvPr id="8" name="TextBox 7"/>
+          <p:cNvSpPr txBox="1"/>
+          <p:nvPr/>
+        </p:nvSpPr>
+        <p:spPr>
+          <a:xfrm>
+            <a:off x="4648200" y="456426"/>
+            <a:ext cx="2758576" cy="369332"/>
+          </a:xfrm>
+          <a:prstGeom prst="rect">
+            <a:avLst/>
+          </a:prstGeom>
+          <a:noFill/>
+        </p:spPr>
+        <p:txBody>
+          <a:bodyPr wrap="none" rtlCol="0">
+            <a:spAutoFit/>
+          </a:bodyPr>
+          <a:lstStyle/>
+          <a:p>
+            <a:pPr marL="285750" indent="-285750">
+              <a:buFont typeface="Wingdings" pitchFamily="2" charset="2"/>
+              <a:buChar char="q"/>
+            </a:pPr>
+            <a:r>
+              <a:rPr lang="en-US" dirty="0" err="1"/>
+              <a:t>Elements_MainFunction</a:t>
+            </a:r>
+            <a:endParaRPr lang="en-US" dirty="0"/>
+          </a:p>
+        </p:txBody>
+      </p:sp>
+      <p:pic>
+        <p:nvPicPr>
+          <p:cNvPr id="9" name="Picture 8"/>
+          <p:cNvPicPr>
+            <a:picLocks noChangeAspect="1"/>
+          </p:cNvPicPr>
+          <p:nvPr/>
+        </p:nvPicPr>
+        <p:blipFill>
+          <a:blip r:embed="rId3">
+            <a:extLst>
+              <a:ext uri="{28A0092B-C50C-407E-A947-70E740481C1C}">
+                <a14:useLocalDpi xmlns:a14="http://schemas.microsoft.com/office/drawing/2010/main" val="0"/>
+              </a:ext>
+            </a:extLst>
+          </a:blip>
+          <a:stretch>
+            <a:fillRect/>
+          </a:stretch>
+        </p:blipFill>
+        <p:spPr>
+          <a:xfrm>
+            <a:off x="2514600" y="1110343"/>
+            <a:ext cx="6553200" cy="5715000"/>
+          </a:xfrm>
+          <a:prstGeom prst="rect">
+            <a:avLst/>
+          </a:prstGeom>
+        </p:spPr>
+      </p:pic>
+    </p:spTree>
+    <p:extLst>
+      <p:ext uri="{BB962C8B-B14F-4D97-AF65-F5344CB8AC3E}">
+        <p14:creationId xmlns:p14="http://schemas.microsoft.com/office/powerpoint/2010/main" val="4107321591"/>
+      </p:ext>
+    </p:extLst>
+  </p:cSld>
+  <p:clrMapOvr>
+    <a:masterClrMapping/>
+  </p:clrMapOvr>
+  <p:timing>
+    <p:tnLst>
+      <p:par>
+        <p:cTn id="1" dur="indefinite" restart="never" nodeType="tmRoot"/>
+      </p:par>
+    </p:tnLst>
+  </p:timing>
+</p:sld>
+</file>
+
 <file path=ppt/theme/theme1.xml><?xml version="1.0" encoding="utf-8"?>
 <a:theme xmlns:a="http://schemas.openxmlformats.org/drawingml/2006/main" name="Office Theme">
   <a:themeElements>

</xml_diff>

<commit_message>
Change EEPROM driver and i2c driver
</commit_message>
<xml_diff>
--- a/WaterHeater.pptx
+++ b/WaterHeater.pptx
@@ -26,6 +26,8 @@
     <p:sldId id="274" r:id="rId20"/>
     <p:sldId id="275" r:id="rId21"/>
     <p:sldId id="276" r:id="rId22"/>
+    <p:sldId id="277" r:id="rId23"/>
+    <p:sldId id="278" r:id="rId24"/>
   </p:sldIdLst>
   <p:sldSz cx="9144000" cy="6858000" type="screen4x3"/>
   <p:notesSz cx="6858000" cy="9144000"/>
@@ -308,7 +310,7 @@
           <a:p>
             <a:fld id="{B6D12BD2-B651-4952-86A6-7B4BE9DDEA50}" type="datetimeFigureOut">
               <a:rPr lang="en-US" smtClean="0"/>
-              <a:t>16-Jul-20</a:t>
+              <a:t>17-Jul-20</a:t>
             </a:fld>
             <a:endParaRPr lang="en-US"/>
           </a:p>
@@ -478,7 +480,7 @@
           <a:p>
             <a:fld id="{B6D12BD2-B651-4952-86A6-7B4BE9DDEA50}" type="datetimeFigureOut">
               <a:rPr lang="en-US" smtClean="0"/>
-              <a:t>16-Jul-20</a:t>
+              <a:t>17-Jul-20</a:t>
             </a:fld>
             <a:endParaRPr lang="en-US"/>
           </a:p>
@@ -658,7 +660,7 @@
           <a:p>
             <a:fld id="{B6D12BD2-B651-4952-86A6-7B4BE9DDEA50}" type="datetimeFigureOut">
               <a:rPr lang="en-US" smtClean="0"/>
-              <a:t>16-Jul-20</a:t>
+              <a:t>17-Jul-20</a:t>
             </a:fld>
             <a:endParaRPr lang="en-US"/>
           </a:p>
@@ -828,7 +830,7 @@
           <a:p>
             <a:fld id="{B6D12BD2-B651-4952-86A6-7B4BE9DDEA50}" type="datetimeFigureOut">
               <a:rPr lang="en-US" smtClean="0"/>
-              <a:t>16-Jul-20</a:t>
+              <a:t>17-Jul-20</a:t>
             </a:fld>
             <a:endParaRPr lang="en-US"/>
           </a:p>
@@ -1074,7 +1076,7 @@
           <a:p>
             <a:fld id="{B6D12BD2-B651-4952-86A6-7B4BE9DDEA50}" type="datetimeFigureOut">
               <a:rPr lang="en-US" smtClean="0"/>
-              <a:t>16-Jul-20</a:t>
+              <a:t>17-Jul-20</a:t>
             </a:fld>
             <a:endParaRPr lang="en-US"/>
           </a:p>
@@ -1362,7 +1364,7 @@
           <a:p>
             <a:fld id="{B6D12BD2-B651-4952-86A6-7B4BE9DDEA50}" type="datetimeFigureOut">
               <a:rPr lang="en-US" smtClean="0"/>
-              <a:t>16-Jul-20</a:t>
+              <a:t>17-Jul-20</a:t>
             </a:fld>
             <a:endParaRPr lang="en-US"/>
           </a:p>
@@ -1784,7 +1786,7 @@
           <a:p>
             <a:fld id="{B6D12BD2-B651-4952-86A6-7B4BE9DDEA50}" type="datetimeFigureOut">
               <a:rPr lang="en-US" smtClean="0"/>
-              <a:t>16-Jul-20</a:t>
+              <a:t>17-Jul-20</a:t>
             </a:fld>
             <a:endParaRPr lang="en-US"/>
           </a:p>
@@ -1902,7 +1904,7 @@
           <a:p>
             <a:fld id="{B6D12BD2-B651-4952-86A6-7B4BE9DDEA50}" type="datetimeFigureOut">
               <a:rPr lang="en-US" smtClean="0"/>
-              <a:t>16-Jul-20</a:t>
+              <a:t>17-Jul-20</a:t>
             </a:fld>
             <a:endParaRPr lang="en-US"/>
           </a:p>
@@ -1997,7 +1999,7 @@
           <a:p>
             <a:fld id="{B6D12BD2-B651-4952-86A6-7B4BE9DDEA50}" type="datetimeFigureOut">
               <a:rPr lang="en-US" smtClean="0"/>
-              <a:t>16-Jul-20</a:t>
+              <a:t>17-Jul-20</a:t>
             </a:fld>
             <a:endParaRPr lang="en-US"/>
           </a:p>
@@ -2274,7 +2276,7 @@
           <a:p>
             <a:fld id="{B6D12BD2-B651-4952-86A6-7B4BE9DDEA50}" type="datetimeFigureOut">
               <a:rPr lang="en-US" smtClean="0"/>
-              <a:t>16-Jul-20</a:t>
+              <a:t>17-Jul-20</a:t>
             </a:fld>
             <a:endParaRPr lang="en-US"/>
           </a:p>
@@ -2527,7 +2529,7 @@
           <a:p>
             <a:fld id="{B6D12BD2-B651-4952-86A6-7B4BE9DDEA50}" type="datetimeFigureOut">
               <a:rPr lang="en-US" smtClean="0"/>
-              <a:t>16-Jul-20</a:t>
+              <a:t>17-Jul-20</a:t>
             </a:fld>
             <a:endParaRPr lang="en-US"/>
           </a:p>
@@ -2740,7 +2742,7 @@
           <a:p>
             <a:fld id="{B6D12BD2-B651-4952-86A6-7B4BE9DDEA50}" type="datetimeFigureOut">
               <a:rPr lang="en-US" smtClean="0"/>
-              <a:t>16-Jul-20</a:t>
+              <a:t>17-Jul-20</a:t>
             </a:fld>
             <a:endParaRPr lang="en-US"/>
           </a:p>
@@ -6319,7 +6321,14 @@
               <a:buChar char="q"/>
             </a:pPr>
             <a:r>
-              <a:rPr lang="en-US" dirty="0"/>
+              <a:rPr lang="en-US" dirty="0">
+                <a:solidFill>
+                  <a:schemeClr val="tx2">
+                    <a:lumMod val="60000"/>
+                    <a:lumOff val="40000"/>
+                  </a:schemeClr>
+                </a:solidFill>
+              </a:rPr>
               <a:t>LED_Control</a:t>
             </a:r>
           </a:p>
@@ -6382,7 +6391,14 @@
               <a:buChar char="q"/>
             </a:pPr>
             <a:r>
-              <a:rPr lang="en-US" dirty="0"/>
+              <a:rPr lang="en-US" dirty="0">
+                <a:solidFill>
+                  <a:schemeClr val="tx2">
+                    <a:lumMod val="60000"/>
+                    <a:lumOff val="40000"/>
+                  </a:schemeClr>
+                </a:solidFill>
+              </a:rPr>
               <a:t>LED_BLINKING</a:t>
             </a:r>
           </a:p>
@@ -6482,7 +6498,11 @@
               <a:buChar char="q"/>
             </a:pPr>
             <a:r>
-              <a:rPr lang="en-US" dirty="0" smtClean="0"/>
+              <a:rPr lang="en-US" dirty="0" smtClean="0">
+                <a:solidFill>
+                  <a:srgbClr val="7030A0"/>
+                </a:solidFill>
+              </a:rPr>
               <a:t>SSD</a:t>
             </a:r>
           </a:p>
@@ -6492,10 +6512,24 @@
               <a:buChar char="q"/>
             </a:pPr>
             <a:r>
-              <a:rPr lang="en-US" dirty="0" err="1"/>
+              <a:rPr lang="en-US" dirty="0" err="1">
+                <a:solidFill>
+                  <a:schemeClr val="tx2">
+                    <a:lumMod val="60000"/>
+                    <a:lumOff val="40000"/>
+                  </a:schemeClr>
+                </a:solidFill>
+              </a:rPr>
               <a:t>SSD_Init</a:t>
             </a:r>
-            <a:endParaRPr lang="en-US" dirty="0"/>
+            <a:endParaRPr lang="en-US" dirty="0">
+              <a:solidFill>
+                <a:schemeClr val="tx2">
+                  <a:lumMod val="60000"/>
+                  <a:lumOff val="40000"/>
+                </a:schemeClr>
+              </a:solidFill>
+            </a:endParaRPr>
           </a:p>
         </p:txBody>
       </p:sp>
@@ -6556,7 +6590,14 @@
               <a:buChar char="q"/>
             </a:pPr>
             <a:r>
-              <a:rPr lang="en-US" dirty="0"/>
+              <a:rPr lang="en-US" dirty="0">
+                <a:solidFill>
+                  <a:schemeClr val="tx2">
+                    <a:lumMod val="60000"/>
+                    <a:lumOff val="40000"/>
+                  </a:schemeClr>
+                </a:solidFill>
+              </a:rPr>
               <a:t>SSD_SelectDisplay</a:t>
             </a:r>
           </a:p>
@@ -6656,10 +6697,24 @@
               <a:buChar char="q"/>
             </a:pPr>
             <a:r>
-              <a:rPr lang="en-US" dirty="0" smtClean="0"/>
+              <a:rPr lang="en-US" dirty="0" smtClean="0">
+                <a:solidFill>
+                  <a:schemeClr val="tx2">
+                    <a:lumMod val="60000"/>
+                    <a:lumOff val="40000"/>
+                  </a:schemeClr>
+                </a:solidFill>
+              </a:rPr>
               <a:t>SSD_SelectDigit</a:t>
             </a:r>
-            <a:endParaRPr lang="en-US" dirty="0"/>
+            <a:endParaRPr lang="en-US" dirty="0">
+              <a:solidFill>
+                <a:schemeClr val="tx2">
+                  <a:lumMod val="60000"/>
+                  <a:lumOff val="40000"/>
+                </a:schemeClr>
+              </a:solidFill>
+            </a:endParaRPr>
           </a:p>
         </p:txBody>
       </p:sp>
@@ -6750,10 +6805,24 @@
               <a:buChar char="q"/>
             </a:pPr>
             <a:r>
-              <a:rPr lang="en-US" dirty="0" smtClean="0"/>
+              <a:rPr lang="en-US" dirty="0" smtClean="0">
+                <a:solidFill>
+                  <a:schemeClr val="tx2">
+                    <a:lumMod val="60000"/>
+                    <a:lumOff val="40000"/>
+                  </a:schemeClr>
+                </a:solidFill>
+              </a:rPr>
               <a:t>SSD_Blink</a:t>
             </a:r>
-            <a:endParaRPr lang="en-US" dirty="0"/>
+            <a:endParaRPr lang="en-US" dirty="0">
+              <a:solidFill>
+                <a:schemeClr val="tx2">
+                  <a:lumMod val="60000"/>
+                  <a:lumOff val="40000"/>
+                </a:schemeClr>
+              </a:solidFill>
+            </a:endParaRPr>
           </a:p>
         </p:txBody>
       </p:sp>
@@ -6821,7 +6890,14 @@
               <a:buChar char="q"/>
             </a:pPr>
             <a:r>
-              <a:rPr lang="en-US" dirty="0"/>
+              <a:rPr lang="en-US" dirty="0">
+                <a:solidFill>
+                  <a:schemeClr val="tx2">
+                    <a:lumMod val="60000"/>
+                    <a:lumOff val="40000"/>
+                  </a:schemeClr>
+                </a:solidFill>
+              </a:rPr>
               <a:t>SSD_MainFunction</a:t>
             </a:r>
           </a:p>
@@ -6909,6 +6985,14 @@
             <a:avLst/>
           </a:prstGeom>
           <a:noFill/>
+          <a:ln>
+            <a:solidFill>
+              <a:schemeClr val="tx2">
+                <a:lumMod val="60000"/>
+                <a:lumOff val="40000"/>
+              </a:schemeClr>
+            </a:solidFill>
+          </a:ln>
         </p:spPr>
         <p:txBody>
           <a:bodyPr wrap="none" rtlCol="0">
@@ -6921,7 +7005,11 @@
               <a:buChar char="q"/>
             </a:pPr>
             <a:r>
-              <a:rPr lang="en-US" dirty="0" smtClean="0"/>
+              <a:rPr lang="en-US" dirty="0" smtClean="0">
+                <a:solidFill>
+                  <a:srgbClr val="7030A0"/>
+                </a:solidFill>
+              </a:rPr>
               <a:t>Water Heater Mode</a:t>
             </a:r>
           </a:p>
@@ -6931,7 +7019,14 @@
               <a:buChar char="q"/>
             </a:pPr>
             <a:r>
-              <a:rPr lang="en-US" dirty="0"/>
+              <a:rPr lang="en-US" dirty="0">
+                <a:solidFill>
+                  <a:schemeClr val="tx2">
+                    <a:lumMod val="60000"/>
+                    <a:lumOff val="40000"/>
+                  </a:schemeClr>
+                </a:solidFill>
+              </a:rPr>
               <a:t>Mode_Init</a:t>
             </a:r>
           </a:p>
@@ -6994,7 +7089,14 @@
               <a:buChar char="q"/>
             </a:pPr>
             <a:r>
-              <a:rPr lang="en-US" dirty="0"/>
+              <a:rPr lang="en-US" dirty="0">
+                <a:solidFill>
+                  <a:schemeClr val="tx2">
+                    <a:lumMod val="60000"/>
+                    <a:lumOff val="40000"/>
+                  </a:schemeClr>
+                </a:solidFill>
+              </a:rPr>
               <a:t>Mode_MainFunction</a:t>
             </a:r>
           </a:p>
@@ -7094,7 +7196,14 @@
               <a:buChar char="q"/>
             </a:pPr>
             <a:r>
-              <a:rPr lang="en-US" dirty="0"/>
+              <a:rPr lang="en-US" dirty="0">
+                <a:solidFill>
+                  <a:schemeClr val="tx2">
+                    <a:lumMod val="60000"/>
+                    <a:lumOff val="40000"/>
+                  </a:schemeClr>
+                </a:solidFill>
+              </a:rPr>
               <a:t>Start_Setting_Timer</a:t>
             </a:r>
           </a:p>
@@ -7194,7 +7303,11 @@
               <a:buChar char="q"/>
             </a:pPr>
             <a:r>
-              <a:rPr lang="en-US" dirty="0" smtClean="0"/>
+              <a:rPr lang="en-US" dirty="0" smtClean="0">
+                <a:solidFill>
+                  <a:srgbClr val="7030A0"/>
+                </a:solidFill>
+              </a:rPr>
               <a:t>Temperature</a:t>
             </a:r>
           </a:p>
@@ -7204,7 +7317,14 @@
               <a:buChar char="q"/>
             </a:pPr>
             <a:r>
-              <a:rPr lang="en-US" dirty="0"/>
+              <a:rPr lang="en-US" dirty="0">
+                <a:solidFill>
+                  <a:schemeClr val="tx2">
+                    <a:lumMod val="60000"/>
+                    <a:lumOff val="40000"/>
+                  </a:schemeClr>
+                </a:solidFill>
+              </a:rPr>
               <a:t>Temperature_Calc</a:t>
             </a:r>
           </a:p>
@@ -7267,10 +7387,18 @@
               <a:buChar char="q"/>
             </a:pPr>
             <a:r>
-              <a:rPr lang="en-US" dirty="0"/>
+              <a:rPr lang="en-US" dirty="0">
+                <a:solidFill>
+                  <a:srgbClr val="7030A0"/>
+                </a:solidFill>
+              </a:rPr>
               <a:t>Average</a:t>
             </a:r>
-            <a:endParaRPr lang="en-US" dirty="0" smtClean="0"/>
+            <a:endParaRPr lang="en-US" dirty="0" smtClean="0">
+              <a:solidFill>
+                <a:srgbClr val="7030A0"/>
+              </a:solidFill>
+            </a:endParaRPr>
           </a:p>
           <a:p>
             <a:pPr marL="742950" lvl="1" indent="-285750">
@@ -7278,10 +7406,24 @@
               <a:buChar char="q"/>
             </a:pPr>
             <a:r>
-              <a:rPr lang="en-US" dirty="0" err="1"/>
+              <a:rPr lang="en-US" dirty="0" err="1">
+                <a:solidFill>
+                  <a:schemeClr val="tx2">
+                    <a:lumMod val="60000"/>
+                    <a:lumOff val="40000"/>
+                  </a:schemeClr>
+                </a:solidFill>
+              </a:rPr>
               <a:t>Average_Value</a:t>
             </a:r>
-            <a:endParaRPr lang="en-US" dirty="0"/>
+            <a:endParaRPr lang="en-US" dirty="0">
+              <a:solidFill>
+                <a:schemeClr val="tx2">
+                  <a:lumMod val="60000"/>
+                  <a:lumOff val="40000"/>
+                </a:schemeClr>
+              </a:solidFill>
+            </a:endParaRPr>
           </a:p>
         </p:txBody>
       </p:sp>
@@ -7379,10 +7521,18 @@
               <a:buChar char="q"/>
             </a:pPr>
             <a:r>
-              <a:rPr lang="en-US" dirty="0"/>
+              <a:rPr lang="en-US" dirty="0">
+                <a:solidFill>
+                  <a:srgbClr val="7030A0"/>
+                </a:solidFill>
+              </a:rPr>
               <a:t>EEPROM</a:t>
             </a:r>
-            <a:endParaRPr lang="en-US" dirty="0" smtClean="0"/>
+            <a:endParaRPr lang="en-US" dirty="0" smtClean="0">
+              <a:solidFill>
+                <a:srgbClr val="7030A0"/>
+              </a:solidFill>
+            </a:endParaRPr>
           </a:p>
           <a:p>
             <a:pPr marL="742950" lvl="1" indent="-285750">
@@ -7390,10 +7540,24 @@
               <a:buChar char="q"/>
             </a:pPr>
             <a:r>
-              <a:rPr lang="en-US" dirty="0" err="1"/>
+              <a:rPr lang="en-US" dirty="0" err="1">
+                <a:solidFill>
+                  <a:schemeClr val="tx2">
+                    <a:lumMod val="60000"/>
+                    <a:lumOff val="40000"/>
+                  </a:schemeClr>
+                </a:solidFill>
+              </a:rPr>
               <a:t>Get_EEPROM_Data</a:t>
             </a:r>
-            <a:endParaRPr lang="en-US" dirty="0"/>
+            <a:endParaRPr lang="en-US" dirty="0">
+              <a:solidFill>
+                <a:schemeClr val="tx2">
+                  <a:lumMod val="60000"/>
+                  <a:lumOff val="40000"/>
+                </a:schemeClr>
+              </a:solidFill>
+            </a:endParaRPr>
           </a:p>
         </p:txBody>
       </p:sp>
@@ -7435,7 +7599,7 @@
         </p:nvSpPr>
         <p:spPr>
           <a:xfrm>
-            <a:off x="5715000" y="205769"/>
+            <a:off x="6172200" y="187404"/>
             <a:ext cx="1872757" cy="369332"/>
           </a:xfrm>
           <a:prstGeom prst="rect">
@@ -7454,16 +7618,30 @@
               <a:buChar char="q"/>
             </a:pPr>
             <a:r>
-              <a:rPr lang="en-US" dirty="0" err="1"/>
+              <a:rPr lang="en-US" dirty="0" err="1">
+                <a:solidFill>
+                  <a:schemeClr val="tx2">
+                    <a:lumMod val="60000"/>
+                    <a:lumOff val="40000"/>
+                  </a:schemeClr>
+                </a:solidFill>
+              </a:rPr>
               <a:t>EEPROM_Read</a:t>
             </a:r>
-            <a:endParaRPr lang="en-US" dirty="0"/>
+            <a:endParaRPr lang="en-US" dirty="0">
+              <a:solidFill>
+                <a:schemeClr val="tx2">
+                  <a:lumMod val="60000"/>
+                  <a:lumOff val="40000"/>
+                </a:schemeClr>
+              </a:solidFill>
+            </a:endParaRPr>
           </a:p>
         </p:txBody>
       </p:sp>
       <p:pic>
         <p:nvPicPr>
-          <p:cNvPr id="8" name="Picture 7"/>
+          <p:cNvPr id="2" name="Picture 1"/>
           <p:cNvPicPr>
             <a:picLocks noChangeAspect="1"/>
           </p:cNvPicPr>
@@ -7483,8 +7661,8 @@
         </p:blipFill>
         <p:spPr>
           <a:xfrm>
-            <a:off x="6239615" y="685800"/>
-            <a:ext cx="1826413" cy="6019799"/>
+            <a:off x="6934200" y="685800"/>
+            <a:ext cx="1447800" cy="6019797"/>
           </a:xfrm>
           <a:prstGeom prst="rect">
             <a:avLst/>
@@ -7555,10 +7733,24 @@
               <a:buChar char="q"/>
             </a:pPr>
             <a:r>
-              <a:rPr lang="en-US" dirty="0" err="1"/>
+              <a:rPr lang="en-US" dirty="0" err="1">
+                <a:solidFill>
+                  <a:schemeClr val="tx2">
+                    <a:lumMod val="60000"/>
+                    <a:lumOff val="40000"/>
+                  </a:schemeClr>
+                </a:solidFill>
+              </a:rPr>
               <a:t>Set_EEPROM_Data</a:t>
             </a:r>
-            <a:endParaRPr lang="en-US" dirty="0"/>
+            <a:endParaRPr lang="en-US" dirty="0">
+              <a:solidFill>
+                <a:schemeClr val="tx2">
+                  <a:lumMod val="60000"/>
+                  <a:lumOff val="40000"/>
+                </a:schemeClr>
+              </a:solidFill>
+            </a:endParaRPr>
           </a:p>
         </p:txBody>
       </p:sp>
@@ -7619,16 +7811,30 @@
               <a:buChar char="q"/>
             </a:pPr>
             <a:r>
-              <a:rPr lang="en-US" dirty="0" err="1"/>
+              <a:rPr lang="en-US" dirty="0" err="1">
+                <a:solidFill>
+                  <a:schemeClr val="tx2">
+                    <a:lumMod val="60000"/>
+                    <a:lumOff val="40000"/>
+                  </a:schemeClr>
+                </a:solidFill>
+              </a:rPr>
               <a:t>EEPROM_Write</a:t>
             </a:r>
-            <a:endParaRPr lang="en-US" dirty="0"/>
+            <a:endParaRPr lang="en-US" dirty="0">
+              <a:solidFill>
+                <a:schemeClr val="tx2">
+                  <a:lumMod val="60000"/>
+                  <a:lumOff val="40000"/>
+                </a:schemeClr>
+              </a:solidFill>
+            </a:endParaRPr>
           </a:p>
         </p:txBody>
       </p:sp>
       <p:pic>
         <p:nvPicPr>
-          <p:cNvPr id="7" name="Picture 6"/>
+          <p:cNvPr id="2" name="Picture 1"/>
           <p:cNvPicPr>
             <a:picLocks noChangeAspect="1"/>
           </p:cNvPicPr>
@@ -7648,8 +7854,8 @@
         </p:blipFill>
         <p:spPr>
           <a:xfrm>
-            <a:off x="6553200" y="819150"/>
-            <a:ext cx="1828800" cy="5581650"/>
+            <a:off x="6781800" y="685800"/>
+            <a:ext cx="1257143" cy="6019800"/>
           </a:xfrm>
           <a:prstGeom prst="rect">
             <a:avLst/>
@@ -7720,10 +7926,18 @@
               <a:buChar char="q"/>
             </a:pPr>
             <a:r>
-              <a:rPr lang="en-US" dirty="0"/>
+              <a:rPr lang="en-US" dirty="0">
+                <a:solidFill>
+                  <a:srgbClr val="7030A0"/>
+                </a:solidFill>
+              </a:rPr>
               <a:t>Scheduler</a:t>
             </a:r>
-            <a:endParaRPr lang="en-US" dirty="0" smtClean="0"/>
+            <a:endParaRPr lang="en-US" dirty="0" smtClean="0">
+              <a:solidFill>
+                <a:srgbClr val="7030A0"/>
+              </a:solidFill>
+            </a:endParaRPr>
           </a:p>
           <a:p>
             <a:pPr marL="742950" lvl="1" indent="-285750">
@@ -7731,10 +7945,24 @@
               <a:buChar char="q"/>
             </a:pPr>
             <a:r>
-              <a:rPr lang="en-US" dirty="0" err="1"/>
+              <a:rPr lang="en-US" dirty="0" err="1">
+                <a:solidFill>
+                  <a:schemeClr val="tx2">
+                    <a:lumMod val="60000"/>
+                    <a:lumOff val="40000"/>
+                  </a:schemeClr>
+                </a:solidFill>
+              </a:rPr>
               <a:t>Scheduler_Init</a:t>
             </a:r>
-            <a:endParaRPr lang="en-US" dirty="0"/>
+            <a:endParaRPr lang="en-US" dirty="0">
+              <a:solidFill>
+                <a:schemeClr val="tx2">
+                  <a:lumMod val="60000"/>
+                  <a:lumOff val="40000"/>
+                </a:schemeClr>
+              </a:solidFill>
+            </a:endParaRPr>
           </a:p>
         </p:txBody>
       </p:sp>
@@ -7760,7 +7988,7 @@
         </p:blipFill>
         <p:spPr>
           <a:xfrm>
-            <a:off x="0" y="1600200"/>
+            <a:off x="104775" y="1619250"/>
             <a:ext cx="2819400" cy="4038600"/>
           </a:xfrm>
           <a:prstGeom prst="rect">
@@ -7776,7 +8004,7 @@
         </p:nvSpPr>
         <p:spPr>
           <a:xfrm>
-            <a:off x="5714999" y="104685"/>
+            <a:off x="5714999" y="456426"/>
             <a:ext cx="2680157" cy="369332"/>
           </a:xfrm>
           <a:prstGeom prst="rect">
@@ -7795,10 +8023,24 @@
               <a:buChar char="q"/>
             </a:pPr>
             <a:r>
-              <a:rPr lang="en-US" dirty="0" err="1"/>
+              <a:rPr lang="en-US" dirty="0" err="1">
+                <a:solidFill>
+                  <a:schemeClr val="tx2">
+                    <a:lumMod val="60000"/>
+                    <a:lumOff val="40000"/>
+                  </a:schemeClr>
+                </a:solidFill>
+              </a:rPr>
               <a:t>Scheduler_ActivateTask</a:t>
             </a:r>
-            <a:endParaRPr lang="en-US" dirty="0"/>
+            <a:endParaRPr lang="en-US" dirty="0">
+              <a:solidFill>
+                <a:schemeClr val="tx2">
+                  <a:lumMod val="60000"/>
+                  <a:lumOff val="40000"/>
+                </a:schemeClr>
+              </a:solidFill>
+            </a:endParaRPr>
           </a:p>
         </p:txBody>
       </p:sp>
@@ -7824,7 +8066,7 @@
         </p:blipFill>
         <p:spPr>
           <a:xfrm>
-            <a:off x="4092118" y="914400"/>
+            <a:off x="4092117" y="1885950"/>
             <a:ext cx="5042357" cy="3810000"/>
           </a:xfrm>
           <a:prstGeom prst="rect">
@@ -8038,6 +8280,790 @@
               </a:rPr>
               <a:t>SSD_SelectDigit</a:t>
             </a:r>
+          </a:p>
+          <a:p>
+            <a:pPr marL="800100" lvl="1" indent="-342900">
+              <a:buFont typeface="Wingdings" pitchFamily="2" charset="2"/>
+              <a:buChar char="q"/>
+            </a:pPr>
+            <a:r>
+              <a:rPr lang="en-US" sz="1600" b="1" dirty="0" smtClean="0">
+                <a:solidFill>
+                  <a:schemeClr val="tx2">
+                    <a:lumMod val="60000"/>
+                    <a:lumOff val="40000"/>
+                  </a:schemeClr>
+                </a:solidFill>
+              </a:rPr>
+              <a:t>SSD_BLINK </a:t>
+            </a:r>
+            <a:endParaRPr lang="en-US" sz="1600" dirty="0" smtClean="0"/>
+          </a:p>
+        </p:txBody>
+      </p:sp>
+      <p:sp>
+        <p:nvSpPr>
+          <p:cNvPr id="16" name="TextBox 15"/>
+          <p:cNvSpPr txBox="1"/>
+          <p:nvPr/>
+        </p:nvSpPr>
+        <p:spPr>
+          <a:xfrm>
+            <a:off x="-13613" y="2388788"/>
+            <a:ext cx="3102428" cy="1323439"/>
+          </a:xfrm>
+          <a:prstGeom prst="rect">
+            <a:avLst/>
+          </a:prstGeom>
+          <a:noFill/>
+        </p:spPr>
+        <p:txBody>
+          <a:bodyPr wrap="square" rtlCol="0">
+            <a:spAutoFit/>
+          </a:bodyPr>
+          <a:lstStyle/>
+          <a:p>
+            <a:pPr marL="285750" indent="-285750">
+              <a:buFont typeface="Wingdings" pitchFamily="2" charset="2"/>
+              <a:buChar char="q"/>
+            </a:pPr>
+            <a:r>
+              <a:rPr lang="en-US" sz="1600" b="1" dirty="0" smtClean="0">
+                <a:solidFill>
+                  <a:schemeClr val="tx2">
+                    <a:lumMod val="60000"/>
+                    <a:lumOff val="40000"/>
+                  </a:schemeClr>
+                </a:solidFill>
+              </a:rPr>
+              <a:t>ELEMENTS</a:t>
+            </a:r>
+          </a:p>
+          <a:p>
+            <a:pPr marL="800100" lvl="1" indent="-342900">
+              <a:buFont typeface="Wingdings" pitchFamily="2" charset="2"/>
+              <a:buChar char="q"/>
+            </a:pPr>
+            <a:r>
+              <a:rPr lang="en-US" sz="1600" b="1" dirty="0" smtClean="0">
+                <a:solidFill>
+                  <a:schemeClr val="tx2">
+                    <a:lumMod val="60000"/>
+                    <a:lumOff val="40000"/>
+                  </a:schemeClr>
+                </a:solidFill>
+              </a:rPr>
+              <a:t>Elements_Init</a:t>
+            </a:r>
+          </a:p>
+          <a:p>
+            <a:pPr marL="800100" lvl="1" indent="-342900">
+              <a:buFont typeface="Wingdings" pitchFamily="2" charset="2"/>
+              <a:buChar char="q"/>
+            </a:pPr>
+            <a:r>
+              <a:rPr lang="en-US" sz="1600" b="1" dirty="0" smtClean="0">
+                <a:solidFill>
+                  <a:schemeClr val="tx2">
+                    <a:lumMod val="60000"/>
+                    <a:lumOff val="40000"/>
+                  </a:schemeClr>
+                </a:solidFill>
+              </a:rPr>
+              <a:t>Elements_MainFunction  </a:t>
+            </a:r>
+          </a:p>
+          <a:p>
+            <a:pPr marL="800100" lvl="1" indent="-342900">
+              <a:buFont typeface="Wingdings" pitchFamily="2" charset="2"/>
+              <a:buChar char="q"/>
+            </a:pPr>
+            <a:r>
+              <a:rPr lang="en-US" sz="1600" b="1" dirty="0" smtClean="0">
+                <a:solidFill>
+                  <a:schemeClr val="tx2">
+                    <a:lumMod val="60000"/>
+                    <a:lumOff val="40000"/>
+                  </a:schemeClr>
+                </a:solidFill>
+              </a:rPr>
+              <a:t>LED_Control</a:t>
+            </a:r>
+          </a:p>
+          <a:p>
+            <a:pPr marL="800100" lvl="1" indent="-342900">
+              <a:buFont typeface="Wingdings" pitchFamily="2" charset="2"/>
+              <a:buChar char="q"/>
+            </a:pPr>
+            <a:r>
+              <a:rPr lang="en-US" sz="1600" b="1" dirty="0" smtClean="0">
+                <a:solidFill>
+                  <a:schemeClr val="tx2">
+                    <a:lumMod val="60000"/>
+                    <a:lumOff val="40000"/>
+                  </a:schemeClr>
+                </a:solidFill>
+              </a:rPr>
+              <a:t>LED_BLINK</a:t>
+            </a:r>
+            <a:endParaRPr lang="en-US" sz="1600" dirty="0" smtClean="0"/>
+          </a:p>
+        </p:txBody>
+      </p:sp>
+      <p:sp>
+        <p:nvSpPr>
+          <p:cNvPr id="17" name="TextBox 16"/>
+          <p:cNvSpPr txBox="1"/>
+          <p:nvPr/>
+        </p:nvSpPr>
+        <p:spPr>
+          <a:xfrm>
+            <a:off x="-13613" y="3726806"/>
+            <a:ext cx="2841170" cy="1077218"/>
+          </a:xfrm>
+          <a:prstGeom prst="rect">
+            <a:avLst/>
+          </a:prstGeom>
+          <a:noFill/>
+        </p:spPr>
+        <p:txBody>
+          <a:bodyPr wrap="square" rtlCol="0">
+            <a:spAutoFit/>
+          </a:bodyPr>
+          <a:lstStyle/>
+          <a:p>
+            <a:pPr marL="285750" indent="-285750">
+              <a:buFont typeface="Wingdings" pitchFamily="2" charset="2"/>
+              <a:buChar char="q"/>
+            </a:pPr>
+            <a:r>
+              <a:rPr lang="en-US" sz="1600" b="1" dirty="0" smtClean="0">
+                <a:solidFill>
+                  <a:schemeClr val="tx2">
+                    <a:lumMod val="60000"/>
+                    <a:lumOff val="40000"/>
+                  </a:schemeClr>
+                </a:solidFill>
+              </a:rPr>
+              <a:t>MODE</a:t>
+            </a:r>
+          </a:p>
+          <a:p>
+            <a:pPr marL="800100" lvl="1" indent="-342900">
+              <a:buFont typeface="Wingdings" pitchFamily="2" charset="2"/>
+              <a:buChar char="q"/>
+            </a:pPr>
+            <a:r>
+              <a:rPr lang="en-US" sz="1600" b="1" dirty="0" smtClean="0">
+                <a:solidFill>
+                  <a:schemeClr val="tx2">
+                    <a:lumMod val="60000"/>
+                    <a:lumOff val="40000"/>
+                  </a:schemeClr>
+                </a:solidFill>
+              </a:rPr>
+              <a:t>Mode_Init</a:t>
+            </a:r>
+          </a:p>
+          <a:p>
+            <a:pPr marL="800100" lvl="1" indent="-342900">
+              <a:buFont typeface="Wingdings" pitchFamily="2" charset="2"/>
+              <a:buChar char="q"/>
+            </a:pPr>
+            <a:r>
+              <a:rPr lang="en-US" sz="1600" b="1" dirty="0" smtClean="0">
+                <a:solidFill>
+                  <a:schemeClr val="tx2">
+                    <a:lumMod val="60000"/>
+                    <a:lumOff val="40000"/>
+                  </a:schemeClr>
+                </a:solidFill>
+              </a:rPr>
+              <a:t>Mode_MainFunction</a:t>
+            </a:r>
+          </a:p>
+          <a:p>
+            <a:pPr marL="800100" lvl="1" indent="-342900">
+              <a:buFont typeface="Wingdings" pitchFamily="2" charset="2"/>
+              <a:buChar char="q"/>
+            </a:pPr>
+            <a:r>
+              <a:rPr lang="en-US" sz="1600" b="1" dirty="0" smtClean="0">
+                <a:solidFill>
+                  <a:schemeClr val="tx2">
+                    <a:lumMod val="60000"/>
+                    <a:lumOff val="40000"/>
+                  </a:schemeClr>
+                </a:solidFill>
+              </a:rPr>
+              <a:t>Start_Setting_Timer</a:t>
+            </a:r>
+            <a:endParaRPr lang="en-US" sz="1600" dirty="0" smtClean="0"/>
+          </a:p>
+        </p:txBody>
+      </p:sp>
+      <p:sp>
+        <p:nvSpPr>
+          <p:cNvPr id="18" name="TextBox 17"/>
+          <p:cNvSpPr txBox="1"/>
+          <p:nvPr/>
+        </p:nvSpPr>
+        <p:spPr>
+          <a:xfrm>
+            <a:off x="6607621" y="2671386"/>
+            <a:ext cx="2743200" cy="830997"/>
+          </a:xfrm>
+          <a:prstGeom prst="rect">
+            <a:avLst/>
+          </a:prstGeom>
+          <a:noFill/>
+        </p:spPr>
+        <p:txBody>
+          <a:bodyPr wrap="square" rtlCol="0">
+            <a:spAutoFit/>
+          </a:bodyPr>
+          <a:lstStyle/>
+          <a:p>
+            <a:pPr marL="285750" indent="-285750">
+              <a:buFont typeface="Wingdings" pitchFamily="2" charset="2"/>
+              <a:buChar char="q"/>
+            </a:pPr>
+            <a:r>
+              <a:rPr lang="en-US" sz="1600" b="1" dirty="0" smtClean="0">
+                <a:solidFill>
+                  <a:schemeClr val="tx2">
+                    <a:lumMod val="60000"/>
+                    <a:lumOff val="40000"/>
+                  </a:schemeClr>
+                </a:solidFill>
+              </a:rPr>
+              <a:t>Timer</a:t>
+            </a:r>
+          </a:p>
+          <a:p>
+            <a:pPr marL="800100" lvl="1" indent="-342900">
+              <a:buFont typeface="Wingdings" pitchFamily="2" charset="2"/>
+              <a:buChar char="q"/>
+            </a:pPr>
+            <a:r>
+              <a:rPr lang="en-US" sz="1600" b="1" dirty="0" smtClean="0">
+                <a:solidFill>
+                  <a:schemeClr val="tx2">
+                    <a:lumMod val="60000"/>
+                    <a:lumOff val="40000"/>
+                  </a:schemeClr>
+                </a:solidFill>
+              </a:rPr>
+              <a:t>Timer0_Init</a:t>
+            </a:r>
+          </a:p>
+          <a:p>
+            <a:pPr marL="800100" lvl="1" indent="-342900">
+              <a:buFont typeface="Wingdings" pitchFamily="2" charset="2"/>
+              <a:buChar char="q"/>
+            </a:pPr>
+            <a:r>
+              <a:rPr lang="en-US" sz="1600" b="1" dirty="0" smtClean="0">
+                <a:solidFill>
+                  <a:schemeClr val="tx2">
+                    <a:lumMod val="60000"/>
+                    <a:lumOff val="40000"/>
+                  </a:schemeClr>
+                </a:solidFill>
+              </a:rPr>
+              <a:t>Timer0_CallBack</a:t>
+            </a:r>
+            <a:endParaRPr lang="en-US" sz="1600" dirty="0" smtClean="0"/>
+          </a:p>
+        </p:txBody>
+      </p:sp>
+      <p:sp>
+        <p:nvSpPr>
+          <p:cNvPr id="20" name="TextBox 19"/>
+          <p:cNvSpPr txBox="1"/>
+          <p:nvPr/>
+        </p:nvSpPr>
+        <p:spPr>
+          <a:xfrm>
+            <a:off x="6607621" y="3815054"/>
+            <a:ext cx="2569041" cy="584775"/>
+          </a:xfrm>
+          <a:prstGeom prst="rect">
+            <a:avLst/>
+          </a:prstGeom>
+          <a:noFill/>
+        </p:spPr>
+        <p:txBody>
+          <a:bodyPr wrap="square" rtlCol="0">
+            <a:spAutoFit/>
+          </a:bodyPr>
+          <a:lstStyle/>
+          <a:p>
+            <a:pPr marL="285750" indent="-285750">
+              <a:buFont typeface="Wingdings" pitchFamily="2" charset="2"/>
+              <a:buChar char="q"/>
+            </a:pPr>
+            <a:r>
+              <a:rPr lang="en-US" sz="1600" b="1" dirty="0" smtClean="0">
+                <a:solidFill>
+                  <a:schemeClr val="tx2">
+                    <a:lumMod val="60000"/>
+                    <a:lumOff val="40000"/>
+                  </a:schemeClr>
+                </a:solidFill>
+              </a:rPr>
+              <a:t>Temperature</a:t>
+            </a:r>
+          </a:p>
+          <a:p>
+            <a:pPr marL="800100" lvl="1" indent="-342900">
+              <a:buFont typeface="Wingdings" pitchFamily="2" charset="2"/>
+              <a:buChar char="q"/>
+            </a:pPr>
+            <a:r>
+              <a:rPr lang="en-US" sz="1600" b="1" dirty="0" smtClean="0">
+                <a:solidFill>
+                  <a:schemeClr val="tx2">
+                    <a:lumMod val="60000"/>
+                    <a:lumOff val="40000"/>
+                  </a:schemeClr>
+                </a:solidFill>
+              </a:rPr>
+              <a:t>Temperature_Calc</a:t>
+            </a:r>
+          </a:p>
+        </p:txBody>
+      </p:sp>
+      <p:sp>
+        <p:nvSpPr>
+          <p:cNvPr id="22" name="TextBox 21"/>
+          <p:cNvSpPr txBox="1"/>
+          <p:nvPr/>
+        </p:nvSpPr>
+        <p:spPr>
+          <a:xfrm>
+            <a:off x="6662033" y="4661793"/>
+            <a:ext cx="2743200" cy="584775"/>
+          </a:xfrm>
+          <a:prstGeom prst="rect">
+            <a:avLst/>
+          </a:prstGeom>
+          <a:noFill/>
+        </p:spPr>
+        <p:txBody>
+          <a:bodyPr wrap="square" rtlCol="0">
+            <a:spAutoFit/>
+          </a:bodyPr>
+          <a:lstStyle/>
+          <a:p>
+            <a:pPr marL="285750" indent="-285750">
+              <a:buFont typeface="Wingdings" pitchFamily="2" charset="2"/>
+              <a:buChar char="q"/>
+            </a:pPr>
+            <a:r>
+              <a:rPr lang="en-US" sz="1600" b="1" dirty="0" smtClean="0">
+                <a:solidFill>
+                  <a:schemeClr val="tx2">
+                    <a:lumMod val="60000"/>
+                    <a:lumOff val="40000"/>
+                  </a:schemeClr>
+                </a:solidFill>
+              </a:rPr>
+              <a:t>Average</a:t>
+            </a:r>
+          </a:p>
+          <a:p>
+            <a:pPr marL="800100" lvl="1" indent="-342900">
+              <a:buFont typeface="Wingdings" pitchFamily="2" charset="2"/>
+              <a:buChar char="q"/>
+            </a:pPr>
+            <a:r>
+              <a:rPr lang="en-US" sz="1600" b="1" dirty="0" smtClean="0">
+                <a:solidFill>
+                  <a:schemeClr val="tx2">
+                    <a:lumMod val="60000"/>
+                    <a:lumOff val="40000"/>
+                  </a:schemeClr>
+                </a:solidFill>
+              </a:rPr>
+              <a:t>Average_Value</a:t>
+            </a:r>
+          </a:p>
+        </p:txBody>
+      </p:sp>
+      <p:sp>
+        <p:nvSpPr>
+          <p:cNvPr id="23" name="TextBox 22"/>
+          <p:cNvSpPr txBox="1"/>
+          <p:nvPr/>
+        </p:nvSpPr>
+        <p:spPr>
+          <a:xfrm>
+            <a:off x="3009894" y="5284945"/>
+            <a:ext cx="2667000" cy="1323439"/>
+          </a:xfrm>
+          <a:prstGeom prst="rect">
+            <a:avLst/>
+          </a:prstGeom>
+          <a:noFill/>
+        </p:spPr>
+        <p:txBody>
+          <a:bodyPr wrap="square" rtlCol="0">
+            <a:spAutoFit/>
+          </a:bodyPr>
+          <a:lstStyle/>
+          <a:p>
+            <a:pPr marL="285750" indent="-285750">
+              <a:buFont typeface="Wingdings" pitchFamily="2" charset="2"/>
+              <a:buChar char="q"/>
+            </a:pPr>
+            <a:r>
+              <a:rPr lang="en-US" sz="1600" b="1" dirty="0" smtClean="0">
+                <a:solidFill>
+                  <a:schemeClr val="tx2">
+                    <a:lumMod val="60000"/>
+                    <a:lumOff val="40000"/>
+                  </a:schemeClr>
+                </a:solidFill>
+              </a:rPr>
+              <a:t>EEPROM</a:t>
+            </a:r>
+          </a:p>
+          <a:p>
+            <a:pPr marL="800100" lvl="1" indent="-342900">
+              <a:buFont typeface="Wingdings" pitchFamily="2" charset="2"/>
+              <a:buChar char="q"/>
+            </a:pPr>
+            <a:r>
+              <a:rPr lang="en-US" sz="1600" b="1" dirty="0" smtClean="0">
+                <a:solidFill>
+                  <a:schemeClr val="tx2">
+                    <a:lumMod val="60000"/>
+                    <a:lumOff val="40000"/>
+                  </a:schemeClr>
+                </a:solidFill>
+              </a:rPr>
+              <a:t>Get_EEPROM_Data</a:t>
+            </a:r>
+          </a:p>
+          <a:p>
+            <a:pPr marL="800100" lvl="1" indent="-342900">
+              <a:buFont typeface="Wingdings" pitchFamily="2" charset="2"/>
+              <a:buChar char="q"/>
+            </a:pPr>
+            <a:r>
+              <a:rPr lang="en-US" sz="1600" b="1" dirty="0">
+                <a:solidFill>
+                  <a:schemeClr val="tx2">
+                    <a:lumMod val="60000"/>
+                    <a:lumOff val="40000"/>
+                  </a:schemeClr>
+                </a:solidFill>
+              </a:rPr>
+              <a:t>S</a:t>
+            </a:r>
+            <a:r>
+              <a:rPr lang="en-US" sz="1600" b="1" dirty="0" smtClean="0">
+                <a:solidFill>
+                  <a:schemeClr val="tx2">
+                    <a:lumMod val="60000"/>
+                    <a:lumOff val="40000"/>
+                  </a:schemeClr>
+                </a:solidFill>
+              </a:rPr>
+              <a:t>et_EEPROM_Data</a:t>
+            </a:r>
+          </a:p>
+          <a:p>
+            <a:pPr marL="800100" lvl="1" indent="-342900">
+              <a:buFont typeface="Wingdings" pitchFamily="2" charset="2"/>
+              <a:buChar char="q"/>
+            </a:pPr>
+            <a:r>
+              <a:rPr lang="en-US" sz="1600" b="1" dirty="0" smtClean="0">
+                <a:solidFill>
+                  <a:schemeClr val="tx2">
+                    <a:lumMod val="60000"/>
+                    <a:lumOff val="40000"/>
+                  </a:schemeClr>
+                </a:solidFill>
+              </a:rPr>
+              <a:t>EEPROM_Write</a:t>
+            </a:r>
+          </a:p>
+          <a:p>
+            <a:pPr marL="800100" lvl="1" indent="-342900">
+              <a:buFont typeface="Wingdings" pitchFamily="2" charset="2"/>
+              <a:buChar char="q"/>
+            </a:pPr>
+            <a:r>
+              <a:rPr lang="en-US" sz="1600" b="1" dirty="0" smtClean="0">
+                <a:solidFill>
+                  <a:schemeClr val="tx2">
+                    <a:lumMod val="60000"/>
+                    <a:lumOff val="40000"/>
+                  </a:schemeClr>
+                </a:solidFill>
+              </a:rPr>
+              <a:t>EEPROM_Read</a:t>
+            </a:r>
+          </a:p>
+        </p:txBody>
+      </p:sp>
+      <p:sp>
+        <p:nvSpPr>
+          <p:cNvPr id="24" name="TextBox 23"/>
+          <p:cNvSpPr txBox="1"/>
+          <p:nvPr/>
+        </p:nvSpPr>
+        <p:spPr>
+          <a:xfrm>
+            <a:off x="2830279" y="837922"/>
+            <a:ext cx="3026230" cy="1077218"/>
+          </a:xfrm>
+          <a:prstGeom prst="rect">
+            <a:avLst/>
+          </a:prstGeom>
+          <a:noFill/>
+        </p:spPr>
+        <p:txBody>
+          <a:bodyPr wrap="square" rtlCol="0">
+            <a:spAutoFit/>
+          </a:bodyPr>
+          <a:lstStyle/>
+          <a:p>
+            <a:pPr marL="285750" indent="-285750">
+              <a:buFont typeface="Wingdings" pitchFamily="2" charset="2"/>
+              <a:buChar char="q"/>
+            </a:pPr>
+            <a:r>
+              <a:rPr lang="en-US" sz="1600" b="1" dirty="0" smtClean="0">
+                <a:solidFill>
+                  <a:schemeClr val="tx2">
+                    <a:lumMod val="60000"/>
+                    <a:lumOff val="40000"/>
+                  </a:schemeClr>
+                </a:solidFill>
+              </a:rPr>
+              <a:t>Scheduler</a:t>
+            </a:r>
+          </a:p>
+          <a:p>
+            <a:pPr marL="800100" lvl="1" indent="-342900">
+              <a:buFont typeface="Wingdings" pitchFamily="2" charset="2"/>
+              <a:buChar char="q"/>
+            </a:pPr>
+            <a:r>
+              <a:rPr lang="en-US" sz="1600" b="1" dirty="0" smtClean="0">
+                <a:solidFill>
+                  <a:schemeClr val="tx2">
+                    <a:lumMod val="60000"/>
+                    <a:lumOff val="40000"/>
+                  </a:schemeClr>
+                </a:solidFill>
+              </a:rPr>
+              <a:t>Scheduler_Init</a:t>
+            </a:r>
+          </a:p>
+          <a:p>
+            <a:pPr marL="800100" lvl="1" indent="-342900">
+              <a:buFont typeface="Wingdings" pitchFamily="2" charset="2"/>
+              <a:buChar char="q"/>
+            </a:pPr>
+            <a:r>
+              <a:rPr lang="en-US" sz="1600" b="1" dirty="0" smtClean="0">
+                <a:solidFill>
+                  <a:schemeClr val="tx2">
+                    <a:lumMod val="60000"/>
+                    <a:lumOff val="40000"/>
+                  </a:schemeClr>
+                </a:solidFill>
+              </a:rPr>
+              <a:t>Scheduler_ActivateTask</a:t>
+            </a:r>
+          </a:p>
+          <a:p>
+            <a:pPr marL="800100" lvl="1" indent="-342900">
+              <a:buFont typeface="Wingdings" pitchFamily="2" charset="2"/>
+              <a:buChar char="q"/>
+            </a:pPr>
+            <a:r>
+              <a:rPr lang="en-US" sz="1600" b="1" dirty="0" smtClean="0">
+                <a:solidFill>
+                  <a:schemeClr val="tx2">
+                    <a:lumMod val="60000"/>
+                    <a:lumOff val="40000"/>
+                  </a:schemeClr>
+                </a:solidFill>
+              </a:rPr>
+              <a:t>Scheduler_Start</a:t>
+            </a:r>
+            <a:endParaRPr lang="en-US" sz="1600" dirty="0" smtClean="0"/>
+          </a:p>
+        </p:txBody>
+      </p:sp>
+      <p:sp>
+        <p:nvSpPr>
+          <p:cNvPr id="25" name="TextBox 24"/>
+          <p:cNvSpPr txBox="1"/>
+          <p:nvPr/>
+        </p:nvSpPr>
+        <p:spPr>
+          <a:xfrm>
+            <a:off x="2852052" y="1915140"/>
+            <a:ext cx="3418116" cy="1323439"/>
+          </a:xfrm>
+          <a:prstGeom prst="rect">
+            <a:avLst/>
+          </a:prstGeom>
+          <a:noFill/>
+        </p:spPr>
+        <p:txBody>
+          <a:bodyPr wrap="square" rtlCol="0">
+            <a:spAutoFit/>
+          </a:bodyPr>
+          <a:lstStyle/>
+          <a:p>
+            <a:pPr marL="285750" indent="-285750">
+              <a:buFont typeface="Wingdings" pitchFamily="2" charset="2"/>
+              <a:buChar char="q"/>
+            </a:pPr>
+            <a:r>
+              <a:rPr lang="en-US" sz="1600" b="1" dirty="0" smtClean="0">
+                <a:solidFill>
+                  <a:schemeClr val="tx2">
+                    <a:lumMod val="60000"/>
+                    <a:lumOff val="40000"/>
+                  </a:schemeClr>
+                </a:solidFill>
+              </a:rPr>
+              <a:t>ADC</a:t>
+            </a:r>
+          </a:p>
+          <a:p>
+            <a:pPr marL="800100" lvl="1" indent="-342900">
+              <a:buFont typeface="Wingdings" pitchFamily="2" charset="2"/>
+              <a:buChar char="q"/>
+            </a:pPr>
+            <a:r>
+              <a:rPr lang="en-US" sz="1600" b="1" dirty="0" smtClean="0">
+                <a:solidFill>
+                  <a:schemeClr val="tx2">
+                    <a:lumMod val="60000"/>
+                    <a:lumOff val="40000"/>
+                  </a:schemeClr>
+                </a:solidFill>
+              </a:rPr>
+              <a:t>ADC_Init</a:t>
+            </a:r>
+          </a:p>
+          <a:p>
+            <a:pPr marL="800100" lvl="1" indent="-342900">
+              <a:buFont typeface="Wingdings" pitchFamily="2" charset="2"/>
+              <a:buChar char="q"/>
+            </a:pPr>
+            <a:r>
+              <a:rPr lang="en-US" sz="1600" b="1" dirty="0" smtClean="0">
+                <a:solidFill>
+                  <a:schemeClr val="tx2">
+                    <a:lumMod val="60000"/>
+                    <a:lumOff val="40000"/>
+                  </a:schemeClr>
+                </a:solidFill>
+              </a:rPr>
+              <a:t>ADC_Start_Conv</a:t>
+            </a:r>
+          </a:p>
+          <a:p>
+            <a:pPr marL="800100" lvl="1" indent="-342900">
+              <a:buFont typeface="Wingdings" pitchFamily="2" charset="2"/>
+              <a:buChar char="q"/>
+            </a:pPr>
+            <a:r>
+              <a:rPr lang="en-US" sz="1600" b="1" dirty="0" smtClean="0">
+                <a:solidFill>
+                  <a:schemeClr val="tx2">
+                    <a:lumMod val="60000"/>
+                    <a:lumOff val="40000"/>
+                  </a:schemeClr>
+                </a:solidFill>
+              </a:rPr>
+              <a:t>ADC_Conv_MainFunction</a:t>
+            </a:r>
+          </a:p>
+          <a:p>
+            <a:pPr marL="800100" lvl="1" indent="-342900">
+              <a:buFont typeface="Wingdings" pitchFamily="2" charset="2"/>
+              <a:buChar char="q"/>
+            </a:pPr>
+            <a:r>
+              <a:rPr lang="en-US" sz="1600" b="1" dirty="0" smtClean="0">
+                <a:solidFill>
+                  <a:schemeClr val="tx2">
+                    <a:lumMod val="60000"/>
+                    <a:lumOff val="40000"/>
+                  </a:schemeClr>
+                </a:solidFill>
+              </a:rPr>
+              <a:t>ADC_Value_Ready_CallBack</a:t>
+            </a:r>
+          </a:p>
+        </p:txBody>
+      </p:sp>
+      <p:sp>
+        <p:nvSpPr>
+          <p:cNvPr id="26" name="TextBox 25"/>
+          <p:cNvSpPr txBox="1"/>
+          <p:nvPr/>
+        </p:nvSpPr>
+        <p:spPr>
+          <a:xfrm>
+            <a:off x="2935049" y="3238579"/>
+            <a:ext cx="2841170" cy="2554545"/>
+          </a:xfrm>
+          <a:prstGeom prst="rect">
+            <a:avLst/>
+          </a:prstGeom>
+          <a:noFill/>
+        </p:spPr>
+        <p:txBody>
+          <a:bodyPr wrap="square" rtlCol="0">
+            <a:spAutoFit/>
+          </a:bodyPr>
+          <a:lstStyle/>
+          <a:p>
+            <a:pPr marL="285750" indent="-285750">
+              <a:buFont typeface="Wingdings" pitchFamily="2" charset="2"/>
+              <a:buChar char="q"/>
+            </a:pPr>
+            <a:r>
+              <a:rPr lang="en-US" sz="1600" b="1" dirty="0" smtClean="0">
+                <a:solidFill>
+                  <a:schemeClr val="tx2">
+                    <a:lumMod val="60000"/>
+                    <a:lumOff val="40000"/>
+                  </a:schemeClr>
+                </a:solidFill>
+              </a:rPr>
+              <a:t>I2C</a:t>
+            </a:r>
+          </a:p>
+          <a:p>
+            <a:pPr marL="800100" lvl="1" indent="-342900">
+              <a:buFont typeface="Wingdings" pitchFamily="2" charset="2"/>
+              <a:buChar char="q"/>
+            </a:pPr>
+            <a:r>
+              <a:rPr lang="en-US" sz="1600" b="1" dirty="0">
+                <a:solidFill>
+                  <a:schemeClr val="tx2">
+                    <a:lumMod val="60000"/>
+                    <a:lumOff val="40000"/>
+                  </a:schemeClr>
+                </a:solidFill>
+              </a:rPr>
+              <a:t>I2c_Init</a:t>
+            </a:r>
             <a:endParaRPr lang="en-US" sz="1600" b="1" dirty="0" smtClean="0">
               <a:solidFill>
                 <a:schemeClr val="tx2">
@@ -8061,22 +9087,228 @@
                   </a:schemeClr>
                 </a:solidFill>
               </a:rPr>
-              <a:t>SSD_BLINK </a:t>
-            </a:r>
+              <a:t>I2c_Write</a:t>
+            </a:r>
+          </a:p>
+          <a:p>
+            <a:pPr marL="800100" lvl="1" indent="-342900">
+              <a:buFont typeface="Wingdings" pitchFamily="2" charset="2"/>
+              <a:buChar char="q"/>
+            </a:pPr>
+            <a:r>
+              <a:rPr lang="en-US" sz="1600" b="1" dirty="0">
+                <a:solidFill>
+                  <a:schemeClr val="tx2">
+                    <a:lumMod val="60000"/>
+                    <a:lumOff val="40000"/>
+                  </a:schemeClr>
+                </a:solidFill>
+              </a:rPr>
+              <a:t>I2c_Read</a:t>
+            </a:r>
+            <a:endParaRPr lang="en-US" sz="1600" b="1" dirty="0" smtClean="0">
+              <a:solidFill>
+                <a:schemeClr val="tx2">
+                  <a:lumMod val="60000"/>
+                  <a:lumOff val="40000"/>
+                </a:schemeClr>
+              </a:solidFill>
+            </a:endParaRPr>
+          </a:p>
+          <a:p>
+            <a:pPr marL="800100" lvl="1" indent="-342900">
+              <a:buFont typeface="Wingdings" pitchFamily="2" charset="2"/>
+              <a:buChar char="q"/>
+            </a:pPr>
+            <a:r>
+              <a:rPr lang="en-US" sz="1600" b="1" dirty="0" smtClean="0">
+                <a:solidFill>
+                  <a:schemeClr val="tx2">
+                    <a:lumMod val="60000"/>
+                    <a:lumOff val="40000"/>
+                  </a:schemeClr>
+                </a:solidFill>
+              </a:rPr>
+              <a:t>I2c_Start</a:t>
+            </a:r>
+          </a:p>
+          <a:p>
+            <a:pPr marL="800100" lvl="1" indent="-342900">
+              <a:buFont typeface="Wingdings" pitchFamily="2" charset="2"/>
+              <a:buChar char="q"/>
+            </a:pPr>
+            <a:r>
+              <a:rPr lang="en-US" sz="1600" b="1" dirty="0" smtClean="0">
+                <a:solidFill>
+                  <a:schemeClr val="tx2">
+                    <a:lumMod val="60000"/>
+                    <a:lumOff val="40000"/>
+                  </a:schemeClr>
+                </a:solidFill>
+              </a:rPr>
+              <a:t>I2c_Stop</a:t>
+            </a:r>
+          </a:p>
+          <a:p>
+            <a:pPr marL="800100" lvl="1" indent="-342900">
+              <a:buFont typeface="Wingdings" pitchFamily="2" charset="2"/>
+              <a:buChar char="q"/>
+            </a:pPr>
+            <a:r>
+              <a:rPr lang="en-US" sz="1600" b="1" dirty="0" smtClean="0">
+                <a:solidFill>
+                  <a:schemeClr val="tx2">
+                    <a:lumMod val="60000"/>
+                    <a:lumOff val="40000"/>
+                  </a:schemeClr>
+                </a:solidFill>
+              </a:rPr>
+              <a:t>I2c_WaitAck</a:t>
+            </a:r>
+          </a:p>
+          <a:p>
+            <a:pPr marL="800100" lvl="1" indent="-342900">
+              <a:buFont typeface="Wingdings" pitchFamily="2" charset="2"/>
+              <a:buChar char="q"/>
+            </a:pPr>
+            <a:r>
+              <a:rPr lang="en-US" sz="1600" b="1" dirty="0">
+                <a:solidFill>
+                  <a:schemeClr val="tx2">
+                    <a:lumMod val="60000"/>
+                    <a:lumOff val="40000"/>
+                  </a:schemeClr>
+                </a:solidFill>
+              </a:rPr>
+              <a:t>I2c_Send_NAck</a:t>
+            </a:r>
+            <a:endParaRPr lang="en-US" sz="1600" b="1" dirty="0" smtClean="0">
+              <a:solidFill>
+                <a:schemeClr val="tx2">
+                  <a:lumMod val="60000"/>
+                  <a:lumOff val="40000"/>
+                </a:schemeClr>
+              </a:solidFill>
+            </a:endParaRPr>
+          </a:p>
+          <a:p>
+            <a:pPr marL="800100" lvl="1" indent="-342900">
+              <a:buFont typeface="Wingdings" pitchFamily="2" charset="2"/>
+              <a:buChar char="q"/>
+            </a:pPr>
+            <a:endParaRPr lang="en-US" sz="1600" dirty="0"/>
+          </a:p>
+          <a:p>
+            <a:pPr marL="800100" lvl="1" indent="-342900">
+              <a:buFont typeface="Wingdings" pitchFamily="2" charset="2"/>
+              <a:buChar char="q"/>
+            </a:pPr>
             <a:endParaRPr lang="en-US" sz="1600" dirty="0" smtClean="0"/>
           </a:p>
         </p:txBody>
       </p:sp>
       <p:sp>
         <p:nvSpPr>
-          <p:cNvPr id="16" name="TextBox 15"/>
+          <p:cNvPr id="27" name="TextBox 26"/>
           <p:cNvSpPr txBox="1"/>
           <p:nvPr/>
         </p:nvSpPr>
         <p:spPr>
           <a:xfrm>
-            <a:off x="-13613" y="2388788"/>
-            <a:ext cx="3102428" cy="1323439"/>
+            <a:off x="6117765" y="848530"/>
+            <a:ext cx="3026230" cy="1077218"/>
+          </a:xfrm>
+          <a:prstGeom prst="rect">
+            <a:avLst/>
+          </a:prstGeom>
+          <a:noFill/>
+        </p:spPr>
+        <p:txBody>
+          <a:bodyPr wrap="square" rtlCol="0">
+            <a:spAutoFit/>
+          </a:bodyPr>
+          <a:lstStyle/>
+          <a:p>
+            <a:pPr marL="742950" lvl="1" indent="-285750">
+              <a:buFont typeface="Wingdings" pitchFamily="2" charset="2"/>
+              <a:buChar char="q"/>
+            </a:pPr>
+            <a:r>
+              <a:rPr lang="en-US" sz="1600" b="1" dirty="0" smtClean="0">
+                <a:solidFill>
+                  <a:schemeClr val="tx2">
+                    <a:lumMod val="60000"/>
+                    <a:lumOff val="40000"/>
+                  </a:schemeClr>
+                </a:solidFill>
+              </a:rPr>
+              <a:t>Task</a:t>
+            </a:r>
+          </a:p>
+          <a:p>
+            <a:pPr marL="1257300" lvl="2" indent="-342900">
+              <a:buFont typeface="Wingdings" pitchFamily="2" charset="2"/>
+              <a:buChar char="q"/>
+            </a:pPr>
+            <a:r>
+              <a:rPr lang="en-US" sz="1600" b="1" dirty="0" smtClean="0">
+                <a:solidFill>
+                  <a:schemeClr val="tx2">
+                    <a:lumMod val="60000"/>
+                    <a:lumOff val="40000"/>
+                  </a:schemeClr>
+                </a:solidFill>
+              </a:rPr>
+              <a:t>Scheduler_Task1</a:t>
+            </a:r>
+          </a:p>
+          <a:p>
+            <a:pPr marL="1257300" lvl="2" indent="-342900">
+              <a:buFont typeface="Wingdings" pitchFamily="2" charset="2"/>
+              <a:buChar char="q"/>
+            </a:pPr>
+            <a:r>
+              <a:rPr lang="en-US" sz="1600" b="1" dirty="0" smtClean="0">
+                <a:solidFill>
+                  <a:schemeClr val="tx2">
+                    <a:lumMod val="60000"/>
+                    <a:lumOff val="40000"/>
+                  </a:schemeClr>
+                </a:solidFill>
+              </a:rPr>
+              <a:t>Scheduler_Task2</a:t>
+            </a:r>
+          </a:p>
+          <a:p>
+            <a:pPr marL="1257300" lvl="2" indent="-342900">
+              <a:buFont typeface="Wingdings" pitchFamily="2" charset="2"/>
+              <a:buChar char="q"/>
+            </a:pPr>
+            <a:r>
+              <a:rPr lang="en-US" sz="1600" b="1" dirty="0" smtClean="0">
+                <a:solidFill>
+                  <a:schemeClr val="tx2">
+                    <a:lumMod val="60000"/>
+                    <a:lumOff val="40000"/>
+                  </a:schemeClr>
+                </a:solidFill>
+              </a:rPr>
+              <a:t>Scheduler_Task3</a:t>
+            </a:r>
+            <a:endParaRPr lang="en-US" sz="1600" dirty="0" smtClean="0"/>
+          </a:p>
+        </p:txBody>
+      </p:sp>
+      <p:sp>
+        <p:nvSpPr>
+          <p:cNvPr id="29" name="TextBox 28"/>
+          <p:cNvSpPr txBox="1"/>
+          <p:nvPr/>
+        </p:nvSpPr>
+        <p:spPr>
+          <a:xfrm>
+            <a:off x="6574956" y="1970313"/>
+            <a:ext cx="2046518" cy="584775"/>
           </a:xfrm>
           <a:prstGeom prst="rect">
             <a:avLst/>
@@ -8094,7 +9326,7 @@
               <a:buChar char="q"/>
             </a:pPr>
             <a:r>
-              <a:rPr lang="en-US" sz="1600" b="1" dirty="0" smtClean="0">
+              <a:rPr lang="en-US" sz="1600" b="1" dirty="0">
                 <a:solidFill>
                   <a:schemeClr val="tx2">
                     <a:lumMod val="60000"/>
@@ -8102,7 +9334,18 @@
                   </a:schemeClr>
                 </a:solidFill>
               </a:rPr>
-              <a:t>ELEMENTS</a:t>
+              <a:t>I</a:t>
+            </a:r>
+            <a:r>
+              <a:rPr lang="en-US" sz="1600" b="1" dirty="0" smtClean="0">
+                <a:solidFill>
+                  <a:schemeClr val="tx2">
+                    <a:lumMod val="60000"/>
+                    <a:lumOff val="40000"/>
+                  </a:schemeClr>
+                </a:solidFill>
+              </a:rPr>
+              <a:t>nterrupt</a:t>
             </a:r>
           </a:p>
           <a:p>
@@ -8119,927 +9362,6 @@
                   </a:schemeClr>
                 </a:solidFill>
               </a:rPr>
-              <a:t>Elements_Init</a:t>
-            </a:r>
-          </a:p>
-          <a:p>
-            <a:pPr marL="800100" lvl="1" indent="-342900">
-              <a:buFont typeface="Wingdings" pitchFamily="2" charset="2"/>
-              <a:buChar char="q"/>
-            </a:pPr>
-            <a:r>
-              <a:rPr lang="en-US" sz="1600" b="1" dirty="0" smtClean="0">
-                <a:solidFill>
-                  <a:schemeClr val="tx2">
-                    <a:lumMod val="60000"/>
-                    <a:lumOff val="40000"/>
-                  </a:schemeClr>
-                </a:solidFill>
-              </a:rPr>
-              <a:t>Elements_MainFunction  </a:t>
-            </a:r>
-          </a:p>
-          <a:p>
-            <a:pPr marL="800100" lvl="1" indent="-342900">
-              <a:buFont typeface="Wingdings" pitchFamily="2" charset="2"/>
-              <a:buChar char="q"/>
-            </a:pPr>
-            <a:r>
-              <a:rPr lang="en-US" sz="1600" b="1" dirty="0" smtClean="0">
-                <a:solidFill>
-                  <a:schemeClr val="tx2">
-                    <a:lumMod val="60000"/>
-                    <a:lumOff val="40000"/>
-                  </a:schemeClr>
-                </a:solidFill>
-              </a:rPr>
-              <a:t>LED_Control</a:t>
-            </a:r>
-          </a:p>
-          <a:p>
-            <a:pPr marL="800100" lvl="1" indent="-342900">
-              <a:buFont typeface="Wingdings" pitchFamily="2" charset="2"/>
-              <a:buChar char="q"/>
-            </a:pPr>
-            <a:r>
-              <a:rPr lang="en-US" sz="1600" b="1" dirty="0" smtClean="0">
-                <a:solidFill>
-                  <a:schemeClr val="tx2">
-                    <a:lumMod val="60000"/>
-                    <a:lumOff val="40000"/>
-                  </a:schemeClr>
-                </a:solidFill>
-              </a:rPr>
-              <a:t>LED_BLINK</a:t>
-            </a:r>
-            <a:endParaRPr lang="en-US" sz="1600" dirty="0" smtClean="0"/>
-          </a:p>
-        </p:txBody>
-      </p:sp>
-      <p:sp>
-        <p:nvSpPr>
-          <p:cNvPr id="17" name="TextBox 16"/>
-          <p:cNvSpPr txBox="1"/>
-          <p:nvPr/>
-        </p:nvSpPr>
-        <p:spPr>
-          <a:xfrm>
-            <a:off x="-13613" y="3726806"/>
-            <a:ext cx="2841170" cy="1077218"/>
-          </a:xfrm>
-          <a:prstGeom prst="rect">
-            <a:avLst/>
-          </a:prstGeom>
-          <a:noFill/>
-        </p:spPr>
-        <p:txBody>
-          <a:bodyPr wrap="square" rtlCol="0">
-            <a:spAutoFit/>
-          </a:bodyPr>
-          <a:lstStyle/>
-          <a:p>
-            <a:pPr marL="285750" indent="-285750">
-              <a:buFont typeface="Wingdings" pitchFamily="2" charset="2"/>
-              <a:buChar char="q"/>
-            </a:pPr>
-            <a:r>
-              <a:rPr lang="en-US" sz="1600" b="1" dirty="0" smtClean="0">
-                <a:solidFill>
-                  <a:schemeClr val="tx2">
-                    <a:lumMod val="60000"/>
-                    <a:lumOff val="40000"/>
-                  </a:schemeClr>
-                </a:solidFill>
-              </a:rPr>
-              <a:t>MODE</a:t>
-            </a:r>
-          </a:p>
-          <a:p>
-            <a:pPr marL="800100" lvl="1" indent="-342900">
-              <a:buFont typeface="Wingdings" pitchFamily="2" charset="2"/>
-              <a:buChar char="q"/>
-            </a:pPr>
-            <a:r>
-              <a:rPr lang="en-US" sz="1600" b="1" dirty="0" smtClean="0">
-                <a:solidFill>
-                  <a:schemeClr val="tx2">
-                    <a:lumMod val="60000"/>
-                    <a:lumOff val="40000"/>
-                  </a:schemeClr>
-                </a:solidFill>
-              </a:rPr>
-              <a:t>Mode_Init</a:t>
-            </a:r>
-          </a:p>
-          <a:p>
-            <a:pPr marL="800100" lvl="1" indent="-342900">
-              <a:buFont typeface="Wingdings" pitchFamily="2" charset="2"/>
-              <a:buChar char="q"/>
-            </a:pPr>
-            <a:r>
-              <a:rPr lang="en-US" sz="1600" b="1" dirty="0" smtClean="0">
-                <a:solidFill>
-                  <a:schemeClr val="tx2">
-                    <a:lumMod val="60000"/>
-                    <a:lumOff val="40000"/>
-                  </a:schemeClr>
-                </a:solidFill>
-              </a:rPr>
-              <a:t>Mode_MainFunction</a:t>
-            </a:r>
-          </a:p>
-          <a:p>
-            <a:pPr marL="800100" lvl="1" indent="-342900">
-              <a:buFont typeface="Wingdings" pitchFamily="2" charset="2"/>
-              <a:buChar char="q"/>
-            </a:pPr>
-            <a:r>
-              <a:rPr lang="en-US" sz="1600" b="1" dirty="0" smtClean="0">
-                <a:solidFill>
-                  <a:schemeClr val="tx2">
-                    <a:lumMod val="60000"/>
-                    <a:lumOff val="40000"/>
-                  </a:schemeClr>
-                </a:solidFill>
-              </a:rPr>
-              <a:t>Start_Setting_Timer</a:t>
-            </a:r>
-            <a:endParaRPr lang="en-US" sz="1600" dirty="0" smtClean="0"/>
-          </a:p>
-        </p:txBody>
-      </p:sp>
-      <p:sp>
-        <p:nvSpPr>
-          <p:cNvPr id="18" name="TextBox 17"/>
-          <p:cNvSpPr txBox="1"/>
-          <p:nvPr/>
-        </p:nvSpPr>
-        <p:spPr>
-          <a:xfrm>
-            <a:off x="6607621" y="2671386"/>
-            <a:ext cx="2743200" cy="830997"/>
-          </a:xfrm>
-          <a:prstGeom prst="rect">
-            <a:avLst/>
-          </a:prstGeom>
-          <a:noFill/>
-        </p:spPr>
-        <p:txBody>
-          <a:bodyPr wrap="square" rtlCol="0">
-            <a:spAutoFit/>
-          </a:bodyPr>
-          <a:lstStyle/>
-          <a:p>
-            <a:pPr marL="285750" indent="-285750">
-              <a:buFont typeface="Wingdings" pitchFamily="2" charset="2"/>
-              <a:buChar char="q"/>
-            </a:pPr>
-            <a:r>
-              <a:rPr lang="en-US" sz="1600" b="1" dirty="0" smtClean="0">
-                <a:solidFill>
-                  <a:schemeClr val="tx2">
-                    <a:lumMod val="60000"/>
-                    <a:lumOff val="40000"/>
-                  </a:schemeClr>
-                </a:solidFill>
-              </a:rPr>
-              <a:t>Timer</a:t>
-            </a:r>
-          </a:p>
-          <a:p>
-            <a:pPr marL="800100" lvl="1" indent="-342900">
-              <a:buFont typeface="Wingdings" pitchFamily="2" charset="2"/>
-              <a:buChar char="q"/>
-            </a:pPr>
-            <a:r>
-              <a:rPr lang="en-US" sz="1600" b="1" dirty="0" smtClean="0">
-                <a:solidFill>
-                  <a:schemeClr val="tx2">
-                    <a:lumMod val="60000"/>
-                    <a:lumOff val="40000"/>
-                  </a:schemeClr>
-                </a:solidFill>
-              </a:rPr>
-              <a:t>Timer0_Init</a:t>
-            </a:r>
-          </a:p>
-          <a:p>
-            <a:pPr marL="800100" lvl="1" indent="-342900">
-              <a:buFont typeface="Wingdings" pitchFamily="2" charset="2"/>
-              <a:buChar char="q"/>
-            </a:pPr>
-            <a:r>
-              <a:rPr lang="en-US" sz="1600" b="1" dirty="0" smtClean="0">
-                <a:solidFill>
-                  <a:schemeClr val="tx2">
-                    <a:lumMod val="60000"/>
-                    <a:lumOff val="40000"/>
-                  </a:schemeClr>
-                </a:solidFill>
-              </a:rPr>
-              <a:t>Timer0_CallBack</a:t>
-            </a:r>
-            <a:endParaRPr lang="en-US" sz="1600" dirty="0" smtClean="0"/>
-          </a:p>
-        </p:txBody>
-      </p:sp>
-      <p:sp>
-        <p:nvSpPr>
-          <p:cNvPr id="20" name="TextBox 19"/>
-          <p:cNvSpPr txBox="1"/>
-          <p:nvPr/>
-        </p:nvSpPr>
-        <p:spPr>
-          <a:xfrm>
-            <a:off x="6607621" y="3815054"/>
-            <a:ext cx="2569041" cy="584775"/>
-          </a:xfrm>
-          <a:prstGeom prst="rect">
-            <a:avLst/>
-          </a:prstGeom>
-          <a:noFill/>
-        </p:spPr>
-        <p:txBody>
-          <a:bodyPr wrap="square" rtlCol="0">
-            <a:spAutoFit/>
-          </a:bodyPr>
-          <a:lstStyle/>
-          <a:p>
-            <a:pPr marL="285750" indent="-285750">
-              <a:buFont typeface="Wingdings" pitchFamily="2" charset="2"/>
-              <a:buChar char="q"/>
-            </a:pPr>
-            <a:r>
-              <a:rPr lang="en-US" sz="1600" b="1" dirty="0" smtClean="0">
-                <a:solidFill>
-                  <a:schemeClr val="tx2">
-                    <a:lumMod val="60000"/>
-                    <a:lumOff val="40000"/>
-                  </a:schemeClr>
-                </a:solidFill>
-              </a:rPr>
-              <a:t>Temperature</a:t>
-            </a:r>
-          </a:p>
-          <a:p>
-            <a:pPr marL="800100" lvl="1" indent="-342900">
-              <a:buFont typeface="Wingdings" pitchFamily="2" charset="2"/>
-              <a:buChar char="q"/>
-            </a:pPr>
-            <a:r>
-              <a:rPr lang="en-US" sz="1600" b="1" dirty="0" smtClean="0">
-                <a:solidFill>
-                  <a:schemeClr val="tx2">
-                    <a:lumMod val="60000"/>
-                    <a:lumOff val="40000"/>
-                  </a:schemeClr>
-                </a:solidFill>
-              </a:rPr>
-              <a:t>Temperature_Calc</a:t>
-            </a:r>
-          </a:p>
-        </p:txBody>
-      </p:sp>
-      <p:sp>
-        <p:nvSpPr>
-          <p:cNvPr id="22" name="TextBox 21"/>
-          <p:cNvSpPr txBox="1"/>
-          <p:nvPr/>
-        </p:nvSpPr>
-        <p:spPr>
-          <a:xfrm>
-            <a:off x="6662033" y="4661793"/>
-            <a:ext cx="2743200" cy="584775"/>
-          </a:xfrm>
-          <a:prstGeom prst="rect">
-            <a:avLst/>
-          </a:prstGeom>
-          <a:noFill/>
-        </p:spPr>
-        <p:txBody>
-          <a:bodyPr wrap="square" rtlCol="0">
-            <a:spAutoFit/>
-          </a:bodyPr>
-          <a:lstStyle/>
-          <a:p>
-            <a:pPr marL="285750" indent="-285750">
-              <a:buFont typeface="Wingdings" pitchFamily="2" charset="2"/>
-              <a:buChar char="q"/>
-            </a:pPr>
-            <a:r>
-              <a:rPr lang="en-US" sz="1600" b="1" dirty="0" smtClean="0">
-                <a:solidFill>
-                  <a:schemeClr val="tx2">
-                    <a:lumMod val="60000"/>
-                    <a:lumOff val="40000"/>
-                  </a:schemeClr>
-                </a:solidFill>
-              </a:rPr>
-              <a:t>Average</a:t>
-            </a:r>
-          </a:p>
-          <a:p>
-            <a:pPr marL="800100" lvl="1" indent="-342900">
-              <a:buFont typeface="Wingdings" pitchFamily="2" charset="2"/>
-              <a:buChar char="q"/>
-            </a:pPr>
-            <a:r>
-              <a:rPr lang="en-US" sz="1600" b="1" dirty="0" smtClean="0">
-                <a:solidFill>
-                  <a:schemeClr val="tx2">
-                    <a:lumMod val="60000"/>
-                    <a:lumOff val="40000"/>
-                  </a:schemeClr>
-                </a:solidFill>
-              </a:rPr>
-              <a:t>Average_Value</a:t>
-            </a:r>
-          </a:p>
-        </p:txBody>
-      </p:sp>
-      <p:sp>
-        <p:nvSpPr>
-          <p:cNvPr id="23" name="TextBox 22"/>
-          <p:cNvSpPr txBox="1"/>
-          <p:nvPr/>
-        </p:nvSpPr>
-        <p:spPr>
-          <a:xfrm>
-            <a:off x="3009894" y="4672679"/>
-            <a:ext cx="2667000" cy="1323439"/>
-          </a:xfrm>
-          <a:prstGeom prst="rect">
-            <a:avLst/>
-          </a:prstGeom>
-          <a:noFill/>
-        </p:spPr>
-        <p:txBody>
-          <a:bodyPr wrap="square" rtlCol="0">
-            <a:spAutoFit/>
-          </a:bodyPr>
-          <a:lstStyle/>
-          <a:p>
-            <a:pPr marL="285750" indent="-285750">
-              <a:buFont typeface="Wingdings" pitchFamily="2" charset="2"/>
-              <a:buChar char="q"/>
-            </a:pPr>
-            <a:r>
-              <a:rPr lang="en-US" sz="1600" b="1" dirty="0" smtClean="0">
-                <a:solidFill>
-                  <a:schemeClr val="tx2">
-                    <a:lumMod val="60000"/>
-                    <a:lumOff val="40000"/>
-                  </a:schemeClr>
-                </a:solidFill>
-              </a:rPr>
-              <a:t>EEPROM</a:t>
-            </a:r>
-          </a:p>
-          <a:p>
-            <a:pPr marL="800100" lvl="1" indent="-342900">
-              <a:buFont typeface="Wingdings" pitchFamily="2" charset="2"/>
-              <a:buChar char="q"/>
-            </a:pPr>
-            <a:r>
-              <a:rPr lang="en-US" sz="1600" b="1" dirty="0" smtClean="0">
-                <a:solidFill>
-                  <a:schemeClr val="tx2">
-                    <a:lumMod val="60000"/>
-                    <a:lumOff val="40000"/>
-                  </a:schemeClr>
-                </a:solidFill>
-              </a:rPr>
-              <a:t>Get_EEPROM_Data</a:t>
-            </a:r>
-          </a:p>
-          <a:p>
-            <a:pPr marL="800100" lvl="1" indent="-342900">
-              <a:buFont typeface="Wingdings" pitchFamily="2" charset="2"/>
-              <a:buChar char="q"/>
-            </a:pPr>
-            <a:r>
-              <a:rPr lang="en-US" sz="1600" b="1" dirty="0">
-                <a:solidFill>
-                  <a:schemeClr val="tx2">
-                    <a:lumMod val="60000"/>
-                    <a:lumOff val="40000"/>
-                  </a:schemeClr>
-                </a:solidFill>
-              </a:rPr>
-              <a:t>S</a:t>
-            </a:r>
-            <a:r>
-              <a:rPr lang="en-US" sz="1600" b="1" dirty="0" smtClean="0">
-                <a:solidFill>
-                  <a:schemeClr val="tx2">
-                    <a:lumMod val="60000"/>
-                    <a:lumOff val="40000"/>
-                  </a:schemeClr>
-                </a:solidFill>
-              </a:rPr>
-              <a:t>et_EEPROM_Data</a:t>
-            </a:r>
-          </a:p>
-          <a:p>
-            <a:pPr marL="800100" lvl="1" indent="-342900">
-              <a:buFont typeface="Wingdings" pitchFamily="2" charset="2"/>
-              <a:buChar char="q"/>
-            </a:pPr>
-            <a:r>
-              <a:rPr lang="en-US" sz="1600" b="1" dirty="0" smtClean="0">
-                <a:solidFill>
-                  <a:schemeClr val="tx2">
-                    <a:lumMod val="60000"/>
-                    <a:lumOff val="40000"/>
-                  </a:schemeClr>
-                </a:solidFill>
-              </a:rPr>
-              <a:t>EEPROM_Write</a:t>
-            </a:r>
-          </a:p>
-          <a:p>
-            <a:pPr marL="800100" lvl="1" indent="-342900">
-              <a:buFont typeface="Wingdings" pitchFamily="2" charset="2"/>
-              <a:buChar char="q"/>
-            </a:pPr>
-            <a:r>
-              <a:rPr lang="en-US" sz="1600" b="1" dirty="0" smtClean="0">
-                <a:solidFill>
-                  <a:schemeClr val="tx2">
-                    <a:lumMod val="60000"/>
-                    <a:lumOff val="40000"/>
-                  </a:schemeClr>
-                </a:solidFill>
-              </a:rPr>
-              <a:t>EEPROM_Read</a:t>
-            </a:r>
-          </a:p>
-        </p:txBody>
-      </p:sp>
-      <p:sp>
-        <p:nvSpPr>
-          <p:cNvPr id="24" name="TextBox 23"/>
-          <p:cNvSpPr txBox="1"/>
-          <p:nvPr/>
-        </p:nvSpPr>
-        <p:spPr>
-          <a:xfrm>
-            <a:off x="2830279" y="837922"/>
-            <a:ext cx="3026230" cy="1077218"/>
-          </a:xfrm>
-          <a:prstGeom prst="rect">
-            <a:avLst/>
-          </a:prstGeom>
-          <a:noFill/>
-        </p:spPr>
-        <p:txBody>
-          <a:bodyPr wrap="square" rtlCol="0">
-            <a:spAutoFit/>
-          </a:bodyPr>
-          <a:lstStyle/>
-          <a:p>
-            <a:pPr marL="285750" indent="-285750">
-              <a:buFont typeface="Wingdings" pitchFamily="2" charset="2"/>
-              <a:buChar char="q"/>
-            </a:pPr>
-            <a:r>
-              <a:rPr lang="en-US" sz="1600" b="1" dirty="0" smtClean="0">
-                <a:solidFill>
-                  <a:schemeClr val="tx2">
-                    <a:lumMod val="60000"/>
-                    <a:lumOff val="40000"/>
-                  </a:schemeClr>
-                </a:solidFill>
-              </a:rPr>
-              <a:t>Scheduler</a:t>
-            </a:r>
-          </a:p>
-          <a:p>
-            <a:pPr marL="800100" lvl="1" indent="-342900">
-              <a:buFont typeface="Wingdings" pitchFamily="2" charset="2"/>
-              <a:buChar char="q"/>
-            </a:pPr>
-            <a:r>
-              <a:rPr lang="en-US" sz="1600" b="1" dirty="0" smtClean="0">
-                <a:solidFill>
-                  <a:schemeClr val="tx2">
-                    <a:lumMod val="60000"/>
-                    <a:lumOff val="40000"/>
-                  </a:schemeClr>
-                </a:solidFill>
-              </a:rPr>
-              <a:t>Scheduler_Init</a:t>
-            </a:r>
-          </a:p>
-          <a:p>
-            <a:pPr marL="800100" lvl="1" indent="-342900">
-              <a:buFont typeface="Wingdings" pitchFamily="2" charset="2"/>
-              <a:buChar char="q"/>
-            </a:pPr>
-            <a:r>
-              <a:rPr lang="en-US" sz="1600" b="1" dirty="0" smtClean="0">
-                <a:solidFill>
-                  <a:schemeClr val="tx2">
-                    <a:lumMod val="60000"/>
-                    <a:lumOff val="40000"/>
-                  </a:schemeClr>
-                </a:solidFill>
-              </a:rPr>
-              <a:t>Scheduler_ActivateTask</a:t>
-            </a:r>
-          </a:p>
-          <a:p>
-            <a:pPr marL="800100" lvl="1" indent="-342900">
-              <a:buFont typeface="Wingdings" pitchFamily="2" charset="2"/>
-              <a:buChar char="q"/>
-            </a:pPr>
-            <a:r>
-              <a:rPr lang="en-US" sz="1600" b="1" dirty="0" smtClean="0">
-                <a:solidFill>
-                  <a:schemeClr val="tx2">
-                    <a:lumMod val="60000"/>
-                    <a:lumOff val="40000"/>
-                  </a:schemeClr>
-                </a:solidFill>
-              </a:rPr>
-              <a:t>Scheduler_Start</a:t>
-            </a:r>
-            <a:endParaRPr lang="en-US" sz="1600" dirty="0" smtClean="0"/>
-          </a:p>
-        </p:txBody>
-      </p:sp>
-      <p:sp>
-        <p:nvSpPr>
-          <p:cNvPr id="25" name="TextBox 24"/>
-          <p:cNvSpPr txBox="1"/>
-          <p:nvPr/>
-        </p:nvSpPr>
-        <p:spPr>
-          <a:xfrm>
-            <a:off x="2852052" y="1915140"/>
-            <a:ext cx="3418116" cy="1323439"/>
-          </a:xfrm>
-          <a:prstGeom prst="rect">
-            <a:avLst/>
-          </a:prstGeom>
-          <a:noFill/>
-        </p:spPr>
-        <p:txBody>
-          <a:bodyPr wrap="square" rtlCol="0">
-            <a:spAutoFit/>
-          </a:bodyPr>
-          <a:lstStyle/>
-          <a:p>
-            <a:pPr marL="285750" indent="-285750">
-              <a:buFont typeface="Wingdings" pitchFamily="2" charset="2"/>
-              <a:buChar char="q"/>
-            </a:pPr>
-            <a:r>
-              <a:rPr lang="en-US" sz="1600" b="1" dirty="0" smtClean="0">
-                <a:solidFill>
-                  <a:schemeClr val="tx2">
-                    <a:lumMod val="60000"/>
-                    <a:lumOff val="40000"/>
-                  </a:schemeClr>
-                </a:solidFill>
-              </a:rPr>
-              <a:t>ADC</a:t>
-            </a:r>
-          </a:p>
-          <a:p>
-            <a:pPr marL="800100" lvl="1" indent="-342900">
-              <a:buFont typeface="Wingdings" pitchFamily="2" charset="2"/>
-              <a:buChar char="q"/>
-            </a:pPr>
-            <a:r>
-              <a:rPr lang="en-US" sz="1600" b="1" dirty="0" smtClean="0">
-                <a:solidFill>
-                  <a:schemeClr val="tx2">
-                    <a:lumMod val="60000"/>
-                    <a:lumOff val="40000"/>
-                  </a:schemeClr>
-                </a:solidFill>
-              </a:rPr>
-              <a:t>ADC_Init</a:t>
-            </a:r>
-          </a:p>
-          <a:p>
-            <a:pPr marL="800100" lvl="1" indent="-342900">
-              <a:buFont typeface="Wingdings" pitchFamily="2" charset="2"/>
-              <a:buChar char="q"/>
-            </a:pPr>
-            <a:r>
-              <a:rPr lang="en-US" sz="1600" b="1" dirty="0" smtClean="0">
-                <a:solidFill>
-                  <a:schemeClr val="tx2">
-                    <a:lumMod val="60000"/>
-                    <a:lumOff val="40000"/>
-                  </a:schemeClr>
-                </a:solidFill>
-              </a:rPr>
-              <a:t>ADC_Start_Conv</a:t>
-            </a:r>
-          </a:p>
-          <a:p>
-            <a:pPr marL="800100" lvl="1" indent="-342900">
-              <a:buFont typeface="Wingdings" pitchFamily="2" charset="2"/>
-              <a:buChar char="q"/>
-            </a:pPr>
-            <a:r>
-              <a:rPr lang="en-US" sz="1600" b="1" dirty="0" smtClean="0">
-                <a:solidFill>
-                  <a:schemeClr val="tx2">
-                    <a:lumMod val="60000"/>
-                    <a:lumOff val="40000"/>
-                  </a:schemeClr>
-                </a:solidFill>
-              </a:rPr>
-              <a:t>ADC_Conv_MainFunction</a:t>
-            </a:r>
-          </a:p>
-          <a:p>
-            <a:pPr marL="800100" lvl="1" indent="-342900">
-              <a:buFont typeface="Wingdings" pitchFamily="2" charset="2"/>
-              <a:buChar char="q"/>
-            </a:pPr>
-            <a:r>
-              <a:rPr lang="en-US" sz="1600" b="1" dirty="0" smtClean="0">
-                <a:solidFill>
-                  <a:schemeClr val="tx2">
-                    <a:lumMod val="60000"/>
-                    <a:lumOff val="40000"/>
-                  </a:schemeClr>
-                </a:solidFill>
-              </a:rPr>
-              <a:t>ADC_Value_Ready_CallBack</a:t>
-            </a:r>
-          </a:p>
-        </p:txBody>
-      </p:sp>
-      <p:sp>
-        <p:nvSpPr>
-          <p:cNvPr id="26" name="TextBox 25"/>
-          <p:cNvSpPr txBox="1"/>
-          <p:nvPr/>
-        </p:nvSpPr>
-        <p:spPr>
-          <a:xfrm>
-            <a:off x="2922809" y="3349240"/>
-            <a:ext cx="2841170" cy="1323439"/>
-          </a:xfrm>
-          <a:prstGeom prst="rect">
-            <a:avLst/>
-          </a:prstGeom>
-          <a:noFill/>
-        </p:spPr>
-        <p:txBody>
-          <a:bodyPr wrap="square" rtlCol="0">
-            <a:spAutoFit/>
-          </a:bodyPr>
-          <a:lstStyle/>
-          <a:p>
-            <a:pPr marL="285750" indent="-285750">
-              <a:buFont typeface="Wingdings" pitchFamily="2" charset="2"/>
-              <a:buChar char="q"/>
-            </a:pPr>
-            <a:r>
-              <a:rPr lang="en-US" sz="1600" b="1" dirty="0" smtClean="0">
-                <a:solidFill>
-                  <a:schemeClr val="tx2">
-                    <a:lumMod val="60000"/>
-                    <a:lumOff val="40000"/>
-                  </a:schemeClr>
-                </a:solidFill>
-              </a:rPr>
-              <a:t>I2C</a:t>
-            </a:r>
-          </a:p>
-          <a:p>
-            <a:pPr marL="800100" lvl="1" indent="-342900">
-              <a:buFont typeface="Wingdings" pitchFamily="2" charset="2"/>
-              <a:buChar char="q"/>
-            </a:pPr>
-            <a:r>
-              <a:rPr lang="en-US" sz="1600" b="1" dirty="0" smtClean="0">
-                <a:solidFill>
-                  <a:schemeClr val="tx2">
-                    <a:lumMod val="60000"/>
-                    <a:lumOff val="40000"/>
-                  </a:schemeClr>
-                </a:solidFill>
-              </a:rPr>
-              <a:t>I2c_Start</a:t>
-            </a:r>
-          </a:p>
-          <a:p>
-            <a:pPr marL="800100" lvl="1" indent="-342900">
-              <a:buFont typeface="Wingdings" pitchFamily="2" charset="2"/>
-              <a:buChar char="q"/>
-            </a:pPr>
-            <a:r>
-              <a:rPr lang="en-US" sz="1600" b="1" dirty="0" smtClean="0">
-                <a:solidFill>
-                  <a:schemeClr val="tx2">
-                    <a:lumMod val="60000"/>
-                    <a:lumOff val="40000"/>
-                  </a:schemeClr>
-                </a:solidFill>
-              </a:rPr>
-              <a:t>I2c_Write</a:t>
-            </a:r>
-          </a:p>
-          <a:p>
-            <a:pPr marL="800100" lvl="1" indent="-342900">
-              <a:buFont typeface="Wingdings" pitchFamily="2" charset="2"/>
-              <a:buChar char="q"/>
-            </a:pPr>
-            <a:r>
-              <a:rPr lang="en-US" sz="1600" b="1" dirty="0" smtClean="0">
-                <a:solidFill>
-                  <a:schemeClr val="tx2">
-                    <a:lumMod val="60000"/>
-                    <a:lumOff val="40000"/>
-                  </a:schemeClr>
-                </a:solidFill>
-              </a:rPr>
-              <a:t>I2c_Stop</a:t>
-            </a:r>
-          </a:p>
-          <a:p>
-            <a:pPr marL="800100" lvl="1" indent="-342900">
-              <a:buFont typeface="Wingdings" pitchFamily="2" charset="2"/>
-              <a:buChar char="q"/>
-            </a:pPr>
-            <a:r>
-              <a:rPr lang="en-US" sz="1600" b="1" dirty="0" smtClean="0">
-                <a:solidFill>
-                  <a:schemeClr val="tx2">
-                    <a:lumMod val="60000"/>
-                    <a:lumOff val="40000"/>
-                  </a:schemeClr>
-                </a:solidFill>
-              </a:rPr>
-              <a:t>I2c_Start</a:t>
-            </a:r>
-            <a:endParaRPr lang="en-US" sz="1600" dirty="0" smtClean="0"/>
-          </a:p>
-        </p:txBody>
-      </p:sp>
-      <p:sp>
-        <p:nvSpPr>
-          <p:cNvPr id="27" name="TextBox 26"/>
-          <p:cNvSpPr txBox="1"/>
-          <p:nvPr/>
-        </p:nvSpPr>
-        <p:spPr>
-          <a:xfrm>
-            <a:off x="6117765" y="848530"/>
-            <a:ext cx="3026230" cy="1077218"/>
-          </a:xfrm>
-          <a:prstGeom prst="rect">
-            <a:avLst/>
-          </a:prstGeom>
-          <a:noFill/>
-        </p:spPr>
-        <p:txBody>
-          <a:bodyPr wrap="square" rtlCol="0">
-            <a:spAutoFit/>
-          </a:bodyPr>
-          <a:lstStyle/>
-          <a:p>
-            <a:pPr marL="742950" lvl="1" indent="-285750">
-              <a:buFont typeface="Wingdings" pitchFamily="2" charset="2"/>
-              <a:buChar char="q"/>
-            </a:pPr>
-            <a:r>
-              <a:rPr lang="en-US" sz="1600" b="1" dirty="0" smtClean="0">
-                <a:solidFill>
-                  <a:schemeClr val="tx2">
-                    <a:lumMod val="60000"/>
-                    <a:lumOff val="40000"/>
-                  </a:schemeClr>
-                </a:solidFill>
-              </a:rPr>
-              <a:t>Task</a:t>
-            </a:r>
-          </a:p>
-          <a:p>
-            <a:pPr marL="1257300" lvl="2" indent="-342900">
-              <a:buFont typeface="Wingdings" pitchFamily="2" charset="2"/>
-              <a:buChar char="q"/>
-            </a:pPr>
-            <a:r>
-              <a:rPr lang="en-US" sz="1600" b="1" dirty="0" smtClean="0">
-                <a:solidFill>
-                  <a:schemeClr val="tx2">
-                    <a:lumMod val="60000"/>
-                    <a:lumOff val="40000"/>
-                  </a:schemeClr>
-                </a:solidFill>
-              </a:rPr>
-              <a:t>Scheduler_Task1</a:t>
-            </a:r>
-          </a:p>
-          <a:p>
-            <a:pPr marL="1257300" lvl="2" indent="-342900">
-              <a:buFont typeface="Wingdings" pitchFamily="2" charset="2"/>
-              <a:buChar char="q"/>
-            </a:pPr>
-            <a:r>
-              <a:rPr lang="en-US" sz="1600" b="1" dirty="0" smtClean="0">
-                <a:solidFill>
-                  <a:schemeClr val="tx2">
-                    <a:lumMod val="60000"/>
-                    <a:lumOff val="40000"/>
-                  </a:schemeClr>
-                </a:solidFill>
-              </a:rPr>
-              <a:t>Scheduler_Task2</a:t>
-            </a:r>
-          </a:p>
-          <a:p>
-            <a:pPr marL="1257300" lvl="2" indent="-342900">
-              <a:buFont typeface="Wingdings" pitchFamily="2" charset="2"/>
-              <a:buChar char="q"/>
-            </a:pPr>
-            <a:r>
-              <a:rPr lang="en-US" sz="1600" b="1" dirty="0" smtClean="0">
-                <a:solidFill>
-                  <a:schemeClr val="tx2">
-                    <a:lumMod val="60000"/>
-                    <a:lumOff val="40000"/>
-                  </a:schemeClr>
-                </a:solidFill>
-              </a:rPr>
-              <a:t>Scheduler_Task3</a:t>
-            </a:r>
-            <a:endParaRPr lang="en-US" sz="1600" dirty="0" smtClean="0"/>
-          </a:p>
-        </p:txBody>
-      </p:sp>
-      <p:sp>
-        <p:nvSpPr>
-          <p:cNvPr id="29" name="TextBox 28"/>
-          <p:cNvSpPr txBox="1"/>
-          <p:nvPr/>
-        </p:nvSpPr>
-        <p:spPr>
-          <a:xfrm>
-            <a:off x="6574956" y="1970313"/>
-            <a:ext cx="2046518" cy="584775"/>
-          </a:xfrm>
-          <a:prstGeom prst="rect">
-            <a:avLst/>
-          </a:prstGeom>
-          <a:noFill/>
-        </p:spPr>
-        <p:txBody>
-          <a:bodyPr wrap="square" rtlCol="0">
-            <a:spAutoFit/>
-          </a:bodyPr>
-          <a:lstStyle/>
-          <a:p>
-            <a:pPr marL="285750" indent="-285750">
-              <a:buFont typeface="Wingdings" pitchFamily="2" charset="2"/>
-              <a:buChar char="q"/>
-            </a:pPr>
-            <a:r>
-              <a:rPr lang="en-US" sz="1600" b="1" dirty="0">
-                <a:solidFill>
-                  <a:schemeClr val="tx2">
-                    <a:lumMod val="60000"/>
-                    <a:lumOff val="40000"/>
-                  </a:schemeClr>
-                </a:solidFill>
-              </a:rPr>
-              <a:t>I</a:t>
-            </a:r>
-            <a:r>
-              <a:rPr lang="en-US" sz="1600" b="1" dirty="0" smtClean="0">
-                <a:solidFill>
-                  <a:schemeClr val="tx2">
-                    <a:lumMod val="60000"/>
-                    <a:lumOff val="40000"/>
-                  </a:schemeClr>
-                </a:solidFill>
-              </a:rPr>
-              <a:t>nterrupt</a:t>
-            </a:r>
-          </a:p>
-          <a:p>
-            <a:pPr marL="800100" lvl="1" indent="-342900">
-              <a:buFont typeface="Wingdings" pitchFamily="2" charset="2"/>
-              <a:buChar char="q"/>
-            </a:pPr>
-            <a:r>
-              <a:rPr lang="en-US" sz="1600" b="1" dirty="0" smtClean="0">
-                <a:solidFill>
-                  <a:schemeClr val="tx2">
-                    <a:lumMod val="60000"/>
-                    <a:lumOff val="40000"/>
-                  </a:schemeClr>
-                </a:solidFill>
-              </a:rPr>
               <a:t>myISR</a:t>
             </a:r>
           </a:p>
@@ -9053,7 +9375,7 @@
         </p:nvSpPr>
         <p:spPr>
           <a:xfrm>
-            <a:off x="0" y="4918900"/>
+            <a:off x="-14976" y="5378686"/>
             <a:ext cx="2999010" cy="1077218"/>
           </a:xfrm>
           <a:prstGeom prst="rect">
@@ -9258,10 +9580,24 @@
               <a:buChar char="q"/>
             </a:pPr>
             <a:r>
-              <a:rPr lang="en-US" dirty="0" err="1"/>
+              <a:rPr lang="en-US" dirty="0" err="1">
+                <a:solidFill>
+                  <a:schemeClr val="tx2">
+                    <a:lumMod val="60000"/>
+                    <a:lumOff val="40000"/>
+                  </a:schemeClr>
+                </a:solidFill>
+              </a:rPr>
               <a:t>Scheduler_Start</a:t>
             </a:r>
-            <a:endParaRPr lang="en-US" dirty="0"/>
+            <a:endParaRPr lang="en-US" dirty="0">
+              <a:solidFill>
+                <a:schemeClr val="tx2">
+                  <a:lumMod val="60000"/>
+                  <a:lumOff val="40000"/>
+                </a:schemeClr>
+              </a:solidFill>
+            </a:endParaRPr>
           </a:p>
         </p:txBody>
       </p:sp>
@@ -9359,10 +9695,18 @@
               <a:buChar char="q"/>
             </a:pPr>
             <a:r>
-              <a:rPr lang="en-US" dirty="0"/>
+              <a:rPr lang="en-US" dirty="0">
+                <a:solidFill>
+                  <a:srgbClr val="7030A0"/>
+                </a:solidFill>
+              </a:rPr>
               <a:t>Interrupt</a:t>
             </a:r>
-            <a:endParaRPr lang="en-US" dirty="0" smtClean="0"/>
+            <a:endParaRPr lang="en-US" dirty="0" smtClean="0">
+              <a:solidFill>
+                <a:srgbClr val="7030A0"/>
+              </a:solidFill>
+            </a:endParaRPr>
           </a:p>
           <a:p>
             <a:pPr marL="742950" lvl="1" indent="-285750">
@@ -9371,13 +9715,38 @@
             </a:pPr>
             <a:r>
               <a:rPr lang="en-US" dirty="0"/>
-              <a:t> __interrupt() </a:t>
-            </a:r>
-            <a:r>
-              <a:rPr lang="en-US" dirty="0" err="1"/>
+              <a:t> </a:t>
+            </a:r>
+            <a:r>
+              <a:rPr lang="en-US" dirty="0">
+                <a:solidFill>
+                  <a:schemeClr val="tx2">
+                    <a:lumMod val="60000"/>
+                    <a:lumOff val="40000"/>
+                  </a:schemeClr>
+                </a:solidFill>
+              </a:rPr>
+              <a:t>__interrupt() </a:t>
+            </a:r>
+            <a:r>
+              <a:rPr lang="en-US" dirty="0" err="1">
+                <a:solidFill>
+                  <a:schemeClr val="tx2">
+                    <a:lumMod val="60000"/>
+                    <a:lumOff val="40000"/>
+                  </a:schemeClr>
+                </a:solidFill>
+              </a:rPr>
               <a:t>myISR</a:t>
             </a:r>
-            <a:endParaRPr lang="en-US" dirty="0"/>
+            <a:endParaRPr lang="en-US" dirty="0">
+              <a:solidFill>
+                <a:schemeClr val="tx2">
+                  <a:lumMod val="60000"/>
+                  <a:lumOff val="40000"/>
+                </a:schemeClr>
+              </a:solidFill>
+            </a:endParaRPr>
           </a:p>
         </p:txBody>
       </p:sp>
@@ -9428,6 +9797,631 @@
       </p:par>
     </p:tnLst>
   </p:timing>
+</p:sld>
+</file>
+
+<file path=ppt/slides/slide22.xml><?xml version="1.0" encoding="utf-8"?>
+<p:sld xmlns:a="http://schemas.openxmlformats.org/drawingml/2006/main" xmlns:r="http://schemas.openxmlformats.org/officeDocument/2006/relationships" xmlns:p="http://schemas.openxmlformats.org/presentationml/2006/main">
+  <p:cSld>
+    <p:spTree>
+      <p:nvGrpSpPr>
+        <p:cNvPr id="1" name=""/>
+        <p:cNvGrpSpPr/>
+        <p:nvPr/>
+      </p:nvGrpSpPr>
+      <p:grpSpPr>
+        <a:xfrm>
+          <a:off x="0" y="0"/>
+          <a:ext cx="0" cy="0"/>
+          <a:chOff x="0" y="0"/>
+          <a:chExt cx="0" cy="0"/>
+        </a:xfrm>
+      </p:grpSpPr>
+      <p:sp>
+        <p:nvSpPr>
+          <p:cNvPr id="5" name="TextBox 4"/>
+          <p:cNvSpPr txBox="1"/>
+          <p:nvPr/>
+        </p:nvSpPr>
+        <p:spPr>
+          <a:xfrm>
+            <a:off x="76200" y="179427"/>
+            <a:ext cx="1657826" cy="646331"/>
+          </a:xfrm>
+          <a:prstGeom prst="rect">
+            <a:avLst/>
+          </a:prstGeom>
+          <a:noFill/>
+        </p:spPr>
+        <p:txBody>
+          <a:bodyPr wrap="none" rtlCol="0">
+            <a:spAutoFit/>
+          </a:bodyPr>
+          <a:lstStyle/>
+          <a:p>
+            <a:pPr marL="285750" indent="-285750">
+              <a:buFont typeface="Wingdings" pitchFamily="2" charset="2"/>
+              <a:buChar char="q"/>
+            </a:pPr>
+            <a:r>
+              <a:rPr lang="en-US" dirty="0" smtClean="0">
+                <a:solidFill>
+                  <a:srgbClr val="7030A0"/>
+                </a:solidFill>
+              </a:rPr>
+              <a:t>I2C</a:t>
+            </a:r>
+            <a:endParaRPr lang="en-US" dirty="0" smtClean="0">
+              <a:solidFill>
+                <a:srgbClr val="7030A0"/>
+              </a:solidFill>
+            </a:endParaRPr>
+          </a:p>
+          <a:p>
+            <a:pPr marL="742950" lvl="1" indent="-285750">
+              <a:buFont typeface="Wingdings" pitchFamily="2" charset="2"/>
+              <a:buChar char="q"/>
+            </a:pPr>
+            <a:r>
+              <a:rPr lang="en-US" dirty="0">
+                <a:solidFill>
+                  <a:schemeClr val="tx2">
+                    <a:lumMod val="60000"/>
+                    <a:lumOff val="40000"/>
+                  </a:schemeClr>
+                </a:solidFill>
+              </a:rPr>
+              <a:t>I2c_Init</a:t>
+            </a:r>
+            <a:endParaRPr lang="en-US" dirty="0">
+              <a:solidFill>
+                <a:schemeClr val="tx2">
+                  <a:lumMod val="60000"/>
+                  <a:lumOff val="40000"/>
+                </a:schemeClr>
+              </a:solidFill>
+            </a:endParaRPr>
+          </a:p>
+        </p:txBody>
+      </p:sp>
+      <p:pic>
+        <p:nvPicPr>
+          <p:cNvPr id="6" name="Picture 5"/>
+          <p:cNvPicPr>
+            <a:picLocks noChangeAspect="1"/>
+          </p:cNvPicPr>
+          <p:nvPr/>
+        </p:nvPicPr>
+        <p:blipFill>
+          <a:blip r:embed="rId2">
+            <a:extLst>
+              <a:ext uri="{28A0092B-C50C-407E-A947-70E740481C1C}">
+                <a14:useLocalDpi xmlns:a14="http://schemas.microsoft.com/office/drawing/2010/main" val="0"/>
+              </a:ext>
+            </a:extLst>
+          </a:blip>
+          <a:stretch>
+            <a:fillRect/>
+          </a:stretch>
+        </p:blipFill>
+        <p:spPr>
+          <a:xfrm>
+            <a:off x="152400" y="1219199"/>
+            <a:ext cx="2190476" cy="5238095"/>
+          </a:xfrm>
+          <a:prstGeom prst="rect">
+            <a:avLst/>
+          </a:prstGeom>
+        </p:spPr>
+      </p:pic>
+      <p:sp>
+        <p:nvSpPr>
+          <p:cNvPr id="7" name="TextBox 6"/>
+          <p:cNvSpPr txBox="1"/>
+          <p:nvPr/>
+        </p:nvSpPr>
+        <p:spPr>
+          <a:xfrm>
+            <a:off x="2590800" y="456426"/>
+            <a:ext cx="1770421" cy="369332"/>
+          </a:xfrm>
+          <a:prstGeom prst="rect">
+            <a:avLst/>
+          </a:prstGeom>
+          <a:noFill/>
+        </p:spPr>
+        <p:txBody>
+          <a:bodyPr wrap="none" rtlCol="0">
+            <a:spAutoFit/>
+          </a:bodyPr>
+          <a:lstStyle/>
+          <a:p>
+            <a:pPr marL="742950" lvl="1" indent="-285750">
+              <a:buFont typeface="Wingdings" pitchFamily="2" charset="2"/>
+              <a:buChar char="q"/>
+            </a:pPr>
+            <a:r>
+              <a:rPr lang="en-US" dirty="0">
+                <a:solidFill>
+                  <a:schemeClr val="tx2">
+                    <a:lumMod val="60000"/>
+                    <a:lumOff val="40000"/>
+                  </a:schemeClr>
+                </a:solidFill>
+              </a:rPr>
+              <a:t>I2c_Start</a:t>
+            </a:r>
+            <a:endParaRPr lang="en-US" dirty="0">
+              <a:solidFill>
+                <a:schemeClr val="tx2">
+                  <a:lumMod val="60000"/>
+                  <a:lumOff val="40000"/>
+                </a:schemeClr>
+              </a:solidFill>
+            </a:endParaRPr>
+          </a:p>
+        </p:txBody>
+      </p:sp>
+      <p:pic>
+        <p:nvPicPr>
+          <p:cNvPr id="9" name="Picture 8"/>
+          <p:cNvPicPr>
+            <a:picLocks noChangeAspect="1"/>
+          </p:cNvPicPr>
+          <p:nvPr/>
+        </p:nvPicPr>
+        <p:blipFill>
+          <a:blip r:embed="rId3">
+            <a:extLst>
+              <a:ext uri="{28A0092B-C50C-407E-A947-70E740481C1C}">
+                <a14:useLocalDpi xmlns:a14="http://schemas.microsoft.com/office/drawing/2010/main" val="0"/>
+              </a:ext>
+            </a:extLst>
+          </a:blip>
+          <a:stretch>
+            <a:fillRect/>
+          </a:stretch>
+        </p:blipFill>
+        <p:spPr>
+          <a:xfrm>
+            <a:off x="3037411" y="1209672"/>
+            <a:ext cx="1323810" cy="5238095"/>
+          </a:xfrm>
+          <a:prstGeom prst="rect">
+            <a:avLst/>
+          </a:prstGeom>
+        </p:spPr>
+      </p:pic>
+      <p:sp>
+        <p:nvSpPr>
+          <p:cNvPr id="10" name="TextBox 9"/>
+          <p:cNvSpPr txBox="1"/>
+          <p:nvPr/>
+        </p:nvSpPr>
+        <p:spPr>
+          <a:xfrm>
+            <a:off x="6109356" y="491609"/>
+            <a:ext cx="1308756" cy="369332"/>
+          </a:xfrm>
+          <a:prstGeom prst="rect">
+            <a:avLst/>
+          </a:prstGeom>
+          <a:noFill/>
+        </p:spPr>
+        <p:txBody>
+          <a:bodyPr wrap="none" rtlCol="0">
+            <a:spAutoFit/>
+          </a:bodyPr>
+          <a:lstStyle/>
+          <a:p>
+            <a:pPr marL="285750" indent="-285750">
+              <a:buFont typeface="Wingdings" pitchFamily="2" charset="2"/>
+              <a:buChar char="q"/>
+            </a:pPr>
+            <a:r>
+              <a:rPr lang="en-US" dirty="0">
+                <a:solidFill>
+                  <a:schemeClr val="tx2">
+                    <a:lumMod val="60000"/>
+                    <a:lumOff val="40000"/>
+                  </a:schemeClr>
+                </a:solidFill>
+              </a:rPr>
+              <a:t>I2c_Stop</a:t>
+            </a:r>
+            <a:endParaRPr lang="en-US" dirty="0">
+              <a:solidFill>
+                <a:schemeClr val="tx2">
+                  <a:lumMod val="60000"/>
+                  <a:lumOff val="40000"/>
+                </a:schemeClr>
+              </a:solidFill>
+            </a:endParaRPr>
+          </a:p>
+        </p:txBody>
+      </p:sp>
+      <p:pic>
+        <p:nvPicPr>
+          <p:cNvPr id="11" name="Picture 10"/>
+          <p:cNvPicPr>
+            <a:picLocks noChangeAspect="1"/>
+          </p:cNvPicPr>
+          <p:nvPr/>
+        </p:nvPicPr>
+        <p:blipFill>
+          <a:blip r:embed="rId4">
+            <a:extLst>
+              <a:ext uri="{28A0092B-C50C-407E-A947-70E740481C1C}">
+                <a14:useLocalDpi xmlns:a14="http://schemas.microsoft.com/office/drawing/2010/main" val="0"/>
+              </a:ext>
+            </a:extLst>
+          </a:blip>
+          <a:stretch>
+            <a:fillRect/>
+          </a:stretch>
+        </p:blipFill>
+        <p:spPr>
+          <a:xfrm>
+            <a:off x="6152985" y="1219197"/>
+            <a:ext cx="1323810" cy="5238095"/>
+          </a:xfrm>
+          <a:prstGeom prst="rect">
+            <a:avLst/>
+          </a:prstGeom>
+        </p:spPr>
+      </p:pic>
+    </p:spTree>
+    <p:extLst>
+      <p:ext uri="{BB962C8B-B14F-4D97-AF65-F5344CB8AC3E}">
+        <p14:creationId xmlns:p14="http://schemas.microsoft.com/office/powerpoint/2010/main" val="587496729"/>
+      </p:ext>
+    </p:extLst>
+  </p:cSld>
+  <p:clrMapOvr>
+    <a:masterClrMapping/>
+  </p:clrMapOvr>
+</p:sld>
+</file>
+
+<file path=ppt/slides/slide23.xml><?xml version="1.0" encoding="utf-8"?>
+<p:sld xmlns:a="http://schemas.openxmlformats.org/drawingml/2006/main" xmlns:r="http://schemas.openxmlformats.org/officeDocument/2006/relationships" xmlns:p="http://schemas.openxmlformats.org/presentationml/2006/main">
+  <p:cSld>
+    <p:spTree>
+      <p:nvGrpSpPr>
+        <p:cNvPr id="1" name=""/>
+        <p:cNvGrpSpPr/>
+        <p:nvPr/>
+      </p:nvGrpSpPr>
+      <p:grpSpPr>
+        <a:xfrm>
+          <a:off x="0" y="0"/>
+          <a:ext cx="0" cy="0"/>
+          <a:chOff x="0" y="0"/>
+          <a:chExt cx="0" cy="0"/>
+        </a:xfrm>
+      </p:grpSpPr>
+      <p:sp>
+        <p:nvSpPr>
+          <p:cNvPr id="4" name="TextBox 3"/>
+          <p:cNvSpPr txBox="1"/>
+          <p:nvPr/>
+        </p:nvSpPr>
+        <p:spPr>
+          <a:xfrm>
+            <a:off x="-381000" y="271760"/>
+            <a:ext cx="2133600" cy="369332"/>
+          </a:xfrm>
+          <a:prstGeom prst="rect">
+            <a:avLst/>
+          </a:prstGeom>
+          <a:noFill/>
+        </p:spPr>
+        <p:txBody>
+          <a:bodyPr wrap="square" rtlCol="0">
+            <a:spAutoFit/>
+          </a:bodyPr>
+          <a:lstStyle/>
+          <a:p>
+            <a:pPr marL="742950" lvl="1" indent="-285750">
+              <a:buFont typeface="Wingdings" pitchFamily="2" charset="2"/>
+              <a:buChar char="q"/>
+            </a:pPr>
+            <a:r>
+              <a:rPr lang="en-US" dirty="0">
+                <a:solidFill>
+                  <a:schemeClr val="tx2">
+                    <a:lumMod val="60000"/>
+                    <a:lumOff val="40000"/>
+                  </a:schemeClr>
+                </a:solidFill>
+              </a:rPr>
+              <a:t>I2c_WaitAck</a:t>
+            </a:r>
+            <a:endParaRPr lang="en-US" dirty="0">
+              <a:solidFill>
+                <a:schemeClr val="tx2">
+                  <a:lumMod val="60000"/>
+                  <a:lumOff val="40000"/>
+                </a:schemeClr>
+              </a:solidFill>
+            </a:endParaRPr>
+          </a:p>
+        </p:txBody>
+      </p:sp>
+      <p:pic>
+        <p:nvPicPr>
+          <p:cNvPr id="5" name="Picture 4"/>
+          <p:cNvPicPr>
+            <a:picLocks noChangeAspect="1"/>
+          </p:cNvPicPr>
+          <p:nvPr/>
+        </p:nvPicPr>
+        <p:blipFill>
+          <a:blip r:embed="rId2">
+            <a:extLst>
+              <a:ext uri="{28A0092B-C50C-407E-A947-70E740481C1C}">
+                <a14:useLocalDpi xmlns:a14="http://schemas.microsoft.com/office/drawing/2010/main" val="0"/>
+              </a:ext>
+            </a:extLst>
+          </a:blip>
+          <a:stretch>
+            <a:fillRect/>
+          </a:stretch>
+        </p:blipFill>
+        <p:spPr>
+          <a:xfrm>
+            <a:off x="228600" y="990600"/>
+            <a:ext cx="1323810" cy="4419600"/>
+          </a:xfrm>
+          <a:prstGeom prst="rect">
+            <a:avLst/>
+          </a:prstGeom>
+        </p:spPr>
+      </p:pic>
+      <p:sp>
+        <p:nvSpPr>
+          <p:cNvPr id="6" name="TextBox 5"/>
+          <p:cNvSpPr txBox="1"/>
+          <p:nvPr/>
+        </p:nvSpPr>
+        <p:spPr>
+          <a:xfrm>
+            <a:off x="2057400" y="271760"/>
+            <a:ext cx="2514600" cy="369332"/>
+          </a:xfrm>
+          <a:prstGeom prst="rect">
+            <a:avLst/>
+          </a:prstGeom>
+          <a:noFill/>
+        </p:spPr>
+        <p:txBody>
+          <a:bodyPr wrap="square" rtlCol="0">
+            <a:spAutoFit/>
+          </a:bodyPr>
+          <a:lstStyle/>
+          <a:p>
+            <a:pPr marL="742950" lvl="1" indent="-285750">
+              <a:buFont typeface="Wingdings" pitchFamily="2" charset="2"/>
+              <a:buChar char="q"/>
+            </a:pPr>
+            <a:r>
+              <a:rPr lang="en-US" dirty="0">
+                <a:solidFill>
+                  <a:schemeClr val="tx2">
+                    <a:lumMod val="60000"/>
+                    <a:lumOff val="40000"/>
+                  </a:schemeClr>
+                </a:solidFill>
+              </a:rPr>
+              <a:t>I2c_Send_NAck</a:t>
+            </a:r>
+            <a:endParaRPr lang="en-US" dirty="0">
+              <a:solidFill>
+                <a:schemeClr val="tx2">
+                  <a:lumMod val="60000"/>
+                  <a:lumOff val="40000"/>
+                </a:schemeClr>
+              </a:solidFill>
+            </a:endParaRPr>
+          </a:p>
+        </p:txBody>
+      </p:sp>
+      <p:pic>
+        <p:nvPicPr>
+          <p:cNvPr id="7" name="Picture 6"/>
+          <p:cNvPicPr>
+            <a:picLocks noChangeAspect="1"/>
+          </p:cNvPicPr>
+          <p:nvPr/>
+        </p:nvPicPr>
+        <p:blipFill>
+          <a:blip r:embed="rId3">
+            <a:extLst>
+              <a:ext uri="{28A0092B-C50C-407E-A947-70E740481C1C}">
+                <a14:useLocalDpi xmlns:a14="http://schemas.microsoft.com/office/drawing/2010/main" val="0"/>
+              </a:ext>
+            </a:extLst>
+          </a:blip>
+          <a:stretch>
+            <a:fillRect/>
+          </a:stretch>
+        </p:blipFill>
+        <p:spPr>
+          <a:xfrm>
+            <a:off x="2752795" y="990600"/>
+            <a:ext cx="1123810" cy="4419600"/>
+          </a:xfrm>
+          <a:prstGeom prst="rect">
+            <a:avLst/>
+          </a:prstGeom>
+        </p:spPr>
+      </p:pic>
+      <p:sp>
+        <p:nvSpPr>
+          <p:cNvPr id="8" name="TextBox 7"/>
+          <p:cNvSpPr txBox="1"/>
+          <p:nvPr/>
+        </p:nvSpPr>
+        <p:spPr>
+          <a:xfrm>
+            <a:off x="7191375" y="271760"/>
+            <a:ext cx="1905000" cy="369332"/>
+          </a:xfrm>
+          <a:prstGeom prst="rect">
+            <a:avLst/>
+          </a:prstGeom>
+          <a:noFill/>
+        </p:spPr>
+        <p:txBody>
+          <a:bodyPr wrap="square" rtlCol="0">
+            <a:spAutoFit/>
+          </a:bodyPr>
+          <a:lstStyle/>
+          <a:p>
+            <a:pPr marL="742950" lvl="1" indent="-285750">
+              <a:buFont typeface="Wingdings" pitchFamily="2" charset="2"/>
+              <a:buChar char="q"/>
+            </a:pPr>
+            <a:r>
+              <a:rPr lang="en-US" dirty="0" smtClean="0">
+                <a:solidFill>
+                  <a:schemeClr val="tx2">
+                    <a:lumMod val="60000"/>
+                    <a:lumOff val="40000"/>
+                  </a:schemeClr>
+                </a:solidFill>
+              </a:rPr>
+              <a:t>I2c_Write</a:t>
+            </a:r>
+            <a:endParaRPr lang="en-US" dirty="0">
+              <a:solidFill>
+                <a:schemeClr val="tx2">
+                  <a:lumMod val="60000"/>
+                  <a:lumOff val="40000"/>
+                </a:schemeClr>
+              </a:solidFill>
+            </a:endParaRPr>
+          </a:p>
+        </p:txBody>
+      </p:sp>
+      <p:pic>
+        <p:nvPicPr>
+          <p:cNvPr id="9" name="Picture 8"/>
+          <p:cNvPicPr>
+            <a:picLocks noChangeAspect="1"/>
+          </p:cNvPicPr>
+          <p:nvPr/>
+        </p:nvPicPr>
+        <p:blipFill>
+          <a:blip r:embed="rId4">
+            <a:extLst>
+              <a:ext uri="{28A0092B-C50C-407E-A947-70E740481C1C}">
+                <a14:useLocalDpi xmlns:a14="http://schemas.microsoft.com/office/drawing/2010/main" val="0"/>
+              </a:ext>
+            </a:extLst>
+          </a:blip>
+          <a:stretch>
+            <a:fillRect/>
+          </a:stretch>
+        </p:blipFill>
+        <p:spPr>
+          <a:xfrm>
+            <a:off x="7696256" y="1000125"/>
+            <a:ext cx="895238" cy="3581400"/>
+          </a:xfrm>
+          <a:prstGeom prst="rect">
+            <a:avLst/>
+          </a:prstGeom>
+        </p:spPr>
+      </p:pic>
+      <p:sp>
+        <p:nvSpPr>
+          <p:cNvPr id="10" name="TextBox 9"/>
+          <p:cNvSpPr txBox="1"/>
+          <p:nvPr/>
+        </p:nvSpPr>
+        <p:spPr>
+          <a:xfrm>
+            <a:off x="4876800" y="271760"/>
+            <a:ext cx="1905000" cy="369332"/>
+          </a:xfrm>
+          <a:prstGeom prst="rect">
+            <a:avLst/>
+          </a:prstGeom>
+          <a:noFill/>
+        </p:spPr>
+        <p:txBody>
+          <a:bodyPr wrap="square" rtlCol="0">
+            <a:spAutoFit/>
+          </a:bodyPr>
+          <a:lstStyle/>
+          <a:p>
+            <a:pPr marL="285750" indent="-285750">
+              <a:buFont typeface="Wingdings" pitchFamily="2" charset="2"/>
+              <a:buChar char="q"/>
+            </a:pPr>
+            <a:r>
+              <a:rPr lang="en-US" dirty="0">
+                <a:solidFill>
+                  <a:schemeClr val="tx2">
+                    <a:lumMod val="60000"/>
+                    <a:lumOff val="40000"/>
+                  </a:schemeClr>
+                </a:solidFill>
+              </a:rPr>
+              <a:t>I2c_Read</a:t>
+            </a:r>
+            <a:endParaRPr lang="en-US" dirty="0">
+              <a:solidFill>
+                <a:schemeClr val="tx2">
+                  <a:lumMod val="60000"/>
+                  <a:lumOff val="40000"/>
+                </a:schemeClr>
+              </a:solidFill>
+            </a:endParaRPr>
+          </a:p>
+        </p:txBody>
+      </p:sp>
+      <p:pic>
+        <p:nvPicPr>
+          <p:cNvPr id="11" name="Picture 10"/>
+          <p:cNvPicPr>
+            <a:picLocks noChangeAspect="1"/>
+          </p:cNvPicPr>
+          <p:nvPr/>
+        </p:nvPicPr>
+        <p:blipFill>
+          <a:blip r:embed="rId5">
+            <a:extLst>
+              <a:ext uri="{28A0092B-C50C-407E-A947-70E740481C1C}">
+                <a14:useLocalDpi xmlns:a14="http://schemas.microsoft.com/office/drawing/2010/main" val="0"/>
+              </a:ext>
+            </a:extLst>
+          </a:blip>
+          <a:stretch>
+            <a:fillRect/>
+          </a:stretch>
+        </p:blipFill>
+        <p:spPr>
+          <a:xfrm>
+            <a:off x="4905375" y="914400"/>
+            <a:ext cx="1609524" cy="4780952"/>
+          </a:xfrm>
+          <a:prstGeom prst="rect">
+            <a:avLst/>
+          </a:prstGeom>
+        </p:spPr>
+      </p:pic>
+    </p:spTree>
+    <p:extLst>
+      <p:ext uri="{BB962C8B-B14F-4D97-AF65-F5344CB8AC3E}">
+        <p14:creationId xmlns:p14="http://schemas.microsoft.com/office/powerpoint/2010/main" val="3267565640"/>
+      </p:ext>
+    </p:extLst>
+  </p:cSld>
+  <p:clrMapOvr>
+    <a:masterClrMapping/>
+  </p:clrMapOvr>
 </p:sld>
 </file>
 
@@ -9464,7 +10458,7 @@
         </p:nvGraphicFramePr>
         <p:xfrm>
           <a:off x="228600" y="1295400"/>
-          <a:ext cx="8763000" cy="5625406"/>
+          <a:ext cx="8763000" cy="5634931"/>
         </p:xfrm>
         <a:graphic>
           <a:graphicData uri="http://schemas.openxmlformats.org/drawingml/2006/table">
@@ -9728,13 +10722,7 @@
                         <a:rPr lang="en-US" sz="1600" baseline="0" dirty="0" smtClean="0">
                           <a:effectLst/>
                         </a:rPr>
-                        <a:t> </a:t>
-                      </a:r>
-                      <a:r>
-                        <a:rPr lang="en-US" sz="1600" baseline="0" dirty="0" smtClean="0">
-                          <a:effectLst/>
-                        </a:rPr>
-                        <a:t>SSD</a:t>
+                        <a:t> SSD</a:t>
                       </a:r>
                     </a:p>
                     <a:p>
@@ -9774,9 +10762,6 @@
                         </a:rPr>
                         <a:t>SSD_SelectDigit</a:t>
                       </a:r>
-                      <a:endParaRPr lang="en-US" sz="1600" baseline="0" dirty="0" smtClean="0">
-                        <a:effectLst/>
-                      </a:endParaRPr>
                     </a:p>
                     <a:p>
                       <a:pPr marL="91440" marR="0">
@@ -13119,7 +14104,11 @@
               <a:buChar char="q"/>
             </a:pPr>
             <a:r>
-              <a:rPr lang="en-US" dirty="0" smtClean="0"/>
+              <a:rPr lang="en-US" dirty="0" smtClean="0">
+                <a:solidFill>
+                  <a:srgbClr val="7030A0"/>
+                </a:solidFill>
+              </a:rPr>
               <a:t>ADC</a:t>
             </a:r>
           </a:p>
@@ -13129,10 +14118,24 @@
               <a:buChar char="q"/>
             </a:pPr>
             <a:r>
-              <a:rPr lang="en-US" dirty="0" err="1" smtClean="0"/>
+              <a:rPr lang="en-US" dirty="0" err="1" smtClean="0">
+                <a:solidFill>
+                  <a:schemeClr val="tx2">
+                    <a:lumMod val="60000"/>
+                    <a:lumOff val="40000"/>
+                  </a:schemeClr>
+                </a:solidFill>
+              </a:rPr>
               <a:t>ADC_Init</a:t>
             </a:r>
-            <a:endParaRPr lang="en-US" dirty="0" smtClean="0"/>
+            <a:endParaRPr lang="en-US" dirty="0" smtClean="0">
+              <a:solidFill>
+                <a:schemeClr val="tx2">
+                  <a:lumMod val="60000"/>
+                  <a:lumOff val="40000"/>
+                </a:schemeClr>
+              </a:solidFill>
+            </a:endParaRPr>
           </a:p>
           <a:p>
             <a:pPr lvl="1"/>
@@ -13178,7 +14181,7 @@
         </p:nvSpPr>
         <p:spPr>
           <a:xfrm>
-            <a:off x="4343400" y="1209675"/>
+            <a:off x="4648200" y="1205299"/>
             <a:ext cx="3657600" cy="646331"/>
           </a:xfrm>
           <a:prstGeom prst="rect">
@@ -13197,10 +14200,24 @@
               <a:buChar char="q"/>
             </a:pPr>
             <a:r>
-              <a:rPr lang="en-US" dirty="0" err="1"/>
+              <a:rPr lang="en-US" dirty="0" err="1">
+                <a:solidFill>
+                  <a:schemeClr val="tx2">
+                    <a:lumMod val="60000"/>
+                    <a:lumOff val="40000"/>
+                  </a:schemeClr>
+                </a:solidFill>
+              </a:rPr>
               <a:t>ADC_Start_Conv</a:t>
             </a:r>
-            <a:endParaRPr lang="en-US" dirty="0" smtClean="0"/>
+            <a:endParaRPr lang="en-US" dirty="0" smtClean="0">
+              <a:solidFill>
+                <a:schemeClr val="tx2">
+                  <a:lumMod val="60000"/>
+                  <a:lumOff val="40000"/>
+                </a:schemeClr>
+              </a:solidFill>
+            </a:endParaRPr>
           </a:p>
           <a:p>
             <a:pPr lvl="1"/>
@@ -13302,10 +14319,24 @@
               <a:buChar char="q"/>
             </a:pPr>
             <a:r>
-              <a:rPr lang="en-US" dirty="0" err="1"/>
+              <a:rPr lang="en-US" dirty="0" err="1">
+                <a:solidFill>
+                  <a:schemeClr val="tx2">
+                    <a:lumMod val="60000"/>
+                    <a:lumOff val="40000"/>
+                  </a:schemeClr>
+                </a:solidFill>
+              </a:rPr>
               <a:t>ADC_Conv_MainFunction</a:t>
             </a:r>
-            <a:endParaRPr lang="en-US" dirty="0" smtClean="0"/>
+            <a:endParaRPr lang="en-US" dirty="0" smtClean="0">
+              <a:solidFill>
+                <a:schemeClr val="tx2">
+                  <a:lumMod val="60000"/>
+                  <a:lumOff val="40000"/>
+                </a:schemeClr>
+              </a:solidFill>
+            </a:endParaRPr>
           </a:p>
           <a:p>
             <a:pPr lvl="1"/>
@@ -13370,10 +14401,24 @@
               <a:buChar char="q"/>
             </a:pPr>
             <a:r>
-              <a:rPr lang="en-US" dirty="0" err="1"/>
+              <a:rPr lang="en-US" dirty="0" err="1">
+                <a:solidFill>
+                  <a:schemeClr val="tx2">
+                    <a:lumMod val="60000"/>
+                    <a:lumOff val="40000"/>
+                  </a:schemeClr>
+                </a:solidFill>
+              </a:rPr>
               <a:t>ADC_Value_Ready_CallBack</a:t>
             </a:r>
-            <a:endParaRPr lang="en-US" dirty="0" smtClean="0"/>
+            <a:endParaRPr lang="en-US" dirty="0" smtClean="0">
+              <a:solidFill>
+                <a:schemeClr val="tx2">
+                  <a:lumMod val="60000"/>
+                  <a:lumOff val="40000"/>
+                </a:schemeClr>
+              </a:solidFill>
+            </a:endParaRPr>
           </a:p>
           <a:p>
             <a:pPr lvl="1"/>
@@ -13475,7 +14520,11 @@
               <a:buChar char="q"/>
             </a:pPr>
             <a:r>
-              <a:rPr lang="en-US" dirty="0" smtClean="0"/>
+              <a:rPr lang="en-US" dirty="0" smtClean="0">
+                <a:solidFill>
+                  <a:srgbClr val="7030A0"/>
+                </a:solidFill>
+              </a:rPr>
               <a:t>Buttons</a:t>
             </a:r>
           </a:p>
@@ -13485,10 +14534,24 @@
               <a:buChar char="q"/>
             </a:pPr>
             <a:r>
-              <a:rPr lang="en-US" dirty="0" err="1"/>
+              <a:rPr lang="en-US" dirty="0" err="1">
+                <a:solidFill>
+                  <a:schemeClr val="tx2">
+                    <a:lumMod val="60000"/>
+                    <a:lumOff val="40000"/>
+                  </a:schemeClr>
+                </a:solidFill>
+              </a:rPr>
               <a:t>On_Off_Init</a:t>
             </a:r>
-            <a:endParaRPr lang="en-US" dirty="0"/>
+            <a:endParaRPr lang="en-US" dirty="0">
+              <a:solidFill>
+                <a:schemeClr val="tx2">
+                  <a:lumMod val="60000"/>
+                  <a:lumOff val="40000"/>
+                </a:schemeClr>
+              </a:solidFill>
+            </a:endParaRPr>
           </a:p>
         </p:txBody>
       </p:sp>
@@ -13549,10 +14612,24 @@
               <a:buChar char="q"/>
             </a:pPr>
             <a:r>
-              <a:rPr lang="en-US" dirty="0" err="1"/>
+              <a:rPr lang="en-US" dirty="0" err="1">
+                <a:solidFill>
+                  <a:schemeClr val="tx2">
+                    <a:lumMod val="60000"/>
+                    <a:lumOff val="40000"/>
+                  </a:schemeClr>
+                </a:solidFill>
+              </a:rPr>
               <a:t>EXTI_On_Off_CallBack</a:t>
             </a:r>
-            <a:endParaRPr lang="en-US" dirty="0"/>
+            <a:endParaRPr lang="en-US" dirty="0">
+              <a:solidFill>
+                <a:schemeClr val="tx2">
+                  <a:lumMod val="60000"/>
+                  <a:lumOff val="40000"/>
+                </a:schemeClr>
+              </a:solidFill>
+            </a:endParaRPr>
           </a:p>
         </p:txBody>
       </p:sp>
@@ -13649,10 +14726,24 @@
               <a:buChar char="q"/>
             </a:pPr>
             <a:r>
-              <a:rPr lang="en-US" dirty="0" err="1"/>
+              <a:rPr lang="en-US" dirty="0" err="1">
+                <a:solidFill>
+                  <a:schemeClr val="tx2">
+                    <a:lumMod val="60000"/>
+                    <a:lumOff val="40000"/>
+                  </a:schemeClr>
+                </a:solidFill>
+              </a:rPr>
               <a:t>Buttons_MainFunction</a:t>
             </a:r>
-            <a:endParaRPr lang="en-US" dirty="0"/>
+            <a:endParaRPr lang="en-US" dirty="0">
+              <a:solidFill>
+                <a:schemeClr val="tx2">
+                  <a:lumMod val="60000"/>
+                  <a:lumOff val="40000"/>
+                </a:schemeClr>
+              </a:solidFill>
+            </a:endParaRPr>
           </a:p>
         </p:txBody>
       </p:sp>
@@ -13750,7 +14841,11 @@
               <a:buChar char="q"/>
             </a:pPr>
             <a:r>
-              <a:rPr lang="en-US" dirty="0" smtClean="0"/>
+              <a:rPr lang="en-US" dirty="0" smtClean="0">
+                <a:solidFill>
+                  <a:srgbClr val="7030A0"/>
+                </a:solidFill>
+              </a:rPr>
               <a:t>Elements</a:t>
             </a:r>
           </a:p>
@@ -13760,10 +14855,24 @@
               <a:buChar char="q"/>
             </a:pPr>
             <a:r>
-              <a:rPr lang="en-US" dirty="0" err="1"/>
+              <a:rPr lang="en-US" dirty="0" err="1">
+                <a:solidFill>
+                  <a:schemeClr val="tx2">
+                    <a:lumMod val="60000"/>
+                    <a:lumOff val="40000"/>
+                  </a:schemeClr>
+                </a:solidFill>
+              </a:rPr>
               <a:t>Elements_Init</a:t>
             </a:r>
-            <a:endParaRPr lang="en-US" dirty="0"/>
+            <a:endParaRPr lang="en-US" dirty="0">
+              <a:solidFill>
+                <a:schemeClr val="tx2">
+                  <a:lumMod val="60000"/>
+                  <a:lumOff val="40000"/>
+                </a:schemeClr>
+              </a:solidFill>
+            </a:endParaRPr>
           </a:p>
         </p:txBody>
       </p:sp>
@@ -13824,10 +14933,24 @@
               <a:buChar char="q"/>
             </a:pPr>
             <a:r>
-              <a:rPr lang="en-US" dirty="0" err="1"/>
+              <a:rPr lang="en-US" dirty="0" err="1">
+                <a:solidFill>
+                  <a:schemeClr val="tx2">
+                    <a:lumMod val="60000"/>
+                    <a:lumOff val="40000"/>
+                  </a:schemeClr>
+                </a:solidFill>
+              </a:rPr>
               <a:t>Elements_MainFunction</a:t>
             </a:r>
-            <a:endParaRPr lang="en-US" dirty="0"/>
+            <a:endParaRPr lang="en-US" dirty="0">
+              <a:solidFill>
+                <a:schemeClr val="tx2">
+                  <a:lumMod val="60000"/>
+                  <a:lumOff val="40000"/>
+                </a:schemeClr>
+              </a:solidFill>
+            </a:endParaRPr>
           </a:p>
         </p:txBody>
       </p:sp>

</xml_diff>

<commit_message>
add Cfg files and Cv and StateMachine
</commit_message>
<xml_diff>
--- a/WaterHeater.pptx
+++ b/WaterHeater.pptx
@@ -9,25 +9,26 @@
     <p:sldId id="259" r:id="rId3"/>
     <p:sldId id="258" r:id="rId4"/>
     <p:sldId id="257" r:id="rId5"/>
-    <p:sldId id="260" r:id="rId6"/>
-    <p:sldId id="261" r:id="rId7"/>
-    <p:sldId id="262" r:id="rId8"/>
-    <p:sldId id="263" r:id="rId9"/>
-    <p:sldId id="264" r:id="rId10"/>
-    <p:sldId id="265" r:id="rId11"/>
-    <p:sldId id="266" r:id="rId12"/>
-    <p:sldId id="268" r:id="rId13"/>
-    <p:sldId id="267" r:id="rId14"/>
-    <p:sldId id="269" r:id="rId15"/>
-    <p:sldId id="270" r:id="rId16"/>
-    <p:sldId id="271" r:id="rId17"/>
-    <p:sldId id="272" r:id="rId18"/>
-    <p:sldId id="273" r:id="rId19"/>
-    <p:sldId id="274" r:id="rId20"/>
-    <p:sldId id="275" r:id="rId21"/>
-    <p:sldId id="276" r:id="rId22"/>
-    <p:sldId id="277" r:id="rId23"/>
-    <p:sldId id="278" r:id="rId24"/>
+    <p:sldId id="279" r:id="rId6"/>
+    <p:sldId id="260" r:id="rId7"/>
+    <p:sldId id="261" r:id="rId8"/>
+    <p:sldId id="262" r:id="rId9"/>
+    <p:sldId id="263" r:id="rId10"/>
+    <p:sldId id="264" r:id="rId11"/>
+    <p:sldId id="265" r:id="rId12"/>
+    <p:sldId id="266" r:id="rId13"/>
+    <p:sldId id="268" r:id="rId14"/>
+    <p:sldId id="267" r:id="rId15"/>
+    <p:sldId id="269" r:id="rId16"/>
+    <p:sldId id="270" r:id="rId17"/>
+    <p:sldId id="271" r:id="rId18"/>
+    <p:sldId id="272" r:id="rId19"/>
+    <p:sldId id="273" r:id="rId20"/>
+    <p:sldId id="274" r:id="rId21"/>
+    <p:sldId id="275" r:id="rId22"/>
+    <p:sldId id="276" r:id="rId23"/>
+    <p:sldId id="277" r:id="rId24"/>
+    <p:sldId id="278" r:id="rId25"/>
   </p:sldIdLst>
   <p:sldSz cx="9144000" cy="6858000" type="screen4x3"/>
   <p:notesSz cx="6858000" cy="9144000"/>
@@ -6296,14 +6297,14 @@
       </p:grpSpPr>
       <p:sp>
         <p:nvSpPr>
-          <p:cNvPr id="4" name="TextBox 3"/>
+          <p:cNvPr id="6" name="TextBox 5"/>
           <p:cNvSpPr txBox="1"/>
           <p:nvPr/>
         </p:nvSpPr>
         <p:spPr>
           <a:xfrm>
-            <a:off x="152400" y="85929"/>
-            <a:ext cx="1634358" cy="369332"/>
+            <a:off x="76200" y="179427"/>
+            <a:ext cx="2226379" cy="646331"/>
           </a:xfrm>
           <a:prstGeom prst="rect">
             <a:avLst/>
@@ -6321,7 +6322,21 @@
               <a:buChar char="q"/>
             </a:pPr>
             <a:r>
-              <a:rPr lang="en-US" dirty="0">
+              <a:rPr lang="en-US" dirty="0" smtClean="0">
+                <a:solidFill>
+                  <a:srgbClr val="7030A0"/>
+                </a:solidFill>
+              </a:rPr>
+              <a:t>Elements</a:t>
+            </a:r>
+          </a:p>
+          <a:p>
+            <a:pPr marL="742950" lvl="1" indent="-285750">
+              <a:buFont typeface="Wingdings" pitchFamily="2" charset="2"/>
+              <a:buChar char="q"/>
+            </a:pPr>
+            <a:r>
+              <a:rPr lang="en-US" dirty="0" err="1">
                 <a:solidFill>
                   <a:schemeClr val="tx2">
                     <a:lumMod val="60000"/>
@@ -6329,14 +6344,22 @@
                   </a:schemeClr>
                 </a:solidFill>
               </a:rPr>
-              <a:t>LED_Control</a:t>
-            </a:r>
+              <a:t>Elements_Init</a:t>
+            </a:r>
+            <a:endParaRPr lang="en-US" dirty="0">
+              <a:solidFill>
+                <a:schemeClr val="tx2">
+                  <a:lumMod val="60000"/>
+                  <a:lumOff val="40000"/>
+                </a:schemeClr>
+              </a:solidFill>
+            </a:endParaRPr>
           </a:p>
         </p:txBody>
       </p:sp>
       <p:pic>
         <p:nvPicPr>
-          <p:cNvPr id="5" name="Picture 4"/>
+          <p:cNvPr id="7" name="Picture 6"/>
           <p:cNvPicPr>
             <a:picLocks noChangeAspect="1"/>
           </p:cNvPicPr>
@@ -6356,8 +6379,8 @@
         </p:blipFill>
         <p:spPr>
           <a:xfrm>
-            <a:off x="0" y="838200"/>
-            <a:ext cx="4800600" cy="5791200"/>
+            <a:off x="381000" y="1143000"/>
+            <a:ext cx="1524000" cy="5257800"/>
           </a:xfrm>
           <a:prstGeom prst="rect">
             <a:avLst/>
@@ -6366,14 +6389,14 @@
       </p:pic>
       <p:sp>
         <p:nvSpPr>
-          <p:cNvPr id="6" name="TextBox 5"/>
+          <p:cNvPr id="8" name="TextBox 7"/>
           <p:cNvSpPr txBox="1"/>
           <p:nvPr/>
         </p:nvSpPr>
         <p:spPr>
           <a:xfrm>
-            <a:off x="6075729" y="85929"/>
-            <a:ext cx="1843774" cy="369332"/>
+            <a:off x="4648200" y="456426"/>
+            <a:ext cx="2758576" cy="369332"/>
           </a:xfrm>
           <a:prstGeom prst="rect">
             <a:avLst/>
@@ -6391,7 +6414,7 @@
               <a:buChar char="q"/>
             </a:pPr>
             <a:r>
-              <a:rPr lang="en-US" dirty="0">
+              <a:rPr lang="en-US" dirty="0" err="1">
                 <a:solidFill>
                   <a:schemeClr val="tx2">
                     <a:lumMod val="60000"/>
@@ -6399,14 +6422,22 @@
                   </a:schemeClr>
                 </a:solidFill>
               </a:rPr>
-              <a:t>LED_BLINKING</a:t>
-            </a:r>
+              <a:t>Elements_MainFunction</a:t>
+            </a:r>
+            <a:endParaRPr lang="en-US" dirty="0">
+              <a:solidFill>
+                <a:schemeClr val="tx2">
+                  <a:lumMod val="60000"/>
+                  <a:lumOff val="40000"/>
+                </a:schemeClr>
+              </a:solidFill>
+            </a:endParaRPr>
           </a:p>
         </p:txBody>
       </p:sp>
       <p:pic>
         <p:nvPicPr>
-          <p:cNvPr id="7" name="Picture 6"/>
+          <p:cNvPr id="9" name="Picture 8"/>
           <p:cNvPicPr>
             <a:picLocks noChangeAspect="1"/>
           </p:cNvPicPr>
@@ -6426,8 +6457,8 @@
         </p:blipFill>
         <p:spPr>
           <a:xfrm>
-            <a:off x="5638800" y="990600"/>
-            <a:ext cx="3105150" cy="5638800"/>
+            <a:off x="2514600" y="1110343"/>
+            <a:ext cx="6553200" cy="5715000"/>
           </a:xfrm>
           <a:prstGeom prst="rect">
             <a:avLst/>
@@ -6437,7 +6468,7 @@
     </p:spTree>
     <p:extLst>
       <p:ext uri="{BB962C8B-B14F-4D97-AF65-F5344CB8AC3E}">
-        <p14:creationId xmlns:p14="http://schemas.microsoft.com/office/powerpoint/2010/main" val="490238792"/>
+        <p14:creationId xmlns:p14="http://schemas.microsoft.com/office/powerpoint/2010/main" val="4107321591"/>
       </p:ext>
     </p:extLst>
   </p:cSld>
@@ -6479,8 +6510,8 @@
         </p:nvSpPr>
         <p:spPr>
           <a:xfrm>
-            <a:off x="76200" y="179427"/>
-            <a:ext cx="1713931" cy="646331"/>
+            <a:off x="152400" y="85929"/>
+            <a:ext cx="1634358" cy="369332"/>
           </a:xfrm>
           <a:prstGeom prst="rect">
             <a:avLst/>
@@ -6498,21 +6529,7 @@
               <a:buChar char="q"/>
             </a:pPr>
             <a:r>
-              <a:rPr lang="en-US" dirty="0" smtClean="0">
-                <a:solidFill>
-                  <a:srgbClr val="7030A0"/>
-                </a:solidFill>
-              </a:rPr>
-              <a:t>SSD</a:t>
-            </a:r>
-          </a:p>
-          <a:p>
-            <a:pPr marL="742950" lvl="1" indent="-285750">
-              <a:buFont typeface="Wingdings" pitchFamily="2" charset="2"/>
-              <a:buChar char="q"/>
-            </a:pPr>
-            <a:r>
-              <a:rPr lang="en-US" dirty="0" err="1">
+              <a:rPr lang="en-US" dirty="0">
                 <a:solidFill>
                   <a:schemeClr val="tx2">
                     <a:lumMod val="60000"/>
@@ -6520,16 +6537,8 @@
                   </a:schemeClr>
                 </a:solidFill>
               </a:rPr>
-              <a:t>SSD_Init</a:t>
-            </a:r>
-            <a:endParaRPr lang="en-US" dirty="0">
-              <a:solidFill>
-                <a:schemeClr val="tx2">
-                  <a:lumMod val="60000"/>
-                  <a:lumOff val="40000"/>
-                </a:schemeClr>
-              </a:solidFill>
-            </a:endParaRPr>
+              <a:t>LED_Control</a:t>
+            </a:r>
           </a:p>
         </p:txBody>
       </p:sp>
@@ -6555,8 +6564,8 @@
         </p:blipFill>
         <p:spPr>
           <a:xfrm>
-            <a:off x="152400" y="1219200"/>
-            <a:ext cx="1981200" cy="5257800"/>
+            <a:off x="0" y="838200"/>
+            <a:ext cx="4800600" cy="5791200"/>
           </a:xfrm>
           <a:prstGeom prst="rect">
             <a:avLst/>
@@ -6565,14 +6574,14 @@
       </p:pic>
       <p:sp>
         <p:nvSpPr>
-          <p:cNvPr id="9" name="TextBox 8"/>
+          <p:cNvPr id="6" name="TextBox 5"/>
           <p:cNvSpPr txBox="1"/>
           <p:nvPr/>
         </p:nvSpPr>
         <p:spPr>
           <a:xfrm>
-            <a:off x="4495800" y="471784"/>
-            <a:ext cx="2246128" cy="369332"/>
+            <a:off x="6075729" y="85929"/>
+            <a:ext cx="1843774" cy="369332"/>
           </a:xfrm>
           <a:prstGeom prst="rect">
             <a:avLst/>
@@ -6598,14 +6607,14 @@
                   </a:schemeClr>
                 </a:solidFill>
               </a:rPr>
-              <a:t>SSD_SelectDisplay</a:t>
+              <a:t>LED_BLINKING</a:t>
             </a:r>
           </a:p>
         </p:txBody>
       </p:sp>
       <p:pic>
         <p:nvPicPr>
-          <p:cNvPr id="11" name="Picture 10"/>
+          <p:cNvPr id="7" name="Picture 6"/>
           <p:cNvPicPr>
             <a:picLocks noChangeAspect="1"/>
           </p:cNvPicPr>
@@ -6625,8 +6634,8 @@
         </p:blipFill>
         <p:spPr>
           <a:xfrm>
-            <a:off x="3076574" y="1181100"/>
-            <a:ext cx="6067425" cy="5543550"/>
+            <a:off x="5638800" y="990600"/>
+            <a:ext cx="3105150" cy="5638800"/>
           </a:xfrm>
           <a:prstGeom prst="rect">
             <a:avLst/>
@@ -6636,7 +6645,7 @@
     </p:spTree>
     <p:extLst>
       <p:ext uri="{BB962C8B-B14F-4D97-AF65-F5344CB8AC3E}">
-        <p14:creationId xmlns:p14="http://schemas.microsoft.com/office/powerpoint/2010/main" val="2703036149"/>
+        <p14:creationId xmlns:p14="http://schemas.microsoft.com/office/powerpoint/2010/main" val="490238792"/>
       </p:ext>
     </p:extLst>
   </p:cSld>
@@ -6678,8 +6687,8 @@
         </p:nvSpPr>
         <p:spPr>
           <a:xfrm>
-            <a:off x="5791200" y="113345"/>
-            <a:ext cx="1941557" cy="369332"/>
+            <a:off x="76200" y="179427"/>
+            <a:ext cx="1713931" cy="646331"/>
           </a:xfrm>
           <a:prstGeom prst="rect">
             <a:avLst/>
@@ -6699,13 +6708,27 @@
             <a:r>
               <a:rPr lang="en-US" dirty="0" smtClean="0">
                 <a:solidFill>
+                  <a:srgbClr val="7030A0"/>
+                </a:solidFill>
+              </a:rPr>
+              <a:t>SSD</a:t>
+            </a:r>
+          </a:p>
+          <a:p>
+            <a:pPr marL="742950" lvl="1" indent="-285750">
+              <a:buFont typeface="Wingdings" pitchFamily="2" charset="2"/>
+              <a:buChar char="q"/>
+            </a:pPr>
+            <a:r>
+              <a:rPr lang="en-US" dirty="0" err="1">
+                <a:solidFill>
                   <a:schemeClr val="tx2">
                     <a:lumMod val="60000"/>
                     <a:lumOff val="40000"/>
                   </a:schemeClr>
                 </a:solidFill>
               </a:rPr>
-              <a:t>SSD_SelectDigit</a:t>
+              <a:t>SSD_Init</a:t>
             </a:r>
             <a:endParaRPr lang="en-US" dirty="0">
               <a:solidFill>
@@ -6740,17 +6763,57 @@
         </p:blipFill>
         <p:spPr>
           <a:xfrm>
-            <a:off x="5486400" y="1101802"/>
-            <a:ext cx="3429000" cy="5737148"/>
+            <a:off x="152400" y="1219200"/>
+            <a:ext cx="1981200" cy="5257800"/>
           </a:xfrm>
           <a:prstGeom prst="rect">
             <a:avLst/>
           </a:prstGeom>
         </p:spPr>
       </p:pic>
+      <p:sp>
+        <p:nvSpPr>
+          <p:cNvPr id="9" name="TextBox 8"/>
+          <p:cNvSpPr txBox="1"/>
+          <p:nvPr/>
+        </p:nvSpPr>
+        <p:spPr>
+          <a:xfrm>
+            <a:off x="4495800" y="471784"/>
+            <a:ext cx="2246128" cy="369332"/>
+          </a:xfrm>
+          <a:prstGeom prst="rect">
+            <a:avLst/>
+          </a:prstGeom>
+          <a:noFill/>
+        </p:spPr>
+        <p:txBody>
+          <a:bodyPr wrap="none" rtlCol="0">
+            <a:spAutoFit/>
+          </a:bodyPr>
+          <a:lstStyle/>
+          <a:p>
+            <a:pPr marL="285750" indent="-285750">
+              <a:buFont typeface="Wingdings" pitchFamily="2" charset="2"/>
+              <a:buChar char="q"/>
+            </a:pPr>
+            <a:r>
+              <a:rPr lang="en-US" dirty="0">
+                <a:solidFill>
+                  <a:schemeClr val="tx2">
+                    <a:lumMod val="60000"/>
+                    <a:lumOff val="40000"/>
+                  </a:schemeClr>
+                </a:solidFill>
+              </a:rPr>
+              <a:t>SSD_SelectDisplay</a:t>
+            </a:r>
+          </a:p>
+        </p:txBody>
+      </p:sp>
       <p:pic>
         <p:nvPicPr>
-          <p:cNvPr id="6" name="Picture 5"/>
+          <p:cNvPr id="11" name="Picture 10"/>
           <p:cNvPicPr>
             <a:picLocks noChangeAspect="1"/>
           </p:cNvPicPr>
@@ -6770,66 +6833,18 @@
         </p:blipFill>
         <p:spPr>
           <a:xfrm>
-            <a:off x="152400" y="533400"/>
-            <a:ext cx="4667250" cy="5753100"/>
+            <a:off x="3076574" y="1181100"/>
+            <a:ext cx="6067425" cy="5543550"/>
           </a:xfrm>
           <a:prstGeom prst="rect">
             <a:avLst/>
           </a:prstGeom>
         </p:spPr>
       </p:pic>
-      <p:sp>
-        <p:nvSpPr>
-          <p:cNvPr id="7" name="TextBox 6"/>
-          <p:cNvSpPr txBox="1"/>
-          <p:nvPr/>
-        </p:nvSpPr>
-        <p:spPr>
-          <a:xfrm>
-            <a:off x="152400" y="81079"/>
-            <a:ext cx="1399742" cy="369332"/>
-          </a:xfrm>
-          <a:prstGeom prst="rect">
-            <a:avLst/>
-          </a:prstGeom>
-          <a:noFill/>
-        </p:spPr>
-        <p:txBody>
-          <a:bodyPr wrap="none" rtlCol="0">
-            <a:spAutoFit/>
-          </a:bodyPr>
-          <a:lstStyle/>
-          <a:p>
-            <a:pPr marL="285750" indent="-285750">
-              <a:buFont typeface="Wingdings" pitchFamily="2" charset="2"/>
-              <a:buChar char="q"/>
-            </a:pPr>
-            <a:r>
-              <a:rPr lang="en-US" dirty="0" smtClean="0">
-                <a:solidFill>
-                  <a:schemeClr val="tx2">
-                    <a:lumMod val="60000"/>
-                    <a:lumOff val="40000"/>
-                  </a:schemeClr>
-                </a:solidFill>
-              </a:rPr>
-              <a:t>SSD_Blink</a:t>
-            </a:r>
-            <a:endParaRPr lang="en-US" dirty="0">
-              <a:solidFill>
-                <a:schemeClr val="tx2">
-                  <a:lumMod val="60000"/>
-                  <a:lumOff val="40000"/>
-                </a:schemeClr>
-              </a:solidFill>
-            </a:endParaRPr>
-          </a:p>
-        </p:txBody>
-      </p:sp>
     </p:spTree>
     <p:extLst>
       <p:ext uri="{BB962C8B-B14F-4D97-AF65-F5344CB8AC3E}">
-        <p14:creationId xmlns:p14="http://schemas.microsoft.com/office/powerpoint/2010/main" val="269096366"/>
+        <p14:creationId xmlns:p14="http://schemas.microsoft.com/office/powerpoint/2010/main" val="2703036149"/>
       </p:ext>
     </p:extLst>
   </p:cSld>
@@ -6865,14 +6880,14 @@
       </p:grpSpPr>
       <p:sp>
         <p:nvSpPr>
-          <p:cNvPr id="5" name="TextBox 4"/>
+          <p:cNvPr id="4" name="TextBox 3"/>
           <p:cNvSpPr txBox="1"/>
           <p:nvPr/>
         </p:nvSpPr>
         <p:spPr>
           <a:xfrm>
-            <a:off x="228600" y="239906"/>
-            <a:ext cx="2246128" cy="369332"/>
+            <a:off x="5791200" y="113345"/>
+            <a:ext cx="1941557" cy="369332"/>
           </a:xfrm>
           <a:prstGeom prst="rect">
             <a:avLst/>
@@ -6890,7 +6905,7 @@
               <a:buChar char="q"/>
             </a:pPr>
             <a:r>
-              <a:rPr lang="en-US" dirty="0">
+              <a:rPr lang="en-US" dirty="0" smtClean="0">
                 <a:solidFill>
                   <a:schemeClr val="tx2">
                     <a:lumMod val="60000"/>
@@ -6898,14 +6913,22 @@
                   </a:schemeClr>
                 </a:solidFill>
               </a:rPr>
-              <a:t>SSD_MainFunction</a:t>
-            </a:r>
+              <a:t>SSD_SelectDigit</a:t>
+            </a:r>
+            <a:endParaRPr lang="en-US" dirty="0">
+              <a:solidFill>
+                <a:schemeClr val="tx2">
+                  <a:lumMod val="60000"/>
+                  <a:lumOff val="40000"/>
+                </a:schemeClr>
+              </a:solidFill>
+            </a:endParaRPr>
           </a:p>
         </p:txBody>
       </p:sp>
       <p:pic>
         <p:nvPicPr>
-          <p:cNvPr id="6" name="Picture 5"/>
+          <p:cNvPr id="5" name="Picture 4"/>
           <p:cNvPicPr>
             <a:picLocks noChangeAspect="1"/>
           </p:cNvPicPr>
@@ -6925,18 +6948,96 @@
         </p:blipFill>
         <p:spPr>
           <a:xfrm>
-            <a:off x="217714" y="914400"/>
-            <a:ext cx="8686800" cy="5715000"/>
+            <a:off x="5486400" y="1101802"/>
+            <a:ext cx="3429000" cy="5737148"/>
           </a:xfrm>
           <a:prstGeom prst="rect">
             <a:avLst/>
           </a:prstGeom>
         </p:spPr>
       </p:pic>
+      <p:pic>
+        <p:nvPicPr>
+          <p:cNvPr id="6" name="Picture 5"/>
+          <p:cNvPicPr>
+            <a:picLocks noChangeAspect="1"/>
+          </p:cNvPicPr>
+          <p:nvPr/>
+        </p:nvPicPr>
+        <p:blipFill>
+          <a:blip r:embed="rId3">
+            <a:extLst>
+              <a:ext uri="{28A0092B-C50C-407E-A947-70E740481C1C}">
+                <a14:useLocalDpi xmlns:a14="http://schemas.microsoft.com/office/drawing/2010/main" val="0"/>
+              </a:ext>
+            </a:extLst>
+          </a:blip>
+          <a:stretch>
+            <a:fillRect/>
+          </a:stretch>
+        </p:blipFill>
+        <p:spPr>
+          <a:xfrm>
+            <a:off x="152400" y="533400"/>
+            <a:ext cx="4667250" cy="5753100"/>
+          </a:xfrm>
+          <a:prstGeom prst="rect">
+            <a:avLst/>
+          </a:prstGeom>
+        </p:spPr>
+      </p:pic>
+      <p:sp>
+        <p:nvSpPr>
+          <p:cNvPr id="7" name="TextBox 6"/>
+          <p:cNvSpPr txBox="1"/>
+          <p:nvPr/>
+        </p:nvSpPr>
+        <p:spPr>
+          <a:xfrm>
+            <a:off x="152400" y="81079"/>
+            <a:ext cx="1399742" cy="369332"/>
+          </a:xfrm>
+          <a:prstGeom prst="rect">
+            <a:avLst/>
+          </a:prstGeom>
+          <a:noFill/>
+        </p:spPr>
+        <p:txBody>
+          <a:bodyPr wrap="none" rtlCol="0">
+            <a:spAutoFit/>
+          </a:bodyPr>
+          <a:lstStyle/>
+          <a:p>
+            <a:pPr marL="285750" indent="-285750">
+              <a:buFont typeface="Wingdings" pitchFamily="2" charset="2"/>
+              <a:buChar char="q"/>
+            </a:pPr>
+            <a:r>
+              <a:rPr lang="en-US" dirty="0" smtClean="0">
+                <a:solidFill>
+                  <a:schemeClr val="tx2">
+                    <a:lumMod val="60000"/>
+                    <a:lumOff val="40000"/>
+                  </a:schemeClr>
+                </a:solidFill>
+              </a:rPr>
+              <a:t>SSD_Blink</a:t>
+            </a:r>
+            <a:endParaRPr lang="en-US" dirty="0">
+              <a:solidFill>
+                <a:schemeClr val="tx2">
+                  <a:lumMod val="60000"/>
+                  <a:lumOff val="40000"/>
+                </a:schemeClr>
+              </a:solidFill>
+            </a:endParaRPr>
+          </a:p>
+        </p:txBody>
+      </p:sp>
     </p:spTree>
     <p:extLst>
       <p:ext uri="{BB962C8B-B14F-4D97-AF65-F5344CB8AC3E}">
-        <p14:creationId xmlns:p14="http://schemas.microsoft.com/office/powerpoint/2010/main" val="3286378366"/>
+        <p14:creationId xmlns:p14="http://schemas.microsoft.com/office/powerpoint/2010/main" val="269096366"/>
       </p:ext>
     </p:extLst>
   </p:cSld>
@@ -6972,27 +7073,19 @@
       </p:grpSpPr>
       <p:sp>
         <p:nvSpPr>
-          <p:cNvPr id="4" name="TextBox 3"/>
+          <p:cNvPr id="5" name="TextBox 4"/>
           <p:cNvSpPr txBox="1"/>
           <p:nvPr/>
         </p:nvSpPr>
         <p:spPr>
           <a:xfrm>
-            <a:off x="76200" y="179427"/>
-            <a:ext cx="2349105" cy="646331"/>
+            <a:off x="228600" y="239906"/>
+            <a:ext cx="2246128" cy="369332"/>
           </a:xfrm>
           <a:prstGeom prst="rect">
             <a:avLst/>
           </a:prstGeom>
           <a:noFill/>
-          <a:ln>
-            <a:solidFill>
-              <a:schemeClr val="tx2">
-                <a:lumMod val="60000"/>
-                <a:lumOff val="40000"/>
-              </a:schemeClr>
-            </a:solidFill>
-          </a:ln>
         </p:spPr>
         <p:txBody>
           <a:bodyPr wrap="none" rtlCol="0">
@@ -7005,20 +7098,6 @@
               <a:buChar char="q"/>
             </a:pPr>
             <a:r>
-              <a:rPr lang="en-US" dirty="0" smtClean="0">
-                <a:solidFill>
-                  <a:srgbClr val="7030A0"/>
-                </a:solidFill>
-              </a:rPr>
-              <a:t>Water Heater Mode</a:t>
-            </a:r>
-          </a:p>
-          <a:p>
-            <a:pPr marL="742950" lvl="1" indent="-285750">
-              <a:buFont typeface="Wingdings" pitchFamily="2" charset="2"/>
-              <a:buChar char="q"/>
-            </a:pPr>
-            <a:r>
               <a:rPr lang="en-US" dirty="0">
                 <a:solidFill>
                   <a:schemeClr val="tx2">
@@ -7027,14 +7106,14 @@
                   </a:schemeClr>
                 </a:solidFill>
               </a:rPr>
-              <a:t>Mode_Init</a:t>
+              <a:t>SSD_MainFunction</a:t>
             </a:r>
           </a:p>
         </p:txBody>
       </p:sp>
       <p:pic>
         <p:nvPicPr>
-          <p:cNvPr id="5" name="Picture 4"/>
+          <p:cNvPr id="6" name="Picture 5"/>
           <p:cNvPicPr>
             <a:picLocks noChangeAspect="1"/>
           </p:cNvPicPr>
@@ -7054,78 +7133,8 @@
         </p:blipFill>
         <p:spPr>
           <a:xfrm>
-            <a:off x="228600" y="1524000"/>
-            <a:ext cx="2057400" cy="3124200"/>
-          </a:xfrm>
-          <a:prstGeom prst="rect">
-            <a:avLst/>
-          </a:prstGeom>
-        </p:spPr>
-      </p:pic>
-      <p:sp>
-        <p:nvSpPr>
-          <p:cNvPr id="7" name="TextBox 6"/>
-          <p:cNvSpPr txBox="1"/>
-          <p:nvPr/>
-        </p:nvSpPr>
-        <p:spPr>
-          <a:xfrm>
-            <a:off x="5486400" y="271760"/>
-            <a:ext cx="2448106" cy="369332"/>
-          </a:xfrm>
-          <a:prstGeom prst="rect">
-            <a:avLst/>
-          </a:prstGeom>
-          <a:noFill/>
-        </p:spPr>
-        <p:txBody>
-          <a:bodyPr wrap="none" rtlCol="0">
-            <a:spAutoFit/>
-          </a:bodyPr>
-          <a:lstStyle/>
-          <a:p>
-            <a:pPr marL="285750" indent="-285750">
-              <a:buFont typeface="Wingdings" pitchFamily="2" charset="2"/>
-              <a:buChar char="q"/>
-            </a:pPr>
-            <a:r>
-              <a:rPr lang="en-US" dirty="0">
-                <a:solidFill>
-                  <a:schemeClr val="tx2">
-                    <a:lumMod val="60000"/>
-                    <a:lumOff val="40000"/>
-                  </a:schemeClr>
-                </a:solidFill>
-              </a:rPr>
-              <a:t>Mode_MainFunction</a:t>
-            </a:r>
-          </a:p>
-        </p:txBody>
-      </p:sp>
-      <p:pic>
-        <p:nvPicPr>
-          <p:cNvPr id="8" name="Picture 7"/>
-          <p:cNvPicPr>
-            <a:picLocks noChangeAspect="1"/>
-          </p:cNvPicPr>
-          <p:nvPr/>
-        </p:nvPicPr>
-        <p:blipFill>
-          <a:blip r:embed="rId3">
-            <a:extLst>
-              <a:ext uri="{28A0092B-C50C-407E-A947-70E740481C1C}">
-                <a14:useLocalDpi xmlns:a14="http://schemas.microsoft.com/office/drawing/2010/main" val="0"/>
-              </a:ext>
-            </a:extLst>
-          </a:blip>
-          <a:stretch>
-            <a:fillRect/>
-          </a:stretch>
-        </p:blipFill>
-        <p:spPr>
-          <a:xfrm>
-            <a:off x="2514600" y="685800"/>
-            <a:ext cx="6629400" cy="6096000"/>
+            <a:off x="217714" y="914400"/>
+            <a:ext cx="8686800" cy="5715000"/>
           </a:xfrm>
           <a:prstGeom prst="rect">
             <a:avLst/>
@@ -7135,7 +7144,7 @@
     </p:spTree>
     <p:extLst>
       <p:ext uri="{BB962C8B-B14F-4D97-AF65-F5344CB8AC3E}">
-        <p14:creationId xmlns:p14="http://schemas.microsoft.com/office/powerpoint/2010/main" val="858223657"/>
+        <p14:creationId xmlns:p14="http://schemas.microsoft.com/office/powerpoint/2010/main" val="3286378366"/>
       </p:ext>
     </p:extLst>
   </p:cSld>
@@ -7171,19 +7180,27 @@
       </p:grpSpPr>
       <p:sp>
         <p:nvSpPr>
-          <p:cNvPr id="5" name="TextBox 4"/>
+          <p:cNvPr id="4" name="TextBox 3"/>
           <p:cNvSpPr txBox="1"/>
           <p:nvPr/>
         </p:nvSpPr>
         <p:spPr>
           <a:xfrm>
-            <a:off x="152400" y="162520"/>
-            <a:ext cx="2351028" cy="369332"/>
+            <a:off x="76200" y="179427"/>
+            <a:ext cx="2349105" cy="646331"/>
           </a:xfrm>
           <a:prstGeom prst="rect">
             <a:avLst/>
           </a:prstGeom>
           <a:noFill/>
+          <a:ln>
+            <a:solidFill>
+              <a:schemeClr val="tx2">
+                <a:lumMod val="60000"/>
+                <a:lumOff val="40000"/>
+              </a:schemeClr>
+            </a:solidFill>
+          </a:ln>
         </p:spPr>
         <p:txBody>
           <a:bodyPr wrap="none" rtlCol="0">
@@ -7196,6 +7213,20 @@
               <a:buChar char="q"/>
             </a:pPr>
             <a:r>
+              <a:rPr lang="en-US" dirty="0" smtClean="0">
+                <a:solidFill>
+                  <a:srgbClr val="7030A0"/>
+                </a:solidFill>
+              </a:rPr>
+              <a:t>Water Heater Mode</a:t>
+            </a:r>
+          </a:p>
+          <a:p>
+            <a:pPr marL="742950" lvl="1" indent="-285750">
+              <a:buFont typeface="Wingdings" pitchFamily="2" charset="2"/>
+              <a:buChar char="q"/>
+            </a:pPr>
+            <a:r>
               <a:rPr lang="en-US" dirty="0">
                 <a:solidFill>
                   <a:schemeClr val="tx2">
@@ -7204,14 +7235,14 @@
                   </a:schemeClr>
                 </a:solidFill>
               </a:rPr>
-              <a:t>Start_Setting_Timer</a:t>
+              <a:t>Mode_Init</a:t>
             </a:r>
           </a:p>
         </p:txBody>
       </p:sp>
       <p:pic>
         <p:nvPicPr>
-          <p:cNvPr id="6" name="Picture 5"/>
+          <p:cNvPr id="5" name="Picture 4"/>
           <p:cNvPicPr>
             <a:picLocks noChangeAspect="1"/>
           </p:cNvPicPr>
@@ -7231,8 +7262,78 @@
         </p:blipFill>
         <p:spPr>
           <a:xfrm>
-            <a:off x="2057400" y="523875"/>
-            <a:ext cx="5105399" cy="5810250"/>
+            <a:off x="228600" y="1524000"/>
+            <a:ext cx="2057400" cy="3124200"/>
+          </a:xfrm>
+          <a:prstGeom prst="rect">
+            <a:avLst/>
+          </a:prstGeom>
+        </p:spPr>
+      </p:pic>
+      <p:sp>
+        <p:nvSpPr>
+          <p:cNvPr id="7" name="TextBox 6"/>
+          <p:cNvSpPr txBox="1"/>
+          <p:nvPr/>
+        </p:nvSpPr>
+        <p:spPr>
+          <a:xfrm>
+            <a:off x="5486400" y="271760"/>
+            <a:ext cx="2448106" cy="369332"/>
+          </a:xfrm>
+          <a:prstGeom prst="rect">
+            <a:avLst/>
+          </a:prstGeom>
+          <a:noFill/>
+        </p:spPr>
+        <p:txBody>
+          <a:bodyPr wrap="none" rtlCol="0">
+            <a:spAutoFit/>
+          </a:bodyPr>
+          <a:lstStyle/>
+          <a:p>
+            <a:pPr marL="285750" indent="-285750">
+              <a:buFont typeface="Wingdings" pitchFamily="2" charset="2"/>
+              <a:buChar char="q"/>
+            </a:pPr>
+            <a:r>
+              <a:rPr lang="en-US" dirty="0">
+                <a:solidFill>
+                  <a:schemeClr val="tx2">
+                    <a:lumMod val="60000"/>
+                    <a:lumOff val="40000"/>
+                  </a:schemeClr>
+                </a:solidFill>
+              </a:rPr>
+              <a:t>Mode_MainFunction</a:t>
+            </a:r>
+          </a:p>
+        </p:txBody>
+      </p:sp>
+      <p:pic>
+        <p:nvPicPr>
+          <p:cNvPr id="8" name="Picture 7"/>
+          <p:cNvPicPr>
+            <a:picLocks noChangeAspect="1"/>
+          </p:cNvPicPr>
+          <p:nvPr/>
+        </p:nvPicPr>
+        <p:blipFill>
+          <a:blip r:embed="rId3">
+            <a:extLst>
+              <a:ext uri="{28A0092B-C50C-407E-A947-70E740481C1C}">
+                <a14:useLocalDpi xmlns:a14="http://schemas.microsoft.com/office/drawing/2010/main" val="0"/>
+              </a:ext>
+            </a:extLst>
+          </a:blip>
+          <a:stretch>
+            <a:fillRect/>
+          </a:stretch>
+        </p:blipFill>
+        <p:spPr>
+          <a:xfrm>
+            <a:off x="2514600" y="685800"/>
+            <a:ext cx="6629400" cy="6096000"/>
           </a:xfrm>
           <a:prstGeom prst="rect">
             <a:avLst/>
@@ -7242,7 +7343,7 @@
     </p:spTree>
     <p:extLst>
       <p:ext uri="{BB962C8B-B14F-4D97-AF65-F5344CB8AC3E}">
-        <p14:creationId xmlns:p14="http://schemas.microsoft.com/office/powerpoint/2010/main" val="2383129205"/>
+        <p14:creationId xmlns:p14="http://schemas.microsoft.com/office/powerpoint/2010/main" val="858223657"/>
       </p:ext>
     </p:extLst>
   </p:cSld>
@@ -7278,14 +7379,14 @@
       </p:grpSpPr>
       <p:sp>
         <p:nvSpPr>
-          <p:cNvPr id="4" name="TextBox 3"/>
+          <p:cNvPr id="5" name="TextBox 4"/>
           <p:cNvSpPr txBox="1"/>
           <p:nvPr/>
         </p:nvSpPr>
         <p:spPr>
           <a:xfrm>
-            <a:off x="76200" y="179427"/>
-            <a:ext cx="2638928" cy="646331"/>
+            <a:off x="152400" y="162520"/>
+            <a:ext cx="2351028" cy="369332"/>
           </a:xfrm>
           <a:prstGeom prst="rect">
             <a:avLst/>
@@ -7303,20 +7404,6 @@
               <a:buChar char="q"/>
             </a:pPr>
             <a:r>
-              <a:rPr lang="en-US" dirty="0" smtClean="0">
-                <a:solidFill>
-                  <a:srgbClr val="7030A0"/>
-                </a:solidFill>
-              </a:rPr>
-              <a:t>Temperature</a:t>
-            </a:r>
-          </a:p>
-          <a:p>
-            <a:pPr marL="742950" lvl="1" indent="-285750">
-              <a:buFont typeface="Wingdings" pitchFamily="2" charset="2"/>
-              <a:buChar char="q"/>
-            </a:pPr>
-            <a:r>
               <a:rPr lang="en-US" dirty="0">
                 <a:solidFill>
                   <a:schemeClr val="tx2">
@@ -7325,7 +7412,7 @@
                   </a:schemeClr>
                 </a:solidFill>
               </a:rPr>
-              <a:t>Temperature_Calc</a:t>
+              <a:t>Start_Setting_Timer</a:t>
             </a:r>
           </a:p>
         </p:txBody>
@@ -7352,105 +7439,8 @@
         </p:blipFill>
         <p:spPr>
           <a:xfrm>
-            <a:off x="76200" y="1038225"/>
-            <a:ext cx="3984171" cy="4781550"/>
-          </a:xfrm>
-          <a:prstGeom prst="rect">
-            <a:avLst/>
-          </a:prstGeom>
-        </p:spPr>
-      </p:pic>
-      <p:sp>
-        <p:nvSpPr>
-          <p:cNvPr id="7" name="TextBox 6"/>
-          <p:cNvSpPr txBox="1"/>
-          <p:nvPr/>
-        </p:nvSpPr>
-        <p:spPr>
-          <a:xfrm>
-            <a:off x="5562600" y="179427"/>
-            <a:ext cx="2324291" cy="646331"/>
-          </a:xfrm>
-          <a:prstGeom prst="rect">
-            <a:avLst/>
-          </a:prstGeom>
-          <a:noFill/>
-        </p:spPr>
-        <p:txBody>
-          <a:bodyPr wrap="none" rtlCol="0">
-            <a:spAutoFit/>
-          </a:bodyPr>
-          <a:lstStyle/>
-          <a:p>
-            <a:pPr marL="285750" indent="-285750">
-              <a:buFont typeface="Wingdings" pitchFamily="2" charset="2"/>
-              <a:buChar char="q"/>
-            </a:pPr>
-            <a:r>
-              <a:rPr lang="en-US" dirty="0">
-                <a:solidFill>
-                  <a:srgbClr val="7030A0"/>
-                </a:solidFill>
-              </a:rPr>
-              <a:t>Average</a:t>
-            </a:r>
-            <a:endParaRPr lang="en-US" dirty="0" smtClean="0">
-              <a:solidFill>
-                <a:srgbClr val="7030A0"/>
-              </a:solidFill>
-            </a:endParaRPr>
-          </a:p>
-          <a:p>
-            <a:pPr marL="742950" lvl="1" indent="-285750">
-              <a:buFont typeface="Wingdings" pitchFamily="2" charset="2"/>
-              <a:buChar char="q"/>
-            </a:pPr>
-            <a:r>
-              <a:rPr lang="en-US" dirty="0" err="1">
-                <a:solidFill>
-                  <a:schemeClr val="tx2">
-                    <a:lumMod val="60000"/>
-                    <a:lumOff val="40000"/>
-                  </a:schemeClr>
-                </a:solidFill>
-              </a:rPr>
-              <a:t>Average_Value</a:t>
-            </a:r>
-            <a:endParaRPr lang="en-US" dirty="0">
-              <a:solidFill>
-                <a:schemeClr val="tx2">
-                  <a:lumMod val="60000"/>
-                  <a:lumOff val="40000"/>
-                </a:schemeClr>
-              </a:solidFill>
-            </a:endParaRPr>
-          </a:p>
-        </p:txBody>
-      </p:sp>
-      <p:pic>
-        <p:nvPicPr>
-          <p:cNvPr id="8" name="Picture 7"/>
-          <p:cNvPicPr>
-            <a:picLocks noChangeAspect="1"/>
-          </p:cNvPicPr>
-          <p:nvPr/>
-        </p:nvPicPr>
-        <p:blipFill>
-          <a:blip r:embed="rId3">
-            <a:extLst>
-              <a:ext uri="{28A0092B-C50C-407E-A947-70E740481C1C}">
-                <a14:useLocalDpi xmlns:a14="http://schemas.microsoft.com/office/drawing/2010/main" val="0"/>
-              </a:ext>
-            </a:extLst>
-          </a:blip>
-          <a:stretch>
-            <a:fillRect/>
-          </a:stretch>
-        </p:blipFill>
-        <p:spPr>
-          <a:xfrm>
-            <a:off x="4876800" y="1171575"/>
-            <a:ext cx="4191000" cy="4781550"/>
+            <a:off x="2057400" y="523875"/>
+            <a:ext cx="5105399" cy="5810250"/>
           </a:xfrm>
           <a:prstGeom prst="rect">
             <a:avLst/>
@@ -7460,7 +7450,7 @@
     </p:spTree>
     <p:extLst>
       <p:ext uri="{BB962C8B-B14F-4D97-AF65-F5344CB8AC3E}">
-        <p14:creationId xmlns:p14="http://schemas.microsoft.com/office/powerpoint/2010/main" val="2027477319"/>
+        <p14:creationId xmlns:p14="http://schemas.microsoft.com/office/powerpoint/2010/main" val="2383129205"/>
       </p:ext>
     </p:extLst>
   </p:cSld>
@@ -7503,7 +7493,7 @@
         <p:spPr>
           <a:xfrm>
             <a:off x="76200" y="179427"/>
-            <a:ext cx="2753895" cy="646331"/>
+            <a:ext cx="2638928" cy="646331"/>
           </a:xfrm>
           <a:prstGeom prst="rect">
             <a:avLst/>
@@ -7521,18 +7511,13 @@
               <a:buChar char="q"/>
             </a:pPr>
             <a:r>
-              <a:rPr lang="en-US" dirty="0">
+              <a:rPr lang="en-US" dirty="0" smtClean="0">
                 <a:solidFill>
                   <a:srgbClr val="7030A0"/>
                 </a:solidFill>
               </a:rPr>
-              <a:t>EEPROM</a:t>
-            </a:r>
-            <a:endParaRPr lang="en-US" dirty="0" smtClean="0">
-              <a:solidFill>
-                <a:srgbClr val="7030A0"/>
-              </a:solidFill>
-            </a:endParaRPr>
+              <a:t>Temperature</a:t>
+            </a:r>
           </a:p>
           <a:p>
             <a:pPr marL="742950" lvl="1" indent="-285750">
@@ -7540,7 +7525,7 @@
               <a:buChar char="q"/>
             </a:pPr>
             <a:r>
-              <a:rPr lang="en-US" dirty="0" err="1">
+              <a:rPr lang="en-US" dirty="0">
                 <a:solidFill>
                   <a:schemeClr val="tx2">
                     <a:lumMod val="60000"/>
@@ -7548,16 +7533,8 @@
                   </a:schemeClr>
                 </a:solidFill>
               </a:rPr>
-              <a:t>Get_EEPROM_Data</a:t>
-            </a:r>
-            <a:endParaRPr lang="en-US" dirty="0">
-              <a:solidFill>
-                <a:schemeClr val="tx2">
-                  <a:lumMod val="60000"/>
-                  <a:lumOff val="40000"/>
-                </a:schemeClr>
-              </a:solidFill>
-            </a:endParaRPr>
+              <a:t>Temperature_Calc</a:t>
+            </a:r>
           </a:p>
         </p:txBody>
       </p:sp>
@@ -7583,8 +7560,8 @@
         </p:blipFill>
         <p:spPr>
           <a:xfrm>
-            <a:off x="76200" y="990599"/>
-            <a:ext cx="6019800" cy="5714999"/>
+            <a:off x="76200" y="1038225"/>
+            <a:ext cx="3984171" cy="4781550"/>
           </a:xfrm>
           <a:prstGeom prst="rect">
             <a:avLst/>
@@ -7599,8 +7576,8 @@
         </p:nvSpPr>
         <p:spPr>
           <a:xfrm>
-            <a:off x="6172200" y="187404"/>
-            <a:ext cx="1872757" cy="369332"/>
+            <a:off x="5562600" y="179427"/>
+            <a:ext cx="2324291" cy="646331"/>
           </a:xfrm>
           <a:prstGeom prst="rect">
             <a:avLst/>
@@ -7618,6 +7595,25 @@
               <a:buChar char="q"/>
             </a:pPr>
             <a:r>
+              <a:rPr lang="en-US" dirty="0">
+                <a:solidFill>
+                  <a:srgbClr val="7030A0"/>
+                </a:solidFill>
+              </a:rPr>
+              <a:t>Average</a:t>
+            </a:r>
+            <a:endParaRPr lang="en-US" dirty="0" smtClean="0">
+              <a:solidFill>
+                <a:srgbClr val="7030A0"/>
+              </a:solidFill>
+            </a:endParaRPr>
+          </a:p>
+          <a:p>
+            <a:pPr marL="742950" lvl="1" indent="-285750">
+              <a:buFont typeface="Wingdings" pitchFamily="2" charset="2"/>
+              <a:buChar char="q"/>
+            </a:pPr>
+            <a:r>
               <a:rPr lang="en-US" dirty="0" err="1">
                 <a:solidFill>
                   <a:schemeClr val="tx2">
@@ -7626,7 +7622,7 @@
                   </a:schemeClr>
                 </a:solidFill>
               </a:rPr>
-              <a:t>EEPROM_Read</a:t>
+              <a:t>Average_Value</a:t>
             </a:r>
             <a:endParaRPr lang="en-US" dirty="0">
               <a:solidFill>
@@ -7641,7 +7637,7 @@
       </p:sp>
       <p:pic>
         <p:nvPicPr>
-          <p:cNvPr id="2" name="Picture 1"/>
+          <p:cNvPr id="8" name="Picture 7"/>
           <p:cNvPicPr>
             <a:picLocks noChangeAspect="1"/>
           </p:cNvPicPr>
@@ -7661,8 +7657,8 @@
         </p:blipFill>
         <p:spPr>
           <a:xfrm>
-            <a:off x="6934200" y="685800"/>
-            <a:ext cx="1447800" cy="6019797"/>
+            <a:off x="4876800" y="1171575"/>
+            <a:ext cx="4191000" cy="4781550"/>
           </a:xfrm>
           <a:prstGeom prst="rect">
             <a:avLst/>
@@ -7672,7 +7668,7 @@
     </p:spTree>
     <p:extLst>
       <p:ext uri="{BB962C8B-B14F-4D97-AF65-F5344CB8AC3E}">
-        <p14:creationId xmlns:p14="http://schemas.microsoft.com/office/powerpoint/2010/main" val="903947157"/>
+        <p14:creationId xmlns:p14="http://schemas.microsoft.com/office/powerpoint/2010/main" val="2027477319"/>
       </p:ext>
     </p:extLst>
   </p:cSld>
@@ -7714,8 +7710,8 @@
         </p:nvSpPr>
         <p:spPr>
           <a:xfrm>
-            <a:off x="152400" y="205769"/>
-            <a:ext cx="2252155" cy="369332"/>
+            <a:off x="76200" y="179427"/>
+            <a:ext cx="2753895" cy="646331"/>
           </a:xfrm>
           <a:prstGeom prst="rect">
             <a:avLst/>
@@ -7733,6 +7729,25 @@
               <a:buChar char="q"/>
             </a:pPr>
             <a:r>
+              <a:rPr lang="en-US" dirty="0">
+                <a:solidFill>
+                  <a:srgbClr val="7030A0"/>
+                </a:solidFill>
+              </a:rPr>
+              <a:t>EEPROM</a:t>
+            </a:r>
+            <a:endParaRPr lang="en-US" dirty="0" smtClean="0">
+              <a:solidFill>
+                <a:srgbClr val="7030A0"/>
+              </a:solidFill>
+            </a:endParaRPr>
+          </a:p>
+          <a:p>
+            <a:pPr marL="742950" lvl="1" indent="-285750">
+              <a:buFont typeface="Wingdings" pitchFamily="2" charset="2"/>
+              <a:buChar char="q"/>
+            </a:pPr>
+            <a:r>
               <a:rPr lang="en-US" dirty="0" err="1">
                 <a:solidFill>
                   <a:schemeClr val="tx2">
@@ -7741,7 +7756,7 @@
                   </a:schemeClr>
                 </a:solidFill>
               </a:rPr>
-              <a:t>Set_EEPROM_Data</a:t>
+              <a:t>Get_EEPROM_Data</a:t>
             </a:r>
             <a:endParaRPr lang="en-US" dirty="0">
               <a:solidFill>
@@ -7756,7 +7771,7 @@
       </p:sp>
       <p:pic>
         <p:nvPicPr>
-          <p:cNvPr id="5" name="Picture 4"/>
+          <p:cNvPr id="6" name="Picture 5"/>
           <p:cNvPicPr>
             <a:picLocks noChangeAspect="1"/>
           </p:cNvPicPr>
@@ -7776,8 +7791,8 @@
         </p:blipFill>
         <p:spPr>
           <a:xfrm>
-            <a:off x="0" y="819150"/>
-            <a:ext cx="4800600" cy="5410200"/>
+            <a:off x="76200" y="990599"/>
+            <a:ext cx="6019800" cy="5714999"/>
           </a:xfrm>
           <a:prstGeom prst="rect">
             <a:avLst/>
@@ -7786,14 +7801,14 @@
       </p:pic>
       <p:sp>
         <p:nvSpPr>
-          <p:cNvPr id="6" name="TextBox 5"/>
+          <p:cNvPr id="7" name="TextBox 6"/>
           <p:cNvSpPr txBox="1"/>
           <p:nvPr/>
         </p:nvSpPr>
         <p:spPr>
           <a:xfrm>
-            <a:off x="6324599" y="205769"/>
-            <a:ext cx="1925271" cy="369332"/>
+            <a:off x="6172200" y="187404"/>
+            <a:ext cx="1872757" cy="369332"/>
           </a:xfrm>
           <a:prstGeom prst="rect">
             <a:avLst/>
@@ -7819,7 +7834,7 @@
                   </a:schemeClr>
                 </a:solidFill>
               </a:rPr>
-              <a:t>EEPROM_Write</a:t>
+              <a:t>EEPROM_Read</a:t>
             </a:r>
             <a:endParaRPr lang="en-US" dirty="0">
               <a:solidFill>
@@ -7854,8 +7869,8 @@
         </p:blipFill>
         <p:spPr>
           <a:xfrm>
-            <a:off x="6781800" y="685800"/>
-            <a:ext cx="1257143" cy="6019800"/>
+            <a:off x="6934200" y="685800"/>
+            <a:ext cx="1447800" cy="6019797"/>
           </a:xfrm>
           <a:prstGeom prst="rect">
             <a:avLst/>
@@ -7865,7 +7880,7 @@
     </p:spTree>
     <p:extLst>
       <p:ext uri="{BB962C8B-B14F-4D97-AF65-F5344CB8AC3E}">
-        <p14:creationId xmlns:p14="http://schemas.microsoft.com/office/powerpoint/2010/main" val="1602406984"/>
+        <p14:creationId xmlns:p14="http://schemas.microsoft.com/office/powerpoint/2010/main" val="903947157"/>
       </p:ext>
     </p:extLst>
   </p:cSld>
@@ -7907,8 +7922,8 @@
         </p:nvSpPr>
         <p:spPr>
           <a:xfrm>
-            <a:off x="76200" y="179427"/>
-            <a:ext cx="2292615" cy="646331"/>
+            <a:off x="152400" y="205769"/>
+            <a:ext cx="2252155" cy="369332"/>
           </a:xfrm>
           <a:prstGeom prst="rect">
             <a:avLst/>
@@ -7926,25 +7941,6 @@
               <a:buChar char="q"/>
             </a:pPr>
             <a:r>
-              <a:rPr lang="en-US" dirty="0">
-                <a:solidFill>
-                  <a:srgbClr val="7030A0"/>
-                </a:solidFill>
-              </a:rPr>
-              <a:t>Scheduler</a:t>
-            </a:r>
-            <a:endParaRPr lang="en-US" dirty="0" smtClean="0">
-              <a:solidFill>
-                <a:srgbClr val="7030A0"/>
-              </a:solidFill>
-            </a:endParaRPr>
-          </a:p>
-          <a:p>
-            <a:pPr marL="742950" lvl="1" indent="-285750">
-              <a:buFont typeface="Wingdings" pitchFamily="2" charset="2"/>
-              <a:buChar char="q"/>
-            </a:pPr>
-            <a:r>
               <a:rPr lang="en-US" dirty="0" err="1">
                 <a:solidFill>
                   <a:schemeClr val="tx2">
@@ -7953,7 +7949,7 @@
                   </a:schemeClr>
                 </a:solidFill>
               </a:rPr>
-              <a:t>Scheduler_Init</a:t>
+              <a:t>Set_EEPROM_Data</a:t>
             </a:r>
             <a:endParaRPr lang="en-US" dirty="0">
               <a:solidFill>
@@ -7988,8 +7984,8 @@
         </p:blipFill>
         <p:spPr>
           <a:xfrm>
-            <a:off x="104775" y="1619250"/>
-            <a:ext cx="2819400" cy="4038600"/>
+            <a:off x="0" y="819150"/>
+            <a:ext cx="4800600" cy="5410200"/>
           </a:xfrm>
           <a:prstGeom prst="rect">
             <a:avLst/>
@@ -8004,8 +8000,8 @@
         </p:nvSpPr>
         <p:spPr>
           <a:xfrm>
-            <a:off x="5714999" y="456426"/>
-            <a:ext cx="2680157" cy="369332"/>
+            <a:off x="6324599" y="205769"/>
+            <a:ext cx="1925271" cy="369332"/>
           </a:xfrm>
           <a:prstGeom prst="rect">
             <a:avLst/>
@@ -8031,7 +8027,7 @@
                   </a:schemeClr>
                 </a:solidFill>
               </a:rPr>
-              <a:t>Scheduler_ActivateTask</a:t>
+              <a:t>EEPROM_Write</a:t>
             </a:r>
             <a:endParaRPr lang="en-US" dirty="0">
               <a:solidFill>
@@ -8046,7 +8042,7 @@
       </p:sp>
       <p:pic>
         <p:nvPicPr>
-          <p:cNvPr id="8" name="Picture 7"/>
+          <p:cNvPr id="2" name="Picture 1"/>
           <p:cNvPicPr>
             <a:picLocks noChangeAspect="1"/>
           </p:cNvPicPr>
@@ -8066,8 +8062,8 @@
         </p:blipFill>
         <p:spPr>
           <a:xfrm>
-            <a:off x="4092117" y="1885950"/>
-            <a:ext cx="5042357" cy="3810000"/>
+            <a:off x="6781800" y="685800"/>
+            <a:ext cx="1257143" cy="6019800"/>
           </a:xfrm>
           <a:prstGeom prst="rect">
             <a:avLst/>
@@ -8077,7 +8073,7 @@
     </p:spTree>
     <p:extLst>
       <p:ext uri="{BB962C8B-B14F-4D97-AF65-F5344CB8AC3E}">
-        <p14:creationId xmlns:p14="http://schemas.microsoft.com/office/powerpoint/2010/main" val="3436191451"/>
+        <p14:creationId xmlns:p14="http://schemas.microsoft.com/office/powerpoint/2010/main" val="1602406984"/>
       </p:ext>
     </p:extLst>
   </p:cSld>
@@ -9561,8 +9557,8 @@
         </p:nvSpPr>
         <p:spPr>
           <a:xfrm>
-            <a:off x="152399" y="104685"/>
-            <a:ext cx="1969193" cy="369332"/>
+            <a:off x="76200" y="179427"/>
+            <a:ext cx="2292615" cy="646331"/>
           </a:xfrm>
           <a:prstGeom prst="rect">
             <a:avLst/>
@@ -9580,6 +9576,25 @@
               <a:buChar char="q"/>
             </a:pPr>
             <a:r>
+              <a:rPr lang="en-US" dirty="0">
+                <a:solidFill>
+                  <a:srgbClr val="7030A0"/>
+                </a:solidFill>
+              </a:rPr>
+              <a:t>Scheduler</a:t>
+            </a:r>
+            <a:endParaRPr lang="en-US" dirty="0" smtClean="0">
+              <a:solidFill>
+                <a:srgbClr val="7030A0"/>
+              </a:solidFill>
+            </a:endParaRPr>
+          </a:p>
+          <a:p>
+            <a:pPr marL="742950" lvl="1" indent="-285750">
+              <a:buFont typeface="Wingdings" pitchFamily="2" charset="2"/>
+              <a:buChar char="q"/>
+            </a:pPr>
+            <a:r>
               <a:rPr lang="en-US" dirty="0" err="1">
                 <a:solidFill>
                   <a:schemeClr val="tx2">
@@ -9588,7 +9603,7 @@
                   </a:schemeClr>
                 </a:solidFill>
               </a:rPr>
-              <a:t>Scheduler_Start</a:t>
+              <a:t>Scheduler_Init</a:t>
             </a:r>
             <a:endParaRPr lang="en-US" dirty="0">
               <a:solidFill>
@@ -9623,8 +9638,86 @@
         </p:blipFill>
         <p:spPr>
           <a:xfrm>
-            <a:off x="1143000" y="866775"/>
-            <a:ext cx="5791200" cy="4876800"/>
+            <a:off x="104775" y="1619250"/>
+            <a:ext cx="2819400" cy="4038600"/>
+          </a:xfrm>
+          <a:prstGeom prst="rect">
+            <a:avLst/>
+          </a:prstGeom>
+        </p:spPr>
+      </p:pic>
+      <p:sp>
+        <p:nvSpPr>
+          <p:cNvPr id="6" name="TextBox 5"/>
+          <p:cNvSpPr txBox="1"/>
+          <p:nvPr/>
+        </p:nvSpPr>
+        <p:spPr>
+          <a:xfrm>
+            <a:off x="5714999" y="456426"/>
+            <a:ext cx="2680157" cy="369332"/>
+          </a:xfrm>
+          <a:prstGeom prst="rect">
+            <a:avLst/>
+          </a:prstGeom>
+          <a:noFill/>
+        </p:spPr>
+        <p:txBody>
+          <a:bodyPr wrap="none" rtlCol="0">
+            <a:spAutoFit/>
+          </a:bodyPr>
+          <a:lstStyle/>
+          <a:p>
+            <a:pPr marL="285750" indent="-285750">
+              <a:buFont typeface="Wingdings" pitchFamily="2" charset="2"/>
+              <a:buChar char="q"/>
+            </a:pPr>
+            <a:r>
+              <a:rPr lang="en-US" dirty="0" err="1">
+                <a:solidFill>
+                  <a:schemeClr val="tx2">
+                    <a:lumMod val="60000"/>
+                    <a:lumOff val="40000"/>
+                  </a:schemeClr>
+                </a:solidFill>
+              </a:rPr>
+              <a:t>Scheduler_ActivateTask</a:t>
+            </a:r>
+            <a:endParaRPr lang="en-US" dirty="0">
+              <a:solidFill>
+                <a:schemeClr val="tx2">
+                  <a:lumMod val="60000"/>
+                  <a:lumOff val="40000"/>
+                </a:schemeClr>
+              </a:solidFill>
+            </a:endParaRPr>
+          </a:p>
+        </p:txBody>
+      </p:sp>
+      <p:pic>
+        <p:nvPicPr>
+          <p:cNvPr id="8" name="Picture 7"/>
+          <p:cNvPicPr>
+            <a:picLocks noChangeAspect="1"/>
+          </p:cNvPicPr>
+          <p:nvPr/>
+        </p:nvPicPr>
+        <p:blipFill>
+          <a:blip r:embed="rId3">
+            <a:extLst>
+              <a:ext uri="{28A0092B-C50C-407E-A947-70E740481C1C}">
+                <a14:useLocalDpi xmlns:a14="http://schemas.microsoft.com/office/drawing/2010/main" val="0"/>
+              </a:ext>
+            </a:extLst>
+          </a:blip>
+          <a:stretch>
+            <a:fillRect/>
+          </a:stretch>
+        </p:blipFill>
+        <p:spPr>
+          <a:xfrm>
+            <a:off x="4092117" y="1885950"/>
+            <a:ext cx="5042357" cy="3810000"/>
           </a:xfrm>
           <a:prstGeom prst="rect">
             <a:avLst/>
@@ -9634,7 +9727,7 @@
     </p:spTree>
     <p:extLst>
       <p:ext uri="{BB962C8B-B14F-4D97-AF65-F5344CB8AC3E}">
-        <p14:creationId xmlns:p14="http://schemas.microsoft.com/office/powerpoint/2010/main" val="874812224"/>
+        <p14:creationId xmlns:p14="http://schemas.microsoft.com/office/powerpoint/2010/main" val="3436191451"/>
       </p:ext>
     </p:extLst>
   </p:cSld>
@@ -9676,8 +9769,8 @@
         </p:nvSpPr>
         <p:spPr>
           <a:xfrm>
-            <a:off x="76200" y="179427"/>
-            <a:ext cx="2827697" cy="646331"/>
+            <a:off x="152399" y="104685"/>
+            <a:ext cx="1969193" cy="369332"/>
           </a:xfrm>
           <a:prstGeom prst="rect">
             <a:avLst/>
@@ -9695,30 +9788,7 @@
               <a:buChar char="q"/>
             </a:pPr>
             <a:r>
-              <a:rPr lang="en-US" dirty="0">
-                <a:solidFill>
-                  <a:srgbClr val="7030A0"/>
-                </a:solidFill>
-              </a:rPr>
-              <a:t>Interrupt</a:t>
-            </a:r>
-            <a:endParaRPr lang="en-US" dirty="0" smtClean="0">
-              <a:solidFill>
-                <a:srgbClr val="7030A0"/>
-              </a:solidFill>
-            </a:endParaRPr>
-          </a:p>
-          <a:p>
-            <a:pPr marL="742950" lvl="1" indent="-285750">
-              <a:buFont typeface="Wingdings" pitchFamily="2" charset="2"/>
-              <a:buChar char="q"/>
-            </a:pPr>
-            <a:r>
-              <a:rPr lang="en-US" dirty="0"/>
-              <a:t> </a:t>
-            </a:r>
-            <a:r>
-              <a:rPr lang="en-US" dirty="0">
+              <a:rPr lang="en-US" dirty="0" err="1">
                 <a:solidFill>
                   <a:schemeClr val="tx2">
                     <a:lumMod val="60000"/>
@@ -9726,18 +9796,7 @@
                   </a:schemeClr>
                 </a:solidFill>
               </a:rPr>
-              <a:t>__interrupt() </a:t>
-            </a:r>
-            <a:r>
-              <a:rPr lang="en-US" dirty="0" err="1">
-                <a:solidFill>
-                  <a:schemeClr val="tx2">
-                    <a:lumMod val="60000"/>
-                    <a:lumOff val="40000"/>
-                  </a:schemeClr>
-                </a:solidFill>
-              </a:rPr>
-              <a:t>myISR</a:t>
+              <a:t>Scheduler_Start</a:t>
             </a:r>
             <a:endParaRPr lang="en-US" dirty="0">
               <a:solidFill>
@@ -9772,8 +9831,8 @@
         </p:blipFill>
         <p:spPr>
           <a:xfrm>
-            <a:off x="1981200" y="914400"/>
-            <a:ext cx="4648200" cy="5715000"/>
+            <a:off x="1143000" y="866775"/>
+            <a:ext cx="5791200" cy="4876800"/>
           </a:xfrm>
           <a:prstGeom prst="rect">
             <a:avLst/>
@@ -9783,7 +9842,7 @@
     </p:spTree>
     <p:extLst>
       <p:ext uri="{BB962C8B-B14F-4D97-AF65-F5344CB8AC3E}">
-        <p14:creationId xmlns:p14="http://schemas.microsoft.com/office/powerpoint/2010/main" val="52297288"/>
+        <p14:creationId xmlns:p14="http://schemas.microsoft.com/office/powerpoint/2010/main" val="874812224"/>
       </p:ext>
     </p:extLst>
   </p:cSld>
@@ -9819,14 +9878,14 @@
       </p:grpSpPr>
       <p:sp>
         <p:nvSpPr>
-          <p:cNvPr id="5" name="TextBox 4"/>
+          <p:cNvPr id="4" name="TextBox 3"/>
           <p:cNvSpPr txBox="1"/>
           <p:nvPr/>
         </p:nvSpPr>
         <p:spPr>
           <a:xfrm>
             <a:off x="76200" y="179427"/>
-            <a:ext cx="1657826" cy="646331"/>
+            <a:ext cx="2827697" cy="646331"/>
           </a:xfrm>
           <a:prstGeom prst="rect">
             <a:avLst/>
@@ -9844,12 +9903,12 @@
               <a:buChar char="q"/>
             </a:pPr>
             <a:r>
-              <a:rPr lang="en-US" dirty="0" smtClean="0">
+              <a:rPr lang="en-US" dirty="0">
                 <a:solidFill>
                   <a:srgbClr val="7030A0"/>
                 </a:solidFill>
               </a:rPr>
-              <a:t>I2C</a:t>
+              <a:t>Interrupt</a:t>
             </a:r>
             <a:endParaRPr lang="en-US" dirty="0" smtClean="0">
               <a:solidFill>
@@ -9863,6 +9922,10 @@
               <a:buChar char="q"/>
             </a:pPr>
             <a:r>
+              <a:rPr lang="en-US" dirty="0"/>
+              <a:t> </a:t>
+            </a:r>
+            <a:r>
               <a:rPr lang="en-US" dirty="0">
                 <a:solidFill>
                   <a:schemeClr val="tx2">
@@ -9871,7 +9934,18 @@
                   </a:schemeClr>
                 </a:solidFill>
               </a:rPr>
-              <a:t>I2c_Init</a:t>
+              <a:t>__interrupt() </a:t>
+            </a:r>
+            <a:r>
+              <a:rPr lang="en-US" dirty="0" err="1">
+                <a:solidFill>
+                  <a:schemeClr val="tx2">
+                    <a:lumMod val="60000"/>
+                    <a:lumOff val="40000"/>
+                  </a:schemeClr>
+                </a:solidFill>
+              </a:rPr>
+              <a:t>myISR</a:t>
             </a:r>
             <a:endParaRPr lang="en-US" dirty="0">
               <a:solidFill>
@@ -9886,7 +9960,7 @@
       </p:sp>
       <p:pic>
         <p:nvPicPr>
-          <p:cNvPr id="6" name="Picture 5"/>
+          <p:cNvPr id="5" name="Picture 4"/>
           <p:cNvPicPr>
             <a:picLocks noChangeAspect="1"/>
           </p:cNvPicPr>
@@ -9906,164 +9980,8 @@
         </p:blipFill>
         <p:spPr>
           <a:xfrm>
-            <a:off x="152400" y="1219199"/>
-            <a:ext cx="2190476" cy="5238095"/>
-          </a:xfrm>
-          <a:prstGeom prst="rect">
-            <a:avLst/>
-          </a:prstGeom>
-        </p:spPr>
-      </p:pic>
-      <p:sp>
-        <p:nvSpPr>
-          <p:cNvPr id="7" name="TextBox 6"/>
-          <p:cNvSpPr txBox="1"/>
-          <p:nvPr/>
-        </p:nvSpPr>
-        <p:spPr>
-          <a:xfrm>
-            <a:off x="2590800" y="456426"/>
-            <a:ext cx="1770421" cy="369332"/>
-          </a:xfrm>
-          <a:prstGeom prst="rect">
-            <a:avLst/>
-          </a:prstGeom>
-          <a:noFill/>
-        </p:spPr>
-        <p:txBody>
-          <a:bodyPr wrap="none" rtlCol="0">
-            <a:spAutoFit/>
-          </a:bodyPr>
-          <a:lstStyle/>
-          <a:p>
-            <a:pPr marL="742950" lvl="1" indent="-285750">
-              <a:buFont typeface="Wingdings" pitchFamily="2" charset="2"/>
-              <a:buChar char="q"/>
-            </a:pPr>
-            <a:r>
-              <a:rPr lang="en-US" dirty="0">
-                <a:solidFill>
-                  <a:schemeClr val="tx2">
-                    <a:lumMod val="60000"/>
-                    <a:lumOff val="40000"/>
-                  </a:schemeClr>
-                </a:solidFill>
-              </a:rPr>
-              <a:t>I2c_Start</a:t>
-            </a:r>
-            <a:endParaRPr lang="en-US" dirty="0">
-              <a:solidFill>
-                <a:schemeClr val="tx2">
-                  <a:lumMod val="60000"/>
-                  <a:lumOff val="40000"/>
-                </a:schemeClr>
-              </a:solidFill>
-            </a:endParaRPr>
-          </a:p>
-        </p:txBody>
-      </p:sp>
-      <p:pic>
-        <p:nvPicPr>
-          <p:cNvPr id="9" name="Picture 8"/>
-          <p:cNvPicPr>
-            <a:picLocks noChangeAspect="1"/>
-          </p:cNvPicPr>
-          <p:nvPr/>
-        </p:nvPicPr>
-        <p:blipFill>
-          <a:blip r:embed="rId3">
-            <a:extLst>
-              <a:ext uri="{28A0092B-C50C-407E-A947-70E740481C1C}">
-                <a14:useLocalDpi xmlns:a14="http://schemas.microsoft.com/office/drawing/2010/main" val="0"/>
-              </a:ext>
-            </a:extLst>
-          </a:blip>
-          <a:stretch>
-            <a:fillRect/>
-          </a:stretch>
-        </p:blipFill>
-        <p:spPr>
-          <a:xfrm>
-            <a:off x="3037411" y="1209672"/>
-            <a:ext cx="1323810" cy="5238095"/>
-          </a:xfrm>
-          <a:prstGeom prst="rect">
-            <a:avLst/>
-          </a:prstGeom>
-        </p:spPr>
-      </p:pic>
-      <p:sp>
-        <p:nvSpPr>
-          <p:cNvPr id="10" name="TextBox 9"/>
-          <p:cNvSpPr txBox="1"/>
-          <p:nvPr/>
-        </p:nvSpPr>
-        <p:spPr>
-          <a:xfrm>
-            <a:off x="6109356" y="491609"/>
-            <a:ext cx="1308756" cy="369332"/>
-          </a:xfrm>
-          <a:prstGeom prst="rect">
-            <a:avLst/>
-          </a:prstGeom>
-          <a:noFill/>
-        </p:spPr>
-        <p:txBody>
-          <a:bodyPr wrap="none" rtlCol="0">
-            <a:spAutoFit/>
-          </a:bodyPr>
-          <a:lstStyle/>
-          <a:p>
-            <a:pPr marL="285750" indent="-285750">
-              <a:buFont typeface="Wingdings" pitchFamily="2" charset="2"/>
-              <a:buChar char="q"/>
-            </a:pPr>
-            <a:r>
-              <a:rPr lang="en-US" dirty="0">
-                <a:solidFill>
-                  <a:schemeClr val="tx2">
-                    <a:lumMod val="60000"/>
-                    <a:lumOff val="40000"/>
-                  </a:schemeClr>
-                </a:solidFill>
-              </a:rPr>
-              <a:t>I2c_Stop</a:t>
-            </a:r>
-            <a:endParaRPr lang="en-US" dirty="0">
-              <a:solidFill>
-                <a:schemeClr val="tx2">
-                  <a:lumMod val="60000"/>
-                  <a:lumOff val="40000"/>
-                </a:schemeClr>
-              </a:solidFill>
-            </a:endParaRPr>
-          </a:p>
-        </p:txBody>
-      </p:sp>
-      <p:pic>
-        <p:nvPicPr>
-          <p:cNvPr id="11" name="Picture 10"/>
-          <p:cNvPicPr>
-            <a:picLocks noChangeAspect="1"/>
-          </p:cNvPicPr>
-          <p:nvPr/>
-        </p:nvPicPr>
-        <p:blipFill>
-          <a:blip r:embed="rId4">
-            <a:extLst>
-              <a:ext uri="{28A0092B-C50C-407E-A947-70E740481C1C}">
-                <a14:useLocalDpi xmlns:a14="http://schemas.microsoft.com/office/drawing/2010/main" val="0"/>
-              </a:ext>
-            </a:extLst>
-          </a:blip>
-          <a:stretch>
-            <a:fillRect/>
-          </a:stretch>
-        </p:blipFill>
-        <p:spPr>
-          <a:xfrm>
-            <a:off x="6152985" y="1219197"/>
-            <a:ext cx="1323810" cy="5238095"/>
+            <a:off x="1981200" y="914400"/>
+            <a:ext cx="4648200" cy="5715000"/>
           </a:xfrm>
           <a:prstGeom prst="rect">
             <a:avLst/>
@@ -10073,13 +9991,20 @@
     </p:spTree>
     <p:extLst>
       <p:ext uri="{BB962C8B-B14F-4D97-AF65-F5344CB8AC3E}">
-        <p14:creationId xmlns:p14="http://schemas.microsoft.com/office/powerpoint/2010/main" val="587496729"/>
+        <p14:creationId xmlns:p14="http://schemas.microsoft.com/office/powerpoint/2010/main" val="52297288"/>
       </p:ext>
     </p:extLst>
   </p:cSld>
   <p:clrMapOvr>
     <a:masterClrMapping/>
   </p:clrMapOvr>
+  <p:timing>
+    <p:tnLst>
+      <p:par>
+        <p:cTn id="1" dur="indefinite" restart="never" nodeType="tmRoot"/>
+      </p:par>
+    </p:tnLst>
+  </p:timing>
 </p:sld>
 </file>
 
@@ -10102,14 +10027,14 @@
       </p:grpSpPr>
       <p:sp>
         <p:nvSpPr>
-          <p:cNvPr id="4" name="TextBox 3"/>
+          <p:cNvPr id="5" name="TextBox 4"/>
           <p:cNvSpPr txBox="1"/>
           <p:nvPr/>
         </p:nvSpPr>
         <p:spPr>
           <a:xfrm>
-            <a:off x="-381000" y="271760"/>
-            <a:ext cx="2133600" cy="369332"/>
+            <a:off x="76200" y="179427"/>
+            <a:ext cx="1657826" cy="646331"/>
           </a:xfrm>
           <a:prstGeom prst="rect">
             <a:avLst/>
@@ -10117,10 +10042,24 @@
           <a:noFill/>
         </p:spPr>
         <p:txBody>
-          <a:bodyPr wrap="square" rtlCol="0">
+          <a:bodyPr wrap="none" rtlCol="0">
             <a:spAutoFit/>
           </a:bodyPr>
           <a:lstStyle/>
+          <a:p>
+            <a:pPr marL="285750" indent="-285750">
+              <a:buFont typeface="Wingdings" pitchFamily="2" charset="2"/>
+              <a:buChar char="q"/>
+            </a:pPr>
+            <a:r>
+              <a:rPr lang="en-US" dirty="0" smtClean="0">
+                <a:solidFill>
+                  <a:srgbClr val="7030A0"/>
+                </a:solidFill>
+              </a:rPr>
+              <a:t>I2C</a:t>
+            </a:r>
+          </a:p>
           <a:p>
             <a:pPr marL="742950" lvl="1" indent="-285750">
               <a:buFont typeface="Wingdings" pitchFamily="2" charset="2"/>
@@ -10135,22 +10074,14 @@
                   </a:schemeClr>
                 </a:solidFill>
               </a:rPr>
-              <a:t>I2c_WaitAck</a:t>
-            </a:r>
-            <a:endParaRPr lang="en-US" dirty="0">
-              <a:solidFill>
-                <a:schemeClr val="tx2">
-                  <a:lumMod val="60000"/>
-                  <a:lumOff val="40000"/>
-                </a:schemeClr>
-              </a:solidFill>
-            </a:endParaRPr>
+              <a:t>I2c_Init</a:t>
+            </a:r>
           </a:p>
         </p:txBody>
       </p:sp>
       <p:pic>
         <p:nvPicPr>
-          <p:cNvPr id="5" name="Picture 4"/>
+          <p:cNvPr id="6" name="Picture 5"/>
           <p:cNvPicPr>
             <a:picLocks noChangeAspect="1"/>
           </p:cNvPicPr>
@@ -10170,8 +10101,8 @@
         </p:blipFill>
         <p:spPr>
           <a:xfrm>
-            <a:off x="228600" y="990600"/>
-            <a:ext cx="1323810" cy="4419600"/>
+            <a:off x="152400" y="1219199"/>
+            <a:ext cx="2190476" cy="5238095"/>
           </a:xfrm>
           <a:prstGeom prst="rect">
             <a:avLst/>
@@ -10180,14 +10111,14 @@
       </p:pic>
       <p:sp>
         <p:nvSpPr>
-          <p:cNvPr id="6" name="TextBox 5"/>
+          <p:cNvPr id="7" name="TextBox 6"/>
           <p:cNvSpPr txBox="1"/>
           <p:nvPr/>
         </p:nvSpPr>
         <p:spPr>
           <a:xfrm>
-            <a:off x="2057400" y="271760"/>
-            <a:ext cx="2514600" cy="369332"/>
+            <a:off x="2590800" y="456426"/>
+            <a:ext cx="1770421" cy="369332"/>
           </a:xfrm>
           <a:prstGeom prst="rect">
             <a:avLst/>
@@ -10195,7 +10126,7 @@
           <a:noFill/>
         </p:spPr>
         <p:txBody>
-          <a:bodyPr wrap="square" rtlCol="0">
+          <a:bodyPr wrap="none" rtlCol="0">
             <a:spAutoFit/>
           </a:bodyPr>
           <a:lstStyle/>
@@ -10213,22 +10144,14 @@
                   </a:schemeClr>
                 </a:solidFill>
               </a:rPr>
-              <a:t>I2c_Send_NAck</a:t>
-            </a:r>
-            <a:endParaRPr lang="en-US" dirty="0">
-              <a:solidFill>
-                <a:schemeClr val="tx2">
-                  <a:lumMod val="60000"/>
-                  <a:lumOff val="40000"/>
-                </a:schemeClr>
-              </a:solidFill>
-            </a:endParaRPr>
+              <a:t>I2c_Start</a:t>
+            </a:r>
           </a:p>
         </p:txBody>
       </p:sp>
       <p:pic>
         <p:nvPicPr>
-          <p:cNvPr id="7" name="Picture 6"/>
+          <p:cNvPr id="9" name="Picture 8"/>
           <p:cNvPicPr>
             <a:picLocks noChangeAspect="1"/>
           </p:cNvPicPr>
@@ -10248,8 +10171,8 @@
         </p:blipFill>
         <p:spPr>
           <a:xfrm>
-            <a:off x="2752795" y="990600"/>
-            <a:ext cx="1123810" cy="4419600"/>
+            <a:off x="3037411" y="1209672"/>
+            <a:ext cx="1323810" cy="5238095"/>
           </a:xfrm>
           <a:prstGeom prst="rect">
             <a:avLst/>
@@ -10258,14 +10181,14 @@
       </p:pic>
       <p:sp>
         <p:nvSpPr>
-          <p:cNvPr id="8" name="TextBox 7"/>
+          <p:cNvPr id="10" name="TextBox 9"/>
           <p:cNvSpPr txBox="1"/>
           <p:nvPr/>
         </p:nvSpPr>
         <p:spPr>
           <a:xfrm>
-            <a:off x="7191375" y="271760"/>
-            <a:ext cx="1905000" cy="369332"/>
+            <a:off x="6109356" y="491609"/>
+            <a:ext cx="1308756" cy="369332"/>
           </a:xfrm>
           <a:prstGeom prst="rect">
             <a:avLst/>
@@ -10273,17 +10196,17 @@
           <a:noFill/>
         </p:spPr>
         <p:txBody>
-          <a:bodyPr wrap="square" rtlCol="0">
+          <a:bodyPr wrap="none" rtlCol="0">
             <a:spAutoFit/>
           </a:bodyPr>
           <a:lstStyle/>
           <a:p>
-            <a:pPr marL="742950" lvl="1" indent="-285750">
+            <a:pPr marL="285750" indent="-285750">
               <a:buFont typeface="Wingdings" pitchFamily="2" charset="2"/>
               <a:buChar char="q"/>
             </a:pPr>
             <a:r>
-              <a:rPr lang="en-US" dirty="0" smtClean="0">
+              <a:rPr lang="en-US" dirty="0">
                 <a:solidFill>
                   <a:schemeClr val="tx2">
                     <a:lumMod val="60000"/>
@@ -10291,22 +10214,14 @@
                   </a:schemeClr>
                 </a:solidFill>
               </a:rPr>
-              <a:t>I2c_Write</a:t>
-            </a:r>
-            <a:endParaRPr lang="en-US" dirty="0">
-              <a:solidFill>
-                <a:schemeClr val="tx2">
-                  <a:lumMod val="60000"/>
-                  <a:lumOff val="40000"/>
-                </a:schemeClr>
-              </a:solidFill>
-            </a:endParaRPr>
+              <a:t>I2c_Stop</a:t>
+            </a:r>
           </a:p>
         </p:txBody>
       </p:sp>
       <p:pic>
         <p:nvPicPr>
-          <p:cNvPr id="9" name="Picture 8"/>
+          <p:cNvPr id="11" name="Picture 10"/>
           <p:cNvPicPr>
             <a:picLocks noChangeAspect="1"/>
           </p:cNvPicPr>
@@ -10326,24 +10241,54 @@
         </p:blipFill>
         <p:spPr>
           <a:xfrm>
-            <a:off x="7696256" y="1000125"/>
-            <a:ext cx="895238" cy="3581400"/>
+            <a:off x="6152985" y="1219197"/>
+            <a:ext cx="1323810" cy="5238095"/>
           </a:xfrm>
           <a:prstGeom prst="rect">
             <a:avLst/>
           </a:prstGeom>
         </p:spPr>
       </p:pic>
-      <p:sp>
-        <p:nvSpPr>
-          <p:cNvPr id="10" name="TextBox 9"/>
+    </p:spTree>
+    <p:extLst>
+      <p:ext uri="{BB962C8B-B14F-4D97-AF65-F5344CB8AC3E}">
+        <p14:creationId xmlns:p14="http://schemas.microsoft.com/office/powerpoint/2010/main" val="587496729"/>
+      </p:ext>
+    </p:extLst>
+  </p:cSld>
+  <p:clrMapOvr>
+    <a:masterClrMapping/>
+  </p:clrMapOvr>
+</p:sld>
+</file>
+
+<file path=ppt/slides/slide24.xml><?xml version="1.0" encoding="utf-8"?>
+<p:sld xmlns:a="http://schemas.openxmlformats.org/drawingml/2006/main" xmlns:r="http://schemas.openxmlformats.org/officeDocument/2006/relationships" xmlns:p="http://schemas.openxmlformats.org/presentationml/2006/main">
+  <p:cSld>
+    <p:spTree>
+      <p:nvGrpSpPr>
+        <p:cNvPr id="1" name=""/>
+        <p:cNvGrpSpPr/>
+        <p:nvPr/>
+      </p:nvGrpSpPr>
+      <p:grpSpPr>
+        <a:xfrm>
+          <a:off x="0" y="0"/>
+          <a:ext cx="0" cy="0"/>
+          <a:chOff x="0" y="0"/>
+          <a:chExt cx="0" cy="0"/>
+        </a:xfrm>
+      </p:grpSpPr>
+      <p:sp>
+        <p:nvSpPr>
+          <p:cNvPr id="4" name="TextBox 3"/>
           <p:cNvSpPr txBox="1"/>
           <p:nvPr/>
         </p:nvSpPr>
         <p:spPr>
           <a:xfrm>
-            <a:off x="4876800" y="271760"/>
-            <a:ext cx="1905000" cy="369332"/>
+            <a:off x="-381000" y="271760"/>
+            <a:ext cx="2133600" cy="369332"/>
           </a:xfrm>
           <a:prstGeom prst="rect">
             <a:avLst/>
@@ -10356,7 +10301,7 @@
           </a:bodyPr>
           <a:lstStyle/>
           <a:p>
-            <a:pPr marL="285750" indent="-285750">
+            <a:pPr marL="742950" lvl="1" indent="-285750">
               <a:buFont typeface="Wingdings" pitchFamily="2" charset="2"/>
               <a:buChar char="q"/>
             </a:pPr>
@@ -10369,7 +10314,147 @@
                   </a:schemeClr>
                 </a:solidFill>
               </a:rPr>
-              <a:t>I2c_Read</a:t>
+              <a:t>I2c_WaitAck</a:t>
+            </a:r>
+          </a:p>
+        </p:txBody>
+      </p:sp>
+      <p:pic>
+        <p:nvPicPr>
+          <p:cNvPr id="5" name="Picture 4"/>
+          <p:cNvPicPr>
+            <a:picLocks noChangeAspect="1"/>
+          </p:cNvPicPr>
+          <p:nvPr/>
+        </p:nvPicPr>
+        <p:blipFill>
+          <a:blip r:embed="rId2">
+            <a:extLst>
+              <a:ext uri="{28A0092B-C50C-407E-A947-70E740481C1C}">
+                <a14:useLocalDpi xmlns:a14="http://schemas.microsoft.com/office/drawing/2010/main" val="0"/>
+              </a:ext>
+            </a:extLst>
+          </a:blip>
+          <a:stretch>
+            <a:fillRect/>
+          </a:stretch>
+        </p:blipFill>
+        <p:spPr>
+          <a:xfrm>
+            <a:off x="228600" y="990600"/>
+            <a:ext cx="1323810" cy="4419600"/>
+          </a:xfrm>
+          <a:prstGeom prst="rect">
+            <a:avLst/>
+          </a:prstGeom>
+        </p:spPr>
+      </p:pic>
+      <p:sp>
+        <p:nvSpPr>
+          <p:cNvPr id="6" name="TextBox 5"/>
+          <p:cNvSpPr txBox="1"/>
+          <p:nvPr/>
+        </p:nvSpPr>
+        <p:spPr>
+          <a:xfrm>
+            <a:off x="2057400" y="271760"/>
+            <a:ext cx="2514600" cy="369332"/>
+          </a:xfrm>
+          <a:prstGeom prst="rect">
+            <a:avLst/>
+          </a:prstGeom>
+          <a:noFill/>
+        </p:spPr>
+        <p:txBody>
+          <a:bodyPr wrap="square" rtlCol="0">
+            <a:spAutoFit/>
+          </a:bodyPr>
+          <a:lstStyle/>
+          <a:p>
+            <a:pPr marL="742950" lvl="1" indent="-285750">
+              <a:buFont typeface="Wingdings" pitchFamily="2" charset="2"/>
+              <a:buChar char="q"/>
+            </a:pPr>
+            <a:r>
+              <a:rPr lang="en-US" dirty="0">
+                <a:solidFill>
+                  <a:schemeClr val="tx2">
+                    <a:lumMod val="60000"/>
+                    <a:lumOff val="40000"/>
+                  </a:schemeClr>
+                </a:solidFill>
+              </a:rPr>
+              <a:t>I2c_Send_NAck</a:t>
+            </a:r>
+          </a:p>
+        </p:txBody>
+      </p:sp>
+      <p:pic>
+        <p:nvPicPr>
+          <p:cNvPr id="7" name="Picture 6"/>
+          <p:cNvPicPr>
+            <a:picLocks noChangeAspect="1"/>
+          </p:cNvPicPr>
+          <p:nvPr/>
+        </p:nvPicPr>
+        <p:blipFill>
+          <a:blip r:embed="rId3">
+            <a:extLst>
+              <a:ext uri="{28A0092B-C50C-407E-A947-70E740481C1C}">
+                <a14:useLocalDpi xmlns:a14="http://schemas.microsoft.com/office/drawing/2010/main" val="0"/>
+              </a:ext>
+            </a:extLst>
+          </a:blip>
+          <a:stretch>
+            <a:fillRect/>
+          </a:stretch>
+        </p:blipFill>
+        <p:spPr>
+          <a:xfrm>
+            <a:off x="2752795" y="990600"/>
+            <a:ext cx="1123810" cy="4419600"/>
+          </a:xfrm>
+          <a:prstGeom prst="rect">
+            <a:avLst/>
+          </a:prstGeom>
+        </p:spPr>
+      </p:pic>
+      <p:sp>
+        <p:nvSpPr>
+          <p:cNvPr id="8" name="TextBox 7"/>
+          <p:cNvSpPr txBox="1"/>
+          <p:nvPr/>
+        </p:nvSpPr>
+        <p:spPr>
+          <a:xfrm>
+            <a:off x="7191375" y="271760"/>
+            <a:ext cx="1905000" cy="369332"/>
+          </a:xfrm>
+          <a:prstGeom prst="rect">
+            <a:avLst/>
+          </a:prstGeom>
+          <a:noFill/>
+        </p:spPr>
+        <p:txBody>
+          <a:bodyPr wrap="square" rtlCol="0">
+            <a:spAutoFit/>
+          </a:bodyPr>
+          <a:lstStyle/>
+          <a:p>
+            <a:pPr marL="742950" lvl="1" indent="-285750">
+              <a:buFont typeface="Wingdings" pitchFamily="2" charset="2"/>
+              <a:buChar char="q"/>
+            </a:pPr>
+            <a:r>
+              <a:rPr lang="en-US" dirty="0" smtClean="0">
+                <a:solidFill>
+                  <a:schemeClr val="tx2">
+                    <a:lumMod val="60000"/>
+                    <a:lumOff val="40000"/>
+                  </a:schemeClr>
+                </a:solidFill>
+              </a:rPr>
+              <a:t>I2c_Write</a:t>
             </a:r>
             <a:endParaRPr lang="en-US" dirty="0">
               <a:solidFill>
@@ -10379,6 +10464,76 @@
                 </a:schemeClr>
               </a:solidFill>
             </a:endParaRPr>
+          </a:p>
+        </p:txBody>
+      </p:sp>
+      <p:pic>
+        <p:nvPicPr>
+          <p:cNvPr id="9" name="Picture 8"/>
+          <p:cNvPicPr>
+            <a:picLocks noChangeAspect="1"/>
+          </p:cNvPicPr>
+          <p:nvPr/>
+        </p:nvPicPr>
+        <p:blipFill>
+          <a:blip r:embed="rId4">
+            <a:extLst>
+              <a:ext uri="{28A0092B-C50C-407E-A947-70E740481C1C}">
+                <a14:useLocalDpi xmlns:a14="http://schemas.microsoft.com/office/drawing/2010/main" val="0"/>
+              </a:ext>
+            </a:extLst>
+          </a:blip>
+          <a:stretch>
+            <a:fillRect/>
+          </a:stretch>
+        </p:blipFill>
+        <p:spPr>
+          <a:xfrm>
+            <a:off x="7696256" y="1000125"/>
+            <a:ext cx="895238" cy="3581400"/>
+          </a:xfrm>
+          <a:prstGeom prst="rect">
+            <a:avLst/>
+          </a:prstGeom>
+        </p:spPr>
+      </p:pic>
+      <p:sp>
+        <p:nvSpPr>
+          <p:cNvPr id="10" name="TextBox 9"/>
+          <p:cNvSpPr txBox="1"/>
+          <p:nvPr/>
+        </p:nvSpPr>
+        <p:spPr>
+          <a:xfrm>
+            <a:off x="4876800" y="271760"/>
+            <a:ext cx="1905000" cy="369332"/>
+          </a:xfrm>
+          <a:prstGeom prst="rect">
+            <a:avLst/>
+          </a:prstGeom>
+          <a:noFill/>
+        </p:spPr>
+        <p:txBody>
+          <a:bodyPr wrap="square" rtlCol="0">
+            <a:spAutoFit/>
+          </a:bodyPr>
+          <a:lstStyle/>
+          <a:p>
+            <a:pPr marL="285750" indent="-285750">
+              <a:buFont typeface="Wingdings" pitchFamily="2" charset="2"/>
+              <a:buChar char="q"/>
+            </a:pPr>
+            <a:r>
+              <a:rPr lang="en-US" dirty="0">
+                <a:solidFill>
+                  <a:schemeClr val="tx2">
+                    <a:lumMod val="60000"/>
+                    <a:lumOff val="40000"/>
+                  </a:schemeClr>
+                </a:solidFill>
+              </a:rPr>
+              <a:t>I2c_Read</a:t>
+            </a:r>
           </a:p>
         </p:txBody>
       </p:sp>
@@ -14048,8 +14203,8 @@
         </p:nvSpPr>
         <p:spPr>
           <a:xfrm>
-            <a:off x="304800" y="304800"/>
-            <a:ext cx="5574988" cy="584775"/>
+            <a:off x="152400" y="914400"/>
+            <a:ext cx="6328207" cy="584775"/>
           </a:xfrm>
           <a:prstGeom prst="rect">
             <a:avLst/>
@@ -14062,12 +14217,36 @@
           <a:lstStyle/>
           <a:p>
             <a:r>
+              <a:rPr lang="en-US" sz="3200" b="1" dirty="0">
+                <a:solidFill>
+                  <a:schemeClr val="accent1"/>
+                </a:solidFill>
+              </a:rPr>
+              <a:t>Water Heater System </a:t>
+            </a:r>
+            <a:r>
               <a:rPr lang="en-US" sz="3200" b="1" dirty="0" smtClean="0">
                 <a:solidFill>
                   <a:schemeClr val="accent1"/>
                 </a:solidFill>
               </a:rPr>
-              <a:t>Water Heater System Flowchart</a:t>
+              <a:t>State </a:t>
+            </a:r>
+            <a:r>
+              <a:rPr lang="en-US" sz="3200" b="1" dirty="0">
+                <a:solidFill>
+                  <a:schemeClr val="accent1"/>
+                </a:solidFill>
+              </a:rPr>
+              <a:t>M</a:t>
+            </a:r>
+            <a:r>
+              <a:rPr lang="en-US" sz="3200" b="1" dirty="0" smtClean="0">
+                <a:solidFill>
+                  <a:schemeClr val="accent1"/>
+                </a:solidFill>
+              </a:rPr>
+              <a:t>achine</a:t>
             </a:r>
             <a:endParaRPr lang="en-US" sz="3200" b="1" dirty="0">
               <a:solidFill>
@@ -14077,75 +14256,9 @@
           </a:p>
         </p:txBody>
       </p:sp>
-      <p:sp>
-        <p:nvSpPr>
-          <p:cNvPr id="6" name="TextBox 5"/>
-          <p:cNvSpPr txBox="1"/>
-          <p:nvPr/>
-        </p:nvSpPr>
-        <p:spPr>
-          <a:xfrm>
-            <a:off x="0" y="1066800"/>
-            <a:ext cx="3657600" cy="923330"/>
-          </a:xfrm>
-          <a:prstGeom prst="rect">
-            <a:avLst/>
-          </a:prstGeom>
-          <a:noFill/>
-        </p:spPr>
-        <p:txBody>
-          <a:bodyPr wrap="square" rtlCol="0">
-            <a:spAutoFit/>
-          </a:bodyPr>
-          <a:lstStyle/>
-          <a:p>
-            <a:pPr marL="285750" indent="-285750">
-              <a:buFont typeface="Wingdings" pitchFamily="2" charset="2"/>
-              <a:buChar char="q"/>
-            </a:pPr>
-            <a:r>
-              <a:rPr lang="en-US" dirty="0" smtClean="0">
-                <a:solidFill>
-                  <a:srgbClr val="7030A0"/>
-                </a:solidFill>
-              </a:rPr>
-              <a:t>ADC</a:t>
-            </a:r>
-          </a:p>
-          <a:p>
-            <a:pPr marL="742950" lvl="1" indent="-285750">
-              <a:buFont typeface="Wingdings" pitchFamily="2" charset="2"/>
-              <a:buChar char="q"/>
-            </a:pPr>
-            <a:r>
-              <a:rPr lang="en-US" dirty="0" err="1" smtClean="0">
-                <a:solidFill>
-                  <a:schemeClr val="tx2">
-                    <a:lumMod val="60000"/>
-                    <a:lumOff val="40000"/>
-                  </a:schemeClr>
-                </a:solidFill>
-              </a:rPr>
-              <a:t>ADC_Init</a:t>
-            </a:r>
-            <a:endParaRPr lang="en-US" dirty="0" smtClean="0">
-              <a:solidFill>
-                <a:schemeClr val="tx2">
-                  <a:lumMod val="60000"/>
-                  <a:lumOff val="40000"/>
-                </a:schemeClr>
-              </a:solidFill>
-            </a:endParaRPr>
-          </a:p>
-          <a:p>
-            <a:pPr lvl="1"/>
-            <a:endParaRPr lang="en-US" dirty="0"/>
-          </a:p>
-        </p:txBody>
-      </p:sp>
       <p:pic>
         <p:nvPicPr>
-          <p:cNvPr id="7" name="Picture 6"/>
+          <p:cNvPr id="5" name="Picture 4"/>
           <p:cNvPicPr>
             <a:picLocks noChangeAspect="1"/>
           </p:cNvPicPr>
@@ -14165,90 +14278,8 @@
         </p:blipFill>
         <p:spPr>
           <a:xfrm>
-            <a:off x="457200" y="1676400"/>
-            <a:ext cx="2286000" cy="5105400"/>
-          </a:xfrm>
-          <a:prstGeom prst="rect">
-            <a:avLst/>
-          </a:prstGeom>
-        </p:spPr>
-      </p:pic>
-      <p:sp>
-        <p:nvSpPr>
-          <p:cNvPr id="8" name="TextBox 7"/>
-          <p:cNvSpPr txBox="1"/>
-          <p:nvPr/>
-        </p:nvSpPr>
-        <p:spPr>
-          <a:xfrm>
-            <a:off x="4648200" y="1205299"/>
-            <a:ext cx="3657600" cy="646331"/>
-          </a:xfrm>
-          <a:prstGeom prst="rect">
-            <a:avLst/>
-          </a:prstGeom>
-          <a:noFill/>
-        </p:spPr>
-        <p:txBody>
-          <a:bodyPr wrap="square" rtlCol="0">
-            <a:spAutoFit/>
-          </a:bodyPr>
-          <a:lstStyle/>
-          <a:p>
-            <a:pPr marL="742950" lvl="1" indent="-285750">
-              <a:buFont typeface="Wingdings" pitchFamily="2" charset="2"/>
-              <a:buChar char="q"/>
-            </a:pPr>
-            <a:r>
-              <a:rPr lang="en-US" dirty="0" err="1">
-                <a:solidFill>
-                  <a:schemeClr val="tx2">
-                    <a:lumMod val="60000"/>
-                    <a:lumOff val="40000"/>
-                  </a:schemeClr>
-                </a:solidFill>
-              </a:rPr>
-              <a:t>ADC_Start_Conv</a:t>
-            </a:r>
-            <a:endParaRPr lang="en-US" dirty="0" smtClean="0">
-              <a:solidFill>
-                <a:schemeClr val="tx2">
-                  <a:lumMod val="60000"/>
-                  <a:lumOff val="40000"/>
-                </a:schemeClr>
-              </a:solidFill>
-            </a:endParaRPr>
-          </a:p>
-          <a:p>
-            <a:pPr lvl="1"/>
-            <a:endParaRPr lang="en-US" dirty="0"/>
-          </a:p>
-        </p:txBody>
-      </p:sp>
-      <p:pic>
-        <p:nvPicPr>
-          <p:cNvPr id="9" name="Picture 8"/>
-          <p:cNvPicPr>
-            <a:picLocks noChangeAspect="1"/>
-          </p:cNvPicPr>
-          <p:nvPr/>
-        </p:nvPicPr>
-        <p:blipFill>
-          <a:blip r:embed="rId3">
-            <a:extLst>
-              <a:ext uri="{28A0092B-C50C-407E-A947-70E740481C1C}">
-                <a14:useLocalDpi xmlns:a14="http://schemas.microsoft.com/office/drawing/2010/main" val="0"/>
-              </a:ext>
-            </a:extLst>
-          </a:blip>
-          <a:stretch>
-            <a:fillRect/>
-          </a:stretch>
-        </p:blipFill>
-        <p:spPr>
-          <a:xfrm>
-            <a:off x="5410200" y="1676400"/>
-            <a:ext cx="2895600" cy="4800600"/>
+            <a:off x="0" y="2057400"/>
+            <a:ext cx="8686800" cy="3581400"/>
           </a:xfrm>
           <a:prstGeom prst="rect">
             <a:avLst/>
@@ -14258,20 +14289,13 @@
     </p:spTree>
     <p:extLst>
       <p:ext uri="{BB962C8B-B14F-4D97-AF65-F5344CB8AC3E}">
-        <p14:creationId xmlns:p14="http://schemas.microsoft.com/office/powerpoint/2010/main" val="557966015"/>
+        <p14:creationId xmlns:p14="http://schemas.microsoft.com/office/powerpoint/2010/main" val="2325609564"/>
       </p:ext>
     </p:extLst>
   </p:cSld>
   <p:clrMapOvr>
     <a:masterClrMapping/>
   </p:clrMapOvr>
-  <p:timing>
-    <p:tnLst>
-      <p:par>
-        <p:cTn id="1" dur="indefinite" restart="never" nodeType="tmRoot"/>
-      </p:par>
-    </p:tnLst>
-  </p:timing>
 </p:sld>
 </file>
 
@@ -14294,14 +14318,51 @@
       </p:grpSpPr>
       <p:sp>
         <p:nvSpPr>
-          <p:cNvPr id="4" name="TextBox 3"/>
+          <p:cNvPr id="4" name="Rectangle 3"/>
+          <p:cNvSpPr/>
+          <p:nvPr/>
+        </p:nvSpPr>
+        <p:spPr>
+          <a:xfrm>
+            <a:off x="304800" y="304800"/>
+            <a:ext cx="5738494" cy="584775"/>
+          </a:xfrm>
+          <a:prstGeom prst="rect">
+            <a:avLst/>
+          </a:prstGeom>
+        </p:spPr>
+        <p:txBody>
+          <a:bodyPr wrap="none">
+            <a:spAutoFit/>
+          </a:bodyPr>
+          <a:lstStyle/>
+          <a:p>
+            <a:r>
+              <a:rPr lang="en-US" sz="3200" b="1" dirty="0" smtClean="0">
+                <a:solidFill>
+                  <a:schemeClr val="accent1"/>
+                </a:solidFill>
+              </a:rPr>
+              <a:t>Water Heater System Flowcharts</a:t>
+            </a:r>
+            <a:endParaRPr lang="en-US" sz="3200" b="1" dirty="0">
+              <a:solidFill>
+                <a:schemeClr val="accent1"/>
+              </a:solidFill>
+            </a:endParaRPr>
+          </a:p>
+        </p:txBody>
+      </p:sp>
+      <p:sp>
+        <p:nvSpPr>
+          <p:cNvPr id="6" name="TextBox 5"/>
           <p:cNvSpPr txBox="1"/>
           <p:nvPr/>
         </p:nvSpPr>
         <p:spPr>
           <a:xfrm>
-            <a:off x="-228600" y="57833"/>
-            <a:ext cx="3352800" cy="646331"/>
+            <a:off x="0" y="1066800"/>
+            <a:ext cx="3657600" cy="923330"/>
           </a:xfrm>
           <a:prstGeom prst="rect">
             <a:avLst/>
@@ -14313,13 +14374,27 @@
             <a:spAutoFit/>
           </a:bodyPr>
           <a:lstStyle/>
+          <a:p>
+            <a:pPr marL="285750" indent="-285750">
+              <a:buFont typeface="Wingdings" pitchFamily="2" charset="2"/>
+              <a:buChar char="q"/>
+            </a:pPr>
+            <a:r>
+              <a:rPr lang="en-US" dirty="0" smtClean="0">
+                <a:solidFill>
+                  <a:srgbClr val="7030A0"/>
+                </a:solidFill>
+              </a:rPr>
+              <a:t>ADC</a:t>
+            </a:r>
+          </a:p>
           <a:p>
             <a:pPr marL="742950" lvl="1" indent="-285750">
               <a:buFont typeface="Wingdings" pitchFamily="2" charset="2"/>
               <a:buChar char="q"/>
             </a:pPr>
             <a:r>
-              <a:rPr lang="en-US" dirty="0" err="1">
+              <a:rPr lang="en-US" dirty="0" err="1" smtClean="0">
                 <a:solidFill>
                   <a:schemeClr val="tx2">
                     <a:lumMod val="60000"/>
@@ -14327,7 +14402,7 @@
                   </a:schemeClr>
                 </a:solidFill>
               </a:rPr>
-              <a:t>ADC_Conv_MainFunction</a:t>
+              <a:t>ADC_Init</a:t>
             </a:r>
             <a:endParaRPr lang="en-US" dirty="0" smtClean="0">
               <a:solidFill>
@@ -14346,7 +14421,7 @@
       </p:sp>
       <p:pic>
         <p:nvPicPr>
-          <p:cNvPr id="5" name="Picture 4"/>
+          <p:cNvPr id="7" name="Picture 6"/>
           <p:cNvPicPr>
             <a:picLocks noChangeAspect="1"/>
           </p:cNvPicPr>
@@ -14366,8 +14441,8 @@
         </p:blipFill>
         <p:spPr>
           <a:xfrm>
-            <a:off x="19050" y="457200"/>
-            <a:ext cx="4019550" cy="6096000"/>
+            <a:off x="457200" y="1676400"/>
+            <a:ext cx="2286000" cy="5105400"/>
           </a:xfrm>
           <a:prstGeom prst="rect">
             <a:avLst/>
@@ -14376,13 +14451,13 @@
       </p:pic>
       <p:sp>
         <p:nvSpPr>
-          <p:cNvPr id="6" name="TextBox 5"/>
+          <p:cNvPr id="8" name="TextBox 7"/>
           <p:cNvSpPr txBox="1"/>
           <p:nvPr/>
         </p:nvSpPr>
         <p:spPr>
           <a:xfrm>
-            <a:off x="4953000" y="67358"/>
+            <a:off x="4648200" y="1205299"/>
             <a:ext cx="3657600" cy="646331"/>
           </a:xfrm>
           <a:prstGeom prst="rect">
@@ -14409,7 +14484,7 @@
                   </a:schemeClr>
                 </a:solidFill>
               </a:rPr>
-              <a:t>ADC_Value_Ready_CallBack</a:t>
+              <a:t>ADC_Start_Conv</a:t>
             </a:r>
             <a:endParaRPr lang="en-US" dirty="0" smtClean="0">
               <a:solidFill>
@@ -14428,7 +14503,7 @@
       </p:sp>
       <p:pic>
         <p:nvPicPr>
-          <p:cNvPr id="7" name="Picture 6"/>
+          <p:cNvPr id="9" name="Picture 8"/>
           <p:cNvPicPr>
             <a:picLocks noChangeAspect="1"/>
           </p:cNvPicPr>
@@ -14448,8 +14523,8 @@
         </p:blipFill>
         <p:spPr>
           <a:xfrm>
-            <a:off x="5638800" y="704164"/>
-            <a:ext cx="2286000" cy="3886200"/>
+            <a:off x="5410200" y="1676400"/>
+            <a:ext cx="2895600" cy="4800600"/>
           </a:xfrm>
           <a:prstGeom prst="rect">
             <a:avLst/>
@@ -14459,7 +14534,7 @@
     </p:spTree>
     <p:extLst>
       <p:ext uri="{BB962C8B-B14F-4D97-AF65-F5344CB8AC3E}">
-        <p14:creationId xmlns:p14="http://schemas.microsoft.com/office/powerpoint/2010/main" val="3494525142"/>
+        <p14:creationId xmlns:p14="http://schemas.microsoft.com/office/powerpoint/2010/main" val="557966015"/>
       </p:ext>
     </p:extLst>
   </p:cSld>
@@ -14501,8 +14576,8 @@
         </p:nvSpPr>
         <p:spPr>
           <a:xfrm>
-            <a:off x="76200" y="179427"/>
-            <a:ext cx="2040302" cy="646331"/>
+            <a:off x="-228600" y="57833"/>
+            <a:ext cx="3352800" cy="646331"/>
           </a:xfrm>
           <a:prstGeom prst="rect">
             <a:avLst/>
@@ -14510,24 +14585,10 @@
           <a:noFill/>
         </p:spPr>
         <p:txBody>
-          <a:bodyPr wrap="none" rtlCol="0">
+          <a:bodyPr wrap="square" rtlCol="0">
             <a:spAutoFit/>
           </a:bodyPr>
           <a:lstStyle/>
-          <a:p>
-            <a:pPr marL="285750" indent="-285750">
-              <a:buFont typeface="Wingdings" pitchFamily="2" charset="2"/>
-              <a:buChar char="q"/>
-            </a:pPr>
-            <a:r>
-              <a:rPr lang="en-US" dirty="0" smtClean="0">
-                <a:solidFill>
-                  <a:srgbClr val="7030A0"/>
-                </a:solidFill>
-              </a:rPr>
-              <a:t>Buttons</a:t>
-            </a:r>
-          </a:p>
           <a:p>
             <a:pPr marL="742950" lvl="1" indent="-285750">
               <a:buFont typeface="Wingdings" pitchFamily="2" charset="2"/>
@@ -14542,9 +14603,9 @@
                   </a:schemeClr>
                 </a:solidFill>
               </a:rPr>
-              <a:t>On_Off_Init</a:t>
-            </a:r>
-            <a:endParaRPr lang="en-US" dirty="0">
+              <a:t>ADC_Conv_MainFunction</a:t>
+            </a:r>
+            <a:endParaRPr lang="en-US" dirty="0" smtClean="0">
               <a:solidFill>
                 <a:schemeClr val="tx2">
                   <a:lumMod val="60000"/>
@@ -14552,6 +14613,10 @@
                 </a:schemeClr>
               </a:solidFill>
             </a:endParaRPr>
+          </a:p>
+          <a:p>
+            <a:pPr lvl="1"/>
+            <a:endParaRPr lang="en-US" dirty="0"/>
           </a:p>
         </p:txBody>
       </p:sp>
@@ -14577,8 +14642,8 @@
         </p:blipFill>
         <p:spPr>
           <a:xfrm>
-            <a:off x="305776" y="1371600"/>
-            <a:ext cx="2589824" cy="4495800"/>
+            <a:off x="19050" y="457200"/>
+            <a:ext cx="4019550" cy="6096000"/>
           </a:xfrm>
           <a:prstGeom prst="rect">
             <a:avLst/>
@@ -14593,8 +14658,8 @@
         </p:nvSpPr>
         <p:spPr>
           <a:xfrm>
-            <a:off x="5357237" y="456426"/>
-            <a:ext cx="2620526" cy="369332"/>
+            <a:off x="4953000" y="67358"/>
+            <a:ext cx="3657600" cy="646331"/>
           </a:xfrm>
           <a:prstGeom prst="rect">
             <a:avLst/>
@@ -14602,12 +14667,12 @@
           <a:noFill/>
         </p:spPr>
         <p:txBody>
-          <a:bodyPr wrap="none" rtlCol="0">
+          <a:bodyPr wrap="square" rtlCol="0">
             <a:spAutoFit/>
           </a:bodyPr>
           <a:lstStyle/>
           <a:p>
-            <a:pPr marL="285750" indent="-285750">
+            <a:pPr marL="742950" lvl="1" indent="-285750">
               <a:buFont typeface="Wingdings" pitchFamily="2" charset="2"/>
               <a:buChar char="q"/>
             </a:pPr>
@@ -14620,9 +14685,9 @@
                   </a:schemeClr>
                 </a:solidFill>
               </a:rPr>
-              <a:t>EXTI_On_Off_CallBack</a:t>
-            </a:r>
-            <a:endParaRPr lang="en-US" dirty="0">
+              <a:t>ADC_Value_Ready_CallBack</a:t>
+            </a:r>
+            <a:endParaRPr lang="en-US" dirty="0" smtClean="0">
               <a:solidFill>
                 <a:schemeClr val="tx2">
                   <a:lumMod val="60000"/>
@@ -14630,6 +14695,10 @@
                 </a:schemeClr>
               </a:solidFill>
             </a:endParaRPr>
+          </a:p>
+          <a:p>
+            <a:pPr lvl="1"/>
+            <a:endParaRPr lang="en-US" dirty="0"/>
           </a:p>
         </p:txBody>
       </p:sp>
@@ -14655,8 +14724,8 @@
         </p:blipFill>
         <p:spPr>
           <a:xfrm>
-            <a:off x="4191000" y="825758"/>
-            <a:ext cx="4953000" cy="5194042"/>
+            <a:off x="5638800" y="704164"/>
+            <a:ext cx="2286000" cy="3886200"/>
           </a:xfrm>
           <a:prstGeom prst="rect">
             <a:avLst/>
@@ -14666,7 +14735,7 @@
     </p:spTree>
     <p:extLst>
       <p:ext uri="{BB962C8B-B14F-4D97-AF65-F5344CB8AC3E}">
-        <p14:creationId xmlns:p14="http://schemas.microsoft.com/office/powerpoint/2010/main" val="3021268193"/>
+        <p14:creationId xmlns:p14="http://schemas.microsoft.com/office/powerpoint/2010/main" val="3494525142"/>
       </p:ext>
     </p:extLst>
   </p:cSld>
@@ -14702,21 +14771,22 @@
       </p:grpSpPr>
       <p:sp>
         <p:nvSpPr>
-          <p:cNvPr id="4" name="Rectangle 3"/>
-          <p:cNvSpPr/>
-          <p:nvPr/>
-        </p:nvSpPr>
-        <p:spPr>
-          <a:xfrm>
-            <a:off x="152400" y="152400"/>
-            <a:ext cx="2620526" cy="369332"/>
-          </a:xfrm>
-          <a:prstGeom prst="rect">
-            <a:avLst/>
-          </a:prstGeom>
-        </p:spPr>
-        <p:txBody>
-          <a:bodyPr wrap="none">
+          <p:cNvPr id="4" name="TextBox 3"/>
+          <p:cNvSpPr txBox="1"/>
+          <p:nvPr/>
+        </p:nvSpPr>
+        <p:spPr>
+          <a:xfrm>
+            <a:off x="76200" y="179427"/>
+            <a:ext cx="2040302" cy="646331"/>
+          </a:xfrm>
+          <a:prstGeom prst="rect">
+            <a:avLst/>
+          </a:prstGeom>
+          <a:noFill/>
+        </p:spPr>
+        <p:txBody>
+          <a:bodyPr wrap="none" rtlCol="0">
             <a:spAutoFit/>
           </a:bodyPr>
           <a:lstStyle/>
@@ -14726,6 +14796,20 @@
               <a:buChar char="q"/>
             </a:pPr>
             <a:r>
+              <a:rPr lang="en-US" dirty="0" smtClean="0">
+                <a:solidFill>
+                  <a:srgbClr val="7030A0"/>
+                </a:solidFill>
+              </a:rPr>
+              <a:t>Buttons</a:t>
+            </a:r>
+          </a:p>
+          <a:p>
+            <a:pPr marL="742950" lvl="1" indent="-285750">
+              <a:buFont typeface="Wingdings" pitchFamily="2" charset="2"/>
+              <a:buChar char="q"/>
+            </a:pPr>
+            <a:r>
               <a:rPr lang="en-US" dirty="0" err="1">
                 <a:solidFill>
                   <a:schemeClr val="tx2">
@@ -14734,7 +14818,7 @@
                   </a:schemeClr>
                 </a:solidFill>
               </a:rPr>
-              <a:t>Buttons_MainFunction</a:t>
+              <a:t>On_Off_Init</a:t>
             </a:r>
             <a:endParaRPr lang="en-US" dirty="0">
               <a:solidFill>
@@ -14769,8 +14853,86 @@
         </p:blipFill>
         <p:spPr>
           <a:xfrm>
-            <a:off x="0" y="521732"/>
-            <a:ext cx="9144000" cy="6107668"/>
+            <a:off x="305776" y="1371600"/>
+            <a:ext cx="2589824" cy="4495800"/>
+          </a:xfrm>
+          <a:prstGeom prst="rect">
+            <a:avLst/>
+          </a:prstGeom>
+        </p:spPr>
+      </p:pic>
+      <p:sp>
+        <p:nvSpPr>
+          <p:cNvPr id="6" name="TextBox 5"/>
+          <p:cNvSpPr txBox="1"/>
+          <p:nvPr/>
+        </p:nvSpPr>
+        <p:spPr>
+          <a:xfrm>
+            <a:off x="5357237" y="456426"/>
+            <a:ext cx="2620526" cy="369332"/>
+          </a:xfrm>
+          <a:prstGeom prst="rect">
+            <a:avLst/>
+          </a:prstGeom>
+          <a:noFill/>
+        </p:spPr>
+        <p:txBody>
+          <a:bodyPr wrap="none" rtlCol="0">
+            <a:spAutoFit/>
+          </a:bodyPr>
+          <a:lstStyle/>
+          <a:p>
+            <a:pPr marL="285750" indent="-285750">
+              <a:buFont typeface="Wingdings" pitchFamily="2" charset="2"/>
+              <a:buChar char="q"/>
+            </a:pPr>
+            <a:r>
+              <a:rPr lang="en-US" dirty="0" err="1">
+                <a:solidFill>
+                  <a:schemeClr val="tx2">
+                    <a:lumMod val="60000"/>
+                    <a:lumOff val="40000"/>
+                  </a:schemeClr>
+                </a:solidFill>
+              </a:rPr>
+              <a:t>EXTI_On_Off_CallBack</a:t>
+            </a:r>
+            <a:endParaRPr lang="en-US" dirty="0">
+              <a:solidFill>
+                <a:schemeClr val="tx2">
+                  <a:lumMod val="60000"/>
+                  <a:lumOff val="40000"/>
+                </a:schemeClr>
+              </a:solidFill>
+            </a:endParaRPr>
+          </a:p>
+        </p:txBody>
+      </p:sp>
+      <p:pic>
+        <p:nvPicPr>
+          <p:cNvPr id="7" name="Picture 6"/>
+          <p:cNvPicPr>
+            <a:picLocks noChangeAspect="1"/>
+          </p:cNvPicPr>
+          <p:nvPr/>
+        </p:nvPicPr>
+        <p:blipFill>
+          <a:blip r:embed="rId3">
+            <a:extLst>
+              <a:ext uri="{28A0092B-C50C-407E-A947-70E740481C1C}">
+                <a14:useLocalDpi xmlns:a14="http://schemas.microsoft.com/office/drawing/2010/main" val="0"/>
+              </a:ext>
+            </a:extLst>
+          </a:blip>
+          <a:stretch>
+            <a:fillRect/>
+          </a:stretch>
+        </p:blipFill>
+        <p:spPr>
+          <a:xfrm>
+            <a:off x="4191000" y="825758"/>
+            <a:ext cx="4953000" cy="5194042"/>
           </a:xfrm>
           <a:prstGeom prst="rect">
             <a:avLst/>
@@ -14780,7 +14942,7 @@
     </p:spTree>
     <p:extLst>
       <p:ext uri="{BB962C8B-B14F-4D97-AF65-F5344CB8AC3E}">
-        <p14:creationId xmlns:p14="http://schemas.microsoft.com/office/powerpoint/2010/main" val="245643069"/>
+        <p14:creationId xmlns:p14="http://schemas.microsoft.com/office/powerpoint/2010/main" val="3021268193"/>
       </p:ext>
     </p:extLst>
   </p:cSld>
@@ -14816,22 +14978,21 @@
       </p:grpSpPr>
       <p:sp>
         <p:nvSpPr>
-          <p:cNvPr id="6" name="TextBox 5"/>
-          <p:cNvSpPr txBox="1"/>
-          <p:nvPr/>
-        </p:nvSpPr>
-        <p:spPr>
-          <a:xfrm>
-            <a:off x="76200" y="179427"/>
-            <a:ext cx="2226379" cy="646331"/>
-          </a:xfrm>
-          <a:prstGeom prst="rect">
-            <a:avLst/>
-          </a:prstGeom>
-          <a:noFill/>
-        </p:spPr>
-        <p:txBody>
-          <a:bodyPr wrap="none" rtlCol="0">
+          <p:cNvPr id="4" name="Rectangle 3"/>
+          <p:cNvSpPr/>
+          <p:nvPr/>
+        </p:nvSpPr>
+        <p:spPr>
+          <a:xfrm>
+            <a:off x="152400" y="152400"/>
+            <a:ext cx="2620526" cy="369332"/>
+          </a:xfrm>
+          <a:prstGeom prst="rect">
+            <a:avLst/>
+          </a:prstGeom>
+        </p:spPr>
+        <p:txBody>
+          <a:bodyPr wrap="none">
             <a:spAutoFit/>
           </a:bodyPr>
           <a:lstStyle/>
@@ -14841,20 +15002,6 @@
               <a:buChar char="q"/>
             </a:pPr>
             <a:r>
-              <a:rPr lang="en-US" dirty="0" smtClean="0">
-                <a:solidFill>
-                  <a:srgbClr val="7030A0"/>
-                </a:solidFill>
-              </a:rPr>
-              <a:t>Elements</a:t>
-            </a:r>
-          </a:p>
-          <a:p>
-            <a:pPr marL="742950" lvl="1" indent="-285750">
-              <a:buFont typeface="Wingdings" pitchFamily="2" charset="2"/>
-              <a:buChar char="q"/>
-            </a:pPr>
-            <a:r>
               <a:rPr lang="en-US" dirty="0" err="1">
                 <a:solidFill>
                   <a:schemeClr val="tx2">
@@ -14863,7 +15010,7 @@
                   </a:schemeClr>
                 </a:solidFill>
               </a:rPr>
-              <a:t>Elements_Init</a:t>
+              <a:t>Buttons_MainFunction</a:t>
             </a:r>
             <a:endParaRPr lang="en-US" dirty="0">
               <a:solidFill>
@@ -14878,7 +15025,7 @@
       </p:sp>
       <p:pic>
         <p:nvPicPr>
-          <p:cNvPr id="7" name="Picture 6"/>
+          <p:cNvPr id="5" name="Picture 4"/>
           <p:cNvPicPr>
             <a:picLocks noChangeAspect="1"/>
           </p:cNvPicPr>
@@ -14898,86 +15045,8 @@
         </p:blipFill>
         <p:spPr>
           <a:xfrm>
-            <a:off x="381000" y="1143000"/>
-            <a:ext cx="1524000" cy="5257800"/>
-          </a:xfrm>
-          <a:prstGeom prst="rect">
-            <a:avLst/>
-          </a:prstGeom>
-        </p:spPr>
-      </p:pic>
-      <p:sp>
-        <p:nvSpPr>
-          <p:cNvPr id="8" name="TextBox 7"/>
-          <p:cNvSpPr txBox="1"/>
-          <p:nvPr/>
-        </p:nvSpPr>
-        <p:spPr>
-          <a:xfrm>
-            <a:off x="4648200" y="456426"/>
-            <a:ext cx="2758576" cy="369332"/>
-          </a:xfrm>
-          <a:prstGeom prst="rect">
-            <a:avLst/>
-          </a:prstGeom>
-          <a:noFill/>
-        </p:spPr>
-        <p:txBody>
-          <a:bodyPr wrap="none" rtlCol="0">
-            <a:spAutoFit/>
-          </a:bodyPr>
-          <a:lstStyle/>
-          <a:p>
-            <a:pPr marL="285750" indent="-285750">
-              <a:buFont typeface="Wingdings" pitchFamily="2" charset="2"/>
-              <a:buChar char="q"/>
-            </a:pPr>
-            <a:r>
-              <a:rPr lang="en-US" dirty="0" err="1">
-                <a:solidFill>
-                  <a:schemeClr val="tx2">
-                    <a:lumMod val="60000"/>
-                    <a:lumOff val="40000"/>
-                  </a:schemeClr>
-                </a:solidFill>
-              </a:rPr>
-              <a:t>Elements_MainFunction</a:t>
-            </a:r>
-            <a:endParaRPr lang="en-US" dirty="0">
-              <a:solidFill>
-                <a:schemeClr val="tx2">
-                  <a:lumMod val="60000"/>
-                  <a:lumOff val="40000"/>
-                </a:schemeClr>
-              </a:solidFill>
-            </a:endParaRPr>
-          </a:p>
-        </p:txBody>
-      </p:sp>
-      <p:pic>
-        <p:nvPicPr>
-          <p:cNvPr id="9" name="Picture 8"/>
-          <p:cNvPicPr>
-            <a:picLocks noChangeAspect="1"/>
-          </p:cNvPicPr>
-          <p:nvPr/>
-        </p:nvPicPr>
-        <p:blipFill>
-          <a:blip r:embed="rId3">
-            <a:extLst>
-              <a:ext uri="{28A0092B-C50C-407E-A947-70E740481C1C}">
-                <a14:useLocalDpi xmlns:a14="http://schemas.microsoft.com/office/drawing/2010/main" val="0"/>
-              </a:ext>
-            </a:extLst>
-          </a:blip>
-          <a:stretch>
-            <a:fillRect/>
-          </a:stretch>
-        </p:blipFill>
-        <p:spPr>
-          <a:xfrm>
-            <a:off x="2514600" y="1110343"/>
-            <a:ext cx="6553200" cy="5715000"/>
+            <a:off x="0" y="521732"/>
+            <a:ext cx="9144000" cy="6107668"/>
           </a:xfrm>
           <a:prstGeom prst="rect">
             <a:avLst/>
@@ -14987,7 +15056,7 @@
     </p:spTree>
     <p:extLst>
       <p:ext uri="{BB962C8B-B14F-4D97-AF65-F5344CB8AC3E}">
-        <p14:creationId xmlns:p14="http://schemas.microsoft.com/office/powerpoint/2010/main" val="4107321591"/>
+        <p14:creationId xmlns:p14="http://schemas.microsoft.com/office/powerpoint/2010/main" val="245643069"/>
       </p:ext>
     </p:extLst>
   </p:cSld>

</xml_diff>

<commit_message>
add comments in code
</commit_message>
<xml_diff>
--- a/WaterHeater.pptx
+++ b/WaterHeater.pptx
@@ -4731,6 +4731,17 @@
               </a:rPr>
               <a:t>MODE</a:t>
             </a:r>
+          </a:p>
+          <a:p>
+            <a:pPr algn="ctr"/>
+            <a:r>
+              <a:rPr lang="en-US" b="1" dirty="0" smtClean="0">
+                <a:solidFill>
+                  <a:schemeClr val="tx1"/>
+                </a:solidFill>
+              </a:rPr>
+              <a:t>MANAGER</a:t>
+            </a:r>
             <a:endParaRPr lang="en-US" b="1" dirty="0">
               <a:solidFill>
                 <a:schemeClr val="tx1"/>
@@ -8414,8 +8425,8 @@
         </p:nvSpPr>
         <p:spPr>
           <a:xfrm>
-            <a:off x="-13613" y="3726806"/>
-            <a:ext cx="2841170" cy="1077218"/>
+            <a:off x="-13614" y="3726806"/>
+            <a:ext cx="3595014" cy="1077218"/>
           </a:xfrm>
           <a:prstGeom prst="rect">
             <a:avLst/>
@@ -8450,7 +8461,7 @@
               <a:buChar char="q"/>
             </a:pPr>
             <a:r>
-              <a:rPr lang="en-US" sz="1600" b="1" dirty="0" smtClean="0">
+              <a:rPr lang="en-US" sz="1600" b="1" dirty="0" err="1" smtClean="0">
                 <a:solidFill>
                   <a:schemeClr val="tx2">
                     <a:lumMod val="60000"/>
@@ -8458,8 +8469,16 @@
                   </a:schemeClr>
                 </a:solidFill>
               </a:rPr>
-              <a:t>Mode_Init</a:t>
-            </a:r>
+              <a:t>ModeManager_Init</a:t>
+            </a:r>
+            <a:endParaRPr lang="en-US" sz="1600" b="1" dirty="0" smtClean="0">
+              <a:solidFill>
+                <a:schemeClr val="tx2">
+                  <a:lumMod val="60000"/>
+                  <a:lumOff val="40000"/>
+                </a:schemeClr>
+              </a:solidFill>
+            </a:endParaRPr>
           </a:p>
           <a:p>
             <a:pPr marL="800100" lvl="1" indent="-342900">
@@ -8467,7 +8486,7 @@
               <a:buChar char="q"/>
             </a:pPr>
             <a:r>
-              <a:rPr lang="en-US" sz="1600" b="1" dirty="0" smtClean="0">
+              <a:rPr lang="en-US" sz="1600" b="1" dirty="0" err="1">
                 <a:solidFill>
                   <a:schemeClr val="tx2">
                     <a:lumMod val="60000"/>
@@ -8475,8 +8494,16 @@
                   </a:schemeClr>
                 </a:solidFill>
               </a:rPr>
-              <a:t>Mode_MainFunction</a:t>
-            </a:r>
+              <a:t>ModeManage_MainFunction</a:t>
+            </a:r>
+            <a:endParaRPr lang="en-US" sz="1600" b="1" dirty="0" smtClean="0">
+              <a:solidFill>
+                <a:schemeClr val="tx2">
+                  <a:lumMod val="60000"/>
+                  <a:lumOff val="40000"/>
+                </a:schemeClr>
+              </a:solidFill>
+            </a:endParaRPr>
           </a:p>
           <a:p>
             <a:pPr marL="800100" lvl="1" indent="-342900">
@@ -8484,7 +8511,7 @@
               <a:buChar char="q"/>
             </a:pPr>
             <a:r>
-              <a:rPr lang="en-US" sz="1600" b="1" dirty="0" smtClean="0">
+              <a:rPr lang="en-US" sz="1600" b="1" dirty="0" err="1" smtClean="0">
                 <a:solidFill>
                   <a:schemeClr val="tx2">
                     <a:lumMod val="60000"/>
@@ -8492,7 +8519,7 @@
                   </a:schemeClr>
                 </a:solidFill>
               </a:rPr>
-              <a:t>Start_Setting_Timer</a:t>
+              <a:t>Mode_Setting_Timer</a:t>
             </a:r>
             <a:endParaRPr lang="en-US" sz="1600" dirty="0" smtClean="0"/>
           </a:p>
@@ -9014,7 +9041,7 @@
         </p:nvSpPr>
         <p:spPr>
           <a:xfrm>
-            <a:off x="2935049" y="3238579"/>
+            <a:off x="3088815" y="3238579"/>
             <a:ext cx="2841170" cy="2554545"/>
           </a:xfrm>
           <a:prstGeom prst="rect">
@@ -12866,7 +12893,7 @@
         </p:nvSpPr>
         <p:spPr>
           <a:xfrm>
-            <a:off x="5257800" y="1099457"/>
+            <a:off x="6019800" y="1077686"/>
             <a:ext cx="152400" cy="1066800"/>
           </a:xfrm>
           <a:prstGeom prst="rect">
@@ -12998,7 +13025,7 @@
         </p:nvSpPr>
         <p:spPr>
           <a:xfrm>
-            <a:off x="5334000" y="2667000"/>
+            <a:off x="6019800" y="2515267"/>
             <a:ext cx="152400" cy="1066800"/>
           </a:xfrm>
           <a:prstGeom prst="rect">
@@ -13146,7 +13173,7 @@
         </p:nvSpPr>
         <p:spPr>
           <a:xfrm>
-            <a:off x="5431972" y="1120838"/>
+            <a:off x="6422572" y="1120838"/>
             <a:ext cx="1045028" cy="646331"/>
           </a:xfrm>
           <a:prstGeom prst="rect">
@@ -13211,7 +13238,7 @@
         <p:spPr>
           <a:xfrm>
             <a:off x="3505200" y="2696251"/>
-            <a:ext cx="1409700" cy="646331"/>
+            <a:ext cx="2133600" cy="646331"/>
           </a:xfrm>
           <a:prstGeom prst="rect">
             <a:avLst/>
@@ -13226,7 +13253,11 @@
           <a:p>
             <a:r>
               <a:rPr lang="en-US" dirty="0" smtClean="0"/>
-              <a:t>MODE Task @500ms</a:t>
+              <a:t>ModeManager </a:t>
+            </a:r>
+            <a:r>
+              <a:rPr lang="en-US" dirty="0" smtClean="0"/>
+              <a:t>Task @500ms</a:t>
             </a:r>
             <a:endParaRPr lang="en-US" dirty="0"/>
           </a:p>
@@ -13240,7 +13271,7 @@
         </p:nvSpPr>
         <p:spPr>
           <a:xfrm>
-            <a:off x="5486400" y="2696251"/>
+            <a:off x="6539593" y="2659503"/>
             <a:ext cx="1676400" cy="646331"/>
           </a:xfrm>
           <a:prstGeom prst="rect">

</xml_diff>

<commit_message>
add power point after merge with last change of code
</commit_message>
<xml_diff>
--- a/WaterHeater.pptx
+++ b/WaterHeater.pptx
@@ -22,13 +22,14 @@
     <p:sldId id="269" r:id="rId16"/>
     <p:sldId id="270" r:id="rId17"/>
     <p:sldId id="271" r:id="rId18"/>
-    <p:sldId id="272" r:id="rId19"/>
-    <p:sldId id="273" r:id="rId20"/>
-    <p:sldId id="274" r:id="rId21"/>
-    <p:sldId id="275" r:id="rId22"/>
-    <p:sldId id="276" r:id="rId23"/>
-    <p:sldId id="277" r:id="rId24"/>
-    <p:sldId id="278" r:id="rId25"/>
+    <p:sldId id="280" r:id="rId19"/>
+    <p:sldId id="272" r:id="rId20"/>
+    <p:sldId id="273" r:id="rId21"/>
+    <p:sldId id="274" r:id="rId22"/>
+    <p:sldId id="275" r:id="rId23"/>
+    <p:sldId id="276" r:id="rId24"/>
+    <p:sldId id="277" r:id="rId25"/>
+    <p:sldId id="278" r:id="rId26"/>
   </p:sldIdLst>
   <p:sldSz cx="9144000" cy="6858000" type="screen4x3"/>
   <p:notesSz cx="6858000" cy="9144000"/>
@@ -7396,8 +7397,8 @@
         </p:nvSpPr>
         <p:spPr>
           <a:xfrm>
-            <a:off x="152400" y="162520"/>
-            <a:ext cx="2351028" cy="369332"/>
+            <a:off x="173648" y="149304"/>
+            <a:ext cx="2459648" cy="369332"/>
           </a:xfrm>
           <a:prstGeom prst="rect">
             <a:avLst/>
@@ -7415,7 +7416,7 @@
               <a:buChar char="q"/>
             </a:pPr>
             <a:r>
-              <a:rPr lang="en-US" dirty="0">
+              <a:rPr lang="en-US" dirty="0" err="1" smtClean="0">
                 <a:solidFill>
                   <a:schemeClr val="tx2">
                     <a:lumMod val="60000"/>
@@ -7423,8 +7424,16 @@
                   </a:schemeClr>
                 </a:solidFill>
               </a:rPr>
-              <a:t>Start_Setting_Timer</a:t>
-            </a:r>
+              <a:t>Mode_Setting_Timer</a:t>
+            </a:r>
+            <a:endParaRPr lang="en-US" dirty="0">
+              <a:solidFill>
+                <a:schemeClr val="tx2">
+                  <a:lumMod val="60000"/>
+                  <a:lumOff val="40000"/>
+                </a:schemeClr>
+              </a:solidFill>
+            </a:endParaRPr>
           </a:p>
         </p:txBody>
       </p:sp>
@@ -7581,14 +7590,14 @@
       </p:pic>
       <p:sp>
         <p:nvSpPr>
-          <p:cNvPr id="7" name="TextBox 6"/>
+          <p:cNvPr id="9" name="TextBox 8"/>
           <p:cNvSpPr txBox="1"/>
           <p:nvPr/>
         </p:nvSpPr>
         <p:spPr>
           <a:xfrm>
-            <a:off x="5562600" y="179427"/>
-            <a:ext cx="2324291" cy="646331"/>
+            <a:off x="5352406" y="456426"/>
+            <a:ext cx="3095784" cy="369332"/>
           </a:xfrm>
           <a:prstGeom prst="rect">
             <a:avLst/>
@@ -7606,25 +7615,6 @@
               <a:buChar char="q"/>
             </a:pPr>
             <a:r>
-              <a:rPr lang="en-US" dirty="0">
-                <a:solidFill>
-                  <a:srgbClr val="7030A0"/>
-                </a:solidFill>
-              </a:rPr>
-              <a:t>Average</a:t>
-            </a:r>
-            <a:endParaRPr lang="en-US" dirty="0" smtClean="0">
-              <a:solidFill>
-                <a:srgbClr val="7030A0"/>
-              </a:solidFill>
-            </a:endParaRPr>
-          </a:p>
-          <a:p>
-            <a:pPr marL="742950" lvl="1" indent="-285750">
-              <a:buFont typeface="Wingdings" pitchFamily="2" charset="2"/>
-              <a:buChar char="q"/>
-            </a:pPr>
-            <a:r>
               <a:rPr lang="en-US" dirty="0" err="1">
                 <a:solidFill>
                   <a:schemeClr val="tx2">
@@ -7633,7 +7623,7 @@
                   </a:schemeClr>
                 </a:solidFill>
               </a:rPr>
-              <a:t>Average_Value</a:t>
+              <a:t>Temperature_MainFunction</a:t>
             </a:r>
             <a:endParaRPr lang="en-US" dirty="0">
               <a:solidFill>
@@ -7648,7 +7638,7 @@
       </p:sp>
       <p:pic>
         <p:nvPicPr>
-          <p:cNvPr id="8" name="Picture 7"/>
+          <p:cNvPr id="5" name="Picture 4"/>
           <p:cNvPicPr>
             <a:picLocks noChangeAspect="1"/>
           </p:cNvPicPr>
@@ -7668,8 +7658,8 @@
         </p:blipFill>
         <p:spPr>
           <a:xfrm>
-            <a:off x="4876800" y="1171575"/>
-            <a:ext cx="4191000" cy="4781550"/>
+            <a:off x="4648200" y="1476375"/>
+            <a:ext cx="3876190" cy="4343400"/>
           </a:xfrm>
           <a:prstGeom prst="rect">
             <a:avLst/>
@@ -7715,14 +7705,14 @@
       </p:grpSpPr>
       <p:sp>
         <p:nvSpPr>
-          <p:cNvPr id="4" name="TextBox 3"/>
+          <p:cNvPr id="5" name="TextBox 4"/>
           <p:cNvSpPr txBox="1"/>
           <p:nvPr/>
         </p:nvSpPr>
         <p:spPr>
           <a:xfrm>
-            <a:off x="76200" y="179427"/>
-            <a:ext cx="2753895" cy="646331"/>
+            <a:off x="228600" y="228599"/>
+            <a:ext cx="2324291" cy="646331"/>
           </a:xfrm>
           <a:prstGeom prst="rect">
             <a:avLst/>
@@ -7745,7 +7735,7 @@
                   <a:srgbClr val="7030A0"/>
                 </a:solidFill>
               </a:rPr>
-              <a:t>EEPROM</a:t>
+              <a:t>Average</a:t>
             </a:r>
             <a:endParaRPr lang="en-US" dirty="0" smtClean="0">
               <a:solidFill>
@@ -7767,7 +7757,7 @@
                   </a:schemeClr>
                 </a:solidFill>
               </a:rPr>
-              <a:t>Get_EEPROM_Data</a:t>
+              <a:t>Average_Value</a:t>
             </a:r>
             <a:endParaRPr lang="en-US" dirty="0">
               <a:solidFill>
@@ -7802,86 +7792,8 @@
         </p:blipFill>
         <p:spPr>
           <a:xfrm>
-            <a:off x="76200" y="990599"/>
-            <a:ext cx="6019800" cy="5714999"/>
-          </a:xfrm>
-          <a:prstGeom prst="rect">
-            <a:avLst/>
-          </a:prstGeom>
-        </p:spPr>
-      </p:pic>
-      <p:sp>
-        <p:nvSpPr>
-          <p:cNvPr id="7" name="TextBox 6"/>
-          <p:cNvSpPr txBox="1"/>
-          <p:nvPr/>
-        </p:nvSpPr>
-        <p:spPr>
-          <a:xfrm>
-            <a:off x="6172200" y="187404"/>
-            <a:ext cx="1872757" cy="369332"/>
-          </a:xfrm>
-          <a:prstGeom prst="rect">
-            <a:avLst/>
-          </a:prstGeom>
-          <a:noFill/>
-        </p:spPr>
-        <p:txBody>
-          <a:bodyPr wrap="none" rtlCol="0">
-            <a:spAutoFit/>
-          </a:bodyPr>
-          <a:lstStyle/>
-          <a:p>
-            <a:pPr marL="285750" indent="-285750">
-              <a:buFont typeface="Wingdings" pitchFamily="2" charset="2"/>
-              <a:buChar char="q"/>
-            </a:pPr>
-            <a:r>
-              <a:rPr lang="en-US" dirty="0" err="1">
-                <a:solidFill>
-                  <a:schemeClr val="tx2">
-                    <a:lumMod val="60000"/>
-                    <a:lumOff val="40000"/>
-                  </a:schemeClr>
-                </a:solidFill>
-              </a:rPr>
-              <a:t>EEPROM_Read</a:t>
-            </a:r>
-            <a:endParaRPr lang="en-US" dirty="0">
-              <a:solidFill>
-                <a:schemeClr val="tx2">
-                  <a:lumMod val="60000"/>
-                  <a:lumOff val="40000"/>
-                </a:schemeClr>
-              </a:solidFill>
-            </a:endParaRPr>
-          </a:p>
-        </p:txBody>
-      </p:sp>
-      <p:pic>
-        <p:nvPicPr>
-          <p:cNvPr id="2" name="Picture 1"/>
-          <p:cNvPicPr>
-            <a:picLocks noChangeAspect="1"/>
-          </p:cNvPicPr>
-          <p:nvPr/>
-        </p:nvPicPr>
-        <p:blipFill>
-          <a:blip r:embed="rId3">
-            <a:extLst>
-              <a:ext uri="{28A0092B-C50C-407E-A947-70E740481C1C}">
-                <a14:useLocalDpi xmlns:a14="http://schemas.microsoft.com/office/drawing/2010/main" val="0"/>
-              </a:ext>
-            </a:extLst>
-          </a:blip>
-          <a:stretch>
-            <a:fillRect/>
-          </a:stretch>
-        </p:blipFill>
-        <p:spPr>
-          <a:xfrm>
-            <a:off x="6934200" y="685800"/>
-            <a:ext cx="1447800" cy="6019797"/>
+            <a:off x="1219200" y="1447800"/>
+            <a:ext cx="4191000" cy="4781550"/>
           </a:xfrm>
           <a:prstGeom prst="rect">
             <a:avLst/>
@@ -7891,20 +7803,13 @@
     </p:spTree>
     <p:extLst>
       <p:ext uri="{BB962C8B-B14F-4D97-AF65-F5344CB8AC3E}">
-        <p14:creationId xmlns:p14="http://schemas.microsoft.com/office/powerpoint/2010/main" val="903947157"/>
+        <p14:creationId xmlns:p14="http://schemas.microsoft.com/office/powerpoint/2010/main" val="2542264048"/>
       </p:ext>
     </p:extLst>
   </p:cSld>
   <p:clrMapOvr>
     <a:masterClrMapping/>
   </p:clrMapOvr>
-  <p:timing>
-    <p:tnLst>
-      <p:par>
-        <p:cTn id="1" dur="indefinite" restart="never" nodeType="tmRoot"/>
-      </p:par>
-    </p:tnLst>
-  </p:timing>
 </p:sld>
 </file>
 
@@ -7933,8 +7838,8 @@
         </p:nvSpPr>
         <p:spPr>
           <a:xfrm>
-            <a:off x="152400" y="205769"/>
-            <a:ext cx="2252155" cy="369332"/>
+            <a:off x="76200" y="179427"/>
+            <a:ext cx="2753895" cy="646331"/>
           </a:xfrm>
           <a:prstGeom prst="rect">
             <a:avLst/>
@@ -7952,6 +7857,25 @@
               <a:buChar char="q"/>
             </a:pPr>
             <a:r>
+              <a:rPr lang="en-US" dirty="0">
+                <a:solidFill>
+                  <a:srgbClr val="7030A0"/>
+                </a:solidFill>
+              </a:rPr>
+              <a:t>EEPROM</a:t>
+            </a:r>
+            <a:endParaRPr lang="en-US" dirty="0" smtClean="0">
+              <a:solidFill>
+                <a:srgbClr val="7030A0"/>
+              </a:solidFill>
+            </a:endParaRPr>
+          </a:p>
+          <a:p>
+            <a:pPr marL="742950" lvl="1" indent="-285750">
+              <a:buFont typeface="Wingdings" pitchFamily="2" charset="2"/>
+              <a:buChar char="q"/>
+            </a:pPr>
+            <a:r>
               <a:rPr lang="en-US" dirty="0" err="1">
                 <a:solidFill>
                   <a:schemeClr val="tx2">
@@ -7960,7 +7884,7 @@
                   </a:schemeClr>
                 </a:solidFill>
               </a:rPr>
-              <a:t>Set_EEPROM_Data</a:t>
+              <a:t>Get_EEPROM_Data</a:t>
             </a:r>
             <a:endParaRPr lang="en-US" dirty="0">
               <a:solidFill>
@@ -7975,7 +7899,7 @@
       </p:sp>
       <p:pic>
         <p:nvPicPr>
-          <p:cNvPr id="5" name="Picture 4"/>
+          <p:cNvPr id="6" name="Picture 5"/>
           <p:cNvPicPr>
             <a:picLocks noChangeAspect="1"/>
           </p:cNvPicPr>
@@ -7995,8 +7919,8 @@
         </p:blipFill>
         <p:spPr>
           <a:xfrm>
-            <a:off x="0" y="819150"/>
-            <a:ext cx="4800600" cy="5410200"/>
+            <a:off x="76200" y="990599"/>
+            <a:ext cx="6019800" cy="5714999"/>
           </a:xfrm>
           <a:prstGeom prst="rect">
             <a:avLst/>
@@ -8005,14 +7929,14 @@
       </p:pic>
       <p:sp>
         <p:nvSpPr>
-          <p:cNvPr id="6" name="TextBox 5"/>
+          <p:cNvPr id="7" name="TextBox 6"/>
           <p:cNvSpPr txBox="1"/>
           <p:nvPr/>
         </p:nvSpPr>
         <p:spPr>
           <a:xfrm>
-            <a:off x="6324599" y="205769"/>
-            <a:ext cx="1925271" cy="369332"/>
+            <a:off x="6172200" y="187404"/>
+            <a:ext cx="1872757" cy="369332"/>
           </a:xfrm>
           <a:prstGeom prst="rect">
             <a:avLst/>
@@ -8038,7 +7962,7 @@
                   </a:schemeClr>
                 </a:solidFill>
               </a:rPr>
-              <a:t>EEPROM_Write</a:t>
+              <a:t>EEPROM_Read</a:t>
             </a:r>
             <a:endParaRPr lang="en-US" dirty="0">
               <a:solidFill>
@@ -8073,8 +7997,8 @@
         </p:blipFill>
         <p:spPr>
           <a:xfrm>
-            <a:off x="6781800" y="685800"/>
-            <a:ext cx="1257143" cy="6019800"/>
+            <a:off x="6934200" y="685800"/>
+            <a:ext cx="1447800" cy="6019797"/>
           </a:xfrm>
           <a:prstGeom prst="rect">
             <a:avLst/>
@@ -8084,7 +8008,7 @@
     </p:spTree>
     <p:extLst>
       <p:ext uri="{BB962C8B-B14F-4D97-AF65-F5344CB8AC3E}">
-        <p14:creationId xmlns:p14="http://schemas.microsoft.com/office/powerpoint/2010/main" val="1602406984"/>
+        <p14:creationId xmlns:p14="http://schemas.microsoft.com/office/powerpoint/2010/main" val="903947157"/>
       </p:ext>
     </p:extLst>
   </p:cSld>
@@ -9584,8 +9508,8 @@
         </p:nvSpPr>
         <p:spPr>
           <a:xfrm>
-            <a:off x="76200" y="179427"/>
-            <a:ext cx="2292615" cy="646331"/>
+            <a:off x="152400" y="205769"/>
+            <a:ext cx="2252155" cy="369332"/>
           </a:xfrm>
           <a:prstGeom prst="rect">
             <a:avLst/>
@@ -9603,25 +9527,6 @@
               <a:buChar char="q"/>
             </a:pPr>
             <a:r>
-              <a:rPr lang="en-US" dirty="0">
-                <a:solidFill>
-                  <a:srgbClr val="7030A0"/>
-                </a:solidFill>
-              </a:rPr>
-              <a:t>Scheduler</a:t>
-            </a:r>
-            <a:endParaRPr lang="en-US" dirty="0" smtClean="0">
-              <a:solidFill>
-                <a:srgbClr val="7030A0"/>
-              </a:solidFill>
-            </a:endParaRPr>
-          </a:p>
-          <a:p>
-            <a:pPr marL="742950" lvl="1" indent="-285750">
-              <a:buFont typeface="Wingdings" pitchFamily="2" charset="2"/>
-              <a:buChar char="q"/>
-            </a:pPr>
-            <a:r>
               <a:rPr lang="en-US" dirty="0" err="1">
                 <a:solidFill>
                   <a:schemeClr val="tx2">
@@ -9630,7 +9535,7 @@
                   </a:schemeClr>
                 </a:solidFill>
               </a:rPr>
-              <a:t>Scheduler_Init</a:t>
+              <a:t>Set_EEPROM_Data</a:t>
             </a:r>
             <a:endParaRPr lang="en-US" dirty="0">
               <a:solidFill>
@@ -9665,8 +9570,8 @@
         </p:blipFill>
         <p:spPr>
           <a:xfrm>
-            <a:off x="104775" y="1619250"/>
-            <a:ext cx="2819400" cy="4038600"/>
+            <a:off x="0" y="819150"/>
+            <a:ext cx="4800600" cy="5410200"/>
           </a:xfrm>
           <a:prstGeom prst="rect">
             <a:avLst/>
@@ -9681,8 +9586,8 @@
         </p:nvSpPr>
         <p:spPr>
           <a:xfrm>
-            <a:off x="5714999" y="456426"/>
-            <a:ext cx="2680157" cy="369332"/>
+            <a:off x="6324599" y="205769"/>
+            <a:ext cx="1925271" cy="369332"/>
           </a:xfrm>
           <a:prstGeom prst="rect">
             <a:avLst/>
@@ -9708,7 +9613,7 @@
                   </a:schemeClr>
                 </a:solidFill>
               </a:rPr>
-              <a:t>Scheduler_ActivateTask</a:t>
+              <a:t>EEPROM_Write</a:t>
             </a:r>
             <a:endParaRPr lang="en-US" dirty="0">
               <a:solidFill>
@@ -9723,7 +9628,7 @@
       </p:sp>
       <p:pic>
         <p:nvPicPr>
-          <p:cNvPr id="8" name="Picture 7"/>
+          <p:cNvPr id="2" name="Picture 1"/>
           <p:cNvPicPr>
             <a:picLocks noChangeAspect="1"/>
           </p:cNvPicPr>
@@ -9743,8 +9648,8 @@
         </p:blipFill>
         <p:spPr>
           <a:xfrm>
-            <a:off x="4092117" y="1885950"/>
-            <a:ext cx="5042357" cy="3810000"/>
+            <a:off x="6781800" y="685800"/>
+            <a:ext cx="1257143" cy="6019800"/>
           </a:xfrm>
           <a:prstGeom prst="rect">
             <a:avLst/>
@@ -9754,7 +9659,7 @@
     </p:spTree>
     <p:extLst>
       <p:ext uri="{BB962C8B-B14F-4D97-AF65-F5344CB8AC3E}">
-        <p14:creationId xmlns:p14="http://schemas.microsoft.com/office/powerpoint/2010/main" val="3436191451"/>
+        <p14:creationId xmlns:p14="http://schemas.microsoft.com/office/powerpoint/2010/main" val="1602406984"/>
       </p:ext>
     </p:extLst>
   </p:cSld>
@@ -9796,8 +9701,8 @@
         </p:nvSpPr>
         <p:spPr>
           <a:xfrm>
-            <a:off x="152399" y="104685"/>
-            <a:ext cx="1969193" cy="369332"/>
+            <a:off x="76200" y="179427"/>
+            <a:ext cx="2292615" cy="646331"/>
           </a:xfrm>
           <a:prstGeom prst="rect">
             <a:avLst/>
@@ -9815,6 +9720,25 @@
               <a:buChar char="q"/>
             </a:pPr>
             <a:r>
+              <a:rPr lang="en-US" dirty="0">
+                <a:solidFill>
+                  <a:srgbClr val="7030A0"/>
+                </a:solidFill>
+              </a:rPr>
+              <a:t>Scheduler</a:t>
+            </a:r>
+            <a:endParaRPr lang="en-US" dirty="0" smtClean="0">
+              <a:solidFill>
+                <a:srgbClr val="7030A0"/>
+              </a:solidFill>
+            </a:endParaRPr>
+          </a:p>
+          <a:p>
+            <a:pPr marL="742950" lvl="1" indent="-285750">
+              <a:buFont typeface="Wingdings" pitchFamily="2" charset="2"/>
+              <a:buChar char="q"/>
+            </a:pPr>
+            <a:r>
               <a:rPr lang="en-US" dirty="0" err="1">
                 <a:solidFill>
                   <a:schemeClr val="tx2">
@@ -9823,7 +9747,7 @@
                   </a:schemeClr>
                 </a:solidFill>
               </a:rPr>
-              <a:t>Scheduler_Start</a:t>
+              <a:t>Scheduler_Init</a:t>
             </a:r>
             <a:endParaRPr lang="en-US" dirty="0">
               <a:solidFill>
@@ -9858,8 +9782,86 @@
         </p:blipFill>
         <p:spPr>
           <a:xfrm>
-            <a:off x="1143000" y="866775"/>
-            <a:ext cx="5791200" cy="4876800"/>
+            <a:off x="104775" y="1619250"/>
+            <a:ext cx="2819400" cy="4038600"/>
+          </a:xfrm>
+          <a:prstGeom prst="rect">
+            <a:avLst/>
+          </a:prstGeom>
+        </p:spPr>
+      </p:pic>
+      <p:sp>
+        <p:nvSpPr>
+          <p:cNvPr id="6" name="TextBox 5"/>
+          <p:cNvSpPr txBox="1"/>
+          <p:nvPr/>
+        </p:nvSpPr>
+        <p:spPr>
+          <a:xfrm>
+            <a:off x="5714999" y="456426"/>
+            <a:ext cx="2680157" cy="369332"/>
+          </a:xfrm>
+          <a:prstGeom prst="rect">
+            <a:avLst/>
+          </a:prstGeom>
+          <a:noFill/>
+        </p:spPr>
+        <p:txBody>
+          <a:bodyPr wrap="none" rtlCol="0">
+            <a:spAutoFit/>
+          </a:bodyPr>
+          <a:lstStyle/>
+          <a:p>
+            <a:pPr marL="285750" indent="-285750">
+              <a:buFont typeface="Wingdings" pitchFamily="2" charset="2"/>
+              <a:buChar char="q"/>
+            </a:pPr>
+            <a:r>
+              <a:rPr lang="en-US" dirty="0" err="1">
+                <a:solidFill>
+                  <a:schemeClr val="tx2">
+                    <a:lumMod val="60000"/>
+                    <a:lumOff val="40000"/>
+                  </a:schemeClr>
+                </a:solidFill>
+              </a:rPr>
+              <a:t>Scheduler_ActivateTask</a:t>
+            </a:r>
+            <a:endParaRPr lang="en-US" dirty="0">
+              <a:solidFill>
+                <a:schemeClr val="tx2">
+                  <a:lumMod val="60000"/>
+                  <a:lumOff val="40000"/>
+                </a:schemeClr>
+              </a:solidFill>
+            </a:endParaRPr>
+          </a:p>
+        </p:txBody>
+      </p:sp>
+      <p:pic>
+        <p:nvPicPr>
+          <p:cNvPr id="8" name="Picture 7"/>
+          <p:cNvPicPr>
+            <a:picLocks noChangeAspect="1"/>
+          </p:cNvPicPr>
+          <p:nvPr/>
+        </p:nvPicPr>
+        <p:blipFill>
+          <a:blip r:embed="rId3">
+            <a:extLst>
+              <a:ext uri="{28A0092B-C50C-407E-A947-70E740481C1C}">
+                <a14:useLocalDpi xmlns:a14="http://schemas.microsoft.com/office/drawing/2010/main" val="0"/>
+              </a:ext>
+            </a:extLst>
+          </a:blip>
+          <a:stretch>
+            <a:fillRect/>
+          </a:stretch>
+        </p:blipFill>
+        <p:spPr>
+          <a:xfrm>
+            <a:off x="4092117" y="1885950"/>
+            <a:ext cx="5042357" cy="3810000"/>
           </a:xfrm>
           <a:prstGeom prst="rect">
             <a:avLst/>
@@ -9869,7 +9871,7 @@
     </p:spTree>
     <p:extLst>
       <p:ext uri="{BB962C8B-B14F-4D97-AF65-F5344CB8AC3E}">
-        <p14:creationId xmlns:p14="http://schemas.microsoft.com/office/powerpoint/2010/main" val="874812224"/>
+        <p14:creationId xmlns:p14="http://schemas.microsoft.com/office/powerpoint/2010/main" val="3436191451"/>
       </p:ext>
     </p:extLst>
   </p:cSld>
@@ -9911,8 +9913,8 @@
         </p:nvSpPr>
         <p:spPr>
           <a:xfrm>
-            <a:off x="76200" y="179427"/>
-            <a:ext cx="2827697" cy="646331"/>
+            <a:off x="152399" y="104685"/>
+            <a:ext cx="1969193" cy="369332"/>
           </a:xfrm>
           <a:prstGeom prst="rect">
             <a:avLst/>
@@ -9930,30 +9932,7 @@
               <a:buChar char="q"/>
             </a:pPr>
             <a:r>
-              <a:rPr lang="en-US" dirty="0">
-                <a:solidFill>
-                  <a:srgbClr val="7030A0"/>
-                </a:solidFill>
-              </a:rPr>
-              <a:t>Interrupt</a:t>
-            </a:r>
-            <a:endParaRPr lang="en-US" dirty="0" smtClean="0">
-              <a:solidFill>
-                <a:srgbClr val="7030A0"/>
-              </a:solidFill>
-            </a:endParaRPr>
-          </a:p>
-          <a:p>
-            <a:pPr marL="742950" lvl="1" indent="-285750">
-              <a:buFont typeface="Wingdings" pitchFamily="2" charset="2"/>
-              <a:buChar char="q"/>
-            </a:pPr>
-            <a:r>
-              <a:rPr lang="en-US" dirty="0"/>
-              <a:t> </a:t>
-            </a:r>
-            <a:r>
-              <a:rPr lang="en-US" dirty="0">
+              <a:rPr lang="en-US" dirty="0" err="1">
                 <a:solidFill>
                   <a:schemeClr val="tx2">
                     <a:lumMod val="60000"/>
@@ -9961,18 +9940,7 @@
                   </a:schemeClr>
                 </a:solidFill>
               </a:rPr>
-              <a:t>__interrupt() </a:t>
-            </a:r>
-            <a:r>
-              <a:rPr lang="en-US" dirty="0" err="1">
-                <a:solidFill>
-                  <a:schemeClr val="tx2">
-                    <a:lumMod val="60000"/>
-                    <a:lumOff val="40000"/>
-                  </a:schemeClr>
-                </a:solidFill>
-              </a:rPr>
-              <a:t>myISR</a:t>
+              <a:t>Scheduler_Start</a:t>
             </a:r>
             <a:endParaRPr lang="en-US" dirty="0">
               <a:solidFill>
@@ -10007,8 +9975,8 @@
         </p:blipFill>
         <p:spPr>
           <a:xfrm>
-            <a:off x="1981200" y="914400"/>
-            <a:ext cx="4648200" cy="5715000"/>
+            <a:off x="1143000" y="866775"/>
+            <a:ext cx="5791200" cy="4876800"/>
           </a:xfrm>
           <a:prstGeom prst="rect">
             <a:avLst/>
@@ -10018,7 +9986,7 @@
     </p:spTree>
     <p:extLst>
       <p:ext uri="{BB962C8B-B14F-4D97-AF65-F5344CB8AC3E}">
-        <p14:creationId xmlns:p14="http://schemas.microsoft.com/office/powerpoint/2010/main" val="52297288"/>
+        <p14:creationId xmlns:p14="http://schemas.microsoft.com/office/powerpoint/2010/main" val="874812224"/>
       </p:ext>
     </p:extLst>
   </p:cSld>
@@ -10054,6 +10022,155 @@
       </p:grpSpPr>
       <p:sp>
         <p:nvSpPr>
+          <p:cNvPr id="4" name="TextBox 3"/>
+          <p:cNvSpPr txBox="1"/>
+          <p:nvPr/>
+        </p:nvSpPr>
+        <p:spPr>
+          <a:xfrm>
+            <a:off x="76200" y="179427"/>
+            <a:ext cx="2827697" cy="646331"/>
+          </a:xfrm>
+          <a:prstGeom prst="rect">
+            <a:avLst/>
+          </a:prstGeom>
+          <a:noFill/>
+        </p:spPr>
+        <p:txBody>
+          <a:bodyPr wrap="none" rtlCol="0">
+            <a:spAutoFit/>
+          </a:bodyPr>
+          <a:lstStyle/>
+          <a:p>
+            <a:pPr marL="285750" indent="-285750">
+              <a:buFont typeface="Wingdings" pitchFamily="2" charset="2"/>
+              <a:buChar char="q"/>
+            </a:pPr>
+            <a:r>
+              <a:rPr lang="en-US" dirty="0">
+                <a:solidFill>
+                  <a:srgbClr val="7030A0"/>
+                </a:solidFill>
+              </a:rPr>
+              <a:t>Interrupt</a:t>
+            </a:r>
+            <a:endParaRPr lang="en-US" dirty="0" smtClean="0">
+              <a:solidFill>
+                <a:srgbClr val="7030A0"/>
+              </a:solidFill>
+            </a:endParaRPr>
+          </a:p>
+          <a:p>
+            <a:pPr marL="742950" lvl="1" indent="-285750">
+              <a:buFont typeface="Wingdings" pitchFamily="2" charset="2"/>
+              <a:buChar char="q"/>
+            </a:pPr>
+            <a:r>
+              <a:rPr lang="en-US" dirty="0"/>
+              <a:t> </a:t>
+            </a:r>
+            <a:r>
+              <a:rPr lang="en-US" dirty="0">
+                <a:solidFill>
+                  <a:schemeClr val="tx2">
+                    <a:lumMod val="60000"/>
+                    <a:lumOff val="40000"/>
+                  </a:schemeClr>
+                </a:solidFill>
+              </a:rPr>
+              <a:t>__interrupt() </a:t>
+            </a:r>
+            <a:r>
+              <a:rPr lang="en-US" dirty="0" err="1">
+                <a:solidFill>
+                  <a:schemeClr val="tx2">
+                    <a:lumMod val="60000"/>
+                    <a:lumOff val="40000"/>
+                  </a:schemeClr>
+                </a:solidFill>
+              </a:rPr>
+              <a:t>myISR</a:t>
+            </a:r>
+            <a:endParaRPr lang="en-US" dirty="0">
+              <a:solidFill>
+                <a:schemeClr val="tx2">
+                  <a:lumMod val="60000"/>
+                  <a:lumOff val="40000"/>
+                </a:schemeClr>
+              </a:solidFill>
+            </a:endParaRPr>
+          </a:p>
+        </p:txBody>
+      </p:sp>
+      <p:pic>
+        <p:nvPicPr>
+          <p:cNvPr id="5" name="Picture 4"/>
+          <p:cNvPicPr>
+            <a:picLocks noChangeAspect="1"/>
+          </p:cNvPicPr>
+          <p:nvPr/>
+        </p:nvPicPr>
+        <p:blipFill>
+          <a:blip r:embed="rId2">
+            <a:extLst>
+              <a:ext uri="{28A0092B-C50C-407E-A947-70E740481C1C}">
+                <a14:useLocalDpi xmlns:a14="http://schemas.microsoft.com/office/drawing/2010/main" val="0"/>
+              </a:ext>
+            </a:extLst>
+          </a:blip>
+          <a:stretch>
+            <a:fillRect/>
+          </a:stretch>
+        </p:blipFill>
+        <p:spPr>
+          <a:xfrm>
+            <a:off x="1981200" y="914400"/>
+            <a:ext cx="4648200" cy="5715000"/>
+          </a:xfrm>
+          <a:prstGeom prst="rect">
+            <a:avLst/>
+          </a:prstGeom>
+        </p:spPr>
+      </p:pic>
+    </p:spTree>
+    <p:extLst>
+      <p:ext uri="{BB962C8B-B14F-4D97-AF65-F5344CB8AC3E}">
+        <p14:creationId xmlns:p14="http://schemas.microsoft.com/office/powerpoint/2010/main" val="52297288"/>
+      </p:ext>
+    </p:extLst>
+  </p:cSld>
+  <p:clrMapOvr>
+    <a:masterClrMapping/>
+  </p:clrMapOvr>
+  <p:timing>
+    <p:tnLst>
+      <p:par>
+        <p:cTn id="1" dur="indefinite" restart="never" nodeType="tmRoot"/>
+      </p:par>
+    </p:tnLst>
+  </p:timing>
+</p:sld>
+</file>
+
+<file path=ppt/slides/slide24.xml><?xml version="1.0" encoding="utf-8"?>
+<p:sld xmlns:a="http://schemas.openxmlformats.org/drawingml/2006/main" xmlns:r="http://schemas.openxmlformats.org/officeDocument/2006/relationships" xmlns:p="http://schemas.openxmlformats.org/presentationml/2006/main">
+  <p:cSld>
+    <p:spTree>
+      <p:nvGrpSpPr>
+        <p:cNvPr id="1" name=""/>
+        <p:cNvGrpSpPr/>
+        <p:nvPr/>
+      </p:nvGrpSpPr>
+      <p:grpSpPr>
+        <a:xfrm>
+          <a:off x="0" y="0"/>
+          <a:ext cx="0" cy="0"/>
+          <a:chOff x="0" y="0"/>
+          <a:chExt cx="0" cy="0"/>
+        </a:xfrm>
+      </p:grpSpPr>
+      <p:sp>
+        <p:nvSpPr>
           <p:cNvPr id="5" name="TextBox 4"/>
           <p:cNvSpPr txBox="1"/>
           <p:nvPr/>
@@ -10289,7 +10406,7 @@
 </p:sld>
 </file>
 
-<file path=ppt/slides/slide24.xml><?xml version="1.0" encoding="utf-8"?>
+<file path=ppt/slides/slide25.xml><?xml version="1.0" encoding="utf-8"?>
 <p:sld xmlns:a="http://schemas.openxmlformats.org/drawingml/2006/main" xmlns:r="http://schemas.openxmlformats.org/officeDocument/2006/relationships" xmlns:p="http://schemas.openxmlformats.org/presentationml/2006/main">
   <p:cSld>
     <p:spTree>
@@ -13253,11 +13370,7 @@
           <a:p>
             <a:r>
               <a:rPr lang="en-US" dirty="0" smtClean="0"/>
-              <a:t>ModeManager </a:t>
-            </a:r>
-            <a:r>
-              <a:rPr lang="en-US" dirty="0" smtClean="0"/>
-              <a:t>Task @500ms</a:t>
+              <a:t>ModeManager Task @500ms</a:t>
             </a:r>
             <a:endParaRPr lang="en-US" dirty="0"/>
           </a:p>
@@ -14634,7 +14747,7 @@
                   </a:schemeClr>
                 </a:solidFill>
               </a:rPr>
-              <a:t>ADC_Conv_MainFunction</a:t>
+              <a:t>ADC_Get_Value</a:t>
             </a:r>
             <a:endParaRPr lang="en-US" dirty="0" smtClean="0">
               <a:solidFill>
@@ -14653,7 +14766,7 @@
       </p:sp>
       <p:pic>
         <p:nvPicPr>
-          <p:cNvPr id="5" name="Picture 4"/>
+          <p:cNvPr id="2" name="Picture 1"/>
           <p:cNvPicPr>
             <a:picLocks noChangeAspect="1"/>
           </p:cNvPicPr>
@@ -14673,90 +14786,8 @@
         </p:blipFill>
         <p:spPr>
           <a:xfrm>
-            <a:off x="19050" y="457200"/>
-            <a:ext cx="4019550" cy="6096000"/>
-          </a:xfrm>
-          <a:prstGeom prst="rect">
-            <a:avLst/>
-          </a:prstGeom>
-        </p:spPr>
-      </p:pic>
-      <p:sp>
-        <p:nvSpPr>
-          <p:cNvPr id="6" name="TextBox 5"/>
-          <p:cNvSpPr txBox="1"/>
-          <p:nvPr/>
-        </p:nvSpPr>
-        <p:spPr>
-          <a:xfrm>
-            <a:off x="4953000" y="67358"/>
-            <a:ext cx="3657600" cy="646331"/>
-          </a:xfrm>
-          <a:prstGeom prst="rect">
-            <a:avLst/>
-          </a:prstGeom>
-          <a:noFill/>
-        </p:spPr>
-        <p:txBody>
-          <a:bodyPr wrap="square" rtlCol="0">
-            <a:spAutoFit/>
-          </a:bodyPr>
-          <a:lstStyle/>
-          <a:p>
-            <a:pPr marL="742950" lvl="1" indent="-285750">
-              <a:buFont typeface="Wingdings" pitchFamily="2" charset="2"/>
-              <a:buChar char="q"/>
-            </a:pPr>
-            <a:r>
-              <a:rPr lang="en-US" dirty="0" err="1">
-                <a:solidFill>
-                  <a:schemeClr val="tx2">
-                    <a:lumMod val="60000"/>
-                    <a:lumOff val="40000"/>
-                  </a:schemeClr>
-                </a:solidFill>
-              </a:rPr>
-              <a:t>ADC_Value_Ready_CallBack</a:t>
-            </a:r>
-            <a:endParaRPr lang="en-US" dirty="0" smtClean="0">
-              <a:solidFill>
-                <a:schemeClr val="tx2">
-                  <a:lumMod val="60000"/>
-                  <a:lumOff val="40000"/>
-                </a:schemeClr>
-              </a:solidFill>
-            </a:endParaRPr>
-          </a:p>
-          <a:p>
-            <a:pPr lvl="1"/>
-            <a:endParaRPr lang="en-US" dirty="0"/>
-          </a:p>
-        </p:txBody>
-      </p:sp>
-      <p:pic>
-        <p:nvPicPr>
-          <p:cNvPr id="7" name="Picture 6"/>
-          <p:cNvPicPr>
-            <a:picLocks noChangeAspect="1"/>
-          </p:cNvPicPr>
-          <p:nvPr/>
-        </p:nvPicPr>
-        <p:blipFill>
-          <a:blip r:embed="rId3">
-            <a:extLst>
-              <a:ext uri="{28A0092B-C50C-407E-A947-70E740481C1C}">
-                <a14:useLocalDpi xmlns:a14="http://schemas.microsoft.com/office/drawing/2010/main" val="0"/>
-              </a:ext>
-            </a:extLst>
-          </a:blip>
-          <a:stretch>
-            <a:fillRect/>
-          </a:stretch>
-        </p:blipFill>
-        <p:spPr>
-          <a:xfrm>
-            <a:off x="5638800" y="704164"/>
-            <a:ext cx="2286000" cy="3886200"/>
+            <a:off x="152400" y="765841"/>
+            <a:ext cx="3580952" cy="4581993"/>
           </a:xfrm>
           <a:prstGeom prst="rect">
             <a:avLst/>

</xml_diff>